<commit_message>
Add first topic to presentation, add code samples for first topic
</commit_message>
<xml_diff>
--- a/docs/Introduction to Docker.pptx
+++ b/docs/Introduction to Docker.pptx
@@ -5,10 +5,10 @@
     <p:sldMasterId id="2147483648" r:id="rId1"/>
   </p:sldMasterIdLst>
   <p:notesMasterIdLst>
-    <p:notesMasterId r:id="rId19"/>
+    <p:notesMasterId r:id="rId27"/>
   </p:notesMasterIdLst>
   <p:handoutMasterIdLst>
-    <p:handoutMasterId r:id="rId20"/>
+    <p:handoutMasterId r:id="rId28"/>
   </p:handoutMasterIdLst>
   <p:sldIdLst>
     <p:sldId id="279" r:id="rId2"/>
@@ -16,47 +16,62 @@
     <p:sldId id="676" r:id="rId4"/>
     <p:sldId id="687" r:id="rId5"/>
     <p:sldId id="708" r:id="rId6"/>
-    <p:sldId id="688" r:id="rId7"/>
-    <p:sldId id="709" r:id="rId8"/>
-    <p:sldId id="689" r:id="rId9"/>
-    <p:sldId id="710" r:id="rId10"/>
-    <p:sldId id="690" r:id="rId11"/>
-    <p:sldId id="711" r:id="rId12"/>
-    <p:sldId id="691" r:id="rId13"/>
-    <p:sldId id="712" r:id="rId14"/>
-    <p:sldId id="692" r:id="rId15"/>
-    <p:sldId id="713" r:id="rId16"/>
-    <p:sldId id="321" r:id="rId17"/>
-    <p:sldId id="320" r:id="rId18"/>
+    <p:sldId id="718" r:id="rId7"/>
+    <p:sldId id="719" r:id="rId8"/>
+    <p:sldId id="716" r:id="rId9"/>
+    <p:sldId id="717" r:id="rId10"/>
+    <p:sldId id="720" r:id="rId11"/>
+    <p:sldId id="721" r:id="rId12"/>
+    <p:sldId id="722" r:id="rId13"/>
+    <p:sldId id="723" r:id="rId14"/>
+    <p:sldId id="688" r:id="rId15"/>
+    <p:sldId id="709" r:id="rId16"/>
+    <p:sldId id="689" r:id="rId17"/>
+    <p:sldId id="710" r:id="rId18"/>
+    <p:sldId id="690" r:id="rId19"/>
+    <p:sldId id="711" r:id="rId20"/>
+    <p:sldId id="691" r:id="rId21"/>
+    <p:sldId id="712" r:id="rId22"/>
+    <p:sldId id="692" r:id="rId23"/>
+    <p:sldId id="713" r:id="rId24"/>
+    <p:sldId id="321" r:id="rId25"/>
+    <p:sldId id="320" r:id="rId26"/>
   </p:sldIdLst>
   <p:sldSz cx="12192000" cy="6858000"/>
   <p:notesSz cx="6858000" cy="9144000"/>
   <p:embeddedFontLst>
     <p:embeddedFont>
       <p:font typeface="Calibri" panose="020F0502020204030204" pitchFamily="34" charset="0"/>
-      <p:regular r:id="rId21"/>
-      <p:bold r:id="rId22"/>
-      <p:italic r:id="rId23"/>
-      <p:boldItalic r:id="rId24"/>
+      <p:regular r:id="rId29"/>
+      <p:bold r:id="rId30"/>
+      <p:italic r:id="rId31"/>
+      <p:boldItalic r:id="rId32"/>
+    </p:embeddedFont>
+    <p:embeddedFont>
+      <p:font typeface="Consolas" panose="020B0609020204030204" pitchFamily="49" charset="0"/>
+      <p:regular r:id="rId33"/>
+      <p:bold r:id="rId34"/>
+      <p:italic r:id="rId35"/>
+      <p:boldItalic r:id="rId36"/>
     </p:embeddedFont>
     <p:embeddedFont>
       <p:font typeface="Open Sans" panose="020B0606030504020204" pitchFamily="34" charset="0"/>
-      <p:regular r:id="rId25"/>
-      <p:bold r:id="rId26"/>
-      <p:italic r:id="rId27"/>
-      <p:boldItalic r:id="rId28"/>
+      <p:regular r:id="rId37"/>
+      <p:bold r:id="rId38"/>
+      <p:italic r:id="rId39"/>
+      <p:boldItalic r:id="rId40"/>
     </p:embeddedFont>
     <p:embeddedFont>
       <p:font typeface="Open Sans Light" panose="020B0306030504020204" pitchFamily="34" charset="0"/>
-      <p:regular r:id="rId29"/>
-      <p:italic r:id="rId30"/>
+      <p:regular r:id="rId41"/>
+      <p:italic r:id="rId42"/>
     </p:embeddedFont>
     <p:embeddedFont>
       <p:font typeface="Open Sans Semibold" panose="020B0706030804020204" pitchFamily="34" charset="0"/>
-      <p:regular r:id="rId31"/>
-      <p:bold r:id="rId32"/>
-      <p:italic r:id="rId33"/>
-      <p:boldItalic r:id="rId34"/>
+      <p:regular r:id="rId43"/>
+      <p:bold r:id="rId44"/>
+      <p:italic r:id="rId45"/>
+      <p:boldItalic r:id="rId46"/>
     </p:embeddedFont>
   </p:embeddedFontLst>
   <p:defaultTextStyle>
@@ -172,6 +187,14 @@
           <p14:sldIdLst>
             <p14:sldId id="687"/>
             <p14:sldId id="708"/>
+            <p14:sldId id="718"/>
+            <p14:sldId id="719"/>
+            <p14:sldId id="716"/>
+            <p14:sldId id="717"/>
+            <p14:sldId id="720"/>
+            <p14:sldId id="721"/>
+            <p14:sldId id="722"/>
+            <p14:sldId id="723"/>
           </p14:sldIdLst>
         </p14:section>
         <p14:section name="Creating Docker images" id="{E64072F2-5BC7-4931-9C5C-8253A43906AF}">
@@ -1053,6 +1076,779 @@
     <p:extLst>
       <p:ext uri="{BB962C8B-B14F-4D97-AF65-F5344CB8AC3E}">
         <p14:creationId xmlns:p14="http://schemas.microsoft.com/office/powerpoint/2010/main" val="1174825998"/>
+      </p:ext>
+    </p:extLst>
+  </p:cSld>
+  <p:clrMapOvr>
+    <a:masterClrMapping/>
+  </p:clrMapOvr>
+</p:notes>
+</file>
+
+<file path=ppt/notesSlides/notesSlide10.xml><?xml version="1.0" encoding="utf-8"?>
+<p:notes xmlns:a="http://schemas.openxmlformats.org/drawingml/2006/main" xmlns:r="http://schemas.openxmlformats.org/officeDocument/2006/relationships" xmlns:p="http://schemas.openxmlformats.org/presentationml/2006/main">
+  <p:cSld>
+    <p:spTree>
+      <p:nvGrpSpPr>
+        <p:cNvPr id="1" name=""/>
+        <p:cNvGrpSpPr/>
+        <p:nvPr/>
+      </p:nvGrpSpPr>
+      <p:grpSpPr>
+        <a:xfrm>
+          <a:off x="0" y="0"/>
+          <a:ext cx="0" cy="0"/>
+          <a:chOff x="0" y="0"/>
+          <a:chExt cx="0" cy="0"/>
+        </a:xfrm>
+      </p:grpSpPr>
+      <p:sp>
+        <p:nvSpPr>
+          <p:cNvPr id="2" name="Slide Image Placeholder 1"/>
+          <p:cNvSpPr>
+            <a:spLocks noGrp="1" noRot="1" noChangeAspect="1"/>
+          </p:cNvSpPr>
+          <p:nvPr>
+            <p:ph type="sldImg"/>
+          </p:nvPr>
+        </p:nvSpPr>
+        <p:spPr/>
+      </p:sp>
+      <p:sp>
+        <p:nvSpPr>
+          <p:cNvPr id="3" name="Notes Placeholder 2"/>
+          <p:cNvSpPr>
+            <a:spLocks noGrp="1"/>
+          </p:cNvSpPr>
+          <p:nvPr>
+            <p:ph type="body" idx="1"/>
+          </p:nvPr>
+        </p:nvSpPr>
+        <p:spPr/>
+        <p:txBody>
+          <a:bodyPr/>
+          <a:lstStyle/>
+          <a:p>
+            <a:r>
+              <a:rPr lang="en-US" dirty="0"/>
+              <a:t>Sample commands can be found in </a:t>
+            </a:r>
+            <a:r>
+              <a:rPr lang="en-US" dirty="0" err="1"/>
+              <a:t>src</a:t>
+            </a:r>
+            <a:r>
+              <a:rPr lang="en-US" dirty="0"/>
+              <a:t>/01_Introducing_Docker</a:t>
+            </a:r>
+          </a:p>
+          <a:p>
+            <a:r>
+              <a:rPr lang="en-US" dirty="0"/>
+              <a:t>When connecting to SQL Server using SQL Server Management Studio, specify “localhost,14330” as server name</a:t>
+            </a:r>
+          </a:p>
+        </p:txBody>
+      </p:sp>
+      <p:sp>
+        <p:nvSpPr>
+          <p:cNvPr id="4" name="Slide Number Placeholder 3"/>
+          <p:cNvSpPr>
+            <a:spLocks noGrp="1"/>
+          </p:cNvSpPr>
+          <p:nvPr>
+            <p:ph type="sldNum" sz="quarter" idx="5"/>
+          </p:nvPr>
+        </p:nvSpPr>
+        <p:spPr/>
+        <p:txBody>
+          <a:bodyPr/>
+          <a:lstStyle/>
+          <a:p>
+            <a:fld id="{AA4E6B44-8A2D-409F-997F-4C23C1BB012E}" type="slidenum">
+              <a:rPr lang="en-US" smtClean="0"/>
+              <a:t>13</a:t>
+            </a:fld>
+            <a:endParaRPr lang="en-US"/>
+          </a:p>
+        </p:txBody>
+      </p:sp>
+    </p:spTree>
+    <p:extLst>
+      <p:ext uri="{BB962C8B-B14F-4D97-AF65-F5344CB8AC3E}">
+        <p14:creationId xmlns:p14="http://schemas.microsoft.com/office/powerpoint/2010/main" val="847710781"/>
+      </p:ext>
+    </p:extLst>
+  </p:cSld>
+  <p:clrMapOvr>
+    <a:masterClrMapping/>
+  </p:clrMapOvr>
+</p:notes>
+</file>
+
+<file path=ppt/notesSlides/notesSlide2.xml><?xml version="1.0" encoding="utf-8"?>
+<p:notes xmlns:a="http://schemas.openxmlformats.org/drawingml/2006/main" xmlns:r="http://schemas.openxmlformats.org/officeDocument/2006/relationships" xmlns:p="http://schemas.openxmlformats.org/presentationml/2006/main">
+  <p:cSld>
+    <p:spTree>
+      <p:nvGrpSpPr>
+        <p:cNvPr id="1" name=""/>
+        <p:cNvGrpSpPr/>
+        <p:nvPr/>
+      </p:nvGrpSpPr>
+      <p:grpSpPr>
+        <a:xfrm>
+          <a:off x="0" y="0"/>
+          <a:ext cx="0" cy="0"/>
+          <a:chOff x="0" y="0"/>
+          <a:chExt cx="0" cy="0"/>
+        </a:xfrm>
+      </p:grpSpPr>
+      <p:sp>
+        <p:nvSpPr>
+          <p:cNvPr id="2" name="Slide Image Placeholder 1"/>
+          <p:cNvSpPr>
+            <a:spLocks noGrp="1" noRot="1" noChangeAspect="1"/>
+          </p:cNvSpPr>
+          <p:nvPr>
+            <p:ph type="sldImg"/>
+          </p:nvPr>
+        </p:nvSpPr>
+        <p:spPr/>
+      </p:sp>
+      <p:sp>
+        <p:nvSpPr>
+          <p:cNvPr id="3" name="Notes Placeholder 2"/>
+          <p:cNvSpPr>
+            <a:spLocks noGrp="1"/>
+          </p:cNvSpPr>
+          <p:nvPr>
+            <p:ph type="body" idx="1"/>
+          </p:nvPr>
+        </p:nvSpPr>
+        <p:spPr/>
+        <p:txBody>
+          <a:bodyPr/>
+          <a:lstStyle/>
+          <a:p>
+            <a:endParaRPr lang="en-US" dirty="0"/>
+          </a:p>
+        </p:txBody>
+      </p:sp>
+      <p:sp>
+        <p:nvSpPr>
+          <p:cNvPr id="4" name="Slide Number Placeholder 3"/>
+          <p:cNvSpPr>
+            <a:spLocks noGrp="1"/>
+          </p:cNvSpPr>
+          <p:nvPr>
+            <p:ph type="sldNum" sz="quarter" idx="5"/>
+          </p:nvPr>
+        </p:nvSpPr>
+        <p:spPr/>
+        <p:txBody>
+          <a:bodyPr/>
+          <a:lstStyle/>
+          <a:p>
+            <a:fld id="{AA4E6B44-8A2D-409F-997F-4C23C1BB012E}" type="slidenum">
+              <a:rPr lang="en-US" smtClean="0"/>
+              <a:t>5</a:t>
+            </a:fld>
+            <a:endParaRPr lang="en-US"/>
+          </a:p>
+        </p:txBody>
+      </p:sp>
+    </p:spTree>
+    <p:extLst>
+      <p:ext uri="{BB962C8B-B14F-4D97-AF65-F5344CB8AC3E}">
+        <p14:creationId xmlns:p14="http://schemas.microsoft.com/office/powerpoint/2010/main" val="3278737274"/>
+      </p:ext>
+    </p:extLst>
+  </p:cSld>
+  <p:clrMapOvr>
+    <a:masterClrMapping/>
+  </p:clrMapOvr>
+</p:notes>
+</file>
+
+<file path=ppt/notesSlides/notesSlide3.xml><?xml version="1.0" encoding="utf-8"?>
+<p:notes xmlns:a="http://schemas.openxmlformats.org/drawingml/2006/main" xmlns:r="http://schemas.openxmlformats.org/officeDocument/2006/relationships" xmlns:p="http://schemas.openxmlformats.org/presentationml/2006/main">
+  <p:cSld>
+    <p:spTree>
+      <p:nvGrpSpPr>
+        <p:cNvPr id="1" name=""/>
+        <p:cNvGrpSpPr/>
+        <p:nvPr/>
+      </p:nvGrpSpPr>
+      <p:grpSpPr>
+        <a:xfrm>
+          <a:off x="0" y="0"/>
+          <a:ext cx="0" cy="0"/>
+          <a:chOff x="0" y="0"/>
+          <a:chExt cx="0" cy="0"/>
+        </a:xfrm>
+      </p:grpSpPr>
+      <p:sp>
+        <p:nvSpPr>
+          <p:cNvPr id="2" name="Slide Image Placeholder 1"/>
+          <p:cNvSpPr>
+            <a:spLocks noGrp="1" noRot="1" noChangeAspect="1"/>
+          </p:cNvSpPr>
+          <p:nvPr>
+            <p:ph type="sldImg"/>
+          </p:nvPr>
+        </p:nvSpPr>
+        <p:spPr/>
+      </p:sp>
+      <p:sp>
+        <p:nvSpPr>
+          <p:cNvPr id="3" name="Notes Placeholder 2"/>
+          <p:cNvSpPr>
+            <a:spLocks noGrp="1"/>
+          </p:cNvSpPr>
+          <p:nvPr>
+            <p:ph type="body" idx="1"/>
+          </p:nvPr>
+        </p:nvSpPr>
+        <p:spPr/>
+        <p:txBody>
+          <a:bodyPr/>
+          <a:lstStyle/>
+          <a:p>
+            <a:endParaRPr lang="en-US" dirty="0"/>
+          </a:p>
+        </p:txBody>
+      </p:sp>
+      <p:sp>
+        <p:nvSpPr>
+          <p:cNvPr id="4" name="Slide Number Placeholder 3"/>
+          <p:cNvSpPr>
+            <a:spLocks noGrp="1"/>
+          </p:cNvSpPr>
+          <p:nvPr>
+            <p:ph type="sldNum" sz="quarter" idx="5"/>
+          </p:nvPr>
+        </p:nvSpPr>
+        <p:spPr/>
+        <p:txBody>
+          <a:bodyPr/>
+          <a:lstStyle/>
+          <a:p>
+            <a:fld id="{AA4E6B44-8A2D-409F-997F-4C23C1BB012E}" type="slidenum">
+              <a:rPr lang="en-US" smtClean="0"/>
+              <a:t>6</a:t>
+            </a:fld>
+            <a:endParaRPr lang="en-US"/>
+          </a:p>
+        </p:txBody>
+      </p:sp>
+    </p:spTree>
+    <p:extLst>
+      <p:ext uri="{BB962C8B-B14F-4D97-AF65-F5344CB8AC3E}">
+        <p14:creationId xmlns:p14="http://schemas.microsoft.com/office/powerpoint/2010/main" val="2489601663"/>
+      </p:ext>
+    </p:extLst>
+  </p:cSld>
+  <p:clrMapOvr>
+    <a:masterClrMapping/>
+  </p:clrMapOvr>
+</p:notes>
+</file>
+
+<file path=ppt/notesSlides/notesSlide4.xml><?xml version="1.0" encoding="utf-8"?>
+<p:notes xmlns:a="http://schemas.openxmlformats.org/drawingml/2006/main" xmlns:r="http://schemas.openxmlformats.org/officeDocument/2006/relationships" xmlns:p="http://schemas.openxmlformats.org/presentationml/2006/main">
+  <p:cSld>
+    <p:spTree>
+      <p:nvGrpSpPr>
+        <p:cNvPr id="1" name=""/>
+        <p:cNvGrpSpPr/>
+        <p:nvPr/>
+      </p:nvGrpSpPr>
+      <p:grpSpPr>
+        <a:xfrm>
+          <a:off x="0" y="0"/>
+          <a:ext cx="0" cy="0"/>
+          <a:chOff x="0" y="0"/>
+          <a:chExt cx="0" cy="0"/>
+        </a:xfrm>
+      </p:grpSpPr>
+      <p:sp>
+        <p:nvSpPr>
+          <p:cNvPr id="2" name="Slide Image Placeholder 1"/>
+          <p:cNvSpPr>
+            <a:spLocks noGrp="1" noRot="1" noChangeAspect="1"/>
+          </p:cNvSpPr>
+          <p:nvPr>
+            <p:ph type="sldImg"/>
+          </p:nvPr>
+        </p:nvSpPr>
+        <p:spPr/>
+      </p:sp>
+      <p:sp>
+        <p:nvSpPr>
+          <p:cNvPr id="3" name="Notes Placeholder 2"/>
+          <p:cNvSpPr>
+            <a:spLocks noGrp="1"/>
+          </p:cNvSpPr>
+          <p:nvPr>
+            <p:ph type="body" idx="1"/>
+          </p:nvPr>
+        </p:nvSpPr>
+        <p:spPr/>
+        <p:txBody>
+          <a:bodyPr/>
+          <a:lstStyle/>
+          <a:p>
+            <a:endParaRPr lang="en-US" dirty="0"/>
+          </a:p>
+        </p:txBody>
+      </p:sp>
+      <p:sp>
+        <p:nvSpPr>
+          <p:cNvPr id="4" name="Slide Number Placeholder 3"/>
+          <p:cNvSpPr>
+            <a:spLocks noGrp="1"/>
+          </p:cNvSpPr>
+          <p:nvPr>
+            <p:ph type="sldNum" sz="quarter" idx="5"/>
+          </p:nvPr>
+        </p:nvSpPr>
+        <p:spPr/>
+        <p:txBody>
+          <a:bodyPr/>
+          <a:lstStyle/>
+          <a:p>
+            <a:fld id="{AA4E6B44-8A2D-409F-997F-4C23C1BB012E}" type="slidenum">
+              <a:rPr lang="en-US" smtClean="0"/>
+              <a:t>7</a:t>
+            </a:fld>
+            <a:endParaRPr lang="en-US"/>
+          </a:p>
+        </p:txBody>
+      </p:sp>
+    </p:spTree>
+    <p:extLst>
+      <p:ext uri="{BB962C8B-B14F-4D97-AF65-F5344CB8AC3E}">
+        <p14:creationId xmlns:p14="http://schemas.microsoft.com/office/powerpoint/2010/main" val="196774734"/>
+      </p:ext>
+    </p:extLst>
+  </p:cSld>
+  <p:clrMapOvr>
+    <a:masterClrMapping/>
+  </p:clrMapOvr>
+</p:notes>
+</file>
+
+<file path=ppt/notesSlides/notesSlide5.xml><?xml version="1.0" encoding="utf-8"?>
+<p:notes xmlns:a="http://schemas.openxmlformats.org/drawingml/2006/main" xmlns:r="http://schemas.openxmlformats.org/officeDocument/2006/relationships" xmlns:p="http://schemas.openxmlformats.org/presentationml/2006/main">
+  <p:cSld>
+    <p:spTree>
+      <p:nvGrpSpPr>
+        <p:cNvPr id="1" name=""/>
+        <p:cNvGrpSpPr/>
+        <p:nvPr/>
+      </p:nvGrpSpPr>
+      <p:grpSpPr>
+        <a:xfrm>
+          <a:off x="0" y="0"/>
+          <a:ext cx="0" cy="0"/>
+          <a:chOff x="0" y="0"/>
+          <a:chExt cx="0" cy="0"/>
+        </a:xfrm>
+      </p:grpSpPr>
+      <p:sp>
+        <p:nvSpPr>
+          <p:cNvPr id="2" name="Slide Image Placeholder 1"/>
+          <p:cNvSpPr>
+            <a:spLocks noGrp="1" noRot="1" noChangeAspect="1"/>
+          </p:cNvSpPr>
+          <p:nvPr>
+            <p:ph type="sldImg"/>
+          </p:nvPr>
+        </p:nvSpPr>
+        <p:spPr/>
+      </p:sp>
+      <p:sp>
+        <p:nvSpPr>
+          <p:cNvPr id="3" name="Notes Placeholder 2"/>
+          <p:cNvSpPr>
+            <a:spLocks noGrp="1"/>
+          </p:cNvSpPr>
+          <p:nvPr>
+            <p:ph type="body" idx="1"/>
+          </p:nvPr>
+        </p:nvSpPr>
+        <p:spPr/>
+        <p:txBody>
+          <a:bodyPr/>
+          <a:lstStyle/>
+          <a:p>
+            <a:endParaRPr lang="en-US" dirty="0"/>
+          </a:p>
+        </p:txBody>
+      </p:sp>
+      <p:sp>
+        <p:nvSpPr>
+          <p:cNvPr id="4" name="Slide Number Placeholder 3"/>
+          <p:cNvSpPr>
+            <a:spLocks noGrp="1"/>
+          </p:cNvSpPr>
+          <p:nvPr>
+            <p:ph type="sldNum" sz="quarter" idx="5"/>
+          </p:nvPr>
+        </p:nvSpPr>
+        <p:spPr/>
+        <p:txBody>
+          <a:bodyPr/>
+          <a:lstStyle/>
+          <a:p>
+            <a:fld id="{AA4E6B44-8A2D-409F-997F-4C23C1BB012E}" type="slidenum">
+              <a:rPr lang="en-US" smtClean="0"/>
+              <a:t>8</a:t>
+            </a:fld>
+            <a:endParaRPr lang="en-US"/>
+          </a:p>
+        </p:txBody>
+      </p:sp>
+    </p:spTree>
+    <p:extLst>
+      <p:ext uri="{BB962C8B-B14F-4D97-AF65-F5344CB8AC3E}">
+        <p14:creationId xmlns:p14="http://schemas.microsoft.com/office/powerpoint/2010/main" val="606238274"/>
+      </p:ext>
+    </p:extLst>
+  </p:cSld>
+  <p:clrMapOvr>
+    <a:masterClrMapping/>
+  </p:clrMapOvr>
+</p:notes>
+</file>
+
+<file path=ppt/notesSlides/notesSlide6.xml><?xml version="1.0" encoding="utf-8"?>
+<p:notes xmlns:a="http://schemas.openxmlformats.org/drawingml/2006/main" xmlns:r="http://schemas.openxmlformats.org/officeDocument/2006/relationships" xmlns:p="http://schemas.openxmlformats.org/presentationml/2006/main">
+  <p:cSld>
+    <p:spTree>
+      <p:nvGrpSpPr>
+        <p:cNvPr id="1" name=""/>
+        <p:cNvGrpSpPr/>
+        <p:nvPr/>
+      </p:nvGrpSpPr>
+      <p:grpSpPr>
+        <a:xfrm>
+          <a:off x="0" y="0"/>
+          <a:ext cx="0" cy="0"/>
+          <a:chOff x="0" y="0"/>
+          <a:chExt cx="0" cy="0"/>
+        </a:xfrm>
+      </p:grpSpPr>
+      <p:sp>
+        <p:nvSpPr>
+          <p:cNvPr id="2" name="Slide Image Placeholder 1"/>
+          <p:cNvSpPr>
+            <a:spLocks noGrp="1" noRot="1" noChangeAspect="1"/>
+          </p:cNvSpPr>
+          <p:nvPr>
+            <p:ph type="sldImg"/>
+          </p:nvPr>
+        </p:nvSpPr>
+        <p:spPr/>
+      </p:sp>
+      <p:sp>
+        <p:nvSpPr>
+          <p:cNvPr id="3" name="Notes Placeholder 2"/>
+          <p:cNvSpPr>
+            <a:spLocks noGrp="1"/>
+          </p:cNvSpPr>
+          <p:nvPr>
+            <p:ph type="body" idx="1"/>
+          </p:nvPr>
+        </p:nvSpPr>
+        <p:spPr/>
+        <p:txBody>
+          <a:bodyPr/>
+          <a:lstStyle/>
+          <a:p>
+            <a:endParaRPr lang="en-US" dirty="0"/>
+          </a:p>
+        </p:txBody>
+      </p:sp>
+      <p:sp>
+        <p:nvSpPr>
+          <p:cNvPr id="4" name="Slide Number Placeholder 3"/>
+          <p:cNvSpPr>
+            <a:spLocks noGrp="1"/>
+          </p:cNvSpPr>
+          <p:nvPr>
+            <p:ph type="sldNum" sz="quarter" idx="5"/>
+          </p:nvPr>
+        </p:nvSpPr>
+        <p:spPr/>
+        <p:txBody>
+          <a:bodyPr/>
+          <a:lstStyle/>
+          <a:p>
+            <a:fld id="{AA4E6B44-8A2D-409F-997F-4C23C1BB012E}" type="slidenum">
+              <a:rPr lang="en-US" smtClean="0"/>
+              <a:t>9</a:t>
+            </a:fld>
+            <a:endParaRPr lang="en-US"/>
+          </a:p>
+        </p:txBody>
+      </p:sp>
+    </p:spTree>
+    <p:extLst>
+      <p:ext uri="{BB962C8B-B14F-4D97-AF65-F5344CB8AC3E}">
+        <p14:creationId xmlns:p14="http://schemas.microsoft.com/office/powerpoint/2010/main" val="1139229474"/>
+      </p:ext>
+    </p:extLst>
+  </p:cSld>
+  <p:clrMapOvr>
+    <a:masterClrMapping/>
+  </p:clrMapOvr>
+</p:notes>
+</file>
+
+<file path=ppt/notesSlides/notesSlide7.xml><?xml version="1.0" encoding="utf-8"?>
+<p:notes xmlns:a="http://schemas.openxmlformats.org/drawingml/2006/main" xmlns:r="http://schemas.openxmlformats.org/officeDocument/2006/relationships" xmlns:p="http://schemas.openxmlformats.org/presentationml/2006/main">
+  <p:cSld>
+    <p:spTree>
+      <p:nvGrpSpPr>
+        <p:cNvPr id="1" name=""/>
+        <p:cNvGrpSpPr/>
+        <p:nvPr/>
+      </p:nvGrpSpPr>
+      <p:grpSpPr>
+        <a:xfrm>
+          <a:off x="0" y="0"/>
+          <a:ext cx="0" cy="0"/>
+          <a:chOff x="0" y="0"/>
+          <a:chExt cx="0" cy="0"/>
+        </a:xfrm>
+      </p:grpSpPr>
+      <p:sp>
+        <p:nvSpPr>
+          <p:cNvPr id="2" name="Slide Image Placeholder 1"/>
+          <p:cNvSpPr>
+            <a:spLocks noGrp="1" noRot="1" noChangeAspect="1"/>
+          </p:cNvSpPr>
+          <p:nvPr>
+            <p:ph type="sldImg"/>
+          </p:nvPr>
+        </p:nvSpPr>
+        <p:spPr/>
+      </p:sp>
+      <p:sp>
+        <p:nvSpPr>
+          <p:cNvPr id="3" name="Notes Placeholder 2"/>
+          <p:cNvSpPr>
+            <a:spLocks noGrp="1"/>
+          </p:cNvSpPr>
+          <p:nvPr>
+            <p:ph type="body" idx="1"/>
+          </p:nvPr>
+        </p:nvSpPr>
+        <p:spPr/>
+        <p:txBody>
+          <a:bodyPr/>
+          <a:lstStyle/>
+          <a:p>
+            <a:endParaRPr lang="en-US" dirty="0"/>
+          </a:p>
+        </p:txBody>
+      </p:sp>
+      <p:sp>
+        <p:nvSpPr>
+          <p:cNvPr id="4" name="Slide Number Placeholder 3"/>
+          <p:cNvSpPr>
+            <a:spLocks noGrp="1"/>
+          </p:cNvSpPr>
+          <p:nvPr>
+            <p:ph type="sldNum" sz="quarter" idx="5"/>
+          </p:nvPr>
+        </p:nvSpPr>
+        <p:spPr/>
+        <p:txBody>
+          <a:bodyPr/>
+          <a:lstStyle/>
+          <a:p>
+            <a:fld id="{AA4E6B44-8A2D-409F-997F-4C23C1BB012E}" type="slidenum">
+              <a:rPr lang="en-US" smtClean="0"/>
+              <a:t>10</a:t>
+            </a:fld>
+            <a:endParaRPr lang="en-US"/>
+          </a:p>
+        </p:txBody>
+      </p:sp>
+    </p:spTree>
+    <p:extLst>
+      <p:ext uri="{BB962C8B-B14F-4D97-AF65-F5344CB8AC3E}">
+        <p14:creationId xmlns:p14="http://schemas.microsoft.com/office/powerpoint/2010/main" val="3711014895"/>
+      </p:ext>
+    </p:extLst>
+  </p:cSld>
+  <p:clrMapOvr>
+    <a:masterClrMapping/>
+  </p:clrMapOvr>
+</p:notes>
+</file>
+
+<file path=ppt/notesSlides/notesSlide8.xml><?xml version="1.0" encoding="utf-8"?>
+<p:notes xmlns:a="http://schemas.openxmlformats.org/drawingml/2006/main" xmlns:r="http://schemas.openxmlformats.org/officeDocument/2006/relationships" xmlns:p="http://schemas.openxmlformats.org/presentationml/2006/main">
+  <p:cSld>
+    <p:spTree>
+      <p:nvGrpSpPr>
+        <p:cNvPr id="1" name=""/>
+        <p:cNvGrpSpPr/>
+        <p:nvPr/>
+      </p:nvGrpSpPr>
+      <p:grpSpPr>
+        <a:xfrm>
+          <a:off x="0" y="0"/>
+          <a:ext cx="0" cy="0"/>
+          <a:chOff x="0" y="0"/>
+          <a:chExt cx="0" cy="0"/>
+        </a:xfrm>
+      </p:grpSpPr>
+      <p:sp>
+        <p:nvSpPr>
+          <p:cNvPr id="2" name="Slide Image Placeholder 1"/>
+          <p:cNvSpPr>
+            <a:spLocks noGrp="1" noRot="1" noChangeAspect="1"/>
+          </p:cNvSpPr>
+          <p:nvPr>
+            <p:ph type="sldImg"/>
+          </p:nvPr>
+        </p:nvSpPr>
+        <p:spPr/>
+      </p:sp>
+      <p:sp>
+        <p:nvSpPr>
+          <p:cNvPr id="3" name="Notes Placeholder 2"/>
+          <p:cNvSpPr>
+            <a:spLocks noGrp="1"/>
+          </p:cNvSpPr>
+          <p:nvPr>
+            <p:ph type="body" idx="1"/>
+          </p:nvPr>
+        </p:nvSpPr>
+        <p:spPr/>
+        <p:txBody>
+          <a:bodyPr/>
+          <a:lstStyle/>
+          <a:p>
+            <a:endParaRPr lang="en-US" dirty="0"/>
+          </a:p>
+        </p:txBody>
+      </p:sp>
+      <p:sp>
+        <p:nvSpPr>
+          <p:cNvPr id="4" name="Slide Number Placeholder 3"/>
+          <p:cNvSpPr>
+            <a:spLocks noGrp="1"/>
+          </p:cNvSpPr>
+          <p:nvPr>
+            <p:ph type="sldNum" sz="quarter" idx="5"/>
+          </p:nvPr>
+        </p:nvSpPr>
+        <p:spPr/>
+        <p:txBody>
+          <a:bodyPr/>
+          <a:lstStyle/>
+          <a:p>
+            <a:fld id="{AA4E6B44-8A2D-409F-997F-4C23C1BB012E}" type="slidenum">
+              <a:rPr lang="en-US" smtClean="0"/>
+              <a:t>11</a:t>
+            </a:fld>
+            <a:endParaRPr lang="en-US"/>
+          </a:p>
+        </p:txBody>
+      </p:sp>
+    </p:spTree>
+    <p:extLst>
+      <p:ext uri="{BB962C8B-B14F-4D97-AF65-F5344CB8AC3E}">
+        <p14:creationId xmlns:p14="http://schemas.microsoft.com/office/powerpoint/2010/main" val="3375070812"/>
+      </p:ext>
+    </p:extLst>
+  </p:cSld>
+  <p:clrMapOvr>
+    <a:masterClrMapping/>
+  </p:clrMapOvr>
+</p:notes>
+</file>
+
+<file path=ppt/notesSlides/notesSlide9.xml><?xml version="1.0" encoding="utf-8"?>
+<p:notes xmlns:a="http://schemas.openxmlformats.org/drawingml/2006/main" xmlns:r="http://schemas.openxmlformats.org/officeDocument/2006/relationships" xmlns:p="http://schemas.openxmlformats.org/presentationml/2006/main">
+  <p:cSld>
+    <p:spTree>
+      <p:nvGrpSpPr>
+        <p:cNvPr id="1" name=""/>
+        <p:cNvGrpSpPr/>
+        <p:nvPr/>
+      </p:nvGrpSpPr>
+      <p:grpSpPr>
+        <a:xfrm>
+          <a:off x="0" y="0"/>
+          <a:ext cx="0" cy="0"/>
+          <a:chOff x="0" y="0"/>
+          <a:chExt cx="0" cy="0"/>
+        </a:xfrm>
+      </p:grpSpPr>
+      <p:sp>
+        <p:nvSpPr>
+          <p:cNvPr id="2" name="Slide Image Placeholder 1"/>
+          <p:cNvSpPr>
+            <a:spLocks noGrp="1" noRot="1" noChangeAspect="1"/>
+          </p:cNvSpPr>
+          <p:nvPr>
+            <p:ph type="sldImg"/>
+          </p:nvPr>
+        </p:nvSpPr>
+        <p:spPr/>
+      </p:sp>
+      <p:sp>
+        <p:nvSpPr>
+          <p:cNvPr id="3" name="Notes Placeholder 2"/>
+          <p:cNvSpPr>
+            <a:spLocks noGrp="1"/>
+          </p:cNvSpPr>
+          <p:nvPr>
+            <p:ph type="body" idx="1"/>
+          </p:nvPr>
+        </p:nvSpPr>
+        <p:spPr/>
+        <p:txBody>
+          <a:bodyPr/>
+          <a:lstStyle/>
+          <a:p>
+            <a:endParaRPr lang="en-US" dirty="0"/>
+          </a:p>
+        </p:txBody>
+      </p:sp>
+      <p:sp>
+        <p:nvSpPr>
+          <p:cNvPr id="4" name="Slide Number Placeholder 3"/>
+          <p:cNvSpPr>
+            <a:spLocks noGrp="1"/>
+          </p:cNvSpPr>
+          <p:nvPr>
+            <p:ph type="sldNum" sz="quarter" idx="5"/>
+          </p:nvPr>
+        </p:nvSpPr>
+        <p:spPr/>
+        <p:txBody>
+          <a:bodyPr/>
+          <a:lstStyle/>
+          <a:p>
+            <a:fld id="{AA4E6B44-8A2D-409F-997F-4C23C1BB012E}" type="slidenum">
+              <a:rPr lang="en-US" smtClean="0"/>
+              <a:t>12</a:t>
+            </a:fld>
+            <a:endParaRPr lang="en-US"/>
+          </a:p>
+        </p:txBody>
+      </p:sp>
+    </p:spTree>
+    <p:extLst>
+      <p:ext uri="{BB962C8B-B14F-4D97-AF65-F5344CB8AC3E}">
+        <p14:creationId xmlns:p14="http://schemas.microsoft.com/office/powerpoint/2010/main" val="1151269579"/>
       </p:ext>
     </p:extLst>
   </p:cSld>
@@ -21422,10 +22218,10 @@
       </p:grpSpPr>
       <p:sp>
         <p:nvSpPr>
-          <p:cNvPr id="2" name="Text Placeholder 1">
+          <p:cNvPr id="3" name="Text Placeholder 2">
             <a:extLst>
               <a:ext uri="{FF2B5EF4-FFF2-40B4-BE49-F238E27FC236}">
-                <a16:creationId xmlns:a16="http://schemas.microsoft.com/office/drawing/2014/main" id="{149FE133-FF4E-4029-8D0B-291BF433476E}"/>
+                <a16:creationId xmlns:a16="http://schemas.microsoft.com/office/drawing/2014/main" id="{CBA50F54-F9F0-49C1-A1C9-8D18F10A83B3}"/>
               </a:ext>
             </a:extLst>
           </p:cNvPr>
@@ -21433,7 +22229,7 @@
             <a:spLocks noGrp="1"/>
           </p:cNvSpPr>
           <p:nvPr>
-            <p:ph type="body" sz="quarter" idx="10"/>
+            <p:ph type="body" sz="quarter" idx="12"/>
           </p:nvPr>
         </p:nvSpPr>
         <p:spPr/>
@@ -21443,15 +22239,48 @@
           <a:p>
             <a:r>
               <a:rPr lang="en-US" dirty="0"/>
-              <a:t>Data Storage in Docker</a:t>
+              <a:t>Installing Docker</a:t>
             </a:r>
           </a:p>
         </p:txBody>
       </p:sp>
+      <p:pic>
+        <p:nvPicPr>
+          <p:cNvPr id="7" name="Content Placeholder 6">
+            <a:hlinkClick r:id="rId3"/>
+            <a:extLst>
+              <a:ext uri="{FF2B5EF4-FFF2-40B4-BE49-F238E27FC236}">
+                <a16:creationId xmlns:a16="http://schemas.microsoft.com/office/drawing/2014/main" id="{8B60A2AD-9532-41D3-B5F6-B732AA0BC1A8}"/>
+              </a:ext>
+            </a:extLst>
+          </p:cNvPr>
+          <p:cNvPicPr>
+            <a:picLocks noGrp="1" noChangeAspect="1"/>
+          </p:cNvPicPr>
+          <p:nvPr>
+            <p:ph idx="1"/>
+          </p:nvPr>
+        </p:nvPicPr>
+        <p:blipFill>
+          <a:blip r:embed="rId4"/>
+          <a:stretch>
+            <a:fillRect/>
+          </a:stretch>
+        </p:blipFill>
+        <p:spPr>
+          <a:xfrm>
+            <a:off x="2041840" y="1352550"/>
+            <a:ext cx="8081332" cy="4767263"/>
+          </a:xfrm>
+          <a:prstGeom prst="rect">
+            <a:avLst/>
+          </a:prstGeom>
+        </p:spPr>
+      </p:pic>
     </p:spTree>
     <p:extLst>
       <p:ext uri="{BB962C8B-B14F-4D97-AF65-F5344CB8AC3E}">
-        <p14:creationId xmlns:p14="http://schemas.microsoft.com/office/powerpoint/2010/main" val="459366342"/>
+        <p14:creationId xmlns:p14="http://schemas.microsoft.com/office/powerpoint/2010/main" val="262173664"/>
       </p:ext>
     </p:extLst>
   </p:cSld>
@@ -21504,8 +22333,18 @@
               <a:buChar char="•"/>
             </a:pPr>
             <a:r>
-              <a:rPr lang="en-US" dirty="0"/>
-              <a:t>Content</a:t>
+              <a:rPr lang="en-US" b="0" dirty="0"/>
+              <a:t>After Docker Desktop is installed, try running </a:t>
+            </a:r>
+            <a:r>
+              <a:rPr lang="en-US" b="0" dirty="0">
+                <a:latin typeface="Consolas" panose="020B0609020204030204" pitchFamily="49" charset="0"/>
+              </a:rPr>
+              <a:t>docker version</a:t>
+            </a:r>
+            <a:r>
+              <a:rPr lang="en-US" b="0" dirty="0"/>
+              <a:t> command</a:t>
             </a:r>
           </a:p>
           <a:p>
@@ -21513,6 +22352,10 @@
               <a:buFont typeface="Arial" panose="020B0604020202020204" pitchFamily="34" charset="0"/>
               <a:buChar char="•"/>
             </a:pPr>
+            <a:endParaRPr lang="en-US" b="0" dirty="0"/>
+          </a:p>
+          <a:p>
+            <a:pPr marL="342900" indent="-342900"/>
             <a:endParaRPr lang="en-US" dirty="0"/>
           </a:p>
         </p:txBody>
@@ -21540,15 +22383,45 @@
           <a:p>
             <a:r>
               <a:rPr lang="en-US" dirty="0"/>
-              <a:t>Header</a:t>
+              <a:t>Installing Docker</a:t>
             </a:r>
           </a:p>
         </p:txBody>
       </p:sp>
+      <p:pic>
+        <p:nvPicPr>
+          <p:cNvPr id="4" name="Picture 3">
+            <a:extLst>
+              <a:ext uri="{FF2B5EF4-FFF2-40B4-BE49-F238E27FC236}">
+                <a16:creationId xmlns:a16="http://schemas.microsoft.com/office/drawing/2014/main" id="{CC1210CA-DE1C-4798-839F-2F4B9DC03138}"/>
+              </a:ext>
+            </a:extLst>
+          </p:cNvPr>
+          <p:cNvPicPr>
+            <a:picLocks noChangeAspect="1"/>
+          </p:cNvPicPr>
+          <p:nvPr/>
+        </p:nvPicPr>
+        <p:blipFill>
+          <a:blip r:embed="rId3"/>
+          <a:stretch>
+            <a:fillRect/>
+          </a:stretch>
+        </p:blipFill>
+        <p:spPr>
+          <a:xfrm>
+            <a:off x="2322934" y="1885950"/>
+            <a:ext cx="7546131" cy="4448838"/>
+          </a:xfrm>
+          <a:prstGeom prst="rect">
+            <a:avLst/>
+          </a:prstGeom>
+        </p:spPr>
+      </p:pic>
     </p:spTree>
     <p:extLst>
       <p:ext uri="{BB962C8B-B14F-4D97-AF65-F5344CB8AC3E}">
-        <p14:creationId xmlns:p14="http://schemas.microsoft.com/office/powerpoint/2010/main" val="2132152713"/>
+        <p14:creationId xmlns:p14="http://schemas.microsoft.com/office/powerpoint/2010/main" val="3162771470"/>
       </p:ext>
     </p:extLst>
   </p:cSld>
@@ -21577,10 +22450,10 @@
       </p:grpSpPr>
       <p:sp>
         <p:nvSpPr>
-          <p:cNvPr id="2" name="Text Placeholder 1">
+          <p:cNvPr id="2" name="Content Placeholder 1">
             <a:extLst>
               <a:ext uri="{FF2B5EF4-FFF2-40B4-BE49-F238E27FC236}">
-                <a16:creationId xmlns:a16="http://schemas.microsoft.com/office/drawing/2014/main" id="{149FE133-FF4E-4029-8D0B-291BF433476E}"/>
+                <a16:creationId xmlns:a16="http://schemas.microsoft.com/office/drawing/2014/main" id="{AFF96931-CCDB-47D1-B982-0BFE2F5C618C}"/>
               </a:ext>
             </a:extLst>
           </p:cNvPr>
@@ -21588,7 +22461,7 @@
             <a:spLocks noGrp="1"/>
           </p:cNvSpPr>
           <p:nvPr>
-            <p:ph type="body" sz="quarter" idx="10"/>
+            <p:ph idx="1"/>
           </p:nvPr>
         </p:nvSpPr>
         <p:spPr/>
@@ -21596,9 +22469,72 @@
           <a:bodyPr/>
           <a:lstStyle/>
           <a:p>
-            <a:r>
-              <a:rPr lang="en-US" dirty="0"/>
-              <a:t>Orchestrating Systems with Docker</a:t>
+            <a:pPr marL="342900" indent="-342900">
+              <a:buFont typeface="Arial" panose="020B0604020202020204" pitchFamily="34" charset="0"/>
+              <a:buChar char="•"/>
+            </a:pPr>
+            <a:r>
+              <a:rPr lang="en-US" b="0" dirty="0"/>
+              <a:t>Docker images are packaged applications. You can push them to a central store (called a registry) and pull them on any machine that has access to the registry. The image is a single logical unit that contains the application package. In order to start the app, you run a container from the image. </a:t>
+            </a:r>
+          </a:p>
+          <a:p>
+            <a:pPr marL="342900" indent="-342900">
+              <a:buFont typeface="Arial" panose="020B0604020202020204" pitchFamily="34" charset="0"/>
+              <a:buChar char="•"/>
+            </a:pPr>
+            <a:r>
+              <a:rPr lang="en-US" b="0" dirty="0"/>
+              <a:t>Images are typically built to run a single process. If your app needs to work with other services, you run those services in their own containers and orchestrate them so that all the containers can work together</a:t>
+            </a:r>
+          </a:p>
+          <a:p>
+            <a:pPr marL="342900" indent="-342900">
+              <a:buFont typeface="Arial" panose="020B0604020202020204" pitchFamily="34" charset="0"/>
+              <a:buChar char="•"/>
+            </a:pPr>
+            <a:r>
+              <a:rPr lang="en-US" b="0" dirty="0"/>
+              <a:t>When you run a container from an image, it may be a short-lived app that runs some functionality and then ends; it may be a long-running app that runs like a background service; or it may be an interactive container that you can connect with as though it was a remote machine. </a:t>
+            </a:r>
+          </a:p>
+          <a:p>
+            <a:pPr marL="342900" indent="-342900">
+              <a:buFont typeface="Arial" panose="020B0604020202020204" pitchFamily="34" charset="0"/>
+              <a:buChar char="•"/>
+            </a:pPr>
+            <a:endParaRPr lang="en-US" b="0" dirty="0"/>
+          </a:p>
+          <a:p>
+            <a:pPr marL="342900" indent="-342900"/>
+            <a:endParaRPr lang="en-US" dirty="0"/>
+          </a:p>
+        </p:txBody>
+      </p:sp>
+      <p:sp>
+        <p:nvSpPr>
+          <p:cNvPr id="3" name="Text Placeholder 2">
+            <a:extLst>
+              <a:ext uri="{FF2B5EF4-FFF2-40B4-BE49-F238E27FC236}">
+                <a16:creationId xmlns:a16="http://schemas.microsoft.com/office/drawing/2014/main" id="{CBA50F54-F9F0-49C1-A1C9-8D18F10A83B3}"/>
+              </a:ext>
+            </a:extLst>
+          </p:cNvPr>
+          <p:cNvSpPr>
+            <a:spLocks noGrp="1"/>
+          </p:cNvSpPr>
+          <p:nvPr>
+            <p:ph type="body" sz="quarter" idx="12"/>
+          </p:nvPr>
+        </p:nvSpPr>
+        <p:spPr/>
+        <p:txBody>
+          <a:bodyPr/>
+          <a:lstStyle/>
+          <a:p>
+            <a:r>
+              <a:rPr lang="en-US" dirty="0"/>
+              <a:t>Running containers</a:t>
             </a:r>
           </a:p>
         </p:txBody>
@@ -21606,7 +22542,7 @@
     </p:spTree>
     <p:extLst>
       <p:ext uri="{BB962C8B-B14F-4D97-AF65-F5344CB8AC3E}">
-        <p14:creationId xmlns:p14="http://schemas.microsoft.com/office/powerpoint/2010/main" val="2036340124"/>
+        <p14:creationId xmlns:p14="http://schemas.microsoft.com/office/powerpoint/2010/main" val="3940577420"/>
       </p:ext>
     </p:extLst>
   </p:cSld>
@@ -21651,23 +22587,28 @@
         </p:nvSpPr>
         <p:spPr/>
         <p:txBody>
-          <a:bodyPr/>
+          <a:bodyPr anchor="ctr"/>
           <a:lstStyle/>
+          <a:p>
+            <a:pPr algn="ctr"/>
+            <a:r>
+              <a:rPr lang="en-US" sz="9600" b="0" dirty="0"/>
+              <a:t>DEMO</a:t>
+            </a:r>
+            <a:r>
+              <a:rPr lang="en-US" b="0" dirty="0"/>
+              <a:t> </a:t>
+            </a:r>
+          </a:p>
           <a:p>
             <a:pPr marL="342900" indent="-342900">
               <a:buFont typeface="Arial" panose="020B0604020202020204" pitchFamily="34" charset="0"/>
               <a:buChar char="•"/>
             </a:pPr>
-            <a:r>
-              <a:rPr lang="en-US" dirty="0"/>
-              <a:t>Content</a:t>
-            </a:r>
-          </a:p>
-          <a:p>
-            <a:pPr marL="342900" indent="-342900">
-              <a:buFont typeface="Arial" panose="020B0604020202020204" pitchFamily="34" charset="0"/>
-              <a:buChar char="•"/>
-            </a:pPr>
+            <a:endParaRPr lang="en-US" b="0" dirty="0"/>
+          </a:p>
+          <a:p>
+            <a:pPr marL="342900" indent="-342900"/>
             <a:endParaRPr lang="en-US" dirty="0"/>
           </a:p>
         </p:txBody>
@@ -21695,7 +22636,7 @@
           <a:p>
             <a:r>
               <a:rPr lang="en-US" dirty="0"/>
-              <a:t>Header</a:t>
+              <a:t>Running containers</a:t>
             </a:r>
           </a:p>
         </p:txBody>
@@ -21703,7 +22644,7 @@
     </p:spTree>
     <p:extLst>
       <p:ext uri="{BB962C8B-B14F-4D97-AF65-F5344CB8AC3E}">
-        <p14:creationId xmlns:p14="http://schemas.microsoft.com/office/powerpoint/2010/main" val="1180309019"/>
+        <p14:creationId xmlns:p14="http://schemas.microsoft.com/office/powerpoint/2010/main" val="3447734083"/>
       </p:ext>
     </p:extLst>
   </p:cSld>
@@ -21753,7 +22694,7 @@
           <a:p>
             <a:r>
               <a:rPr lang="en-US" dirty="0"/>
-              <a:t>Clustering Hosts with Docker Swarm</a:t>
+              <a:t>Creating Docker images</a:t>
             </a:r>
           </a:p>
         </p:txBody>
@@ -21761,7 +22702,7 @@
     </p:spTree>
     <p:extLst>
       <p:ext uri="{BB962C8B-B14F-4D97-AF65-F5344CB8AC3E}">
-        <p14:creationId xmlns:p14="http://schemas.microsoft.com/office/powerpoint/2010/main" val="3059142854"/>
+        <p14:creationId xmlns:p14="http://schemas.microsoft.com/office/powerpoint/2010/main" val="3895573058"/>
       </p:ext>
     </p:extLst>
   </p:cSld>
@@ -21858,7 +22799,7 @@
     </p:spTree>
     <p:extLst>
       <p:ext uri="{BB962C8B-B14F-4D97-AF65-F5344CB8AC3E}">
-        <p14:creationId xmlns:p14="http://schemas.microsoft.com/office/powerpoint/2010/main" val="2079409009"/>
+        <p14:creationId xmlns:p14="http://schemas.microsoft.com/office/powerpoint/2010/main" val="3053133482"/>
       </p:ext>
     </p:extLst>
   </p:cSld>
@@ -21890,7 +22831,7 @@
           <p:cNvPr id="2" name="Text Placeholder 1">
             <a:extLst>
               <a:ext uri="{FF2B5EF4-FFF2-40B4-BE49-F238E27FC236}">
-                <a16:creationId xmlns:a16="http://schemas.microsoft.com/office/drawing/2014/main" id="{882E656E-F534-4E9B-AF42-6610DE8D6DE7}"/>
+                <a16:creationId xmlns:a16="http://schemas.microsoft.com/office/drawing/2014/main" id="{149FE133-FF4E-4029-8D0B-291BF433476E}"/>
               </a:ext>
             </a:extLst>
           </p:cNvPr>
@@ -21907,8 +22848,8 @@
           <a:lstStyle/>
           <a:p>
             <a:r>
-              <a:rPr lang="en-US" sz="9600" dirty="0"/>
-              <a:t>Q&amp;A</a:t>
+              <a:rPr lang="en-US" dirty="0"/>
+              <a:t>Image registries and Docker Hub</a:t>
             </a:r>
           </a:p>
         </p:txBody>
@@ -21916,7 +22857,7 @@
     </p:spTree>
     <p:extLst>
       <p:ext uri="{BB962C8B-B14F-4D97-AF65-F5344CB8AC3E}">
-        <p14:creationId xmlns:p14="http://schemas.microsoft.com/office/powerpoint/2010/main" val="1891880177"/>
+        <p14:creationId xmlns:p14="http://schemas.microsoft.com/office/powerpoint/2010/main" val="4261129366"/>
       </p:ext>
     </p:extLst>
   </p:cSld>
@@ -21943,10 +22884,232 @@
           <a:chExt cx="0" cy="0"/>
         </a:xfrm>
       </p:grpSpPr>
+      <p:sp>
+        <p:nvSpPr>
+          <p:cNvPr id="2" name="Content Placeholder 1">
+            <a:extLst>
+              <a:ext uri="{FF2B5EF4-FFF2-40B4-BE49-F238E27FC236}">
+                <a16:creationId xmlns:a16="http://schemas.microsoft.com/office/drawing/2014/main" id="{AFF96931-CCDB-47D1-B982-0BFE2F5C618C}"/>
+              </a:ext>
+            </a:extLst>
+          </p:cNvPr>
+          <p:cNvSpPr>
+            <a:spLocks noGrp="1"/>
+          </p:cNvSpPr>
+          <p:nvPr>
+            <p:ph idx="1"/>
+          </p:nvPr>
+        </p:nvSpPr>
+        <p:spPr/>
+        <p:txBody>
+          <a:bodyPr/>
+          <a:lstStyle/>
+          <a:p>
+            <a:pPr marL="342900" indent="-342900">
+              <a:buFont typeface="Arial" panose="020B0604020202020204" pitchFamily="34" charset="0"/>
+              <a:buChar char="•"/>
+            </a:pPr>
+            <a:r>
+              <a:rPr lang="en-US" dirty="0"/>
+              <a:t>Content</a:t>
+            </a:r>
+          </a:p>
+          <a:p>
+            <a:pPr marL="342900" indent="-342900">
+              <a:buFont typeface="Arial" panose="020B0604020202020204" pitchFamily="34" charset="0"/>
+              <a:buChar char="•"/>
+            </a:pPr>
+            <a:endParaRPr lang="en-US" dirty="0"/>
+          </a:p>
+        </p:txBody>
+      </p:sp>
+      <p:sp>
+        <p:nvSpPr>
+          <p:cNvPr id="3" name="Text Placeholder 2">
+            <a:extLst>
+              <a:ext uri="{FF2B5EF4-FFF2-40B4-BE49-F238E27FC236}">
+                <a16:creationId xmlns:a16="http://schemas.microsoft.com/office/drawing/2014/main" id="{CBA50F54-F9F0-49C1-A1C9-8D18F10A83B3}"/>
+              </a:ext>
+            </a:extLst>
+          </p:cNvPr>
+          <p:cNvSpPr>
+            <a:spLocks noGrp="1"/>
+          </p:cNvSpPr>
+          <p:nvPr>
+            <p:ph type="body" sz="quarter" idx="12"/>
+          </p:nvPr>
+        </p:nvSpPr>
+        <p:spPr/>
+        <p:txBody>
+          <a:bodyPr/>
+          <a:lstStyle/>
+          <a:p>
+            <a:r>
+              <a:rPr lang="en-US" dirty="0"/>
+              <a:t>Header</a:t>
+            </a:r>
+          </a:p>
+        </p:txBody>
+      </p:sp>
     </p:spTree>
     <p:extLst>
       <p:ext uri="{BB962C8B-B14F-4D97-AF65-F5344CB8AC3E}">
-        <p14:creationId xmlns:p14="http://schemas.microsoft.com/office/powerpoint/2010/main" val="1456301527"/>
+        <p14:creationId xmlns:p14="http://schemas.microsoft.com/office/powerpoint/2010/main" val="2047067086"/>
+      </p:ext>
+    </p:extLst>
+  </p:cSld>
+  <p:clrMapOvr>
+    <a:masterClrMapping/>
+  </p:clrMapOvr>
+</p:sld>
+</file>
+
+<file path=ppt/slides/slide18.xml><?xml version="1.0" encoding="utf-8"?>
+<p:sld xmlns:a="http://schemas.openxmlformats.org/drawingml/2006/main" xmlns:r="http://schemas.openxmlformats.org/officeDocument/2006/relationships" xmlns:p="http://schemas.openxmlformats.org/presentationml/2006/main">
+  <p:cSld>
+    <p:spTree>
+      <p:nvGrpSpPr>
+        <p:cNvPr id="1" name=""/>
+        <p:cNvGrpSpPr/>
+        <p:nvPr/>
+      </p:nvGrpSpPr>
+      <p:grpSpPr>
+        <a:xfrm>
+          <a:off x="0" y="0"/>
+          <a:ext cx="0" cy="0"/>
+          <a:chOff x="0" y="0"/>
+          <a:chExt cx="0" cy="0"/>
+        </a:xfrm>
+      </p:grpSpPr>
+      <p:sp>
+        <p:nvSpPr>
+          <p:cNvPr id="2" name="Text Placeholder 1">
+            <a:extLst>
+              <a:ext uri="{FF2B5EF4-FFF2-40B4-BE49-F238E27FC236}">
+                <a16:creationId xmlns:a16="http://schemas.microsoft.com/office/drawing/2014/main" id="{149FE133-FF4E-4029-8D0B-291BF433476E}"/>
+              </a:ext>
+            </a:extLst>
+          </p:cNvPr>
+          <p:cNvSpPr>
+            <a:spLocks noGrp="1"/>
+          </p:cNvSpPr>
+          <p:nvPr>
+            <p:ph type="body" sz="quarter" idx="10"/>
+          </p:nvPr>
+        </p:nvSpPr>
+        <p:spPr/>
+        <p:txBody>
+          <a:bodyPr/>
+          <a:lstStyle/>
+          <a:p>
+            <a:r>
+              <a:rPr lang="en-US" dirty="0"/>
+              <a:t>Data Storage in Docker</a:t>
+            </a:r>
+          </a:p>
+        </p:txBody>
+      </p:sp>
+    </p:spTree>
+    <p:extLst>
+      <p:ext uri="{BB962C8B-B14F-4D97-AF65-F5344CB8AC3E}">
+        <p14:creationId xmlns:p14="http://schemas.microsoft.com/office/powerpoint/2010/main" val="459366342"/>
+      </p:ext>
+    </p:extLst>
+  </p:cSld>
+  <p:clrMapOvr>
+    <a:masterClrMapping/>
+  </p:clrMapOvr>
+</p:sld>
+</file>
+
+<file path=ppt/slides/slide19.xml><?xml version="1.0" encoding="utf-8"?>
+<p:sld xmlns:a="http://schemas.openxmlformats.org/drawingml/2006/main" xmlns:r="http://schemas.openxmlformats.org/officeDocument/2006/relationships" xmlns:p="http://schemas.openxmlformats.org/presentationml/2006/main">
+  <p:cSld>
+    <p:spTree>
+      <p:nvGrpSpPr>
+        <p:cNvPr id="1" name=""/>
+        <p:cNvGrpSpPr/>
+        <p:nvPr/>
+      </p:nvGrpSpPr>
+      <p:grpSpPr>
+        <a:xfrm>
+          <a:off x="0" y="0"/>
+          <a:ext cx="0" cy="0"/>
+          <a:chOff x="0" y="0"/>
+          <a:chExt cx="0" cy="0"/>
+        </a:xfrm>
+      </p:grpSpPr>
+      <p:sp>
+        <p:nvSpPr>
+          <p:cNvPr id="2" name="Content Placeholder 1">
+            <a:extLst>
+              <a:ext uri="{FF2B5EF4-FFF2-40B4-BE49-F238E27FC236}">
+                <a16:creationId xmlns:a16="http://schemas.microsoft.com/office/drawing/2014/main" id="{AFF96931-CCDB-47D1-B982-0BFE2F5C618C}"/>
+              </a:ext>
+            </a:extLst>
+          </p:cNvPr>
+          <p:cNvSpPr>
+            <a:spLocks noGrp="1"/>
+          </p:cNvSpPr>
+          <p:nvPr>
+            <p:ph idx="1"/>
+          </p:nvPr>
+        </p:nvSpPr>
+        <p:spPr/>
+        <p:txBody>
+          <a:bodyPr/>
+          <a:lstStyle/>
+          <a:p>
+            <a:pPr marL="342900" indent="-342900">
+              <a:buFont typeface="Arial" panose="020B0604020202020204" pitchFamily="34" charset="0"/>
+              <a:buChar char="•"/>
+            </a:pPr>
+            <a:r>
+              <a:rPr lang="en-US" dirty="0"/>
+              <a:t>Content</a:t>
+            </a:r>
+          </a:p>
+          <a:p>
+            <a:pPr marL="342900" indent="-342900">
+              <a:buFont typeface="Arial" panose="020B0604020202020204" pitchFamily="34" charset="0"/>
+              <a:buChar char="•"/>
+            </a:pPr>
+            <a:endParaRPr lang="en-US" dirty="0"/>
+          </a:p>
+        </p:txBody>
+      </p:sp>
+      <p:sp>
+        <p:nvSpPr>
+          <p:cNvPr id="3" name="Text Placeholder 2">
+            <a:extLst>
+              <a:ext uri="{FF2B5EF4-FFF2-40B4-BE49-F238E27FC236}">
+                <a16:creationId xmlns:a16="http://schemas.microsoft.com/office/drawing/2014/main" id="{CBA50F54-F9F0-49C1-A1C9-8D18F10A83B3}"/>
+              </a:ext>
+            </a:extLst>
+          </p:cNvPr>
+          <p:cNvSpPr>
+            <a:spLocks noGrp="1"/>
+          </p:cNvSpPr>
+          <p:nvPr>
+            <p:ph type="body" sz="quarter" idx="12"/>
+          </p:nvPr>
+        </p:nvSpPr>
+        <p:spPr/>
+        <p:txBody>
+          <a:bodyPr/>
+          <a:lstStyle/>
+          <a:p>
+            <a:r>
+              <a:rPr lang="en-US" dirty="0"/>
+              <a:t>Header</a:t>
+            </a:r>
+          </a:p>
+        </p:txBody>
+      </p:sp>
+    </p:spTree>
+    <p:extLst>
+      <p:ext uri="{BB962C8B-B14F-4D97-AF65-F5344CB8AC3E}">
+        <p14:creationId xmlns:p14="http://schemas.microsoft.com/office/powerpoint/2010/main" val="2132152713"/>
       </p:ext>
     </p:extLst>
   </p:cSld>
@@ -22102,6 +23265,404 @@
 </p:sld>
 </file>
 
+<file path=ppt/slides/slide20.xml><?xml version="1.0" encoding="utf-8"?>
+<p:sld xmlns:a="http://schemas.openxmlformats.org/drawingml/2006/main" xmlns:r="http://schemas.openxmlformats.org/officeDocument/2006/relationships" xmlns:p="http://schemas.openxmlformats.org/presentationml/2006/main">
+  <p:cSld>
+    <p:spTree>
+      <p:nvGrpSpPr>
+        <p:cNvPr id="1" name=""/>
+        <p:cNvGrpSpPr/>
+        <p:nvPr/>
+      </p:nvGrpSpPr>
+      <p:grpSpPr>
+        <a:xfrm>
+          <a:off x="0" y="0"/>
+          <a:ext cx="0" cy="0"/>
+          <a:chOff x="0" y="0"/>
+          <a:chExt cx="0" cy="0"/>
+        </a:xfrm>
+      </p:grpSpPr>
+      <p:sp>
+        <p:nvSpPr>
+          <p:cNvPr id="2" name="Text Placeholder 1">
+            <a:extLst>
+              <a:ext uri="{FF2B5EF4-FFF2-40B4-BE49-F238E27FC236}">
+                <a16:creationId xmlns:a16="http://schemas.microsoft.com/office/drawing/2014/main" id="{149FE133-FF4E-4029-8D0B-291BF433476E}"/>
+              </a:ext>
+            </a:extLst>
+          </p:cNvPr>
+          <p:cNvSpPr>
+            <a:spLocks noGrp="1"/>
+          </p:cNvSpPr>
+          <p:nvPr>
+            <p:ph type="body" sz="quarter" idx="10"/>
+          </p:nvPr>
+        </p:nvSpPr>
+        <p:spPr/>
+        <p:txBody>
+          <a:bodyPr/>
+          <a:lstStyle/>
+          <a:p>
+            <a:r>
+              <a:rPr lang="en-US" dirty="0"/>
+              <a:t>Orchestrating Systems with Docker</a:t>
+            </a:r>
+          </a:p>
+        </p:txBody>
+      </p:sp>
+    </p:spTree>
+    <p:extLst>
+      <p:ext uri="{BB962C8B-B14F-4D97-AF65-F5344CB8AC3E}">
+        <p14:creationId xmlns:p14="http://schemas.microsoft.com/office/powerpoint/2010/main" val="2036340124"/>
+      </p:ext>
+    </p:extLst>
+  </p:cSld>
+  <p:clrMapOvr>
+    <a:masterClrMapping/>
+  </p:clrMapOvr>
+</p:sld>
+</file>
+
+<file path=ppt/slides/slide21.xml><?xml version="1.0" encoding="utf-8"?>
+<p:sld xmlns:a="http://schemas.openxmlformats.org/drawingml/2006/main" xmlns:r="http://schemas.openxmlformats.org/officeDocument/2006/relationships" xmlns:p="http://schemas.openxmlformats.org/presentationml/2006/main">
+  <p:cSld>
+    <p:spTree>
+      <p:nvGrpSpPr>
+        <p:cNvPr id="1" name=""/>
+        <p:cNvGrpSpPr/>
+        <p:nvPr/>
+      </p:nvGrpSpPr>
+      <p:grpSpPr>
+        <a:xfrm>
+          <a:off x="0" y="0"/>
+          <a:ext cx="0" cy="0"/>
+          <a:chOff x="0" y="0"/>
+          <a:chExt cx="0" cy="0"/>
+        </a:xfrm>
+      </p:grpSpPr>
+      <p:sp>
+        <p:nvSpPr>
+          <p:cNvPr id="2" name="Content Placeholder 1">
+            <a:extLst>
+              <a:ext uri="{FF2B5EF4-FFF2-40B4-BE49-F238E27FC236}">
+                <a16:creationId xmlns:a16="http://schemas.microsoft.com/office/drawing/2014/main" id="{AFF96931-CCDB-47D1-B982-0BFE2F5C618C}"/>
+              </a:ext>
+            </a:extLst>
+          </p:cNvPr>
+          <p:cNvSpPr>
+            <a:spLocks noGrp="1"/>
+          </p:cNvSpPr>
+          <p:nvPr>
+            <p:ph idx="1"/>
+          </p:nvPr>
+        </p:nvSpPr>
+        <p:spPr/>
+        <p:txBody>
+          <a:bodyPr/>
+          <a:lstStyle/>
+          <a:p>
+            <a:pPr marL="342900" indent="-342900">
+              <a:buFont typeface="Arial" panose="020B0604020202020204" pitchFamily="34" charset="0"/>
+              <a:buChar char="•"/>
+            </a:pPr>
+            <a:r>
+              <a:rPr lang="en-US" dirty="0"/>
+              <a:t>Content</a:t>
+            </a:r>
+          </a:p>
+          <a:p>
+            <a:pPr marL="342900" indent="-342900">
+              <a:buFont typeface="Arial" panose="020B0604020202020204" pitchFamily="34" charset="0"/>
+              <a:buChar char="•"/>
+            </a:pPr>
+            <a:endParaRPr lang="en-US" dirty="0"/>
+          </a:p>
+        </p:txBody>
+      </p:sp>
+      <p:sp>
+        <p:nvSpPr>
+          <p:cNvPr id="3" name="Text Placeholder 2">
+            <a:extLst>
+              <a:ext uri="{FF2B5EF4-FFF2-40B4-BE49-F238E27FC236}">
+                <a16:creationId xmlns:a16="http://schemas.microsoft.com/office/drawing/2014/main" id="{CBA50F54-F9F0-49C1-A1C9-8D18F10A83B3}"/>
+              </a:ext>
+            </a:extLst>
+          </p:cNvPr>
+          <p:cNvSpPr>
+            <a:spLocks noGrp="1"/>
+          </p:cNvSpPr>
+          <p:nvPr>
+            <p:ph type="body" sz="quarter" idx="12"/>
+          </p:nvPr>
+        </p:nvSpPr>
+        <p:spPr/>
+        <p:txBody>
+          <a:bodyPr/>
+          <a:lstStyle/>
+          <a:p>
+            <a:r>
+              <a:rPr lang="en-US" dirty="0"/>
+              <a:t>Header</a:t>
+            </a:r>
+          </a:p>
+        </p:txBody>
+      </p:sp>
+    </p:spTree>
+    <p:extLst>
+      <p:ext uri="{BB962C8B-B14F-4D97-AF65-F5344CB8AC3E}">
+        <p14:creationId xmlns:p14="http://schemas.microsoft.com/office/powerpoint/2010/main" val="1180309019"/>
+      </p:ext>
+    </p:extLst>
+  </p:cSld>
+  <p:clrMapOvr>
+    <a:masterClrMapping/>
+  </p:clrMapOvr>
+</p:sld>
+</file>
+
+<file path=ppt/slides/slide22.xml><?xml version="1.0" encoding="utf-8"?>
+<p:sld xmlns:a="http://schemas.openxmlformats.org/drawingml/2006/main" xmlns:r="http://schemas.openxmlformats.org/officeDocument/2006/relationships" xmlns:p="http://schemas.openxmlformats.org/presentationml/2006/main">
+  <p:cSld>
+    <p:spTree>
+      <p:nvGrpSpPr>
+        <p:cNvPr id="1" name=""/>
+        <p:cNvGrpSpPr/>
+        <p:nvPr/>
+      </p:nvGrpSpPr>
+      <p:grpSpPr>
+        <a:xfrm>
+          <a:off x="0" y="0"/>
+          <a:ext cx="0" cy="0"/>
+          <a:chOff x="0" y="0"/>
+          <a:chExt cx="0" cy="0"/>
+        </a:xfrm>
+      </p:grpSpPr>
+      <p:sp>
+        <p:nvSpPr>
+          <p:cNvPr id="2" name="Text Placeholder 1">
+            <a:extLst>
+              <a:ext uri="{FF2B5EF4-FFF2-40B4-BE49-F238E27FC236}">
+                <a16:creationId xmlns:a16="http://schemas.microsoft.com/office/drawing/2014/main" id="{149FE133-FF4E-4029-8D0B-291BF433476E}"/>
+              </a:ext>
+            </a:extLst>
+          </p:cNvPr>
+          <p:cNvSpPr>
+            <a:spLocks noGrp="1"/>
+          </p:cNvSpPr>
+          <p:nvPr>
+            <p:ph type="body" sz="quarter" idx="10"/>
+          </p:nvPr>
+        </p:nvSpPr>
+        <p:spPr/>
+        <p:txBody>
+          <a:bodyPr/>
+          <a:lstStyle/>
+          <a:p>
+            <a:r>
+              <a:rPr lang="en-US" dirty="0"/>
+              <a:t>Clustering Hosts with Docker Swarm</a:t>
+            </a:r>
+          </a:p>
+        </p:txBody>
+      </p:sp>
+    </p:spTree>
+    <p:extLst>
+      <p:ext uri="{BB962C8B-B14F-4D97-AF65-F5344CB8AC3E}">
+        <p14:creationId xmlns:p14="http://schemas.microsoft.com/office/powerpoint/2010/main" val="3059142854"/>
+      </p:ext>
+    </p:extLst>
+  </p:cSld>
+  <p:clrMapOvr>
+    <a:masterClrMapping/>
+  </p:clrMapOvr>
+</p:sld>
+</file>
+
+<file path=ppt/slides/slide23.xml><?xml version="1.0" encoding="utf-8"?>
+<p:sld xmlns:a="http://schemas.openxmlformats.org/drawingml/2006/main" xmlns:r="http://schemas.openxmlformats.org/officeDocument/2006/relationships" xmlns:p="http://schemas.openxmlformats.org/presentationml/2006/main">
+  <p:cSld>
+    <p:spTree>
+      <p:nvGrpSpPr>
+        <p:cNvPr id="1" name=""/>
+        <p:cNvGrpSpPr/>
+        <p:nvPr/>
+      </p:nvGrpSpPr>
+      <p:grpSpPr>
+        <a:xfrm>
+          <a:off x="0" y="0"/>
+          <a:ext cx="0" cy="0"/>
+          <a:chOff x="0" y="0"/>
+          <a:chExt cx="0" cy="0"/>
+        </a:xfrm>
+      </p:grpSpPr>
+      <p:sp>
+        <p:nvSpPr>
+          <p:cNvPr id="2" name="Content Placeholder 1">
+            <a:extLst>
+              <a:ext uri="{FF2B5EF4-FFF2-40B4-BE49-F238E27FC236}">
+                <a16:creationId xmlns:a16="http://schemas.microsoft.com/office/drawing/2014/main" id="{AFF96931-CCDB-47D1-B982-0BFE2F5C618C}"/>
+              </a:ext>
+            </a:extLst>
+          </p:cNvPr>
+          <p:cNvSpPr>
+            <a:spLocks noGrp="1"/>
+          </p:cNvSpPr>
+          <p:nvPr>
+            <p:ph idx="1"/>
+          </p:nvPr>
+        </p:nvSpPr>
+        <p:spPr/>
+        <p:txBody>
+          <a:bodyPr/>
+          <a:lstStyle/>
+          <a:p>
+            <a:pPr marL="342900" indent="-342900">
+              <a:buFont typeface="Arial" panose="020B0604020202020204" pitchFamily="34" charset="0"/>
+              <a:buChar char="•"/>
+            </a:pPr>
+            <a:r>
+              <a:rPr lang="en-US" dirty="0"/>
+              <a:t>Content</a:t>
+            </a:r>
+          </a:p>
+          <a:p>
+            <a:pPr marL="342900" indent="-342900">
+              <a:buFont typeface="Arial" panose="020B0604020202020204" pitchFamily="34" charset="0"/>
+              <a:buChar char="•"/>
+            </a:pPr>
+            <a:endParaRPr lang="en-US" dirty="0"/>
+          </a:p>
+        </p:txBody>
+      </p:sp>
+      <p:sp>
+        <p:nvSpPr>
+          <p:cNvPr id="3" name="Text Placeholder 2">
+            <a:extLst>
+              <a:ext uri="{FF2B5EF4-FFF2-40B4-BE49-F238E27FC236}">
+                <a16:creationId xmlns:a16="http://schemas.microsoft.com/office/drawing/2014/main" id="{CBA50F54-F9F0-49C1-A1C9-8D18F10A83B3}"/>
+              </a:ext>
+            </a:extLst>
+          </p:cNvPr>
+          <p:cNvSpPr>
+            <a:spLocks noGrp="1"/>
+          </p:cNvSpPr>
+          <p:nvPr>
+            <p:ph type="body" sz="quarter" idx="12"/>
+          </p:nvPr>
+        </p:nvSpPr>
+        <p:spPr/>
+        <p:txBody>
+          <a:bodyPr/>
+          <a:lstStyle/>
+          <a:p>
+            <a:r>
+              <a:rPr lang="en-US" dirty="0"/>
+              <a:t>Header</a:t>
+            </a:r>
+          </a:p>
+        </p:txBody>
+      </p:sp>
+    </p:spTree>
+    <p:extLst>
+      <p:ext uri="{BB962C8B-B14F-4D97-AF65-F5344CB8AC3E}">
+        <p14:creationId xmlns:p14="http://schemas.microsoft.com/office/powerpoint/2010/main" val="2079409009"/>
+      </p:ext>
+    </p:extLst>
+  </p:cSld>
+  <p:clrMapOvr>
+    <a:masterClrMapping/>
+  </p:clrMapOvr>
+</p:sld>
+</file>
+
+<file path=ppt/slides/slide24.xml><?xml version="1.0" encoding="utf-8"?>
+<p:sld xmlns:a="http://schemas.openxmlformats.org/drawingml/2006/main" xmlns:r="http://schemas.openxmlformats.org/officeDocument/2006/relationships" xmlns:p="http://schemas.openxmlformats.org/presentationml/2006/main">
+  <p:cSld>
+    <p:spTree>
+      <p:nvGrpSpPr>
+        <p:cNvPr id="1" name=""/>
+        <p:cNvGrpSpPr/>
+        <p:nvPr/>
+      </p:nvGrpSpPr>
+      <p:grpSpPr>
+        <a:xfrm>
+          <a:off x="0" y="0"/>
+          <a:ext cx="0" cy="0"/>
+          <a:chOff x="0" y="0"/>
+          <a:chExt cx="0" cy="0"/>
+        </a:xfrm>
+      </p:grpSpPr>
+      <p:sp>
+        <p:nvSpPr>
+          <p:cNvPr id="2" name="Text Placeholder 1">
+            <a:extLst>
+              <a:ext uri="{FF2B5EF4-FFF2-40B4-BE49-F238E27FC236}">
+                <a16:creationId xmlns:a16="http://schemas.microsoft.com/office/drawing/2014/main" id="{882E656E-F534-4E9B-AF42-6610DE8D6DE7}"/>
+              </a:ext>
+            </a:extLst>
+          </p:cNvPr>
+          <p:cNvSpPr>
+            <a:spLocks noGrp="1"/>
+          </p:cNvSpPr>
+          <p:nvPr>
+            <p:ph type="body" sz="quarter" idx="10"/>
+          </p:nvPr>
+        </p:nvSpPr>
+        <p:spPr/>
+        <p:txBody>
+          <a:bodyPr/>
+          <a:lstStyle/>
+          <a:p>
+            <a:r>
+              <a:rPr lang="en-US" sz="9600" dirty="0"/>
+              <a:t>Q&amp;A</a:t>
+            </a:r>
+          </a:p>
+        </p:txBody>
+      </p:sp>
+    </p:spTree>
+    <p:extLst>
+      <p:ext uri="{BB962C8B-B14F-4D97-AF65-F5344CB8AC3E}">
+        <p14:creationId xmlns:p14="http://schemas.microsoft.com/office/powerpoint/2010/main" val="1891880177"/>
+      </p:ext>
+    </p:extLst>
+  </p:cSld>
+  <p:clrMapOvr>
+    <a:masterClrMapping/>
+  </p:clrMapOvr>
+</p:sld>
+</file>
+
+<file path=ppt/slides/slide25.xml><?xml version="1.0" encoding="utf-8"?>
+<p:sld xmlns:a="http://schemas.openxmlformats.org/drawingml/2006/main" xmlns:r="http://schemas.openxmlformats.org/officeDocument/2006/relationships" xmlns:p="http://schemas.openxmlformats.org/presentationml/2006/main">
+  <p:cSld>
+    <p:spTree>
+      <p:nvGrpSpPr>
+        <p:cNvPr id="1" name=""/>
+        <p:cNvGrpSpPr/>
+        <p:nvPr/>
+      </p:nvGrpSpPr>
+      <p:grpSpPr>
+        <a:xfrm>
+          <a:off x="0" y="0"/>
+          <a:ext cx="0" cy="0"/>
+          <a:chOff x="0" y="0"/>
+          <a:chExt cx="0" cy="0"/>
+        </a:xfrm>
+      </p:grpSpPr>
+    </p:spTree>
+    <p:extLst>
+      <p:ext uri="{BB962C8B-B14F-4D97-AF65-F5344CB8AC3E}">
+        <p14:creationId xmlns:p14="http://schemas.microsoft.com/office/powerpoint/2010/main" val="1456301527"/>
+      </p:ext>
+    </p:extLst>
+  </p:cSld>
+  <p:clrMapOvr>
+    <a:masterClrMapping/>
+  </p:clrMapOvr>
+</p:sld>
+</file>
+
 <file path=ppt/slides/slide3.xml><?xml version="1.0" encoding="utf-8"?>
 <p:sld xmlns:a="http://schemas.openxmlformats.org/drawingml/2006/main" xmlns:r="http://schemas.openxmlformats.org/officeDocument/2006/relationships" xmlns:p="http://schemas.openxmlformats.org/presentationml/2006/main">
   <p:cSld>
@@ -22378,15 +23939,9 @@
               <a:buChar char="•"/>
             </a:pPr>
             <a:r>
-              <a:rPr lang="en-US" dirty="0"/>
-              <a:t>Content</a:t>
-            </a:r>
-          </a:p>
-          <a:p>
-            <a:pPr marL="342900" indent="-342900">
-              <a:buFont typeface="Arial" panose="020B0604020202020204" pitchFamily="34" charset="0"/>
-              <a:buChar char="•"/>
-            </a:pPr>
+              <a:rPr lang="en-US" b="0" dirty="0"/>
+              <a:t>Docker is an application platform. It lets you package your application with everything it needs, from the operating system upwards, into a single unit that you can share and run on any computer that has Docker. Docker runs your application in a lightweight, isolated component called a container. </a:t>
+            </a:r>
             <a:endParaRPr lang="en-US" dirty="0"/>
           </a:p>
         </p:txBody>
@@ -22414,11 +23969,58 @@
           <a:p>
             <a:r>
               <a:rPr lang="en-US" dirty="0"/>
-              <a:t>Header</a:t>
+              <a:t>What is Docker?</a:t>
             </a:r>
           </a:p>
         </p:txBody>
       </p:sp>
+      <p:pic>
+        <p:nvPicPr>
+          <p:cNvPr id="1026" name="Picture 2" descr="Image result for Docker logo">
+            <a:extLst>
+              <a:ext uri="{FF2B5EF4-FFF2-40B4-BE49-F238E27FC236}">
+                <a16:creationId xmlns:a16="http://schemas.microsoft.com/office/drawing/2014/main" id="{ECD77058-91B9-48F1-888B-C068D4E7B521}"/>
+              </a:ext>
+            </a:extLst>
+          </p:cNvPr>
+          <p:cNvPicPr>
+            <a:picLocks noChangeAspect="1" noChangeArrowheads="1"/>
+          </p:cNvPicPr>
+          <p:nvPr/>
+        </p:nvPicPr>
+        <p:blipFill>
+          <a:blip r:embed="rId3">
+            <a:extLst>
+              <a:ext uri="{28A0092B-C50C-407E-A947-70E740481C1C}">
+                <a14:useLocalDpi xmlns:a14="http://schemas.microsoft.com/office/drawing/2010/main" val="0"/>
+              </a:ext>
+            </a:extLst>
+          </a:blip>
+          <a:srcRect/>
+          <a:stretch>
+            <a:fillRect/>
+          </a:stretch>
+        </p:blipFill>
+        <p:spPr bwMode="auto">
+          <a:xfrm>
+            <a:off x="4606652" y="3740790"/>
+            <a:ext cx="2978695" cy="2136136"/>
+          </a:xfrm>
+          <a:prstGeom prst="rect">
+            <a:avLst/>
+          </a:prstGeom>
+          <a:noFill/>
+          <a:extLst>
+            <a:ext uri="{909E8E84-426E-40DD-AFC4-6F175D3DCCD1}">
+              <a14:hiddenFill xmlns:a14="http://schemas.microsoft.com/office/drawing/2010/main">
+                <a:solidFill>
+                  <a:srgbClr val="FFFFFF"/>
+                </a:solidFill>
+              </a14:hiddenFill>
+            </a:ext>
+          </a:extLst>
+        </p:spPr>
+      </p:pic>
     </p:spTree>
     <p:extLst>
       <p:ext uri="{BB962C8B-B14F-4D97-AF65-F5344CB8AC3E}">
@@ -22451,10 +24053,10 @@
       </p:grpSpPr>
       <p:sp>
         <p:nvSpPr>
-          <p:cNvPr id="2" name="Text Placeholder 1">
+          <p:cNvPr id="2" name="Content Placeholder 1">
             <a:extLst>
               <a:ext uri="{FF2B5EF4-FFF2-40B4-BE49-F238E27FC236}">
-                <a16:creationId xmlns:a16="http://schemas.microsoft.com/office/drawing/2014/main" id="{149FE133-FF4E-4029-8D0B-291BF433476E}"/>
+                <a16:creationId xmlns:a16="http://schemas.microsoft.com/office/drawing/2014/main" id="{AFF96931-CCDB-47D1-B982-0BFE2F5C618C}"/>
               </a:ext>
             </a:extLst>
           </p:cNvPr>
@@ -22462,7 +24064,7 @@
             <a:spLocks noGrp="1"/>
           </p:cNvSpPr>
           <p:nvPr>
-            <p:ph type="body" sz="quarter" idx="10"/>
+            <p:ph idx="1"/>
           </p:nvPr>
         </p:nvSpPr>
         <p:spPr/>
@@ -22470,9 +24072,72 @@
           <a:bodyPr/>
           <a:lstStyle/>
           <a:p>
-            <a:r>
-              <a:rPr lang="en-US" dirty="0"/>
-              <a:t>Creating Docker images</a:t>
+            <a:pPr marL="342900" indent="-342900">
+              <a:buFont typeface="Arial" panose="020B0604020202020204" pitchFamily="34" charset="0"/>
+              <a:buChar char="•"/>
+            </a:pPr>
+            <a:r>
+              <a:rPr lang="en-US" b="0" dirty="0"/>
+              <a:t>The application package, called a Docker image, is typically only tens or hundreds of megabytes, so it’s cheap to store and fast to move.</a:t>
+            </a:r>
+          </a:p>
+          <a:p>
+            <a:pPr marL="342900" indent="-342900">
+              <a:buFont typeface="Arial" panose="020B0604020202020204" pitchFamily="34" charset="0"/>
+              <a:buChar char="•"/>
+            </a:pPr>
+            <a:r>
+              <a:rPr lang="en-US" b="0" dirty="0"/>
+              <a:t>When you run a container from the image, it will start in seconds and the application process actually runs on the host, which means you can run hundreds of containers on a single machine.</a:t>
+            </a:r>
+          </a:p>
+          <a:p>
+            <a:pPr marL="342900" indent="-342900">
+              <a:buFont typeface="Arial" panose="020B0604020202020204" pitchFamily="34" charset="0"/>
+              <a:buChar char="•"/>
+            </a:pPr>
+            <a:r>
+              <a:rPr lang="en-US" b="0" dirty="0"/>
+              <a:t>Images can be versioned, so you can be sure the software you release to production is exactly what you’ve tested.</a:t>
+            </a:r>
+          </a:p>
+          <a:p>
+            <a:pPr marL="342900" indent="-342900">
+              <a:buFont typeface="Arial" panose="020B0604020202020204" pitchFamily="34" charset="0"/>
+              <a:buChar char="•"/>
+            </a:pPr>
+            <a:r>
+              <a:rPr lang="en-US" b="0" dirty="0"/>
+              <a:t>With Docker, you can build your application image and know that it will run in the same way on your development laptop, on a VM in an on-premise test lab, or on a cluster of machines in the cloud.</a:t>
+            </a:r>
+            <a:endParaRPr lang="ru-UA" b="0" dirty="0"/>
+          </a:p>
+        </p:txBody>
+      </p:sp>
+      <p:sp>
+        <p:nvSpPr>
+          <p:cNvPr id="3" name="Text Placeholder 2">
+            <a:extLst>
+              <a:ext uri="{FF2B5EF4-FFF2-40B4-BE49-F238E27FC236}">
+                <a16:creationId xmlns:a16="http://schemas.microsoft.com/office/drawing/2014/main" id="{CBA50F54-F9F0-49C1-A1C9-8D18F10A83B3}"/>
+              </a:ext>
+            </a:extLst>
+          </p:cNvPr>
+          <p:cNvSpPr>
+            <a:spLocks noGrp="1"/>
+          </p:cNvSpPr>
+          <p:nvPr>
+            <p:ph type="body" sz="quarter" idx="12"/>
+          </p:nvPr>
+        </p:nvSpPr>
+        <p:spPr/>
+        <p:txBody>
+          <a:bodyPr/>
+          <a:lstStyle/>
+          <a:p>
+            <a:r>
+              <a:rPr lang="en-US" dirty="0"/>
+              <a:t>Advantages of Docker</a:t>
             </a:r>
           </a:p>
         </p:txBody>
@@ -22480,7 +24145,7 @@
     </p:spTree>
     <p:extLst>
       <p:ext uri="{BB962C8B-B14F-4D97-AF65-F5344CB8AC3E}">
-        <p14:creationId xmlns:p14="http://schemas.microsoft.com/office/powerpoint/2010/main" val="3895573058"/>
+        <p14:creationId xmlns:p14="http://schemas.microsoft.com/office/powerpoint/2010/main" val="3868965243"/>
       </p:ext>
     </p:extLst>
   </p:cSld>
@@ -22533,8 +24198,8 @@
               <a:buChar char="•"/>
             </a:pPr>
             <a:r>
-              <a:rPr lang="en-US" dirty="0"/>
-              <a:t>Content</a:t>
+              <a:rPr lang="en-US" b="0" dirty="0"/>
+              <a:t>Docker is open source and cross-platform, and one of its ecosystem’s most compelling aspects is the Docker Hub—a public registry where organizations and individuals share their own application container images.</a:t>
             </a:r>
           </a:p>
           <a:p>
@@ -22542,6 +24207,10 @@
               <a:buFont typeface="Arial" panose="020B0604020202020204" pitchFamily="34" charset="0"/>
               <a:buChar char="•"/>
             </a:pPr>
+            <a:r>
+              <a:rPr lang="en-US" b="0" dirty="0"/>
+              <a:t>In Docker, the packaging process is where development and operations meet, which means it’s a great start for the transition to DevOps. And having a framework for orchestrating work between many containers gives you the foundation for microservice architectures.</a:t>
+            </a:r>
             <a:endParaRPr lang="en-US" dirty="0"/>
           </a:p>
         </p:txBody>
@@ -22569,7 +24238,7 @@
           <a:p>
             <a:r>
               <a:rPr lang="en-US" dirty="0"/>
-              <a:t>Header</a:t>
+              <a:t>Advantages of Docker</a:t>
             </a:r>
           </a:p>
         </p:txBody>
@@ -22577,7 +24246,7 @@
     </p:spTree>
     <p:extLst>
       <p:ext uri="{BB962C8B-B14F-4D97-AF65-F5344CB8AC3E}">
-        <p14:creationId xmlns:p14="http://schemas.microsoft.com/office/powerpoint/2010/main" val="3053133482"/>
+        <p14:creationId xmlns:p14="http://schemas.microsoft.com/office/powerpoint/2010/main" val="3409128669"/>
       </p:ext>
     </p:extLst>
   </p:cSld>
@@ -22606,10 +24275,10 @@
       </p:grpSpPr>
       <p:sp>
         <p:nvSpPr>
-          <p:cNvPr id="2" name="Text Placeholder 1">
+          <p:cNvPr id="2" name="Content Placeholder 1">
             <a:extLst>
               <a:ext uri="{FF2B5EF4-FFF2-40B4-BE49-F238E27FC236}">
-                <a16:creationId xmlns:a16="http://schemas.microsoft.com/office/drawing/2014/main" id="{149FE133-FF4E-4029-8D0B-291BF433476E}"/>
+                <a16:creationId xmlns:a16="http://schemas.microsoft.com/office/drawing/2014/main" id="{AFF96931-CCDB-47D1-B982-0BFE2F5C618C}"/>
               </a:ext>
             </a:extLst>
           </p:cNvPr>
@@ -22617,7 +24286,7 @@
             <a:spLocks noGrp="1"/>
           </p:cNvSpPr>
           <p:nvPr>
-            <p:ph type="body" sz="quarter" idx="10"/>
+            <p:ph idx="1"/>
           </p:nvPr>
         </p:nvSpPr>
         <p:spPr/>
@@ -22625,9 +24294,86 @@
           <a:bodyPr/>
           <a:lstStyle/>
           <a:p>
-            <a:r>
-              <a:rPr lang="en-US" dirty="0"/>
-              <a:t>Image registries and Docker Hub</a:t>
+            <a:pPr marL="342900" indent="-342900">
+              <a:buFont typeface="Arial" panose="020B0604020202020204" pitchFamily="34" charset="0"/>
+              <a:buChar char="•"/>
+            </a:pPr>
+            <a:r>
+              <a:rPr lang="en-US" b="0" dirty="0"/>
+              <a:t>Docker is a single product which has three components:</a:t>
+            </a:r>
+          </a:p>
+          <a:p>
+            <a:pPr marL="1028700" lvl="1" indent="-342900"/>
+            <a:r>
+              <a:rPr lang="en-US" b="0" dirty="0"/>
+              <a:t>Background server that does the work;</a:t>
+            </a:r>
+          </a:p>
+          <a:p>
+            <a:pPr marL="1028700" lvl="1" indent="-342900"/>
+            <a:r>
+              <a:rPr lang="en-US" b="0" dirty="0"/>
+              <a:t>Docker client, a command-line interface for working with the server;</a:t>
+            </a:r>
+          </a:p>
+          <a:p>
+            <a:pPr marL="1028700" lvl="1" indent="-342900"/>
+            <a:r>
+              <a:rPr lang="en-US" b="0" dirty="0"/>
+              <a:t>REST API for client-server communication.</a:t>
+            </a:r>
+          </a:p>
+          <a:p>
+            <a:pPr marL="342900" indent="-342900">
+              <a:buFont typeface="Arial" panose="020B0604020202020204" pitchFamily="34" charset="0"/>
+              <a:buChar char="•"/>
+            </a:pPr>
+            <a:r>
+              <a:rPr lang="en-US" b="0" dirty="0"/>
+              <a:t>The client is cross-platform, which means you can run it natively from Linux, Windows, and OS/X machines, and you can manage Docker running locally or on a remote machine.</a:t>
+            </a:r>
+          </a:p>
+          <a:p>
+            <a:pPr marL="342900" indent="-342900">
+              <a:buFont typeface="Arial" panose="020B0604020202020204" pitchFamily="34" charset="0"/>
+              <a:buChar char="•"/>
+            </a:pPr>
+            <a:r>
+              <a:rPr lang="en-US" b="0" dirty="0"/>
+              <a:t>The Docker server runs on Linux and on the latest versions of Windows.</a:t>
+            </a:r>
+          </a:p>
+          <a:p>
+            <a:pPr marL="342900" indent="-342900"/>
+            <a:endParaRPr lang="en-US" dirty="0"/>
+          </a:p>
+        </p:txBody>
+      </p:sp>
+      <p:sp>
+        <p:nvSpPr>
+          <p:cNvPr id="3" name="Text Placeholder 2">
+            <a:extLst>
+              <a:ext uri="{FF2B5EF4-FFF2-40B4-BE49-F238E27FC236}">
+                <a16:creationId xmlns:a16="http://schemas.microsoft.com/office/drawing/2014/main" id="{CBA50F54-F9F0-49C1-A1C9-8D18F10A83B3}"/>
+              </a:ext>
+            </a:extLst>
+          </p:cNvPr>
+          <p:cNvSpPr>
+            <a:spLocks noGrp="1"/>
+          </p:cNvSpPr>
+          <p:nvPr>
+            <p:ph type="body" sz="quarter" idx="12"/>
+          </p:nvPr>
+        </p:nvSpPr>
+        <p:spPr/>
+        <p:txBody>
+          <a:bodyPr/>
+          <a:lstStyle/>
+          <a:p>
+            <a:r>
+              <a:rPr lang="en-US" dirty="0"/>
+              <a:t>Installing Docker</a:t>
             </a:r>
           </a:p>
         </p:txBody>
@@ -22635,7 +24381,7 @@
     </p:spTree>
     <p:extLst>
       <p:ext uri="{BB962C8B-B14F-4D97-AF65-F5344CB8AC3E}">
-        <p14:creationId xmlns:p14="http://schemas.microsoft.com/office/powerpoint/2010/main" val="4261129366"/>
+        <p14:creationId xmlns:p14="http://schemas.microsoft.com/office/powerpoint/2010/main" val="3793462126"/>
       </p:ext>
     </p:extLst>
   </p:cSld>
@@ -22678,7 +24424,12 @@
             <p:ph idx="1"/>
           </p:nvPr>
         </p:nvSpPr>
-        <p:spPr/>
+        <p:spPr>
+          <a:xfrm>
+            <a:off x="498418" y="1352362"/>
+            <a:ext cx="5597582" cy="4767330"/>
+          </a:xfrm>
+        </p:spPr>
         <p:txBody>
           <a:bodyPr/>
           <a:lstStyle/>
@@ -22688,8 +24439,8 @@
               <a:buChar char="•"/>
             </a:pPr>
             <a:r>
-              <a:rPr lang="en-US" dirty="0"/>
-              <a:t>Content</a:t>
+              <a:rPr lang="en-US" sz="2000" b="0" dirty="0"/>
+              <a:t>The Docker team has put together packages for Mac and Windows that make use of virtualization technology on the host so that your Docker server runs inside a Linux VM on your OS/X or Windows machine (you run the client locally and talk to the server through the REST API exposed on the VM).</a:t>
             </a:r>
           </a:p>
           <a:p>
@@ -22697,7 +24448,32 @@
               <a:buFont typeface="Arial" panose="020B0604020202020204" pitchFamily="34" charset="0"/>
               <a:buChar char="•"/>
             </a:pPr>
-            <a:endParaRPr lang="en-US" dirty="0"/>
+            <a:r>
+              <a:rPr lang="en-US" sz="2000" dirty="0"/>
+              <a:t>On Windows, you’ll need to have Hardware Virtualization (VT-x) enabled in the BIOS to run the Docker Linux VM, and after installing you’ll need to reboot.</a:t>
+            </a:r>
+          </a:p>
+          <a:p>
+            <a:pPr marL="342900" indent="-342900">
+              <a:buFont typeface="Arial" panose="020B0604020202020204" pitchFamily="34" charset="0"/>
+              <a:buChar char="•"/>
+            </a:pPr>
+            <a:r>
+              <a:rPr lang="en-US" sz="2000" dirty="0"/>
+              <a:t>You can switch between Windows containers and Linux containers</a:t>
+            </a:r>
+            <a:endParaRPr lang="en-US" sz="2000" b="0" dirty="0"/>
+          </a:p>
+          <a:p>
+            <a:pPr marL="342900" indent="-342900">
+              <a:buFont typeface="Arial" panose="020B0604020202020204" pitchFamily="34" charset="0"/>
+              <a:buChar char="•"/>
+            </a:pPr>
+            <a:endParaRPr lang="en-US" sz="2000" b="0" dirty="0"/>
+          </a:p>
+          <a:p>
+            <a:pPr marL="342900" indent="-342900"/>
+            <a:endParaRPr lang="en-US" sz="2000" dirty="0"/>
           </a:p>
         </p:txBody>
       </p:sp>
@@ -22724,15 +24500,45 @@
           <a:p>
             <a:r>
               <a:rPr lang="en-US" dirty="0"/>
-              <a:t>Header</a:t>
+              <a:t>Installing Docker</a:t>
             </a:r>
           </a:p>
         </p:txBody>
       </p:sp>
+      <p:pic>
+        <p:nvPicPr>
+          <p:cNvPr id="4" name="Picture 3">
+            <a:extLst>
+              <a:ext uri="{FF2B5EF4-FFF2-40B4-BE49-F238E27FC236}">
+                <a16:creationId xmlns:a16="http://schemas.microsoft.com/office/drawing/2014/main" id="{9B8C1755-AEE9-479A-99E9-B300D41AFD47}"/>
+              </a:ext>
+            </a:extLst>
+          </p:cNvPr>
+          <p:cNvPicPr>
+            <a:picLocks noChangeAspect="1"/>
+          </p:cNvPicPr>
+          <p:nvPr/>
+        </p:nvPicPr>
+        <p:blipFill>
+          <a:blip r:embed="rId3"/>
+          <a:stretch>
+            <a:fillRect/>
+          </a:stretch>
+        </p:blipFill>
+        <p:spPr>
+          <a:xfrm>
+            <a:off x="6281624" y="1076940"/>
+            <a:ext cx="5439001" cy="5161320"/>
+          </a:xfrm>
+          <a:prstGeom prst="rect">
+            <a:avLst/>
+          </a:prstGeom>
+        </p:spPr>
+      </p:pic>
     </p:spTree>
     <p:extLst>
       <p:ext uri="{BB962C8B-B14F-4D97-AF65-F5344CB8AC3E}">
-        <p14:creationId xmlns:p14="http://schemas.microsoft.com/office/powerpoint/2010/main" val="2047067086"/>
+        <p14:creationId xmlns:p14="http://schemas.microsoft.com/office/powerpoint/2010/main" val="224369129"/>
       </p:ext>
     </p:extLst>
   </p:cSld>

</xml_diff>

<commit_message>
Add script for running windows container, change names of containers
</commit_message>
<xml_diff>
--- a/docs/Introduction to Docker.pptx
+++ b/docs/Introduction to Docker.pptx
@@ -343,7 +343,7 @@
               <a:rPr lang="en-US" smtClean="0">
                 <a:latin typeface="Open Sans" panose="020B0606030504020204" pitchFamily="34" charset="0"/>
               </a:rPr>
-              <a:t>10/11/2019</a:t>
+              <a:t>10/12/2019</a:t>
             </a:fld>
             <a:endParaRPr lang="en-US" dirty="0">
               <a:latin typeface="Open Sans" panose="020B0606030504020204" pitchFamily="34" charset="0"/>
@@ -528,7 +528,7 @@
           <a:p>
             <a:fld id="{1287E087-90D8-45F8-80C0-6755C3C3CEFE}" type="datetimeFigureOut">
               <a:rPr lang="en-US" smtClean="0"/>
-              <a:t>10/11/2019</a:t>
+              <a:t>10/12/2019</a:t>
             </a:fld>
             <a:endParaRPr lang="en-US"/>
           </a:p>
@@ -1147,6 +1147,23 @@
               <a:rPr lang="en-US" dirty="0"/>
               <a:t>When connecting to SQL Server using SQL Server Management Studio, specify “localhost,14330” as server name</a:t>
             </a:r>
+          </a:p>
+          <a:p>
+            <a:r>
+              <a:rPr lang="en-US" dirty="0"/>
+              <a:t>Show switching from Linux containers to Windows containers, show output of “docker version” command after switching.</a:t>
+            </a:r>
+          </a:p>
+          <a:p>
+            <a:r>
+              <a:rPr lang="en-US" dirty="0"/>
+              <a:t>Mention requirement to install updates to be able to run Windows containers. Show output of “docker version” command, it includes </a:t>
+            </a:r>
+            <a:r>
+              <a:rPr lang="en-US"/>
+              <a:t>system architecture.</a:t>
+            </a:r>
+            <a:endParaRPr lang="en-US" dirty="0"/>
           </a:p>
         </p:txBody>
       </p:sp>

</xml_diff>

<commit_message>
Add slides and samples on Image Registries topic
</commit_message>
<xml_diff>
--- a/docs/Introduction to Docker.pptx
+++ b/docs/Introduction to Docker.pptx
@@ -5,10 +5,10 @@
     <p:sldMasterId id="2147483648" r:id="rId1"/>
   </p:sldMasterIdLst>
   <p:notesMasterIdLst>
-    <p:notesMasterId r:id="rId27"/>
+    <p:notesMasterId r:id="rId37"/>
   </p:notesMasterIdLst>
   <p:handoutMasterIdLst>
-    <p:handoutMasterId r:id="rId28"/>
+    <p:handoutMasterId r:id="rId38"/>
   </p:handoutMasterIdLst>
   <p:sldIdLst>
     <p:sldId id="279" r:id="rId2"/>
@@ -23,55 +23,65 @@
     <p:sldId id="720" r:id="rId11"/>
     <p:sldId id="721" r:id="rId12"/>
     <p:sldId id="722" r:id="rId13"/>
-    <p:sldId id="723" r:id="rId14"/>
-    <p:sldId id="688" r:id="rId15"/>
-    <p:sldId id="709" r:id="rId16"/>
-    <p:sldId id="689" r:id="rId17"/>
-    <p:sldId id="710" r:id="rId18"/>
-    <p:sldId id="690" r:id="rId19"/>
-    <p:sldId id="711" r:id="rId20"/>
-    <p:sldId id="691" r:id="rId21"/>
-    <p:sldId id="712" r:id="rId22"/>
-    <p:sldId id="692" r:id="rId23"/>
-    <p:sldId id="713" r:id="rId24"/>
-    <p:sldId id="321" r:id="rId25"/>
-    <p:sldId id="320" r:id="rId26"/>
+    <p:sldId id="725" r:id="rId14"/>
+    <p:sldId id="726" r:id="rId15"/>
+    <p:sldId id="723" r:id="rId16"/>
+    <p:sldId id="688" r:id="rId17"/>
+    <p:sldId id="709" r:id="rId18"/>
+    <p:sldId id="689" r:id="rId19"/>
+    <p:sldId id="710" r:id="rId20"/>
+    <p:sldId id="724" r:id="rId21"/>
+    <p:sldId id="727" r:id="rId22"/>
+    <p:sldId id="728" r:id="rId23"/>
+    <p:sldId id="729" r:id="rId24"/>
+    <p:sldId id="730" r:id="rId25"/>
+    <p:sldId id="731" r:id="rId26"/>
+    <p:sldId id="732" r:id="rId27"/>
+    <p:sldId id="733" r:id="rId28"/>
+    <p:sldId id="690" r:id="rId29"/>
+    <p:sldId id="711" r:id="rId30"/>
+    <p:sldId id="691" r:id="rId31"/>
+    <p:sldId id="712" r:id="rId32"/>
+    <p:sldId id="692" r:id="rId33"/>
+    <p:sldId id="713" r:id="rId34"/>
+    <p:sldId id="321" r:id="rId35"/>
+    <p:sldId id="320" r:id="rId36"/>
   </p:sldIdLst>
   <p:sldSz cx="12192000" cy="6858000"/>
   <p:notesSz cx="6858000" cy="9144000"/>
   <p:embeddedFontLst>
     <p:embeddedFont>
       <p:font typeface="Calibri" panose="020F0502020204030204" pitchFamily="34" charset="0"/>
-      <p:regular r:id="rId29"/>
-      <p:bold r:id="rId30"/>
-      <p:italic r:id="rId31"/>
-      <p:boldItalic r:id="rId32"/>
+      <p:regular r:id="rId39"/>
+      <p:bold r:id="rId40"/>
+      <p:italic r:id="rId41"/>
+      <p:boldItalic r:id="rId42"/>
     </p:embeddedFont>
     <p:embeddedFont>
       <p:font typeface="Consolas" panose="020B0609020204030204" pitchFamily="49" charset="0"/>
-      <p:regular r:id="rId33"/>
-      <p:bold r:id="rId34"/>
-      <p:italic r:id="rId35"/>
-      <p:boldItalic r:id="rId36"/>
-    </p:embeddedFont>
-    <p:embeddedFont>
-      <p:font typeface="Open Sans" panose="020B0606030504020204" pitchFamily="34" charset="0"/>
-      <p:regular r:id="rId37"/>
-      <p:bold r:id="rId38"/>
-      <p:italic r:id="rId39"/>
-      <p:boldItalic r:id="rId40"/>
-    </p:embeddedFont>
-    <p:embeddedFont>
-      <p:font typeface="Open Sans Light" panose="020B0306030504020204" pitchFamily="34" charset="0"/>
-      <p:regular r:id="rId41"/>
-      <p:italic r:id="rId42"/>
-    </p:embeddedFont>
-    <p:embeddedFont>
-      <p:font typeface="Open Sans Semibold" panose="020B0706030804020204" pitchFamily="34" charset="0"/>
       <p:regular r:id="rId43"/>
       <p:bold r:id="rId44"/>
       <p:italic r:id="rId45"/>
       <p:boldItalic r:id="rId46"/>
+    </p:embeddedFont>
+    <p:embeddedFont>
+      <p:font typeface="Open Sans" panose="020B0606030504020204" pitchFamily="34" charset="0"/>
+      <p:regular r:id="rId47"/>
+      <p:bold r:id="rId48"/>
+      <p:italic r:id="rId49"/>
+      <p:boldItalic r:id="rId50"/>
+    </p:embeddedFont>
+    <p:embeddedFont>
+      <p:font typeface="Open Sans Light" panose="020B0306030504020204" pitchFamily="34" charset="0"/>
+      <p:regular r:id="rId51"/>
+      <p:italic r:id="rId52"/>
+    </p:embeddedFont>
+    <p:embeddedFont>
+      <p:font typeface="Open Sans Semibold" panose="020B0706030804020204" pitchFamily="34" charset="0"/>
+      <p:regular r:id="rId53"/>
+      <p:bold r:id="rId54"/>
+      <p:italic r:id="rId55"/>
+      <p:boldItalic r:id="rId56"/>
     </p:embeddedFont>
   </p:embeddedFontLst>
   <p:defaultTextStyle>
@@ -194,6 +204,8 @@
             <p14:sldId id="720"/>
             <p14:sldId id="721"/>
             <p14:sldId id="722"/>
+            <p14:sldId id="725"/>
+            <p14:sldId id="726"/>
             <p14:sldId id="723"/>
           </p14:sldIdLst>
         </p14:section>
@@ -207,6 +219,14 @@
           <p14:sldIdLst>
             <p14:sldId id="689"/>
             <p14:sldId id="710"/>
+            <p14:sldId id="724"/>
+            <p14:sldId id="727"/>
+            <p14:sldId id="728"/>
+            <p14:sldId id="729"/>
+            <p14:sldId id="730"/>
+            <p14:sldId id="731"/>
+            <p14:sldId id="732"/>
+            <p14:sldId id="733"/>
           </p14:sldIdLst>
         </p14:section>
         <p14:section name="Data Storage in Docker" id="{DF5471D5-A005-4306-9E5F-BA269DEE6079}">
@@ -343,7 +363,7 @@
               <a:rPr lang="en-US" smtClean="0">
                 <a:latin typeface="Open Sans" panose="020B0606030504020204" pitchFamily="34" charset="0"/>
               </a:rPr>
-              <a:t>10/12/2019</a:t>
+              <a:t>10/14/2019</a:t>
             </a:fld>
             <a:endParaRPr lang="en-US" dirty="0">
               <a:latin typeface="Open Sans" panose="020B0606030504020204" pitchFamily="34" charset="0"/>
@@ -528,7 +548,7 @@
           <a:p>
             <a:fld id="{1287E087-90D8-45F8-80C0-6755C3C3CEFE}" type="datetimeFigureOut">
               <a:rPr lang="en-US" smtClean="0"/>
-              <a:t>10/12/2019</a:t>
+              <a:t>10/14/2019</a:t>
             </a:fld>
             <a:endParaRPr lang="en-US"/>
           </a:p>
@@ -1129,40 +1149,6 @@
           <a:bodyPr/>
           <a:lstStyle/>
           <a:p>
-            <a:r>
-              <a:rPr lang="en-US" dirty="0"/>
-              <a:t>Sample commands can be found in </a:t>
-            </a:r>
-            <a:r>
-              <a:rPr lang="en-US" dirty="0" err="1"/>
-              <a:t>src</a:t>
-            </a:r>
-            <a:r>
-              <a:rPr lang="en-US" dirty="0"/>
-              <a:t>/01_Introducing_Docker</a:t>
-            </a:r>
-          </a:p>
-          <a:p>
-            <a:r>
-              <a:rPr lang="en-US" dirty="0"/>
-              <a:t>When connecting to SQL Server using SQL Server Management Studio, specify “localhost,14330” as server name</a:t>
-            </a:r>
-          </a:p>
-          <a:p>
-            <a:r>
-              <a:rPr lang="en-US" dirty="0"/>
-              <a:t>Show switching from Linux containers to Windows containers, show output of “docker version” command after switching.</a:t>
-            </a:r>
-          </a:p>
-          <a:p>
-            <a:r>
-              <a:rPr lang="en-US" dirty="0"/>
-              <a:t>Mention requirement to install updates to be able to run Windows containers. Show output of “docker version” command, it includes </a:t>
-            </a:r>
-            <a:r>
-              <a:rPr lang="en-US"/>
-              <a:t>system architecture.</a:t>
-            </a:r>
             <a:endParaRPr lang="en-US" dirty="0"/>
           </a:p>
         </p:txBody>
@@ -1193,7 +1179,304 @@
     </p:spTree>
     <p:extLst>
       <p:ext uri="{BB962C8B-B14F-4D97-AF65-F5344CB8AC3E}">
+        <p14:creationId xmlns:p14="http://schemas.microsoft.com/office/powerpoint/2010/main" val="3803103177"/>
+      </p:ext>
+    </p:extLst>
+  </p:cSld>
+  <p:clrMapOvr>
+    <a:masterClrMapping/>
+  </p:clrMapOvr>
+</p:notes>
+</file>
+
+<file path=ppt/notesSlides/notesSlide11.xml><?xml version="1.0" encoding="utf-8"?>
+<p:notes xmlns:a="http://schemas.openxmlformats.org/drawingml/2006/main" xmlns:r="http://schemas.openxmlformats.org/officeDocument/2006/relationships" xmlns:p="http://schemas.openxmlformats.org/presentationml/2006/main">
+  <p:cSld>
+    <p:spTree>
+      <p:nvGrpSpPr>
+        <p:cNvPr id="1" name=""/>
+        <p:cNvGrpSpPr/>
+        <p:nvPr/>
+      </p:nvGrpSpPr>
+      <p:grpSpPr>
+        <a:xfrm>
+          <a:off x="0" y="0"/>
+          <a:ext cx="0" cy="0"/>
+          <a:chOff x="0" y="0"/>
+          <a:chExt cx="0" cy="0"/>
+        </a:xfrm>
+      </p:grpSpPr>
+      <p:sp>
+        <p:nvSpPr>
+          <p:cNvPr id="2" name="Slide Image Placeholder 1"/>
+          <p:cNvSpPr>
+            <a:spLocks noGrp="1" noRot="1" noChangeAspect="1"/>
+          </p:cNvSpPr>
+          <p:nvPr>
+            <p:ph type="sldImg"/>
+          </p:nvPr>
+        </p:nvSpPr>
+        <p:spPr/>
+      </p:sp>
+      <p:sp>
+        <p:nvSpPr>
+          <p:cNvPr id="3" name="Notes Placeholder 2"/>
+          <p:cNvSpPr>
+            <a:spLocks noGrp="1"/>
+          </p:cNvSpPr>
+          <p:nvPr>
+            <p:ph type="body" idx="1"/>
+          </p:nvPr>
+        </p:nvSpPr>
+        <p:spPr/>
+        <p:txBody>
+          <a:bodyPr/>
+          <a:lstStyle/>
+          <a:p>
+            <a:endParaRPr lang="en-US" dirty="0"/>
+          </a:p>
+        </p:txBody>
+      </p:sp>
+      <p:sp>
+        <p:nvSpPr>
+          <p:cNvPr id="4" name="Slide Number Placeholder 3"/>
+          <p:cNvSpPr>
+            <a:spLocks noGrp="1"/>
+          </p:cNvSpPr>
+          <p:nvPr>
+            <p:ph type="sldNum" sz="quarter" idx="5"/>
+          </p:nvPr>
+        </p:nvSpPr>
+        <p:spPr/>
+        <p:txBody>
+          <a:bodyPr/>
+          <a:lstStyle/>
+          <a:p>
+            <a:fld id="{AA4E6B44-8A2D-409F-997F-4C23C1BB012E}" type="slidenum">
+              <a:rPr lang="en-US" smtClean="0"/>
+              <a:t>14</a:t>
+            </a:fld>
+            <a:endParaRPr lang="en-US"/>
+          </a:p>
+        </p:txBody>
+      </p:sp>
+    </p:spTree>
+    <p:extLst>
+      <p:ext uri="{BB962C8B-B14F-4D97-AF65-F5344CB8AC3E}">
+        <p14:creationId xmlns:p14="http://schemas.microsoft.com/office/powerpoint/2010/main" val="333974542"/>
+      </p:ext>
+    </p:extLst>
+  </p:cSld>
+  <p:clrMapOvr>
+    <a:masterClrMapping/>
+  </p:clrMapOvr>
+</p:notes>
+</file>
+
+<file path=ppt/notesSlides/notesSlide12.xml><?xml version="1.0" encoding="utf-8"?>
+<p:notes xmlns:a="http://schemas.openxmlformats.org/drawingml/2006/main" xmlns:r="http://schemas.openxmlformats.org/officeDocument/2006/relationships" xmlns:p="http://schemas.openxmlformats.org/presentationml/2006/main">
+  <p:cSld>
+    <p:spTree>
+      <p:nvGrpSpPr>
+        <p:cNvPr id="1" name=""/>
+        <p:cNvGrpSpPr/>
+        <p:nvPr/>
+      </p:nvGrpSpPr>
+      <p:grpSpPr>
+        <a:xfrm>
+          <a:off x="0" y="0"/>
+          <a:ext cx="0" cy="0"/>
+          <a:chOff x="0" y="0"/>
+          <a:chExt cx="0" cy="0"/>
+        </a:xfrm>
+      </p:grpSpPr>
+      <p:sp>
+        <p:nvSpPr>
+          <p:cNvPr id="2" name="Slide Image Placeholder 1"/>
+          <p:cNvSpPr>
+            <a:spLocks noGrp="1" noRot="1" noChangeAspect="1"/>
+          </p:cNvSpPr>
+          <p:nvPr>
+            <p:ph type="sldImg"/>
+          </p:nvPr>
+        </p:nvSpPr>
+        <p:spPr/>
+      </p:sp>
+      <p:sp>
+        <p:nvSpPr>
+          <p:cNvPr id="3" name="Notes Placeholder 2"/>
+          <p:cNvSpPr>
+            <a:spLocks noGrp="1"/>
+          </p:cNvSpPr>
+          <p:nvPr>
+            <p:ph type="body" idx="1"/>
+          </p:nvPr>
+        </p:nvSpPr>
+        <p:spPr/>
+        <p:txBody>
+          <a:bodyPr/>
+          <a:lstStyle/>
+          <a:p>
+            <a:r>
+              <a:rPr lang="en-US" dirty="0"/>
+              <a:t>Sample commands can be found in </a:t>
+            </a:r>
+            <a:r>
+              <a:rPr lang="en-US" dirty="0" err="1"/>
+              <a:t>src</a:t>
+            </a:r>
+            <a:r>
+              <a:rPr lang="en-US" dirty="0"/>
+              <a:t>/01_Introducing_Docker</a:t>
+            </a:r>
+          </a:p>
+          <a:p>
+            <a:r>
+              <a:rPr lang="en-US" dirty="0"/>
+              <a:t>When connecting to SQL Server using SQL Server Management Studio, specify “localhost,14330” as server name</a:t>
+            </a:r>
+          </a:p>
+          <a:p>
+            <a:r>
+              <a:rPr lang="en-US" dirty="0"/>
+              <a:t>Show switching from Linux containers to Windows containers, show output of “docker version” command after switching.</a:t>
+            </a:r>
+          </a:p>
+          <a:p>
+            <a:r>
+              <a:rPr lang="en-US" dirty="0"/>
+              <a:t>Mention requirement to install updates to be able to run Windows containers. Show output of “docker version” command, it includes </a:t>
+            </a:r>
+            <a:r>
+              <a:rPr lang="en-US"/>
+              <a:t>system architecture.</a:t>
+            </a:r>
+            <a:endParaRPr lang="en-US" dirty="0"/>
+          </a:p>
+        </p:txBody>
+      </p:sp>
+      <p:sp>
+        <p:nvSpPr>
+          <p:cNvPr id="4" name="Slide Number Placeholder 3"/>
+          <p:cNvSpPr>
+            <a:spLocks noGrp="1"/>
+          </p:cNvSpPr>
+          <p:nvPr>
+            <p:ph type="sldNum" sz="quarter" idx="5"/>
+          </p:nvPr>
+        </p:nvSpPr>
+        <p:spPr/>
+        <p:txBody>
+          <a:bodyPr/>
+          <a:lstStyle/>
+          <a:p>
+            <a:fld id="{AA4E6B44-8A2D-409F-997F-4C23C1BB012E}" type="slidenum">
+              <a:rPr lang="en-US" smtClean="0"/>
+              <a:t>15</a:t>
+            </a:fld>
+            <a:endParaRPr lang="en-US"/>
+          </a:p>
+        </p:txBody>
+      </p:sp>
+    </p:spTree>
+    <p:extLst>
+      <p:ext uri="{BB962C8B-B14F-4D97-AF65-F5344CB8AC3E}">
         <p14:creationId xmlns:p14="http://schemas.microsoft.com/office/powerpoint/2010/main" val="847710781"/>
+      </p:ext>
+    </p:extLst>
+  </p:cSld>
+  <p:clrMapOvr>
+    <a:masterClrMapping/>
+  </p:clrMapOvr>
+</p:notes>
+</file>
+
+<file path=ppt/notesSlides/notesSlide13.xml><?xml version="1.0" encoding="utf-8"?>
+<p:notes xmlns:a="http://schemas.openxmlformats.org/drawingml/2006/main" xmlns:r="http://schemas.openxmlformats.org/officeDocument/2006/relationships" xmlns:p="http://schemas.openxmlformats.org/presentationml/2006/main">
+  <p:cSld>
+    <p:spTree>
+      <p:nvGrpSpPr>
+        <p:cNvPr id="1" name=""/>
+        <p:cNvGrpSpPr/>
+        <p:nvPr/>
+      </p:nvGrpSpPr>
+      <p:grpSpPr>
+        <a:xfrm>
+          <a:off x="0" y="0"/>
+          <a:ext cx="0" cy="0"/>
+          <a:chOff x="0" y="0"/>
+          <a:chExt cx="0" cy="0"/>
+        </a:xfrm>
+      </p:grpSpPr>
+      <p:sp>
+        <p:nvSpPr>
+          <p:cNvPr id="2" name="Slide Image Placeholder 1"/>
+          <p:cNvSpPr>
+            <a:spLocks noGrp="1" noRot="1" noChangeAspect="1"/>
+          </p:cNvSpPr>
+          <p:nvPr>
+            <p:ph type="sldImg"/>
+          </p:nvPr>
+        </p:nvSpPr>
+        <p:spPr/>
+      </p:sp>
+      <p:sp>
+        <p:nvSpPr>
+          <p:cNvPr id="3" name="Notes Placeholder 2"/>
+          <p:cNvSpPr>
+            <a:spLocks noGrp="1"/>
+          </p:cNvSpPr>
+          <p:nvPr>
+            <p:ph type="body" idx="1"/>
+          </p:nvPr>
+        </p:nvSpPr>
+        <p:spPr/>
+        <p:txBody>
+          <a:bodyPr/>
+          <a:lstStyle/>
+          <a:p>
+            <a:r>
+              <a:rPr lang="en-US" dirty="0"/>
+              <a:t>Sample commands can be found in </a:t>
+            </a:r>
+            <a:r>
+              <a:rPr lang="en-US" dirty="0" err="1"/>
+              <a:t>src</a:t>
+            </a:r>
+            <a:r>
+              <a:rPr lang="en-US" dirty="0"/>
+              <a:t>/03_Image_registries_and_Docker_Hub</a:t>
+            </a:r>
+          </a:p>
+        </p:txBody>
+      </p:sp>
+      <p:sp>
+        <p:nvSpPr>
+          <p:cNvPr id="4" name="Slide Number Placeholder 3"/>
+          <p:cNvSpPr>
+            <a:spLocks noGrp="1"/>
+          </p:cNvSpPr>
+          <p:nvPr>
+            <p:ph type="sldNum" sz="quarter" idx="5"/>
+          </p:nvPr>
+        </p:nvSpPr>
+        <p:spPr/>
+        <p:txBody>
+          <a:bodyPr/>
+          <a:lstStyle/>
+          <a:p>
+            <a:fld id="{AA4E6B44-8A2D-409F-997F-4C23C1BB012E}" type="slidenum">
+              <a:rPr lang="en-US" smtClean="0"/>
+              <a:t>27</a:t>
+            </a:fld>
+            <a:endParaRPr lang="en-US"/>
+          </a:p>
+        </p:txBody>
+      </p:sp>
+    </p:spTree>
+    <p:extLst>
+      <p:ext uri="{BB962C8B-B14F-4D97-AF65-F5344CB8AC3E}">
+        <p14:creationId xmlns:p14="http://schemas.microsoft.com/office/powerpoint/2010/main" val="4008943788"/>
       </p:ext>
     </p:extLst>
   </p:cSld>
@@ -22604,14 +22887,41 @@
         </p:nvSpPr>
         <p:spPr/>
         <p:txBody>
-          <a:bodyPr anchor="ctr"/>
+          <a:bodyPr/>
           <a:lstStyle/>
           <a:p>
-            <a:pPr algn="ctr"/>
-            <a:r>
-              <a:rPr lang="en-US" sz="9600" b="0" dirty="0"/>
-              <a:t>DEMO</a:t>
-            </a:r>
+            <a:pPr marL="342900" indent="-342900">
+              <a:buFont typeface="Arial" panose="020B0604020202020204" pitchFamily="34" charset="0"/>
+              <a:buChar char="•"/>
+            </a:pPr>
+            <a:r>
+              <a:rPr lang="en-US" b="0" dirty="0"/>
+              <a:t>Run a command in a new container:</a:t>
+            </a:r>
+          </a:p>
+          <a:p>
+            <a:pPr marL="1028700" lvl="1" indent="-342900"/>
+            <a:r>
+              <a:rPr lang="en-US" dirty="0">
+                <a:latin typeface="Consolas" panose="020B0609020204030204" pitchFamily="49" charset="0"/>
+              </a:rPr>
+              <a:t>docker container run [OPTIONS] IMAGE [COMMAND] [ARG...]</a:t>
+            </a:r>
+            <a:endParaRPr lang="en-US" b="0" dirty="0">
+              <a:latin typeface="Consolas" panose="020B0609020204030204" pitchFamily="49" charset="0"/>
+            </a:endParaRPr>
+          </a:p>
+          <a:p>
+            <a:pPr marL="342900" indent="-342900">
+              <a:buFont typeface="Arial" panose="020B0604020202020204" pitchFamily="34" charset="0"/>
+              <a:buChar char="•"/>
+            </a:pPr>
+            <a:r>
+              <a:rPr lang="en-US" b="0" dirty="0"/>
+              <a:t>Frequently used options:</a:t>
+            </a:r>
+          </a:p>
+          <a:p>
             <a:r>
               <a:rPr lang="en-US" b="0" dirty="0"/>
               <a:t> </a:t>
@@ -22656,12 +22966,315 @@
               <a:t>Running containers</a:t>
             </a:r>
           </a:p>
+          <a:p>
+            <a:endParaRPr lang="en-US" dirty="0"/>
+          </a:p>
         </p:txBody>
       </p:sp>
+      <p:graphicFrame>
+        <p:nvGraphicFramePr>
+          <p:cNvPr id="6" name="Table 6">
+            <a:extLst>
+              <a:ext uri="{FF2B5EF4-FFF2-40B4-BE49-F238E27FC236}">
+                <a16:creationId xmlns:a16="http://schemas.microsoft.com/office/drawing/2014/main" id="{90297064-2960-433E-8E80-A5A8315BB290}"/>
+              </a:ext>
+            </a:extLst>
+          </p:cNvPr>
+          <p:cNvGraphicFramePr>
+            <a:graphicFrameLocks noGrp="1"/>
+          </p:cNvGraphicFramePr>
+          <p:nvPr>
+            <p:extLst>
+              <p:ext uri="{D42A27DB-BD31-4B8C-83A1-F6EECF244321}">
+                <p14:modId xmlns:p14="http://schemas.microsoft.com/office/powerpoint/2010/main" val="816298275"/>
+              </p:ext>
+            </p:extLst>
+          </p:nvPr>
+        </p:nvGraphicFramePr>
+        <p:xfrm>
+          <a:off x="525312" y="2687320"/>
+          <a:ext cx="11168270" cy="2225040"/>
+        </p:xfrm>
+        <a:graphic>
+          <a:graphicData uri="http://schemas.openxmlformats.org/drawingml/2006/table">
+            <a:tbl>
+              <a:tblPr firstRow="1" bandRow="1">
+                <a:tableStyleId>{073A0DAA-6AF3-43AB-8588-CEC1D06C72B9}</a:tableStyleId>
+              </a:tblPr>
+              <a:tblGrid>
+                <a:gridCol w="3960191">
+                  <a:extLst>
+                    <a:ext uri="{9D8B030D-6E8A-4147-A177-3AD203B41FA5}">
+                      <a16:colId xmlns:a16="http://schemas.microsoft.com/office/drawing/2014/main" val="1976949975"/>
+                    </a:ext>
+                  </a:extLst>
+                </a:gridCol>
+                <a:gridCol w="7208079">
+                  <a:extLst>
+                    <a:ext uri="{9D8B030D-6E8A-4147-A177-3AD203B41FA5}">
+                      <a16:colId xmlns:a16="http://schemas.microsoft.com/office/drawing/2014/main" val="486710015"/>
+                    </a:ext>
+                  </a:extLst>
+                </a:gridCol>
+              </a:tblGrid>
+              <a:tr h="370840">
+                <a:tc>
+                  <a:txBody>
+                    <a:bodyPr/>
+                    <a:lstStyle/>
+                    <a:p>
+                      <a:r>
+                        <a:rPr lang="en-US" dirty="0"/>
+                        <a:t>Option</a:t>
+                      </a:r>
+                    </a:p>
+                  </a:txBody>
+                  <a:tcPr/>
+                </a:tc>
+                <a:tc>
+                  <a:txBody>
+                    <a:bodyPr/>
+                    <a:lstStyle/>
+                    <a:p>
+                      <a:r>
+                        <a:rPr lang="en-US" dirty="0"/>
+                        <a:t>Description</a:t>
+                      </a:r>
+                    </a:p>
+                  </a:txBody>
+                  <a:tcPr/>
+                </a:tc>
+                <a:extLst>
+                  <a:ext uri="{0D108BD9-81ED-4DB2-BD59-A6C34878D82A}">
+                    <a16:rowId xmlns:a16="http://schemas.microsoft.com/office/drawing/2014/main" val="1510308222"/>
+                  </a:ext>
+                </a:extLst>
+              </a:tr>
+              <a:tr h="370840">
+                <a:tc>
+                  <a:txBody>
+                    <a:bodyPr/>
+                    <a:lstStyle/>
+                    <a:p>
+                      <a:r>
+                        <a:rPr lang="en-US" dirty="0">
+                          <a:latin typeface="Consolas" panose="020B0609020204030204" pitchFamily="49" charset="0"/>
+                        </a:rPr>
+                        <a:t>-d, --detach</a:t>
+                      </a:r>
+                    </a:p>
+                  </a:txBody>
+                  <a:tcPr/>
+                </a:tc>
+                <a:tc>
+                  <a:txBody>
+                    <a:bodyPr/>
+                    <a:lstStyle/>
+                    <a:p>
+                      <a:r>
+                        <a:rPr lang="en-US" dirty="0"/>
+                        <a:t>Run container in background and print container ID</a:t>
+                      </a:r>
+                    </a:p>
+                  </a:txBody>
+                  <a:tcPr/>
+                </a:tc>
+                <a:extLst>
+                  <a:ext uri="{0D108BD9-81ED-4DB2-BD59-A6C34878D82A}">
+                    <a16:rowId xmlns:a16="http://schemas.microsoft.com/office/drawing/2014/main" val="2468265737"/>
+                  </a:ext>
+                </a:extLst>
+              </a:tr>
+              <a:tr h="370840">
+                <a:tc>
+                  <a:txBody>
+                    <a:bodyPr/>
+                    <a:lstStyle/>
+                    <a:p>
+                      <a:r>
+                        <a:rPr lang="fr-FR" dirty="0">
+                          <a:latin typeface="Consolas" panose="020B0609020204030204" pitchFamily="49" charset="0"/>
+                        </a:rPr>
+                        <a:t>-e, --</a:t>
+                      </a:r>
+                      <a:r>
+                        <a:rPr lang="fr-FR" dirty="0" err="1">
+                          <a:latin typeface="Consolas" panose="020B0609020204030204" pitchFamily="49" charset="0"/>
+                        </a:rPr>
+                        <a:t>env</a:t>
+                      </a:r>
+                      <a:r>
+                        <a:rPr lang="fr-FR" dirty="0">
+                          <a:latin typeface="Consolas" panose="020B0609020204030204" pitchFamily="49" charset="0"/>
+                        </a:rPr>
+                        <a:t> </a:t>
+                      </a:r>
+                      <a:r>
+                        <a:rPr lang="fr-FR" dirty="0" err="1">
+                          <a:latin typeface="Consolas" panose="020B0609020204030204" pitchFamily="49" charset="0"/>
+                        </a:rPr>
+                        <a:t>list</a:t>
+                      </a:r>
+                      <a:endParaRPr lang="en-US" dirty="0">
+                        <a:latin typeface="Consolas" panose="020B0609020204030204" pitchFamily="49" charset="0"/>
+                      </a:endParaRPr>
+                    </a:p>
+                  </a:txBody>
+                  <a:tcPr/>
+                </a:tc>
+                <a:tc>
+                  <a:txBody>
+                    <a:bodyPr/>
+                    <a:lstStyle/>
+                    <a:p>
+                      <a:r>
+                        <a:rPr lang="fr-FR" dirty="0"/>
+                        <a:t>Set </a:t>
+                      </a:r>
+                      <a:r>
+                        <a:rPr lang="fr-FR" dirty="0" err="1"/>
+                        <a:t>environment</a:t>
+                      </a:r>
+                      <a:r>
+                        <a:rPr lang="fr-FR" dirty="0"/>
+                        <a:t> variables</a:t>
+                      </a:r>
+                      <a:endParaRPr lang="en-US" dirty="0"/>
+                    </a:p>
+                  </a:txBody>
+                  <a:tcPr/>
+                </a:tc>
+                <a:extLst>
+                  <a:ext uri="{0D108BD9-81ED-4DB2-BD59-A6C34878D82A}">
+                    <a16:rowId xmlns:a16="http://schemas.microsoft.com/office/drawing/2014/main" val="2618166127"/>
+                  </a:ext>
+                </a:extLst>
+              </a:tr>
+              <a:tr h="370840">
+                <a:tc>
+                  <a:txBody>
+                    <a:bodyPr/>
+                    <a:lstStyle/>
+                    <a:p>
+                      <a:r>
+                        <a:rPr lang="en-US" dirty="0">
+                          <a:latin typeface="Consolas" panose="020B0609020204030204" pitchFamily="49" charset="0"/>
+                        </a:rPr>
+                        <a:t>-</a:t>
+                      </a:r>
+                      <a:r>
+                        <a:rPr lang="en-US" dirty="0" err="1">
+                          <a:latin typeface="Consolas" panose="020B0609020204030204" pitchFamily="49" charset="0"/>
+                        </a:rPr>
+                        <a:t>i</a:t>
+                      </a:r>
+                      <a:r>
+                        <a:rPr lang="en-US" dirty="0">
+                          <a:latin typeface="Consolas" panose="020B0609020204030204" pitchFamily="49" charset="0"/>
+                        </a:rPr>
+                        <a:t>, --interactive</a:t>
+                      </a:r>
+                    </a:p>
+                  </a:txBody>
+                  <a:tcPr/>
+                </a:tc>
+                <a:tc>
+                  <a:txBody>
+                    <a:bodyPr/>
+                    <a:lstStyle/>
+                    <a:p>
+                      <a:r>
+                        <a:rPr lang="en-US" dirty="0"/>
+                        <a:t>Keep STDIN open even if not attached</a:t>
+                      </a:r>
+                    </a:p>
+                  </a:txBody>
+                  <a:tcPr/>
+                </a:tc>
+                <a:extLst>
+                  <a:ext uri="{0D108BD9-81ED-4DB2-BD59-A6C34878D82A}">
+                    <a16:rowId xmlns:a16="http://schemas.microsoft.com/office/drawing/2014/main" val="115566168"/>
+                  </a:ext>
+                </a:extLst>
+              </a:tr>
+              <a:tr h="370840">
+                <a:tc>
+                  <a:txBody>
+                    <a:bodyPr/>
+                    <a:lstStyle/>
+                    <a:p>
+                      <a:r>
+                        <a:rPr lang="en-US" dirty="0">
+                          <a:latin typeface="Consolas" panose="020B0609020204030204" pitchFamily="49" charset="0"/>
+                        </a:rPr>
+                        <a:t>--name string</a:t>
+                      </a:r>
+                    </a:p>
+                  </a:txBody>
+                  <a:tcPr/>
+                </a:tc>
+                <a:tc>
+                  <a:txBody>
+                    <a:bodyPr/>
+                    <a:lstStyle/>
+                    <a:p>
+                      <a:r>
+                        <a:rPr lang="en-US" dirty="0"/>
+                        <a:t>Assign a name to the container</a:t>
+                      </a:r>
+                    </a:p>
+                  </a:txBody>
+                  <a:tcPr/>
+                </a:tc>
+                <a:extLst>
+                  <a:ext uri="{0D108BD9-81ED-4DB2-BD59-A6C34878D82A}">
+                    <a16:rowId xmlns:a16="http://schemas.microsoft.com/office/drawing/2014/main" val="2090687720"/>
+                  </a:ext>
+                </a:extLst>
+              </a:tr>
+              <a:tr h="370840">
+                <a:tc>
+                  <a:txBody>
+                    <a:bodyPr/>
+                    <a:lstStyle/>
+                    <a:p>
+                      <a:r>
+                        <a:rPr lang="en-US" dirty="0">
+                          <a:latin typeface="Consolas" panose="020B0609020204030204" pitchFamily="49" charset="0"/>
+                        </a:rPr>
+                        <a:t>-p, --publish list</a:t>
+                      </a:r>
+                    </a:p>
+                  </a:txBody>
+                  <a:tcPr/>
+                </a:tc>
+                <a:tc>
+                  <a:txBody>
+                    <a:bodyPr/>
+                    <a:lstStyle/>
+                    <a:p>
+                      <a:r>
+                        <a:rPr lang="en-US" dirty="0"/>
+                        <a:t>Publish a container's port(s) to the host</a:t>
+                      </a:r>
+                    </a:p>
+                  </a:txBody>
+                  <a:tcPr/>
+                </a:tc>
+                <a:extLst>
+                  <a:ext uri="{0D108BD9-81ED-4DB2-BD59-A6C34878D82A}">
+                    <a16:rowId xmlns:a16="http://schemas.microsoft.com/office/drawing/2014/main" val="1196957959"/>
+                  </a:ext>
+                </a:extLst>
+              </a:tr>
+            </a:tbl>
+          </a:graphicData>
+        </a:graphic>
+      </p:graphicFrame>
     </p:spTree>
     <p:extLst>
       <p:ext uri="{BB962C8B-B14F-4D97-AF65-F5344CB8AC3E}">
-        <p14:creationId xmlns:p14="http://schemas.microsoft.com/office/powerpoint/2010/main" val="3447734083"/>
+        <p14:creationId xmlns:p14="http://schemas.microsoft.com/office/powerpoint/2010/main" val="3305636815"/>
       </p:ext>
     </p:extLst>
   </p:cSld>
@@ -22690,10 +23303,10 @@
       </p:grpSpPr>
       <p:sp>
         <p:nvSpPr>
-          <p:cNvPr id="2" name="Text Placeholder 1">
+          <p:cNvPr id="2" name="Content Placeholder 1">
             <a:extLst>
               <a:ext uri="{FF2B5EF4-FFF2-40B4-BE49-F238E27FC236}">
-                <a16:creationId xmlns:a16="http://schemas.microsoft.com/office/drawing/2014/main" id="{149FE133-FF4E-4029-8D0B-291BF433476E}"/>
+                <a16:creationId xmlns:a16="http://schemas.microsoft.com/office/drawing/2014/main" id="{AFF96931-CCDB-47D1-B982-0BFE2F5C618C}"/>
               </a:ext>
             </a:extLst>
           </p:cNvPr>
@@ -22701,7 +23314,7 @@
             <a:spLocks noGrp="1"/>
           </p:cNvSpPr>
           <p:nvPr>
-            <p:ph type="body" sz="quarter" idx="10"/>
+            <p:ph idx="1"/>
           </p:nvPr>
         </p:nvSpPr>
         <p:spPr/>
@@ -22709,17 +23322,389 @@
           <a:bodyPr/>
           <a:lstStyle/>
           <a:p>
-            <a:r>
-              <a:rPr lang="en-US" dirty="0"/>
-              <a:t>Creating Docker images</a:t>
-            </a:r>
+            <a:pPr marL="342900" indent="-342900">
+              <a:buFont typeface="Arial" panose="020B0604020202020204" pitchFamily="34" charset="0"/>
+              <a:buChar char="•"/>
+            </a:pPr>
+            <a:r>
+              <a:rPr lang="en-US" b="0" dirty="0"/>
+              <a:t>Manage containers:</a:t>
+            </a:r>
+          </a:p>
+          <a:p>
+            <a:pPr marL="1028700" lvl="1" indent="-342900"/>
+            <a:r>
+              <a:rPr lang="en-US" dirty="0">
+                <a:latin typeface="Consolas" panose="020B0609020204030204" pitchFamily="49" charset="0"/>
+              </a:rPr>
+              <a:t>docker container COMMAND</a:t>
+            </a:r>
+            <a:endParaRPr lang="en-US" b="0" dirty="0">
+              <a:latin typeface="Consolas" panose="020B0609020204030204" pitchFamily="49" charset="0"/>
+            </a:endParaRPr>
+          </a:p>
+          <a:p>
+            <a:pPr marL="342900" indent="-342900">
+              <a:buFont typeface="Arial" panose="020B0604020202020204" pitchFamily="34" charset="0"/>
+              <a:buChar char="•"/>
+            </a:pPr>
+            <a:r>
+              <a:rPr lang="en-US" b="0" dirty="0"/>
+              <a:t>Frequently used commands:</a:t>
+            </a:r>
+          </a:p>
+          <a:p>
+            <a:r>
+              <a:rPr lang="en-US" b="0" dirty="0"/>
+              <a:t> </a:t>
+            </a:r>
+          </a:p>
+          <a:p>
+            <a:pPr marL="342900" indent="-342900">
+              <a:buFont typeface="Arial" panose="020B0604020202020204" pitchFamily="34" charset="0"/>
+              <a:buChar char="•"/>
+            </a:pPr>
+            <a:endParaRPr lang="en-US" b="0" dirty="0"/>
+          </a:p>
+          <a:p>
+            <a:pPr marL="342900" indent="-342900"/>
+            <a:endParaRPr lang="en-US" dirty="0"/>
           </a:p>
         </p:txBody>
       </p:sp>
+      <p:sp>
+        <p:nvSpPr>
+          <p:cNvPr id="3" name="Text Placeholder 2">
+            <a:extLst>
+              <a:ext uri="{FF2B5EF4-FFF2-40B4-BE49-F238E27FC236}">
+                <a16:creationId xmlns:a16="http://schemas.microsoft.com/office/drawing/2014/main" id="{CBA50F54-F9F0-49C1-A1C9-8D18F10A83B3}"/>
+              </a:ext>
+            </a:extLst>
+          </p:cNvPr>
+          <p:cNvSpPr>
+            <a:spLocks noGrp="1"/>
+          </p:cNvSpPr>
+          <p:nvPr>
+            <p:ph type="body" sz="quarter" idx="12"/>
+          </p:nvPr>
+        </p:nvSpPr>
+        <p:spPr/>
+        <p:txBody>
+          <a:bodyPr/>
+          <a:lstStyle/>
+          <a:p>
+            <a:r>
+              <a:rPr lang="en-US" dirty="0"/>
+              <a:t>Managing containers</a:t>
+            </a:r>
+          </a:p>
+          <a:p>
+            <a:endParaRPr lang="en-US" dirty="0"/>
+          </a:p>
+        </p:txBody>
+      </p:sp>
+      <p:graphicFrame>
+        <p:nvGraphicFramePr>
+          <p:cNvPr id="6" name="Table 6">
+            <a:extLst>
+              <a:ext uri="{FF2B5EF4-FFF2-40B4-BE49-F238E27FC236}">
+                <a16:creationId xmlns:a16="http://schemas.microsoft.com/office/drawing/2014/main" id="{90297064-2960-433E-8E80-A5A8315BB290}"/>
+              </a:ext>
+            </a:extLst>
+          </p:cNvPr>
+          <p:cNvGraphicFramePr>
+            <a:graphicFrameLocks noGrp="1"/>
+          </p:cNvGraphicFramePr>
+          <p:nvPr>
+            <p:extLst>
+              <p:ext uri="{D42A27DB-BD31-4B8C-83A1-F6EECF244321}">
+                <p14:modId xmlns:p14="http://schemas.microsoft.com/office/powerpoint/2010/main" val="3060113552"/>
+              </p:ext>
+            </p:extLst>
+          </p:nvPr>
+        </p:nvGraphicFramePr>
+        <p:xfrm>
+          <a:off x="525312" y="2687320"/>
+          <a:ext cx="11168270" cy="2225040"/>
+        </p:xfrm>
+        <a:graphic>
+          <a:graphicData uri="http://schemas.openxmlformats.org/drawingml/2006/table">
+            <a:tbl>
+              <a:tblPr firstRow="1" bandRow="1">
+                <a:tableStyleId>{073A0DAA-6AF3-43AB-8588-CEC1D06C72B9}</a:tableStyleId>
+              </a:tblPr>
+              <a:tblGrid>
+                <a:gridCol w="3960191">
+                  <a:extLst>
+                    <a:ext uri="{9D8B030D-6E8A-4147-A177-3AD203B41FA5}">
+                      <a16:colId xmlns:a16="http://schemas.microsoft.com/office/drawing/2014/main" val="1976949975"/>
+                    </a:ext>
+                  </a:extLst>
+                </a:gridCol>
+                <a:gridCol w="7208079">
+                  <a:extLst>
+                    <a:ext uri="{9D8B030D-6E8A-4147-A177-3AD203B41FA5}">
+                      <a16:colId xmlns:a16="http://schemas.microsoft.com/office/drawing/2014/main" val="486710015"/>
+                    </a:ext>
+                  </a:extLst>
+                </a:gridCol>
+              </a:tblGrid>
+              <a:tr h="370840">
+                <a:tc>
+                  <a:txBody>
+                    <a:bodyPr/>
+                    <a:lstStyle/>
+                    <a:p>
+                      <a:r>
+                        <a:rPr lang="en-US" dirty="0"/>
+                        <a:t>Command</a:t>
+                      </a:r>
+                    </a:p>
+                  </a:txBody>
+                  <a:tcPr/>
+                </a:tc>
+                <a:tc>
+                  <a:txBody>
+                    <a:bodyPr/>
+                    <a:lstStyle/>
+                    <a:p>
+                      <a:r>
+                        <a:rPr lang="en-US" dirty="0"/>
+                        <a:t>Description</a:t>
+                      </a:r>
+                    </a:p>
+                  </a:txBody>
+                  <a:tcPr/>
+                </a:tc>
+                <a:extLst>
+                  <a:ext uri="{0D108BD9-81ED-4DB2-BD59-A6C34878D82A}">
+                    <a16:rowId xmlns:a16="http://schemas.microsoft.com/office/drawing/2014/main" val="1510308222"/>
+                  </a:ext>
+                </a:extLst>
+              </a:tr>
+              <a:tr h="370840">
+                <a:tc>
+                  <a:txBody>
+                    <a:bodyPr/>
+                    <a:lstStyle/>
+                    <a:p>
+                      <a:r>
+                        <a:rPr lang="en-US" dirty="0">
+                          <a:latin typeface="Consolas" panose="020B0609020204030204" pitchFamily="49" charset="0"/>
+                        </a:rPr>
+                        <a:t>exec</a:t>
+                      </a:r>
+                    </a:p>
+                  </a:txBody>
+                  <a:tcPr/>
+                </a:tc>
+                <a:tc>
+                  <a:txBody>
+                    <a:bodyPr/>
+                    <a:lstStyle/>
+                    <a:p>
+                      <a:pPr marL="0" algn="l" defTabSz="914400" rtl="0" eaLnBrk="1" latinLnBrk="0" hangingPunct="1"/>
+                      <a:r>
+                        <a:rPr lang="en-US" sz="1800" kern="1200" dirty="0">
+                          <a:solidFill>
+                            <a:schemeClr val="dk1"/>
+                          </a:solidFill>
+                          <a:latin typeface="+mn-lt"/>
+                          <a:ea typeface="+mn-ea"/>
+                          <a:cs typeface="+mn-cs"/>
+                        </a:rPr>
+                        <a:t>Run a command in a running container</a:t>
+                      </a:r>
+                    </a:p>
+                  </a:txBody>
+                  <a:tcPr/>
+                </a:tc>
+                <a:extLst>
+                  <a:ext uri="{0D108BD9-81ED-4DB2-BD59-A6C34878D82A}">
+                    <a16:rowId xmlns:a16="http://schemas.microsoft.com/office/drawing/2014/main" val="2468265737"/>
+                  </a:ext>
+                </a:extLst>
+              </a:tr>
+              <a:tr h="370840">
+                <a:tc>
+                  <a:txBody>
+                    <a:bodyPr/>
+                    <a:lstStyle/>
+                    <a:p>
+                      <a:r>
+                        <a:rPr lang="en-US" dirty="0">
+                          <a:latin typeface="Consolas" panose="020B0609020204030204" pitchFamily="49" charset="0"/>
+                        </a:rPr>
+                        <a:t>ls</a:t>
+                      </a:r>
+                    </a:p>
+                  </a:txBody>
+                  <a:tcPr/>
+                </a:tc>
+                <a:tc>
+                  <a:txBody>
+                    <a:bodyPr/>
+                    <a:lstStyle/>
+                    <a:p>
+                      <a:pPr marL="0" algn="l" defTabSz="914400" rtl="0" eaLnBrk="1" latinLnBrk="0" hangingPunct="1"/>
+                      <a:r>
+                        <a:rPr lang="en-US" sz="1800" kern="1200" dirty="0">
+                          <a:solidFill>
+                            <a:schemeClr val="dk1"/>
+                          </a:solidFill>
+                          <a:latin typeface="+mn-lt"/>
+                          <a:ea typeface="+mn-ea"/>
+                          <a:cs typeface="+mn-cs"/>
+                        </a:rPr>
+                        <a:t>List containers</a:t>
+                      </a:r>
+                    </a:p>
+                  </a:txBody>
+                  <a:tcPr/>
+                </a:tc>
+                <a:extLst>
+                  <a:ext uri="{0D108BD9-81ED-4DB2-BD59-A6C34878D82A}">
+                    <a16:rowId xmlns:a16="http://schemas.microsoft.com/office/drawing/2014/main" val="2618166127"/>
+                  </a:ext>
+                </a:extLst>
+              </a:tr>
+              <a:tr h="370840">
+                <a:tc>
+                  <a:txBody>
+                    <a:bodyPr/>
+                    <a:lstStyle/>
+                    <a:p>
+                      <a:r>
+                        <a:rPr lang="en-US" dirty="0">
+                          <a:latin typeface="Consolas" panose="020B0609020204030204" pitchFamily="49" charset="0"/>
+                        </a:rPr>
+                        <a:t>rm</a:t>
+                      </a:r>
+                    </a:p>
+                  </a:txBody>
+                  <a:tcPr/>
+                </a:tc>
+                <a:tc>
+                  <a:txBody>
+                    <a:bodyPr/>
+                    <a:lstStyle/>
+                    <a:p>
+                      <a:pPr marL="0" algn="l" defTabSz="914400" rtl="0" eaLnBrk="1" latinLnBrk="0" hangingPunct="1"/>
+                      <a:r>
+                        <a:rPr lang="en-US" sz="1800" kern="1200" dirty="0">
+                          <a:solidFill>
+                            <a:schemeClr val="dk1"/>
+                          </a:solidFill>
+                          <a:latin typeface="+mn-lt"/>
+                          <a:ea typeface="+mn-ea"/>
+                          <a:cs typeface="+mn-cs"/>
+                        </a:rPr>
+                        <a:t>Remove one or more containers</a:t>
+                      </a:r>
+                    </a:p>
+                  </a:txBody>
+                  <a:tcPr/>
+                </a:tc>
+                <a:extLst>
+                  <a:ext uri="{0D108BD9-81ED-4DB2-BD59-A6C34878D82A}">
+                    <a16:rowId xmlns:a16="http://schemas.microsoft.com/office/drawing/2014/main" val="115566168"/>
+                  </a:ext>
+                </a:extLst>
+              </a:tr>
+              <a:tr h="370840">
+                <a:tc>
+                  <a:txBody>
+                    <a:bodyPr/>
+                    <a:lstStyle/>
+                    <a:p>
+                      <a:r>
+                        <a:rPr lang="en-US" dirty="0">
+                          <a:latin typeface="Consolas" panose="020B0609020204030204" pitchFamily="49" charset="0"/>
+                        </a:rPr>
+                        <a:t>run</a:t>
+                      </a:r>
+                    </a:p>
+                  </a:txBody>
+                  <a:tcPr/>
+                </a:tc>
+                <a:tc>
+                  <a:txBody>
+                    <a:bodyPr/>
+                    <a:lstStyle/>
+                    <a:p>
+                      <a:pPr marL="0" algn="l" defTabSz="914400" rtl="0" eaLnBrk="1" latinLnBrk="0" hangingPunct="1"/>
+                      <a:r>
+                        <a:rPr lang="en-US" sz="1800" kern="1200" dirty="0">
+                          <a:solidFill>
+                            <a:schemeClr val="dk1"/>
+                          </a:solidFill>
+                          <a:latin typeface="+mn-lt"/>
+                          <a:ea typeface="+mn-ea"/>
+                          <a:cs typeface="+mn-cs"/>
+                        </a:rPr>
+                        <a:t>Run a command in a new container</a:t>
+                      </a:r>
+                    </a:p>
+                  </a:txBody>
+                  <a:tcPr/>
+                </a:tc>
+                <a:extLst>
+                  <a:ext uri="{0D108BD9-81ED-4DB2-BD59-A6C34878D82A}">
+                    <a16:rowId xmlns:a16="http://schemas.microsoft.com/office/drawing/2014/main" val="2090687720"/>
+                  </a:ext>
+                </a:extLst>
+              </a:tr>
+              <a:tr h="370840">
+                <a:tc>
+                  <a:txBody>
+                    <a:bodyPr/>
+                    <a:lstStyle/>
+                    <a:p>
+                      <a:r>
+                        <a:rPr lang="en-US" dirty="0">
+                          <a:latin typeface="Consolas" panose="020B0609020204030204" pitchFamily="49" charset="0"/>
+                        </a:rPr>
+                        <a:t>stop</a:t>
+                      </a:r>
+                    </a:p>
+                  </a:txBody>
+                  <a:tcPr/>
+                </a:tc>
+                <a:tc>
+                  <a:txBody>
+                    <a:bodyPr/>
+                    <a:lstStyle/>
+                    <a:p>
+                      <a:pPr marL="0" algn="l" defTabSz="914400" rtl="0" eaLnBrk="1" latinLnBrk="0" hangingPunct="1"/>
+                      <a:r>
+                        <a:rPr lang="en-US" sz="1800" kern="1200" dirty="0">
+                          <a:solidFill>
+                            <a:schemeClr val="dk1"/>
+                          </a:solidFill>
+                          <a:latin typeface="+mn-lt"/>
+                          <a:ea typeface="+mn-ea"/>
+                          <a:cs typeface="+mn-cs"/>
+                        </a:rPr>
+                        <a:t>Stop one or more running containers</a:t>
+                      </a:r>
+                    </a:p>
+                  </a:txBody>
+                  <a:tcPr/>
+                </a:tc>
+                <a:extLst>
+                  <a:ext uri="{0D108BD9-81ED-4DB2-BD59-A6C34878D82A}">
+                    <a16:rowId xmlns:a16="http://schemas.microsoft.com/office/drawing/2014/main" val="1196957959"/>
+                  </a:ext>
+                </a:extLst>
+              </a:tr>
+            </a:tbl>
+          </a:graphicData>
+        </a:graphic>
+      </p:graphicFrame>
     </p:spTree>
     <p:extLst>
       <p:ext uri="{BB962C8B-B14F-4D97-AF65-F5344CB8AC3E}">
-        <p14:creationId xmlns:p14="http://schemas.microsoft.com/office/powerpoint/2010/main" val="3895573058"/>
+        <p14:creationId xmlns:p14="http://schemas.microsoft.com/office/powerpoint/2010/main" val="787798642"/>
       </p:ext>
     </p:extLst>
   </p:cSld>
@@ -22764,23 +23749,28 @@
         </p:nvSpPr>
         <p:spPr/>
         <p:txBody>
-          <a:bodyPr/>
+          <a:bodyPr anchor="ctr"/>
           <a:lstStyle/>
+          <a:p>
+            <a:pPr algn="ctr"/>
+            <a:r>
+              <a:rPr lang="en-US" sz="9600" b="0" dirty="0"/>
+              <a:t>DEMO</a:t>
+            </a:r>
+            <a:r>
+              <a:rPr lang="en-US" b="0" dirty="0"/>
+              <a:t> </a:t>
+            </a:r>
+          </a:p>
           <a:p>
             <a:pPr marL="342900" indent="-342900">
               <a:buFont typeface="Arial" panose="020B0604020202020204" pitchFamily="34" charset="0"/>
               <a:buChar char="•"/>
             </a:pPr>
-            <a:r>
-              <a:rPr lang="en-US" dirty="0"/>
-              <a:t>Content</a:t>
-            </a:r>
-          </a:p>
-          <a:p>
-            <a:pPr marL="342900" indent="-342900">
-              <a:buFont typeface="Arial" panose="020B0604020202020204" pitchFamily="34" charset="0"/>
-              <a:buChar char="•"/>
-            </a:pPr>
+            <a:endParaRPr lang="en-US" b="0" dirty="0"/>
+          </a:p>
+          <a:p>
+            <a:pPr marL="342900" indent="-342900"/>
             <a:endParaRPr lang="en-US" dirty="0"/>
           </a:p>
         </p:txBody>
@@ -22808,7 +23798,7 @@
           <a:p>
             <a:r>
               <a:rPr lang="en-US" dirty="0"/>
-              <a:t>Header</a:t>
+              <a:t>Running containers</a:t>
             </a:r>
           </a:p>
         </p:txBody>
@@ -22816,7 +23806,7 @@
     </p:spTree>
     <p:extLst>
       <p:ext uri="{BB962C8B-B14F-4D97-AF65-F5344CB8AC3E}">
-        <p14:creationId xmlns:p14="http://schemas.microsoft.com/office/powerpoint/2010/main" val="3053133482"/>
+        <p14:creationId xmlns:p14="http://schemas.microsoft.com/office/powerpoint/2010/main" val="3447734083"/>
       </p:ext>
     </p:extLst>
   </p:cSld>
@@ -22866,7 +23856,7 @@
           <a:p>
             <a:r>
               <a:rPr lang="en-US" dirty="0"/>
-              <a:t>Image registries and Docker Hub</a:t>
+              <a:t>Creating Docker images</a:t>
             </a:r>
           </a:p>
         </p:txBody>
@@ -22874,7 +23864,7 @@
     </p:spTree>
     <p:extLst>
       <p:ext uri="{BB962C8B-B14F-4D97-AF65-F5344CB8AC3E}">
-        <p14:creationId xmlns:p14="http://schemas.microsoft.com/office/powerpoint/2010/main" val="4261129366"/>
+        <p14:creationId xmlns:p14="http://schemas.microsoft.com/office/powerpoint/2010/main" val="3895573058"/>
       </p:ext>
     </p:extLst>
   </p:cSld>
@@ -22971,7 +23961,7 @@
     </p:spTree>
     <p:extLst>
       <p:ext uri="{BB962C8B-B14F-4D97-AF65-F5344CB8AC3E}">
-        <p14:creationId xmlns:p14="http://schemas.microsoft.com/office/powerpoint/2010/main" val="2047067086"/>
+        <p14:creationId xmlns:p14="http://schemas.microsoft.com/office/powerpoint/2010/main" val="3053133482"/>
       </p:ext>
     </p:extLst>
   </p:cSld>
@@ -23021,7 +24011,7 @@
           <a:p>
             <a:r>
               <a:rPr lang="en-US" dirty="0"/>
-              <a:t>Data Storage in Docker</a:t>
+              <a:t>Image registries and Docker Hub</a:t>
             </a:r>
           </a:p>
         </p:txBody>
@@ -23029,7 +24019,7 @@
     </p:spTree>
     <p:extLst>
       <p:ext uri="{BB962C8B-B14F-4D97-AF65-F5344CB8AC3E}">
-        <p14:creationId xmlns:p14="http://schemas.microsoft.com/office/powerpoint/2010/main" val="459366342"/>
+        <p14:creationId xmlns:p14="http://schemas.microsoft.com/office/powerpoint/2010/main" val="4261129366"/>
       </p:ext>
     </p:extLst>
   </p:cSld>
@@ -23082,9 +24072,54 @@
               <a:buChar char="•"/>
             </a:pPr>
             <a:r>
-              <a:rPr lang="en-US" dirty="0"/>
-              <a:t>Content</a:t>
-            </a:r>
+              <a:rPr lang="en-US" b="0" dirty="0"/>
+              <a:t>Packaging an application into a container image is easy with the </a:t>
+            </a:r>
+            <a:r>
+              <a:rPr lang="en-US" dirty="0">
+                <a:latin typeface="Consolas" panose="020B0609020204030204" pitchFamily="49" charset="0"/>
+              </a:rPr>
+              <a:t>docker image build</a:t>
+            </a:r>
+            <a:r>
+              <a:rPr lang="en-US" dirty="0"/>
+              <a:t> </a:t>
+            </a:r>
+            <a:r>
+              <a:rPr lang="en-US" b="0" dirty="0"/>
+              <a:t>command, but the image only gets created in the local image cache on your own machine.</a:t>
+            </a:r>
+          </a:p>
+          <a:p>
+            <a:pPr marL="342900" indent="-342900">
+              <a:buFont typeface="Arial" panose="020B0604020202020204" pitchFamily="34" charset="0"/>
+              <a:buChar char="•"/>
+            </a:pPr>
+            <a:r>
+              <a:rPr lang="en-US" b="0" dirty="0"/>
+              <a:t>In order to make that image useful, you need to be able to ship it to different hosts, and that’s where image registries come in.</a:t>
+            </a:r>
+          </a:p>
+          <a:p>
+            <a:pPr marL="342900" indent="-342900">
+              <a:buFont typeface="Arial" panose="020B0604020202020204" pitchFamily="34" charset="0"/>
+              <a:buChar char="•"/>
+            </a:pPr>
+            <a:r>
+              <a:rPr lang="en-US" b="0" dirty="0"/>
+              <a:t>A registry is simply a shared location for images—you can push images you’ve created and pull images that you or other people have created.</a:t>
+            </a:r>
+          </a:p>
+          <a:p>
+            <a:pPr marL="342900" indent="-342900">
+              <a:buFont typeface="Arial" panose="020B0604020202020204" pitchFamily="34" charset="0"/>
+              <a:buChar char="•"/>
+            </a:pPr>
+            <a:r>
+              <a:rPr lang="en-US" b="0" dirty="0"/>
+              <a:t>The registry is a core concept in Docker, and you use the normal Docker command-line tool to work with registries. </a:t>
+            </a:r>
+            <a:endParaRPr lang="en-US" dirty="0"/>
           </a:p>
           <a:p>
             <a:pPr marL="342900" indent="-342900">
@@ -23111,14 +24146,19 @@
             <p:ph type="body" sz="quarter" idx="12"/>
           </p:nvPr>
         </p:nvSpPr>
-        <p:spPr/>
+        <p:spPr>
+          <a:xfrm>
+            <a:off x="415625" y="174000"/>
+            <a:ext cx="7546131" cy="399144"/>
+          </a:xfrm>
+        </p:spPr>
         <p:txBody>
           <a:bodyPr/>
           <a:lstStyle/>
           <a:p>
             <a:r>
               <a:rPr lang="en-US" dirty="0"/>
-              <a:t>Header</a:t>
+              <a:t>About image registries </a:t>
             </a:r>
           </a:p>
         </p:txBody>
@@ -23126,7 +24166,7 @@
     </p:spTree>
     <p:extLst>
       <p:ext uri="{BB962C8B-B14F-4D97-AF65-F5344CB8AC3E}">
-        <p14:creationId xmlns:p14="http://schemas.microsoft.com/office/powerpoint/2010/main" val="2132152713"/>
+        <p14:creationId xmlns:p14="http://schemas.microsoft.com/office/powerpoint/2010/main" val="2047067086"/>
       </p:ext>
     </p:extLst>
   </p:cSld>
@@ -23301,10 +24341,10 @@
       </p:grpSpPr>
       <p:sp>
         <p:nvSpPr>
-          <p:cNvPr id="2" name="Text Placeholder 1">
+          <p:cNvPr id="2" name="Content Placeholder 1">
             <a:extLst>
               <a:ext uri="{FF2B5EF4-FFF2-40B4-BE49-F238E27FC236}">
-                <a16:creationId xmlns:a16="http://schemas.microsoft.com/office/drawing/2014/main" id="{149FE133-FF4E-4029-8D0B-291BF433476E}"/>
+                <a16:creationId xmlns:a16="http://schemas.microsoft.com/office/drawing/2014/main" id="{AFF96931-CCDB-47D1-B982-0BFE2F5C618C}"/>
               </a:ext>
             </a:extLst>
           </p:cNvPr>
@@ -23312,7 +24352,7 @@
             <a:spLocks noGrp="1"/>
           </p:cNvSpPr>
           <p:nvPr>
-            <p:ph type="body" sz="quarter" idx="10"/>
+            <p:ph idx="1"/>
           </p:nvPr>
         </p:nvSpPr>
         <p:spPr/>
@@ -23320,9 +24360,102 @@
           <a:bodyPr/>
           <a:lstStyle/>
           <a:p>
-            <a:r>
-              <a:rPr lang="en-US" dirty="0"/>
-              <a:t>Orchestrating Systems with Docker</a:t>
+            <a:pPr marL="342900" indent="-342900">
+              <a:buFont typeface="Arial" panose="020B0604020202020204" pitchFamily="34" charset="0"/>
+              <a:buChar char="•"/>
+            </a:pPr>
+            <a:r>
+              <a:rPr lang="en-US" b="0" dirty="0"/>
+              <a:t>The </a:t>
+            </a:r>
+            <a:r>
+              <a:rPr lang="en-US" b="0" dirty="0">
+                <a:hlinkClick r:id="rId2"/>
+              </a:rPr>
+              <a:t>Docker Hub</a:t>
+            </a:r>
+            <a:r>
+              <a:rPr lang="en-US" b="0" dirty="0"/>
+              <a:t> is a free, public registry for images maintained by Docker, Inc.</a:t>
+            </a:r>
+          </a:p>
+          <a:p>
+            <a:pPr marL="342900" indent="-342900">
+              <a:buFont typeface="Arial" panose="020B0604020202020204" pitchFamily="34" charset="0"/>
+              <a:buChar char="•"/>
+            </a:pPr>
+            <a:r>
+              <a:rPr lang="en-US" b="0" dirty="0"/>
+              <a:t>It is a hugely popular service—</a:t>
+            </a:r>
+            <a:r>
+              <a:rPr lang="ru-UA" b="0" dirty="0"/>
+              <a:t> </a:t>
+            </a:r>
+            <a:r>
+              <a:rPr lang="en-US" b="0" dirty="0"/>
+              <a:t>there is more than a million of images on the Hub.</a:t>
+            </a:r>
+          </a:p>
+          <a:p>
+            <a:pPr marL="342900" indent="-342900">
+              <a:buFont typeface="Arial" panose="020B0604020202020204" pitchFamily="34" charset="0"/>
+              <a:buChar char="•"/>
+            </a:pPr>
+            <a:r>
+              <a:rPr lang="en-US" b="0" dirty="0"/>
+              <a:t>Anyone can push images to the Hub, and in addition to the community images, there are also official images curated by Docker and supported by their owners. </a:t>
+            </a:r>
+          </a:p>
+          <a:p>
+            <a:pPr marL="342900" indent="-342900">
+              <a:buFont typeface="Arial" panose="020B0604020202020204" pitchFamily="34" charset="0"/>
+              <a:buChar char="•"/>
+            </a:pPr>
+            <a:r>
+              <a:rPr lang="en-US" b="0" dirty="0"/>
+              <a:t>Docker Hub is the default source and has a very useful feature set that makes it much more than just an image store. However, if you’re not comfortable storing your own application images in a third-party cloud service, there are many other options.</a:t>
+            </a:r>
+            <a:endParaRPr lang="en-US" dirty="0"/>
+          </a:p>
+          <a:p>
+            <a:pPr marL="342900" indent="-342900">
+              <a:buFont typeface="Arial" panose="020B0604020202020204" pitchFamily="34" charset="0"/>
+              <a:buChar char="•"/>
+            </a:pPr>
+            <a:endParaRPr lang="en-US" dirty="0"/>
+          </a:p>
+        </p:txBody>
+      </p:sp>
+      <p:sp>
+        <p:nvSpPr>
+          <p:cNvPr id="3" name="Text Placeholder 2">
+            <a:extLst>
+              <a:ext uri="{FF2B5EF4-FFF2-40B4-BE49-F238E27FC236}">
+                <a16:creationId xmlns:a16="http://schemas.microsoft.com/office/drawing/2014/main" id="{CBA50F54-F9F0-49C1-A1C9-8D18F10A83B3}"/>
+              </a:ext>
+            </a:extLst>
+          </p:cNvPr>
+          <p:cNvSpPr>
+            <a:spLocks noGrp="1"/>
+          </p:cNvSpPr>
+          <p:nvPr>
+            <p:ph type="body" sz="quarter" idx="12"/>
+          </p:nvPr>
+        </p:nvSpPr>
+        <p:spPr>
+          <a:xfrm>
+            <a:off x="415625" y="174000"/>
+            <a:ext cx="7546131" cy="399144"/>
+          </a:xfrm>
+        </p:spPr>
+        <p:txBody>
+          <a:bodyPr/>
+          <a:lstStyle/>
+          <a:p>
+            <a:r>
+              <a:rPr lang="en-US" dirty="0"/>
+              <a:t>About Docker Hub</a:t>
             </a:r>
           </a:p>
         </p:txBody>
@@ -23330,7 +24463,7 @@
     </p:spTree>
     <p:extLst>
       <p:ext uri="{BB962C8B-B14F-4D97-AF65-F5344CB8AC3E}">
-        <p14:creationId xmlns:p14="http://schemas.microsoft.com/office/powerpoint/2010/main" val="2036340124"/>
+        <p14:creationId xmlns:p14="http://schemas.microsoft.com/office/powerpoint/2010/main" val="3582995138"/>
       </p:ext>
     </p:extLst>
   </p:cSld>
@@ -23383,8 +24516,8 @@
               <a:buChar char="•"/>
             </a:pPr>
             <a:r>
-              <a:rPr lang="en-US" dirty="0"/>
-              <a:t>Content</a:t>
+              <a:rPr lang="en-US" b="0" dirty="0"/>
+              <a:t>You will need your own account on Docker Hub if you want to push images and share them.</a:t>
             </a:r>
           </a:p>
           <a:p>
@@ -23392,6 +24525,56 @@
               <a:buFont typeface="Arial" panose="020B0604020202020204" pitchFamily="34" charset="0"/>
               <a:buChar char="•"/>
             </a:pPr>
+            <a:r>
+              <a:rPr lang="en-US" b="0" dirty="0"/>
+              <a:t>You can register with Docker Hub at </a:t>
+            </a:r>
+            <a:r>
+              <a:rPr lang="en-US" b="0" dirty="0">
+                <a:hlinkClick r:id="rId2"/>
+              </a:rPr>
+              <a:t>https://hub.docker.com</a:t>
+            </a:r>
+            <a:r>
+              <a:rPr lang="en-US" b="0" dirty="0"/>
+              <a:t> and create a free account.</a:t>
+            </a:r>
+          </a:p>
+          <a:p>
+            <a:pPr marL="342900" indent="-342900">
+              <a:buFont typeface="Arial" panose="020B0604020202020204" pitchFamily="34" charset="0"/>
+              <a:buChar char="•"/>
+            </a:pPr>
+            <a:r>
+              <a:rPr lang="en-US" b="0" dirty="0"/>
+              <a:t>The username you choose will be the user part of the repository name when you build your own images (my username on Docker Hub is </a:t>
+            </a:r>
+            <a:r>
+              <a:rPr lang="en-US" b="0" i="1" dirty="0" err="1"/>
+              <a:t>tantsyurasergey</a:t>
+            </a:r>
+            <a:r>
+              <a:rPr lang="en-US" b="0" dirty="0"/>
+              <a:t>, and I can only push images which are prefixed </a:t>
+            </a:r>
+            <a:r>
+              <a:rPr lang="en-US" i="1" dirty="0" err="1"/>
+              <a:t>tantsyurasergey</a:t>
+            </a:r>
+            <a:r>
+              <a:rPr lang="en-US" b="0" dirty="0"/>
+              <a:t>).</a:t>
+            </a:r>
+          </a:p>
+          <a:p>
+            <a:pPr marL="342900" indent="-342900">
+              <a:buFont typeface="Arial" panose="020B0604020202020204" pitchFamily="34" charset="0"/>
+              <a:buChar char="•"/>
+            </a:pPr>
+            <a:r>
+              <a:rPr lang="en-US" b="0" dirty="0"/>
+              <a:t>Docker Hub can be used for storing private repositories, too, and the free plan lets you store one private repository and unlimited public ones.</a:t>
+            </a:r>
             <a:endParaRPr lang="en-US" dirty="0"/>
           </a:p>
         </p:txBody>
@@ -23412,14 +24595,19 @@
             <p:ph type="body" sz="quarter" idx="12"/>
           </p:nvPr>
         </p:nvSpPr>
-        <p:spPr/>
+        <p:spPr>
+          <a:xfrm>
+            <a:off x="415625" y="174000"/>
+            <a:ext cx="7546131" cy="399144"/>
+          </a:xfrm>
+        </p:spPr>
         <p:txBody>
           <a:bodyPr/>
           <a:lstStyle/>
           <a:p>
             <a:r>
               <a:rPr lang="en-US" dirty="0"/>
-              <a:t>Header</a:t>
+              <a:t>Using Docker Hub</a:t>
             </a:r>
           </a:p>
         </p:txBody>
@@ -23427,7 +24615,7 @@
     </p:spTree>
     <p:extLst>
       <p:ext uri="{BB962C8B-B14F-4D97-AF65-F5344CB8AC3E}">
-        <p14:creationId xmlns:p14="http://schemas.microsoft.com/office/powerpoint/2010/main" val="1180309019"/>
+        <p14:creationId xmlns:p14="http://schemas.microsoft.com/office/powerpoint/2010/main" val="252331523"/>
       </p:ext>
     </p:extLst>
   </p:cSld>
@@ -23456,10 +24644,10 @@
       </p:grpSpPr>
       <p:sp>
         <p:nvSpPr>
-          <p:cNvPr id="2" name="Text Placeholder 1">
+          <p:cNvPr id="2" name="Content Placeholder 1">
             <a:extLst>
               <a:ext uri="{FF2B5EF4-FFF2-40B4-BE49-F238E27FC236}">
-                <a16:creationId xmlns:a16="http://schemas.microsoft.com/office/drawing/2014/main" id="{149FE133-FF4E-4029-8D0B-291BF433476E}"/>
+                <a16:creationId xmlns:a16="http://schemas.microsoft.com/office/drawing/2014/main" id="{AFF96931-CCDB-47D1-B982-0BFE2F5C618C}"/>
               </a:ext>
             </a:extLst>
           </p:cNvPr>
@@ -23467,7 +24655,7 @@
             <a:spLocks noGrp="1"/>
           </p:cNvSpPr>
           <p:nvPr>
-            <p:ph type="body" sz="quarter" idx="10"/>
+            <p:ph idx="1"/>
           </p:nvPr>
         </p:nvSpPr>
         <p:spPr/>
@@ -23475,9 +24663,107 @@
           <a:bodyPr/>
           <a:lstStyle/>
           <a:p>
-            <a:r>
-              <a:rPr lang="en-US" dirty="0"/>
-              <a:t>Clustering Hosts with Docker Swarm</a:t>
+            <a:pPr marL="342900" indent="-342900">
+              <a:buFont typeface="Arial" panose="020B0604020202020204" pitchFamily="34" charset="0"/>
+              <a:buChar char="•"/>
+            </a:pPr>
+            <a:r>
+              <a:rPr lang="en-US" b="0" dirty="0"/>
+              <a:t>When you have an account registered with the Docker Hub, you will need to add your credentials to the Docker CLI using the following command:</a:t>
+            </a:r>
+          </a:p>
+          <a:p>
+            <a:pPr marL="1028700" lvl="1" indent="-342900"/>
+            <a:r>
+              <a:rPr lang="en-US" dirty="0">
+                <a:latin typeface="Consolas" panose="020B0609020204030204" pitchFamily="49" charset="0"/>
+              </a:rPr>
+              <a:t>docker login</a:t>
+            </a:r>
+          </a:p>
+          <a:p>
+            <a:pPr marL="342900" indent="-342900">
+              <a:buFont typeface="Arial" panose="020B0604020202020204" pitchFamily="34" charset="0"/>
+              <a:buChar char="•"/>
+            </a:pPr>
+            <a:r>
+              <a:rPr lang="en-US" b="0" dirty="0"/>
+              <a:t>After logging in, you will be able to push images as well as pull them. The </a:t>
+            </a:r>
+            <a:r>
+              <a:rPr lang="en-US" dirty="0">
+                <a:latin typeface="Consolas" panose="020B0609020204030204" pitchFamily="49" charset="0"/>
+              </a:rPr>
+              <a:t>image push</a:t>
+            </a:r>
+            <a:r>
+              <a:rPr lang="en-US" dirty="0"/>
+              <a:t> </a:t>
+            </a:r>
+            <a:r>
+              <a:rPr lang="en-US" b="0" dirty="0"/>
+              <a:t>command is very simple:</a:t>
+            </a:r>
+          </a:p>
+          <a:p>
+            <a:pPr marL="1028700" lvl="1" indent="-342900"/>
+            <a:r>
+              <a:rPr lang="en-US" b="0" dirty="0"/>
+              <a:t>docker image push [OPTIONS] NAME[:TAG] </a:t>
+            </a:r>
+          </a:p>
+          <a:p>
+            <a:pPr marL="342900" indent="-342900">
+              <a:buFont typeface="Arial" panose="020B0604020202020204" pitchFamily="34" charset="0"/>
+              <a:buChar char="•"/>
+            </a:pPr>
+            <a:r>
+              <a:rPr lang="en-US" b="0" dirty="0"/>
+              <a:t>The push works intelligently, pushing only layers that aren’t already available in the registry. Only the new layers created by building my </a:t>
+            </a:r>
+            <a:r>
+              <a:rPr lang="en-US" b="0" dirty="0" err="1">
+                <a:latin typeface="Consolas" panose="020B0609020204030204" pitchFamily="49" charset="0"/>
+              </a:rPr>
+              <a:t>Dockerfile</a:t>
+            </a:r>
+            <a:r>
+              <a:rPr lang="en-US" b="0" dirty="0"/>
+              <a:t> get pushed.</a:t>
+            </a:r>
+            <a:endParaRPr lang="en-US" dirty="0"/>
+          </a:p>
+        </p:txBody>
+      </p:sp>
+      <p:sp>
+        <p:nvSpPr>
+          <p:cNvPr id="3" name="Text Placeholder 2">
+            <a:extLst>
+              <a:ext uri="{FF2B5EF4-FFF2-40B4-BE49-F238E27FC236}">
+                <a16:creationId xmlns:a16="http://schemas.microsoft.com/office/drawing/2014/main" id="{CBA50F54-F9F0-49C1-A1C9-8D18F10A83B3}"/>
+              </a:ext>
+            </a:extLst>
+          </p:cNvPr>
+          <p:cNvSpPr>
+            <a:spLocks noGrp="1"/>
+          </p:cNvSpPr>
+          <p:nvPr>
+            <p:ph type="body" sz="quarter" idx="12"/>
+          </p:nvPr>
+        </p:nvSpPr>
+        <p:spPr>
+          <a:xfrm>
+            <a:off x="415625" y="174000"/>
+            <a:ext cx="7546131" cy="399144"/>
+          </a:xfrm>
+        </p:spPr>
+        <p:txBody>
+          <a:bodyPr/>
+          <a:lstStyle/>
+          <a:p>
+            <a:r>
+              <a:rPr lang="en-US" dirty="0"/>
+              <a:t>Pushing images</a:t>
             </a:r>
           </a:p>
         </p:txBody>
@@ -23485,7 +24771,7 @@
     </p:spTree>
     <p:extLst>
       <p:ext uri="{BB962C8B-B14F-4D97-AF65-F5344CB8AC3E}">
-        <p14:creationId xmlns:p14="http://schemas.microsoft.com/office/powerpoint/2010/main" val="3059142854"/>
+        <p14:creationId xmlns:p14="http://schemas.microsoft.com/office/powerpoint/2010/main" val="2156836171"/>
       </p:ext>
     </p:extLst>
   </p:cSld>
@@ -23538,8 +24824,8 @@
               <a:buChar char="•"/>
             </a:pPr>
             <a:r>
-              <a:rPr lang="en-US" dirty="0"/>
-              <a:t>Content</a:t>
+              <a:rPr lang="en-US" b="0" dirty="0"/>
+              <a:t>Image size can be a few megabytes or many gigabytes, so pulling large images might take a while, which means startup time for a new container can jump from seconds to minutes.</a:t>
             </a:r>
           </a:p>
           <a:p>
@@ -23547,7 +24833,19 @@
               <a:buFont typeface="Arial" panose="020B0604020202020204" pitchFamily="34" charset="0"/>
               <a:buChar char="•"/>
             </a:pPr>
-            <a:endParaRPr lang="en-US" dirty="0"/>
+            <a:r>
+              <a:rPr lang="en-US" b="0" dirty="0"/>
+              <a:t>In order to prevent that, you can explicitly pull images from the Hub and download them before they are needed, so that when you do run a container it uses the local image:</a:t>
+            </a:r>
+          </a:p>
+          <a:p>
+            <a:pPr marL="1028700" lvl="1" indent="-342900"/>
+            <a:r>
+              <a:rPr lang="en-US" dirty="0">
+                <a:latin typeface="Consolas" panose="020B0609020204030204" pitchFamily="49" charset="0"/>
+              </a:rPr>
+              <a:t>docker image pull [OPTIONS] NAME[:TAG|@DIGEST]</a:t>
+            </a:r>
           </a:p>
         </p:txBody>
       </p:sp>
@@ -23567,14 +24865,19 @@
             <p:ph type="body" sz="quarter" idx="12"/>
           </p:nvPr>
         </p:nvSpPr>
-        <p:spPr/>
+        <p:spPr>
+          <a:xfrm>
+            <a:off x="415625" y="174000"/>
+            <a:ext cx="7546131" cy="399144"/>
+          </a:xfrm>
+        </p:spPr>
         <p:txBody>
           <a:bodyPr/>
           <a:lstStyle/>
           <a:p>
             <a:r>
               <a:rPr lang="en-US" dirty="0"/>
-              <a:t>Header</a:t>
+              <a:t>Pulling images</a:t>
             </a:r>
           </a:p>
         </p:txBody>
@@ -23582,7 +24885,7 @@
     </p:spTree>
     <p:extLst>
       <p:ext uri="{BB962C8B-B14F-4D97-AF65-F5344CB8AC3E}">
-        <p14:creationId xmlns:p14="http://schemas.microsoft.com/office/powerpoint/2010/main" val="2079409009"/>
+        <p14:creationId xmlns:p14="http://schemas.microsoft.com/office/powerpoint/2010/main" val="2012956938"/>
       </p:ext>
     </p:extLst>
   </p:cSld>
@@ -23611,10 +24914,10 @@
       </p:grpSpPr>
       <p:sp>
         <p:nvSpPr>
-          <p:cNvPr id="2" name="Text Placeholder 1">
+          <p:cNvPr id="2" name="Content Placeholder 1">
             <a:extLst>
               <a:ext uri="{FF2B5EF4-FFF2-40B4-BE49-F238E27FC236}">
-                <a16:creationId xmlns:a16="http://schemas.microsoft.com/office/drawing/2014/main" id="{882E656E-F534-4E9B-AF42-6610DE8D6DE7}"/>
+                <a16:creationId xmlns:a16="http://schemas.microsoft.com/office/drawing/2014/main" id="{AFF96931-CCDB-47D1-B982-0BFE2F5C618C}"/>
               </a:ext>
             </a:extLst>
           </p:cNvPr>
@@ -23622,7 +24925,7 @@
             <a:spLocks noGrp="1"/>
           </p:cNvSpPr>
           <p:nvPr>
-            <p:ph type="body" sz="quarter" idx="10"/>
+            <p:ph idx="1"/>
           </p:nvPr>
         </p:nvSpPr>
         <p:spPr/>
@@ -23630,9 +24933,110 @@
           <a:bodyPr/>
           <a:lstStyle/>
           <a:p>
-            <a:r>
-              <a:rPr lang="en-US" sz="9600" dirty="0"/>
-              <a:t>Q&amp;A</a:t>
+            <a:pPr marL="342900" indent="-342900">
+              <a:buFont typeface="Arial" panose="020B0604020202020204" pitchFamily="34" charset="0"/>
+              <a:buChar char="•"/>
+            </a:pPr>
+            <a:r>
+              <a:rPr lang="en-US" b="0" dirty="0"/>
+              <a:t>Docker image repositories use the basic format </a:t>
+            </a:r>
+            <a:r>
+              <a:rPr lang="en-US" dirty="0">
+                <a:latin typeface="Consolas" panose="020B0609020204030204" pitchFamily="49" charset="0"/>
+              </a:rPr>
+              <a:t>{user}/{app}</a:t>
+            </a:r>
+            <a:r>
+              <a:rPr lang="en-US" b="0" dirty="0"/>
+              <a:t>, but often the tag is used to specify a release version, or a variant of the image, in the format </a:t>
+            </a:r>
+            <a:r>
+              <a:rPr lang="en-US" dirty="0">
+                <a:latin typeface="Consolas" panose="020B0609020204030204" pitchFamily="49" charset="0"/>
+              </a:rPr>
+              <a:t>{user}/{app}:{tag}</a:t>
+            </a:r>
+            <a:r>
+              <a:rPr lang="en-US" b="0" dirty="0"/>
+              <a:t>.</a:t>
+            </a:r>
+          </a:p>
+          <a:p>
+            <a:pPr marL="342900" indent="-342900">
+              <a:buFont typeface="Arial" panose="020B0604020202020204" pitchFamily="34" charset="0"/>
+              <a:buChar char="•"/>
+            </a:pPr>
+            <a:r>
+              <a:rPr lang="en-US" b="0" dirty="0"/>
+              <a:t>If you don’t specify a tag when you refer to an image, the default </a:t>
+            </a:r>
+            <a:r>
+              <a:rPr lang="en-US" dirty="0">
+                <a:latin typeface="Consolas" panose="020B0609020204030204" pitchFamily="49" charset="0"/>
+              </a:rPr>
+              <a:t>latest</a:t>
+            </a:r>
+            <a:r>
+              <a:rPr lang="en-US" dirty="0"/>
+              <a:t> </a:t>
+            </a:r>
+            <a:r>
+              <a:rPr lang="en-US" b="0" dirty="0"/>
+              <a:t>tag is used.</a:t>
+            </a:r>
+          </a:p>
+          <a:p>
+            <a:pPr marL="342900" indent="-342900">
+              <a:buFont typeface="Arial" panose="020B0604020202020204" pitchFamily="34" charset="0"/>
+              <a:buChar char="•"/>
+            </a:pPr>
+            <a:r>
+              <a:rPr lang="en-US" b="0" dirty="0"/>
+              <a:t>One image can have multiple tags. Tags can be version numbers, commit labels, codenames—any useful way to classify images.</a:t>
+            </a:r>
+          </a:p>
+          <a:p>
+            <a:pPr marL="342900" indent="-342900">
+              <a:buFont typeface="Arial" panose="020B0604020202020204" pitchFamily="34" charset="0"/>
+              <a:buChar char="•"/>
+            </a:pPr>
+            <a:r>
+              <a:rPr lang="en-US" b="0" dirty="0"/>
+              <a:t>It’s important to specify a tag for base images in your FROM instruction. If you don’t, the image tagged as latest will be used. That tag can change to a different image without warning, and there can be breaking changes between image versions, which means your own images might fail to build.</a:t>
+            </a:r>
+          </a:p>
+        </p:txBody>
+      </p:sp>
+      <p:sp>
+        <p:nvSpPr>
+          <p:cNvPr id="3" name="Text Placeholder 2">
+            <a:extLst>
+              <a:ext uri="{FF2B5EF4-FFF2-40B4-BE49-F238E27FC236}">
+                <a16:creationId xmlns:a16="http://schemas.microsoft.com/office/drawing/2014/main" id="{CBA50F54-F9F0-49C1-A1C9-8D18F10A83B3}"/>
+              </a:ext>
+            </a:extLst>
+          </p:cNvPr>
+          <p:cNvSpPr>
+            <a:spLocks noGrp="1"/>
+          </p:cNvSpPr>
+          <p:nvPr>
+            <p:ph type="body" sz="quarter" idx="12"/>
+          </p:nvPr>
+        </p:nvSpPr>
+        <p:spPr>
+          <a:xfrm>
+            <a:off x="415625" y="174000"/>
+            <a:ext cx="7546131" cy="399144"/>
+          </a:xfrm>
+        </p:spPr>
+        <p:txBody>
+          <a:bodyPr/>
+          <a:lstStyle/>
+          <a:p>
+            <a:r>
+              <a:rPr lang="en-US" dirty="0"/>
+              <a:t>Tags and image versions</a:t>
             </a:r>
           </a:p>
         </p:txBody>
@@ -23640,7 +25044,7 @@
     </p:spTree>
     <p:extLst>
       <p:ext uri="{BB962C8B-B14F-4D97-AF65-F5344CB8AC3E}">
-        <p14:creationId xmlns:p14="http://schemas.microsoft.com/office/powerpoint/2010/main" val="1891880177"/>
+        <p14:creationId xmlns:p14="http://schemas.microsoft.com/office/powerpoint/2010/main" val="4283675761"/>
       </p:ext>
     </p:extLst>
   </p:cSld>
@@ -23667,10 +25071,427 @@
           <a:chExt cx="0" cy="0"/>
         </a:xfrm>
       </p:grpSpPr>
+      <p:sp>
+        <p:nvSpPr>
+          <p:cNvPr id="2" name="Content Placeholder 1">
+            <a:extLst>
+              <a:ext uri="{FF2B5EF4-FFF2-40B4-BE49-F238E27FC236}">
+                <a16:creationId xmlns:a16="http://schemas.microsoft.com/office/drawing/2014/main" id="{AFF96931-CCDB-47D1-B982-0BFE2F5C618C}"/>
+              </a:ext>
+            </a:extLst>
+          </p:cNvPr>
+          <p:cNvSpPr>
+            <a:spLocks noGrp="1"/>
+          </p:cNvSpPr>
+          <p:nvPr>
+            <p:ph idx="1"/>
+          </p:nvPr>
+        </p:nvSpPr>
+        <p:spPr/>
+        <p:txBody>
+          <a:bodyPr/>
+          <a:lstStyle/>
+          <a:p>
+            <a:pPr marL="342900" indent="-342900">
+              <a:buFont typeface="Arial" panose="020B0604020202020204" pitchFamily="34" charset="0"/>
+              <a:buChar char="•"/>
+            </a:pPr>
+            <a:r>
+              <a:rPr lang="en-US" b="0" dirty="0"/>
+              <a:t>Content</a:t>
+            </a:r>
+          </a:p>
+        </p:txBody>
+      </p:sp>
+      <p:sp>
+        <p:nvSpPr>
+          <p:cNvPr id="3" name="Text Placeholder 2">
+            <a:extLst>
+              <a:ext uri="{FF2B5EF4-FFF2-40B4-BE49-F238E27FC236}">
+                <a16:creationId xmlns:a16="http://schemas.microsoft.com/office/drawing/2014/main" id="{CBA50F54-F9F0-49C1-A1C9-8D18F10A83B3}"/>
+              </a:ext>
+            </a:extLst>
+          </p:cNvPr>
+          <p:cNvSpPr>
+            <a:spLocks noGrp="1"/>
+          </p:cNvSpPr>
+          <p:nvPr>
+            <p:ph type="body" sz="quarter" idx="12"/>
+          </p:nvPr>
+        </p:nvSpPr>
+        <p:spPr>
+          <a:xfrm>
+            <a:off x="415625" y="174000"/>
+            <a:ext cx="7546131" cy="399144"/>
+          </a:xfrm>
+        </p:spPr>
+        <p:txBody>
+          <a:bodyPr/>
+          <a:lstStyle/>
+          <a:p>
+            <a:r>
+              <a:rPr lang="en-US" dirty="0"/>
+              <a:t>Choose your base image carefully</a:t>
+            </a:r>
+          </a:p>
+        </p:txBody>
+      </p:sp>
     </p:spTree>
     <p:extLst>
       <p:ext uri="{BB962C8B-B14F-4D97-AF65-F5344CB8AC3E}">
-        <p14:creationId xmlns:p14="http://schemas.microsoft.com/office/powerpoint/2010/main" val="1456301527"/>
+        <p14:creationId xmlns:p14="http://schemas.microsoft.com/office/powerpoint/2010/main" val="2426814011"/>
+      </p:ext>
+    </p:extLst>
+  </p:cSld>
+  <p:clrMapOvr>
+    <a:masterClrMapping/>
+  </p:clrMapOvr>
+</p:sld>
+</file>
+
+<file path=ppt/slides/slide26.xml><?xml version="1.0" encoding="utf-8"?>
+<p:sld xmlns:a="http://schemas.openxmlformats.org/drawingml/2006/main" xmlns:r="http://schemas.openxmlformats.org/officeDocument/2006/relationships" xmlns:p="http://schemas.openxmlformats.org/presentationml/2006/main">
+  <p:cSld>
+    <p:spTree>
+      <p:nvGrpSpPr>
+        <p:cNvPr id="1" name=""/>
+        <p:cNvGrpSpPr/>
+        <p:nvPr/>
+      </p:nvGrpSpPr>
+      <p:grpSpPr>
+        <a:xfrm>
+          <a:off x="0" y="0"/>
+          <a:ext cx="0" cy="0"/>
+          <a:chOff x="0" y="0"/>
+          <a:chExt cx="0" cy="0"/>
+        </a:xfrm>
+      </p:grpSpPr>
+      <p:sp>
+        <p:nvSpPr>
+          <p:cNvPr id="2" name="Content Placeholder 1">
+            <a:extLst>
+              <a:ext uri="{FF2B5EF4-FFF2-40B4-BE49-F238E27FC236}">
+                <a16:creationId xmlns:a16="http://schemas.microsoft.com/office/drawing/2014/main" id="{AFF96931-CCDB-47D1-B982-0BFE2F5C618C}"/>
+              </a:ext>
+            </a:extLst>
+          </p:cNvPr>
+          <p:cNvSpPr>
+            <a:spLocks noGrp="1"/>
+          </p:cNvSpPr>
+          <p:nvPr>
+            <p:ph idx="1"/>
+          </p:nvPr>
+        </p:nvSpPr>
+        <p:spPr/>
+        <p:txBody>
+          <a:bodyPr/>
+          <a:lstStyle/>
+          <a:p>
+            <a:pPr marL="342900" indent="-342900">
+              <a:buFont typeface="Arial" panose="020B0604020202020204" pitchFamily="34" charset="0"/>
+              <a:buChar char="•"/>
+            </a:pPr>
+            <a:r>
+              <a:rPr lang="en-US" b="0" dirty="0"/>
+              <a:t>Content</a:t>
+            </a:r>
+          </a:p>
+        </p:txBody>
+      </p:sp>
+      <p:sp>
+        <p:nvSpPr>
+          <p:cNvPr id="3" name="Text Placeholder 2">
+            <a:extLst>
+              <a:ext uri="{FF2B5EF4-FFF2-40B4-BE49-F238E27FC236}">
+                <a16:creationId xmlns:a16="http://schemas.microsoft.com/office/drawing/2014/main" id="{CBA50F54-F9F0-49C1-A1C9-8D18F10A83B3}"/>
+              </a:ext>
+            </a:extLst>
+          </p:cNvPr>
+          <p:cNvSpPr>
+            <a:spLocks noGrp="1"/>
+          </p:cNvSpPr>
+          <p:nvPr>
+            <p:ph type="body" sz="quarter" idx="12"/>
+          </p:nvPr>
+        </p:nvSpPr>
+        <p:spPr>
+          <a:xfrm>
+            <a:off x="415625" y="174000"/>
+            <a:ext cx="7546131" cy="399144"/>
+          </a:xfrm>
+        </p:spPr>
+        <p:txBody>
+          <a:bodyPr/>
+          <a:lstStyle/>
+          <a:p>
+            <a:r>
+              <a:rPr lang="en-US" dirty="0"/>
+              <a:t>Running your own registry</a:t>
+            </a:r>
+          </a:p>
+        </p:txBody>
+      </p:sp>
+    </p:spTree>
+    <p:extLst>
+      <p:ext uri="{BB962C8B-B14F-4D97-AF65-F5344CB8AC3E}">
+        <p14:creationId xmlns:p14="http://schemas.microsoft.com/office/powerpoint/2010/main" val="3442033088"/>
+      </p:ext>
+    </p:extLst>
+  </p:cSld>
+  <p:clrMapOvr>
+    <a:masterClrMapping/>
+  </p:clrMapOvr>
+</p:sld>
+</file>
+
+<file path=ppt/slides/slide27.xml><?xml version="1.0" encoding="utf-8"?>
+<p:sld xmlns:a="http://schemas.openxmlformats.org/drawingml/2006/main" xmlns:r="http://schemas.openxmlformats.org/officeDocument/2006/relationships" xmlns:p="http://schemas.openxmlformats.org/presentationml/2006/main">
+  <p:cSld>
+    <p:spTree>
+      <p:nvGrpSpPr>
+        <p:cNvPr id="1" name=""/>
+        <p:cNvGrpSpPr/>
+        <p:nvPr/>
+      </p:nvGrpSpPr>
+      <p:grpSpPr>
+        <a:xfrm>
+          <a:off x="0" y="0"/>
+          <a:ext cx="0" cy="0"/>
+          <a:chOff x="0" y="0"/>
+          <a:chExt cx="0" cy="0"/>
+        </a:xfrm>
+      </p:grpSpPr>
+      <p:sp>
+        <p:nvSpPr>
+          <p:cNvPr id="2" name="Content Placeholder 1">
+            <a:extLst>
+              <a:ext uri="{FF2B5EF4-FFF2-40B4-BE49-F238E27FC236}">
+                <a16:creationId xmlns:a16="http://schemas.microsoft.com/office/drawing/2014/main" id="{AFF96931-CCDB-47D1-B982-0BFE2F5C618C}"/>
+              </a:ext>
+            </a:extLst>
+          </p:cNvPr>
+          <p:cNvSpPr>
+            <a:spLocks noGrp="1"/>
+          </p:cNvSpPr>
+          <p:nvPr>
+            <p:ph idx="1"/>
+          </p:nvPr>
+        </p:nvSpPr>
+        <p:spPr/>
+        <p:txBody>
+          <a:bodyPr anchor="ctr"/>
+          <a:lstStyle/>
+          <a:p>
+            <a:pPr algn="ctr"/>
+            <a:r>
+              <a:rPr lang="en-US" sz="9600" b="0" dirty="0"/>
+              <a:t>DEMO</a:t>
+            </a:r>
+            <a:r>
+              <a:rPr lang="en-US" b="0" dirty="0"/>
+              <a:t> </a:t>
+            </a:r>
+          </a:p>
+          <a:p>
+            <a:pPr marL="342900" indent="-342900">
+              <a:buFont typeface="Arial" panose="020B0604020202020204" pitchFamily="34" charset="0"/>
+              <a:buChar char="•"/>
+            </a:pPr>
+            <a:endParaRPr lang="en-US" b="0" dirty="0"/>
+          </a:p>
+          <a:p>
+            <a:pPr marL="342900" indent="-342900"/>
+            <a:endParaRPr lang="en-US" dirty="0"/>
+          </a:p>
+        </p:txBody>
+      </p:sp>
+      <p:sp>
+        <p:nvSpPr>
+          <p:cNvPr id="3" name="Text Placeholder 2">
+            <a:extLst>
+              <a:ext uri="{FF2B5EF4-FFF2-40B4-BE49-F238E27FC236}">
+                <a16:creationId xmlns:a16="http://schemas.microsoft.com/office/drawing/2014/main" id="{CBA50F54-F9F0-49C1-A1C9-8D18F10A83B3}"/>
+              </a:ext>
+            </a:extLst>
+          </p:cNvPr>
+          <p:cNvSpPr>
+            <a:spLocks noGrp="1"/>
+          </p:cNvSpPr>
+          <p:nvPr>
+            <p:ph type="body" sz="quarter" idx="12"/>
+          </p:nvPr>
+        </p:nvSpPr>
+        <p:spPr/>
+        <p:txBody>
+          <a:bodyPr/>
+          <a:lstStyle/>
+          <a:p>
+            <a:r>
+              <a:rPr lang="en-US" dirty="0"/>
+              <a:t>Running containers</a:t>
+            </a:r>
+          </a:p>
+        </p:txBody>
+      </p:sp>
+    </p:spTree>
+    <p:extLst>
+      <p:ext uri="{BB962C8B-B14F-4D97-AF65-F5344CB8AC3E}">
+        <p14:creationId xmlns:p14="http://schemas.microsoft.com/office/powerpoint/2010/main" val="949565952"/>
+      </p:ext>
+    </p:extLst>
+  </p:cSld>
+  <p:clrMapOvr>
+    <a:masterClrMapping/>
+  </p:clrMapOvr>
+</p:sld>
+</file>
+
+<file path=ppt/slides/slide28.xml><?xml version="1.0" encoding="utf-8"?>
+<p:sld xmlns:a="http://schemas.openxmlformats.org/drawingml/2006/main" xmlns:r="http://schemas.openxmlformats.org/officeDocument/2006/relationships" xmlns:p="http://schemas.openxmlformats.org/presentationml/2006/main">
+  <p:cSld>
+    <p:spTree>
+      <p:nvGrpSpPr>
+        <p:cNvPr id="1" name=""/>
+        <p:cNvGrpSpPr/>
+        <p:nvPr/>
+      </p:nvGrpSpPr>
+      <p:grpSpPr>
+        <a:xfrm>
+          <a:off x="0" y="0"/>
+          <a:ext cx="0" cy="0"/>
+          <a:chOff x="0" y="0"/>
+          <a:chExt cx="0" cy="0"/>
+        </a:xfrm>
+      </p:grpSpPr>
+      <p:sp>
+        <p:nvSpPr>
+          <p:cNvPr id="2" name="Text Placeholder 1">
+            <a:extLst>
+              <a:ext uri="{FF2B5EF4-FFF2-40B4-BE49-F238E27FC236}">
+                <a16:creationId xmlns:a16="http://schemas.microsoft.com/office/drawing/2014/main" id="{149FE133-FF4E-4029-8D0B-291BF433476E}"/>
+              </a:ext>
+            </a:extLst>
+          </p:cNvPr>
+          <p:cNvSpPr>
+            <a:spLocks noGrp="1"/>
+          </p:cNvSpPr>
+          <p:nvPr>
+            <p:ph type="body" sz="quarter" idx="10"/>
+          </p:nvPr>
+        </p:nvSpPr>
+        <p:spPr/>
+        <p:txBody>
+          <a:bodyPr/>
+          <a:lstStyle/>
+          <a:p>
+            <a:r>
+              <a:rPr lang="en-US" dirty="0"/>
+              <a:t>Data Storage in Docker</a:t>
+            </a:r>
+          </a:p>
+        </p:txBody>
+      </p:sp>
+    </p:spTree>
+    <p:extLst>
+      <p:ext uri="{BB962C8B-B14F-4D97-AF65-F5344CB8AC3E}">
+        <p14:creationId xmlns:p14="http://schemas.microsoft.com/office/powerpoint/2010/main" val="459366342"/>
+      </p:ext>
+    </p:extLst>
+  </p:cSld>
+  <p:clrMapOvr>
+    <a:masterClrMapping/>
+  </p:clrMapOvr>
+</p:sld>
+</file>
+
+<file path=ppt/slides/slide29.xml><?xml version="1.0" encoding="utf-8"?>
+<p:sld xmlns:a="http://schemas.openxmlformats.org/drawingml/2006/main" xmlns:r="http://schemas.openxmlformats.org/officeDocument/2006/relationships" xmlns:p="http://schemas.openxmlformats.org/presentationml/2006/main">
+  <p:cSld>
+    <p:spTree>
+      <p:nvGrpSpPr>
+        <p:cNvPr id="1" name=""/>
+        <p:cNvGrpSpPr/>
+        <p:nvPr/>
+      </p:nvGrpSpPr>
+      <p:grpSpPr>
+        <a:xfrm>
+          <a:off x="0" y="0"/>
+          <a:ext cx="0" cy="0"/>
+          <a:chOff x="0" y="0"/>
+          <a:chExt cx="0" cy="0"/>
+        </a:xfrm>
+      </p:grpSpPr>
+      <p:sp>
+        <p:nvSpPr>
+          <p:cNvPr id="2" name="Content Placeholder 1">
+            <a:extLst>
+              <a:ext uri="{FF2B5EF4-FFF2-40B4-BE49-F238E27FC236}">
+                <a16:creationId xmlns:a16="http://schemas.microsoft.com/office/drawing/2014/main" id="{AFF96931-CCDB-47D1-B982-0BFE2F5C618C}"/>
+              </a:ext>
+            </a:extLst>
+          </p:cNvPr>
+          <p:cNvSpPr>
+            <a:spLocks noGrp="1"/>
+          </p:cNvSpPr>
+          <p:nvPr>
+            <p:ph idx="1"/>
+          </p:nvPr>
+        </p:nvSpPr>
+        <p:spPr/>
+        <p:txBody>
+          <a:bodyPr/>
+          <a:lstStyle/>
+          <a:p>
+            <a:pPr marL="342900" indent="-342900">
+              <a:buFont typeface="Arial" panose="020B0604020202020204" pitchFamily="34" charset="0"/>
+              <a:buChar char="•"/>
+            </a:pPr>
+            <a:r>
+              <a:rPr lang="en-US" dirty="0"/>
+              <a:t>Content</a:t>
+            </a:r>
+          </a:p>
+          <a:p>
+            <a:pPr marL="342900" indent="-342900">
+              <a:buFont typeface="Arial" panose="020B0604020202020204" pitchFamily="34" charset="0"/>
+              <a:buChar char="•"/>
+            </a:pPr>
+            <a:endParaRPr lang="en-US" dirty="0"/>
+          </a:p>
+        </p:txBody>
+      </p:sp>
+      <p:sp>
+        <p:nvSpPr>
+          <p:cNvPr id="3" name="Text Placeholder 2">
+            <a:extLst>
+              <a:ext uri="{FF2B5EF4-FFF2-40B4-BE49-F238E27FC236}">
+                <a16:creationId xmlns:a16="http://schemas.microsoft.com/office/drawing/2014/main" id="{CBA50F54-F9F0-49C1-A1C9-8D18F10A83B3}"/>
+              </a:ext>
+            </a:extLst>
+          </p:cNvPr>
+          <p:cNvSpPr>
+            <a:spLocks noGrp="1"/>
+          </p:cNvSpPr>
+          <p:nvPr>
+            <p:ph type="body" sz="quarter" idx="12"/>
+          </p:nvPr>
+        </p:nvSpPr>
+        <p:spPr/>
+        <p:txBody>
+          <a:bodyPr/>
+          <a:lstStyle/>
+          <a:p>
+            <a:r>
+              <a:rPr lang="en-US" dirty="0"/>
+              <a:t>Header</a:t>
+            </a:r>
+          </a:p>
+        </p:txBody>
+      </p:sp>
+    </p:spTree>
+    <p:extLst>
+      <p:ext uri="{BB962C8B-B14F-4D97-AF65-F5344CB8AC3E}">
+        <p14:creationId xmlns:p14="http://schemas.microsoft.com/office/powerpoint/2010/main" val="2132152713"/>
       </p:ext>
     </p:extLst>
   </p:cSld>
@@ -23846,6 +25667,404 @@
     <p:extLst>
       <p:ext uri="{BB962C8B-B14F-4D97-AF65-F5344CB8AC3E}">
         <p14:creationId xmlns:p14="http://schemas.microsoft.com/office/powerpoint/2010/main" val="3295262724"/>
+      </p:ext>
+    </p:extLst>
+  </p:cSld>
+  <p:clrMapOvr>
+    <a:masterClrMapping/>
+  </p:clrMapOvr>
+</p:sld>
+</file>
+
+<file path=ppt/slides/slide30.xml><?xml version="1.0" encoding="utf-8"?>
+<p:sld xmlns:a="http://schemas.openxmlformats.org/drawingml/2006/main" xmlns:r="http://schemas.openxmlformats.org/officeDocument/2006/relationships" xmlns:p="http://schemas.openxmlformats.org/presentationml/2006/main">
+  <p:cSld>
+    <p:spTree>
+      <p:nvGrpSpPr>
+        <p:cNvPr id="1" name=""/>
+        <p:cNvGrpSpPr/>
+        <p:nvPr/>
+      </p:nvGrpSpPr>
+      <p:grpSpPr>
+        <a:xfrm>
+          <a:off x="0" y="0"/>
+          <a:ext cx="0" cy="0"/>
+          <a:chOff x="0" y="0"/>
+          <a:chExt cx="0" cy="0"/>
+        </a:xfrm>
+      </p:grpSpPr>
+      <p:sp>
+        <p:nvSpPr>
+          <p:cNvPr id="2" name="Text Placeholder 1">
+            <a:extLst>
+              <a:ext uri="{FF2B5EF4-FFF2-40B4-BE49-F238E27FC236}">
+                <a16:creationId xmlns:a16="http://schemas.microsoft.com/office/drawing/2014/main" id="{149FE133-FF4E-4029-8D0B-291BF433476E}"/>
+              </a:ext>
+            </a:extLst>
+          </p:cNvPr>
+          <p:cNvSpPr>
+            <a:spLocks noGrp="1"/>
+          </p:cNvSpPr>
+          <p:nvPr>
+            <p:ph type="body" sz="quarter" idx="10"/>
+          </p:nvPr>
+        </p:nvSpPr>
+        <p:spPr/>
+        <p:txBody>
+          <a:bodyPr/>
+          <a:lstStyle/>
+          <a:p>
+            <a:r>
+              <a:rPr lang="en-US" dirty="0"/>
+              <a:t>Orchestrating Systems with Docker</a:t>
+            </a:r>
+          </a:p>
+        </p:txBody>
+      </p:sp>
+    </p:spTree>
+    <p:extLst>
+      <p:ext uri="{BB962C8B-B14F-4D97-AF65-F5344CB8AC3E}">
+        <p14:creationId xmlns:p14="http://schemas.microsoft.com/office/powerpoint/2010/main" val="2036340124"/>
+      </p:ext>
+    </p:extLst>
+  </p:cSld>
+  <p:clrMapOvr>
+    <a:masterClrMapping/>
+  </p:clrMapOvr>
+</p:sld>
+</file>
+
+<file path=ppt/slides/slide31.xml><?xml version="1.0" encoding="utf-8"?>
+<p:sld xmlns:a="http://schemas.openxmlformats.org/drawingml/2006/main" xmlns:r="http://schemas.openxmlformats.org/officeDocument/2006/relationships" xmlns:p="http://schemas.openxmlformats.org/presentationml/2006/main">
+  <p:cSld>
+    <p:spTree>
+      <p:nvGrpSpPr>
+        <p:cNvPr id="1" name=""/>
+        <p:cNvGrpSpPr/>
+        <p:nvPr/>
+      </p:nvGrpSpPr>
+      <p:grpSpPr>
+        <a:xfrm>
+          <a:off x="0" y="0"/>
+          <a:ext cx="0" cy="0"/>
+          <a:chOff x="0" y="0"/>
+          <a:chExt cx="0" cy="0"/>
+        </a:xfrm>
+      </p:grpSpPr>
+      <p:sp>
+        <p:nvSpPr>
+          <p:cNvPr id="2" name="Content Placeholder 1">
+            <a:extLst>
+              <a:ext uri="{FF2B5EF4-FFF2-40B4-BE49-F238E27FC236}">
+                <a16:creationId xmlns:a16="http://schemas.microsoft.com/office/drawing/2014/main" id="{AFF96931-CCDB-47D1-B982-0BFE2F5C618C}"/>
+              </a:ext>
+            </a:extLst>
+          </p:cNvPr>
+          <p:cNvSpPr>
+            <a:spLocks noGrp="1"/>
+          </p:cNvSpPr>
+          <p:nvPr>
+            <p:ph idx="1"/>
+          </p:nvPr>
+        </p:nvSpPr>
+        <p:spPr/>
+        <p:txBody>
+          <a:bodyPr/>
+          <a:lstStyle/>
+          <a:p>
+            <a:pPr marL="342900" indent="-342900">
+              <a:buFont typeface="Arial" panose="020B0604020202020204" pitchFamily="34" charset="0"/>
+              <a:buChar char="•"/>
+            </a:pPr>
+            <a:r>
+              <a:rPr lang="en-US" dirty="0"/>
+              <a:t>Content</a:t>
+            </a:r>
+          </a:p>
+          <a:p>
+            <a:pPr marL="342900" indent="-342900">
+              <a:buFont typeface="Arial" panose="020B0604020202020204" pitchFamily="34" charset="0"/>
+              <a:buChar char="•"/>
+            </a:pPr>
+            <a:endParaRPr lang="en-US" dirty="0"/>
+          </a:p>
+        </p:txBody>
+      </p:sp>
+      <p:sp>
+        <p:nvSpPr>
+          <p:cNvPr id="3" name="Text Placeholder 2">
+            <a:extLst>
+              <a:ext uri="{FF2B5EF4-FFF2-40B4-BE49-F238E27FC236}">
+                <a16:creationId xmlns:a16="http://schemas.microsoft.com/office/drawing/2014/main" id="{CBA50F54-F9F0-49C1-A1C9-8D18F10A83B3}"/>
+              </a:ext>
+            </a:extLst>
+          </p:cNvPr>
+          <p:cNvSpPr>
+            <a:spLocks noGrp="1"/>
+          </p:cNvSpPr>
+          <p:nvPr>
+            <p:ph type="body" sz="quarter" idx="12"/>
+          </p:nvPr>
+        </p:nvSpPr>
+        <p:spPr/>
+        <p:txBody>
+          <a:bodyPr/>
+          <a:lstStyle/>
+          <a:p>
+            <a:r>
+              <a:rPr lang="en-US" dirty="0"/>
+              <a:t>Header</a:t>
+            </a:r>
+          </a:p>
+        </p:txBody>
+      </p:sp>
+    </p:spTree>
+    <p:extLst>
+      <p:ext uri="{BB962C8B-B14F-4D97-AF65-F5344CB8AC3E}">
+        <p14:creationId xmlns:p14="http://schemas.microsoft.com/office/powerpoint/2010/main" val="1180309019"/>
+      </p:ext>
+    </p:extLst>
+  </p:cSld>
+  <p:clrMapOvr>
+    <a:masterClrMapping/>
+  </p:clrMapOvr>
+</p:sld>
+</file>
+
+<file path=ppt/slides/slide32.xml><?xml version="1.0" encoding="utf-8"?>
+<p:sld xmlns:a="http://schemas.openxmlformats.org/drawingml/2006/main" xmlns:r="http://schemas.openxmlformats.org/officeDocument/2006/relationships" xmlns:p="http://schemas.openxmlformats.org/presentationml/2006/main">
+  <p:cSld>
+    <p:spTree>
+      <p:nvGrpSpPr>
+        <p:cNvPr id="1" name=""/>
+        <p:cNvGrpSpPr/>
+        <p:nvPr/>
+      </p:nvGrpSpPr>
+      <p:grpSpPr>
+        <a:xfrm>
+          <a:off x="0" y="0"/>
+          <a:ext cx="0" cy="0"/>
+          <a:chOff x="0" y="0"/>
+          <a:chExt cx="0" cy="0"/>
+        </a:xfrm>
+      </p:grpSpPr>
+      <p:sp>
+        <p:nvSpPr>
+          <p:cNvPr id="2" name="Text Placeholder 1">
+            <a:extLst>
+              <a:ext uri="{FF2B5EF4-FFF2-40B4-BE49-F238E27FC236}">
+                <a16:creationId xmlns:a16="http://schemas.microsoft.com/office/drawing/2014/main" id="{149FE133-FF4E-4029-8D0B-291BF433476E}"/>
+              </a:ext>
+            </a:extLst>
+          </p:cNvPr>
+          <p:cNvSpPr>
+            <a:spLocks noGrp="1"/>
+          </p:cNvSpPr>
+          <p:nvPr>
+            <p:ph type="body" sz="quarter" idx="10"/>
+          </p:nvPr>
+        </p:nvSpPr>
+        <p:spPr/>
+        <p:txBody>
+          <a:bodyPr/>
+          <a:lstStyle/>
+          <a:p>
+            <a:r>
+              <a:rPr lang="en-US" dirty="0"/>
+              <a:t>Clustering Hosts with Docker Swarm</a:t>
+            </a:r>
+          </a:p>
+        </p:txBody>
+      </p:sp>
+    </p:spTree>
+    <p:extLst>
+      <p:ext uri="{BB962C8B-B14F-4D97-AF65-F5344CB8AC3E}">
+        <p14:creationId xmlns:p14="http://schemas.microsoft.com/office/powerpoint/2010/main" val="3059142854"/>
+      </p:ext>
+    </p:extLst>
+  </p:cSld>
+  <p:clrMapOvr>
+    <a:masterClrMapping/>
+  </p:clrMapOvr>
+</p:sld>
+</file>
+
+<file path=ppt/slides/slide33.xml><?xml version="1.0" encoding="utf-8"?>
+<p:sld xmlns:a="http://schemas.openxmlformats.org/drawingml/2006/main" xmlns:r="http://schemas.openxmlformats.org/officeDocument/2006/relationships" xmlns:p="http://schemas.openxmlformats.org/presentationml/2006/main">
+  <p:cSld>
+    <p:spTree>
+      <p:nvGrpSpPr>
+        <p:cNvPr id="1" name=""/>
+        <p:cNvGrpSpPr/>
+        <p:nvPr/>
+      </p:nvGrpSpPr>
+      <p:grpSpPr>
+        <a:xfrm>
+          <a:off x="0" y="0"/>
+          <a:ext cx="0" cy="0"/>
+          <a:chOff x="0" y="0"/>
+          <a:chExt cx="0" cy="0"/>
+        </a:xfrm>
+      </p:grpSpPr>
+      <p:sp>
+        <p:nvSpPr>
+          <p:cNvPr id="2" name="Content Placeholder 1">
+            <a:extLst>
+              <a:ext uri="{FF2B5EF4-FFF2-40B4-BE49-F238E27FC236}">
+                <a16:creationId xmlns:a16="http://schemas.microsoft.com/office/drawing/2014/main" id="{AFF96931-CCDB-47D1-B982-0BFE2F5C618C}"/>
+              </a:ext>
+            </a:extLst>
+          </p:cNvPr>
+          <p:cNvSpPr>
+            <a:spLocks noGrp="1"/>
+          </p:cNvSpPr>
+          <p:nvPr>
+            <p:ph idx="1"/>
+          </p:nvPr>
+        </p:nvSpPr>
+        <p:spPr/>
+        <p:txBody>
+          <a:bodyPr/>
+          <a:lstStyle/>
+          <a:p>
+            <a:pPr marL="342900" indent="-342900">
+              <a:buFont typeface="Arial" panose="020B0604020202020204" pitchFamily="34" charset="0"/>
+              <a:buChar char="•"/>
+            </a:pPr>
+            <a:r>
+              <a:rPr lang="en-US" dirty="0"/>
+              <a:t>Content</a:t>
+            </a:r>
+          </a:p>
+          <a:p>
+            <a:pPr marL="342900" indent="-342900">
+              <a:buFont typeface="Arial" panose="020B0604020202020204" pitchFamily="34" charset="0"/>
+              <a:buChar char="•"/>
+            </a:pPr>
+            <a:endParaRPr lang="en-US" dirty="0"/>
+          </a:p>
+        </p:txBody>
+      </p:sp>
+      <p:sp>
+        <p:nvSpPr>
+          <p:cNvPr id="3" name="Text Placeholder 2">
+            <a:extLst>
+              <a:ext uri="{FF2B5EF4-FFF2-40B4-BE49-F238E27FC236}">
+                <a16:creationId xmlns:a16="http://schemas.microsoft.com/office/drawing/2014/main" id="{CBA50F54-F9F0-49C1-A1C9-8D18F10A83B3}"/>
+              </a:ext>
+            </a:extLst>
+          </p:cNvPr>
+          <p:cNvSpPr>
+            <a:spLocks noGrp="1"/>
+          </p:cNvSpPr>
+          <p:nvPr>
+            <p:ph type="body" sz="quarter" idx="12"/>
+          </p:nvPr>
+        </p:nvSpPr>
+        <p:spPr/>
+        <p:txBody>
+          <a:bodyPr/>
+          <a:lstStyle/>
+          <a:p>
+            <a:r>
+              <a:rPr lang="en-US" dirty="0"/>
+              <a:t>Header</a:t>
+            </a:r>
+          </a:p>
+        </p:txBody>
+      </p:sp>
+    </p:spTree>
+    <p:extLst>
+      <p:ext uri="{BB962C8B-B14F-4D97-AF65-F5344CB8AC3E}">
+        <p14:creationId xmlns:p14="http://schemas.microsoft.com/office/powerpoint/2010/main" val="2079409009"/>
+      </p:ext>
+    </p:extLst>
+  </p:cSld>
+  <p:clrMapOvr>
+    <a:masterClrMapping/>
+  </p:clrMapOvr>
+</p:sld>
+</file>
+
+<file path=ppt/slides/slide34.xml><?xml version="1.0" encoding="utf-8"?>
+<p:sld xmlns:a="http://schemas.openxmlformats.org/drawingml/2006/main" xmlns:r="http://schemas.openxmlformats.org/officeDocument/2006/relationships" xmlns:p="http://schemas.openxmlformats.org/presentationml/2006/main">
+  <p:cSld>
+    <p:spTree>
+      <p:nvGrpSpPr>
+        <p:cNvPr id="1" name=""/>
+        <p:cNvGrpSpPr/>
+        <p:nvPr/>
+      </p:nvGrpSpPr>
+      <p:grpSpPr>
+        <a:xfrm>
+          <a:off x="0" y="0"/>
+          <a:ext cx="0" cy="0"/>
+          <a:chOff x="0" y="0"/>
+          <a:chExt cx="0" cy="0"/>
+        </a:xfrm>
+      </p:grpSpPr>
+      <p:sp>
+        <p:nvSpPr>
+          <p:cNvPr id="2" name="Text Placeholder 1">
+            <a:extLst>
+              <a:ext uri="{FF2B5EF4-FFF2-40B4-BE49-F238E27FC236}">
+                <a16:creationId xmlns:a16="http://schemas.microsoft.com/office/drawing/2014/main" id="{882E656E-F534-4E9B-AF42-6610DE8D6DE7}"/>
+              </a:ext>
+            </a:extLst>
+          </p:cNvPr>
+          <p:cNvSpPr>
+            <a:spLocks noGrp="1"/>
+          </p:cNvSpPr>
+          <p:nvPr>
+            <p:ph type="body" sz="quarter" idx="10"/>
+          </p:nvPr>
+        </p:nvSpPr>
+        <p:spPr/>
+        <p:txBody>
+          <a:bodyPr/>
+          <a:lstStyle/>
+          <a:p>
+            <a:r>
+              <a:rPr lang="en-US" sz="9600" dirty="0"/>
+              <a:t>Q&amp;A</a:t>
+            </a:r>
+          </a:p>
+        </p:txBody>
+      </p:sp>
+    </p:spTree>
+    <p:extLst>
+      <p:ext uri="{BB962C8B-B14F-4D97-AF65-F5344CB8AC3E}">
+        <p14:creationId xmlns:p14="http://schemas.microsoft.com/office/powerpoint/2010/main" val="1891880177"/>
+      </p:ext>
+    </p:extLst>
+  </p:cSld>
+  <p:clrMapOvr>
+    <a:masterClrMapping/>
+  </p:clrMapOvr>
+</p:sld>
+</file>
+
+<file path=ppt/slides/slide35.xml><?xml version="1.0" encoding="utf-8"?>
+<p:sld xmlns:a="http://schemas.openxmlformats.org/drawingml/2006/main" xmlns:r="http://schemas.openxmlformats.org/officeDocument/2006/relationships" xmlns:p="http://schemas.openxmlformats.org/presentationml/2006/main">
+  <p:cSld>
+    <p:spTree>
+      <p:nvGrpSpPr>
+        <p:cNvPr id="1" name=""/>
+        <p:cNvGrpSpPr/>
+        <p:nvPr/>
+      </p:nvGrpSpPr>
+      <p:grpSpPr>
+        <a:xfrm>
+          <a:off x="0" y="0"/>
+          <a:ext cx="0" cy="0"/>
+          <a:chOff x="0" y="0"/>
+          <a:chExt cx="0" cy="0"/>
+        </a:xfrm>
+      </p:grpSpPr>
+    </p:spTree>
+    <p:extLst>
+      <p:ext uri="{BB962C8B-B14F-4D97-AF65-F5344CB8AC3E}">
+        <p14:creationId xmlns:p14="http://schemas.microsoft.com/office/powerpoint/2010/main" val="1456301527"/>
       </p:ext>
     </p:extLst>
   </p:cSld>

</xml_diff>

<commit_message>
Add more slides and samples on Image Registries topic
</commit_message>
<xml_diff>
--- a/docs/Introduction to Docker.pptx
+++ b/docs/Introduction to Docker.pptx
@@ -363,7 +363,7 @@
               <a:rPr lang="en-US" smtClean="0">
                 <a:latin typeface="Open Sans" panose="020B0606030504020204" pitchFamily="34" charset="0"/>
               </a:rPr>
-              <a:t>10/14/2019</a:t>
+              <a:t>10/15/2019</a:t>
             </a:fld>
             <a:endParaRPr lang="en-US" dirty="0">
               <a:latin typeface="Open Sans" panose="020B0606030504020204" pitchFamily="34" charset="0"/>
@@ -548,7 +548,7 @@
           <a:p>
             <a:fld id="{1287E087-90D8-45F8-80C0-6755C3C3CEFE}" type="datetimeFigureOut">
               <a:rPr lang="en-US" smtClean="0"/>
-              <a:t>10/14/2019</a:t>
+              <a:t>10/15/2019</a:t>
             </a:fld>
             <a:endParaRPr lang="en-US"/>
           </a:p>
@@ -1447,6 +1447,24 @@
               <a:rPr lang="en-US" dirty="0"/>
               <a:t>/03_Image_registries_and_Docker_Hub</a:t>
             </a:r>
+          </a:p>
+          <a:p>
+            <a:endParaRPr lang="en-US" dirty="0"/>
+          </a:p>
+          <a:p>
+            <a:r>
+              <a:rPr lang="en-US" dirty="0"/>
+              <a:t>Use this URL to show that local registry is running and repository is created:</a:t>
+            </a:r>
+          </a:p>
+          <a:p>
+            <a:r>
+              <a:rPr lang="en-US" dirty="0">
+                <a:hlinkClick r:id="rId3"/>
+              </a:rPr>
+              <a:t>http://localhost:8080/v2/_catalog</a:t>
+            </a:r>
+            <a:endParaRPr lang="en-US" dirty="0"/>
           </a:p>
         </p:txBody>
       </p:sp>
@@ -25098,7 +25116,32 @@
             </a:pPr>
             <a:r>
               <a:rPr lang="en-US" b="0" dirty="0"/>
-              <a:t>Content</a:t>
+              <a:t>Docker Hub is the default registry, and there are thousands of high-quality images available there, but only the official repositories are curated. There are no quality gates on any other images in the Hub, which means anyone can build anything into an image.</a:t>
+            </a:r>
+            <a:endParaRPr lang="ru-UA" b="0" dirty="0"/>
+          </a:p>
+          <a:p>
+            <a:pPr marL="342900" indent="-342900">
+              <a:buFont typeface="Arial" panose="020B0604020202020204" pitchFamily="34" charset="0"/>
+              <a:buChar char="•"/>
+            </a:pPr>
+            <a:r>
+              <a:rPr lang="en-US" b="0" dirty="0"/>
+              <a:t>The official repositories are the best place to start. Not only are they actively supported, but the Docker Hub scans the images against a security vulnerability database and will flag any issues it finds.</a:t>
+            </a:r>
+          </a:p>
+          <a:p>
+            <a:pPr marL="342900" indent="-342900">
+              <a:buFont typeface="Arial" panose="020B0604020202020204" pitchFamily="34" charset="0"/>
+              <a:buChar char="•"/>
+            </a:pPr>
+            <a:r>
+              <a:rPr lang="en-US" dirty="0"/>
+              <a:t>If your base image is not from an official repository, the publisher is not required to keep that image up-to-date or even available. If you build from another user’s base image on the Hub, that repository can be deleted, leaving you unable to build your own image. If that’s a concern, you should consider cloning the source and building your own image.</a:t>
+            </a:r>
+            <a:r>
+              <a:rPr lang="en-US" b="0" dirty="0"/>
+              <a:t> </a:t>
             </a:r>
           </a:p>
         </p:txBody>
@@ -25193,8 +25236,128 @@
             </a:pPr>
             <a:r>
               <a:rPr lang="en-US" b="0" dirty="0"/>
-              <a:t>Content</a:t>
-            </a:r>
+              <a:t>For commercial or sensitive applications, you might not want your images built and hosted on a public service, even in a private repository. In that case, you can run your own registry on your own hardware with Docker’s </a:t>
+            </a:r>
+            <a:r>
+              <a:rPr lang="en-US" dirty="0">
+                <a:latin typeface="Consolas" panose="020B0609020204030204" pitchFamily="49" charset="0"/>
+              </a:rPr>
+              <a:t>registry</a:t>
+            </a:r>
+            <a:r>
+              <a:rPr lang="en-US" dirty="0"/>
+              <a:t> </a:t>
+            </a:r>
+            <a:r>
+              <a:rPr lang="en-US" b="0" dirty="0"/>
+              <a:t>image:</a:t>
+            </a:r>
+          </a:p>
+          <a:p>
+            <a:pPr marL="1028700" lvl="1" indent="-342900"/>
+            <a:r>
+              <a:rPr lang="en-US" b="0" dirty="0">
+                <a:latin typeface="Consolas" panose="020B0609020204030204" pitchFamily="49" charset="0"/>
+              </a:rPr>
+              <a:t>docker container run -d -p </a:t>
+            </a:r>
+            <a:r>
+              <a:rPr lang="ru-UA" b="0" dirty="0">
+                <a:latin typeface="Consolas" panose="020B0609020204030204" pitchFamily="49" charset="0"/>
+              </a:rPr>
+              <a:t>8080</a:t>
+            </a:r>
+            <a:r>
+              <a:rPr lang="en-US" b="0" dirty="0">
+                <a:latin typeface="Consolas" panose="020B0609020204030204" pitchFamily="49" charset="0"/>
+              </a:rPr>
+              <a:t>:5000 registry:2</a:t>
+            </a:r>
+            <a:r>
+              <a:rPr lang="en-US" b="0" dirty="0"/>
+              <a:t> 	</a:t>
+            </a:r>
+          </a:p>
+          <a:p>
+            <a:pPr marL="342900" indent="-342900">
+              <a:buFont typeface="Arial" panose="020B0604020202020204" pitchFamily="34" charset="0"/>
+              <a:buChar char="•"/>
+            </a:pPr>
+            <a:r>
+              <a:rPr lang="en-US" b="0" dirty="0"/>
+              <a:t>The registry address is a part of the full image tag, so in order to push an existing image from your cache to your registry, you will need to tag it with the address:</a:t>
+            </a:r>
+          </a:p>
+          <a:p>
+            <a:pPr marL="1028700" lvl="1" indent="-342900"/>
+            <a:r>
+              <a:rPr lang="en-US" b="0" dirty="0">
+                <a:latin typeface="Consolas" panose="020B0609020204030204" pitchFamily="49" charset="0"/>
+              </a:rPr>
+              <a:t>docker image tag </a:t>
+            </a:r>
+            <a:r>
+              <a:rPr lang="en-US" b="0" dirty="0" err="1">
+                <a:latin typeface="Consolas" panose="020B0609020204030204" pitchFamily="49" charset="0"/>
+              </a:rPr>
+              <a:t>tantsyurasergey</a:t>
+            </a:r>
+            <a:r>
+              <a:rPr lang="en-US" b="0" dirty="0">
+                <a:latin typeface="Consolas" panose="020B0609020204030204" pitchFamily="49" charset="0"/>
+              </a:rPr>
+              <a:t>/samplewebapp:1.0.0 localhost:8080/</a:t>
+            </a:r>
+            <a:r>
+              <a:rPr lang="en-US" b="0" dirty="0" err="1">
+                <a:latin typeface="Consolas" panose="020B0609020204030204" pitchFamily="49" charset="0"/>
+              </a:rPr>
+              <a:t>tantsyurasergey</a:t>
+            </a:r>
+            <a:r>
+              <a:rPr lang="en-US" b="0" dirty="0">
+                <a:latin typeface="Consolas" panose="020B0609020204030204" pitchFamily="49" charset="0"/>
+              </a:rPr>
+              <a:t>/samplewebapp:1.0.0</a:t>
+            </a:r>
+          </a:p>
+          <a:p>
+            <a:pPr marL="342900" indent="-342900">
+              <a:buFont typeface="Arial" panose="020B0604020202020204" pitchFamily="34" charset="0"/>
+              <a:buChar char="•"/>
+            </a:pPr>
+            <a:r>
+              <a:rPr lang="en-US" b="0" dirty="0"/>
+              <a:t> Once image is tagged properly, it can be pushed to local registry:</a:t>
+            </a:r>
+          </a:p>
+          <a:p>
+            <a:pPr marL="1028700" lvl="1" indent="-342900"/>
+            <a:r>
+              <a:rPr lang="en-US" b="0" dirty="0">
+                <a:latin typeface="Consolas" panose="020B0609020204030204" pitchFamily="49" charset="0"/>
+              </a:rPr>
+              <a:t>docker image push localhost:8080/</a:t>
+            </a:r>
+            <a:r>
+              <a:rPr lang="en-US" b="0" dirty="0" err="1">
+                <a:latin typeface="Consolas" panose="020B0609020204030204" pitchFamily="49" charset="0"/>
+              </a:rPr>
+              <a:t>tantsyurasergey</a:t>
+            </a:r>
+            <a:r>
+              <a:rPr lang="en-US" b="0" dirty="0">
+                <a:latin typeface="Consolas" panose="020B0609020204030204" pitchFamily="49" charset="0"/>
+              </a:rPr>
+              <a:t>/samplewebapp:1.0.0</a:t>
+            </a:r>
+          </a:p>
+          <a:p>
+            <a:pPr marL="342900" indent="-342900">
+              <a:buFont typeface="Arial" panose="020B0604020202020204" pitchFamily="34" charset="0"/>
+              <a:buChar char="•"/>
+            </a:pPr>
+            <a:endParaRPr lang="en-US" b="0" dirty="0"/>
           </a:p>
         </p:txBody>
       </p:sp>

</xml_diff>

<commit_message>
Add slides and code samples related to Docker networks
</commit_message>
<xml_diff>
--- a/docs/Introduction to Docker.pptx
+++ b/docs/Introduction to Docker.pptx
@@ -5,10 +5,10 @@
     <p:sldMasterId id="2147483648" r:id="rId1"/>
   </p:sldMasterIdLst>
   <p:notesMasterIdLst>
-    <p:notesMasterId r:id="rId37"/>
+    <p:notesMasterId r:id="rId44"/>
   </p:notesMasterIdLst>
   <p:handoutMasterIdLst>
-    <p:handoutMasterId r:id="rId38"/>
+    <p:handoutMasterId r:id="rId45"/>
   </p:handoutMasterIdLst>
   <p:sldIdLst>
     <p:sldId id="279" r:id="rId2"/>
@@ -42,46 +42,53 @@
     <p:sldId id="711" r:id="rId30"/>
     <p:sldId id="691" r:id="rId31"/>
     <p:sldId id="712" r:id="rId32"/>
-    <p:sldId id="692" r:id="rId33"/>
-    <p:sldId id="713" r:id="rId34"/>
-    <p:sldId id="321" r:id="rId35"/>
-    <p:sldId id="320" r:id="rId36"/>
+    <p:sldId id="734" r:id="rId33"/>
+    <p:sldId id="737" r:id="rId34"/>
+    <p:sldId id="738" r:id="rId35"/>
+    <p:sldId id="739" r:id="rId36"/>
+    <p:sldId id="740" r:id="rId37"/>
+    <p:sldId id="735" r:id="rId38"/>
+    <p:sldId id="736" r:id="rId39"/>
+    <p:sldId id="692" r:id="rId40"/>
+    <p:sldId id="713" r:id="rId41"/>
+    <p:sldId id="321" r:id="rId42"/>
+    <p:sldId id="320" r:id="rId43"/>
   </p:sldIdLst>
   <p:sldSz cx="12192000" cy="6858000"/>
   <p:notesSz cx="6858000" cy="9144000"/>
   <p:embeddedFontLst>
     <p:embeddedFont>
       <p:font typeface="Calibri" panose="020F0502020204030204" pitchFamily="34" charset="0"/>
-      <p:regular r:id="rId39"/>
-      <p:bold r:id="rId40"/>
-      <p:italic r:id="rId41"/>
-      <p:boldItalic r:id="rId42"/>
+      <p:regular r:id="rId46"/>
+      <p:bold r:id="rId47"/>
+      <p:italic r:id="rId48"/>
+      <p:boldItalic r:id="rId49"/>
     </p:embeddedFont>
     <p:embeddedFont>
       <p:font typeface="Consolas" panose="020B0609020204030204" pitchFamily="49" charset="0"/>
-      <p:regular r:id="rId43"/>
-      <p:bold r:id="rId44"/>
-      <p:italic r:id="rId45"/>
-      <p:boldItalic r:id="rId46"/>
+      <p:regular r:id="rId50"/>
+      <p:bold r:id="rId51"/>
+      <p:italic r:id="rId52"/>
+      <p:boldItalic r:id="rId53"/>
     </p:embeddedFont>
     <p:embeddedFont>
       <p:font typeface="Open Sans" panose="020B0606030504020204" pitchFamily="34" charset="0"/>
-      <p:regular r:id="rId47"/>
-      <p:bold r:id="rId48"/>
-      <p:italic r:id="rId49"/>
-      <p:boldItalic r:id="rId50"/>
+      <p:regular r:id="rId54"/>
+      <p:bold r:id="rId55"/>
+      <p:italic r:id="rId56"/>
+      <p:boldItalic r:id="rId57"/>
     </p:embeddedFont>
     <p:embeddedFont>
       <p:font typeface="Open Sans Light" panose="020B0306030504020204" pitchFamily="34" charset="0"/>
-      <p:regular r:id="rId51"/>
-      <p:italic r:id="rId52"/>
+      <p:regular r:id="rId58"/>
+      <p:italic r:id="rId59"/>
     </p:embeddedFont>
     <p:embeddedFont>
       <p:font typeface="Open Sans Semibold" panose="020B0706030804020204" pitchFamily="34" charset="0"/>
-      <p:regular r:id="rId53"/>
-      <p:bold r:id="rId54"/>
-      <p:italic r:id="rId55"/>
-      <p:boldItalic r:id="rId56"/>
+      <p:regular r:id="rId60"/>
+      <p:bold r:id="rId61"/>
+      <p:italic r:id="rId62"/>
+      <p:boldItalic r:id="rId63"/>
     </p:embeddedFont>
   </p:embeddedFontLst>
   <p:defaultTextStyle>
@@ -239,6 +246,13 @@
           <p14:sldIdLst>
             <p14:sldId id="691"/>
             <p14:sldId id="712"/>
+            <p14:sldId id="734"/>
+            <p14:sldId id="737"/>
+            <p14:sldId id="738"/>
+            <p14:sldId id="739"/>
+            <p14:sldId id="740"/>
+            <p14:sldId id="735"/>
+            <p14:sldId id="736"/>
           </p14:sldIdLst>
         </p14:section>
         <p14:section name="Clustering Hosts with Docker Swarm" id="{6DC6AF43-3C7E-4F8E-A632-3F9F7D888F39}">
@@ -1495,6 +1509,196 @@
     <p:extLst>
       <p:ext uri="{BB962C8B-B14F-4D97-AF65-F5344CB8AC3E}">
         <p14:creationId xmlns:p14="http://schemas.microsoft.com/office/powerpoint/2010/main" val="4008943788"/>
+      </p:ext>
+    </p:extLst>
+  </p:cSld>
+  <p:clrMapOvr>
+    <a:masterClrMapping/>
+  </p:clrMapOvr>
+</p:notes>
+</file>
+
+<file path=ppt/notesSlides/notesSlide14.xml><?xml version="1.0" encoding="utf-8"?>
+<p:notes xmlns:a="http://schemas.openxmlformats.org/drawingml/2006/main" xmlns:r="http://schemas.openxmlformats.org/officeDocument/2006/relationships" xmlns:p="http://schemas.openxmlformats.org/presentationml/2006/main">
+  <p:cSld>
+    <p:spTree>
+      <p:nvGrpSpPr>
+        <p:cNvPr id="1" name=""/>
+        <p:cNvGrpSpPr/>
+        <p:nvPr/>
+      </p:nvGrpSpPr>
+      <p:grpSpPr>
+        <a:xfrm>
+          <a:off x="0" y="0"/>
+          <a:ext cx="0" cy="0"/>
+          <a:chOff x="0" y="0"/>
+          <a:chExt cx="0" cy="0"/>
+        </a:xfrm>
+      </p:grpSpPr>
+      <p:sp>
+        <p:nvSpPr>
+          <p:cNvPr id="2" name="Slide Image Placeholder 1"/>
+          <p:cNvSpPr>
+            <a:spLocks noGrp="1" noRot="1" noChangeAspect="1"/>
+          </p:cNvSpPr>
+          <p:nvPr>
+            <p:ph type="sldImg"/>
+          </p:nvPr>
+        </p:nvSpPr>
+        <p:spPr/>
+      </p:sp>
+      <p:sp>
+        <p:nvSpPr>
+          <p:cNvPr id="3" name="Notes Placeholder 2"/>
+          <p:cNvSpPr>
+            <a:spLocks noGrp="1"/>
+          </p:cNvSpPr>
+          <p:nvPr>
+            <p:ph type="body" idx="1"/>
+          </p:nvPr>
+        </p:nvSpPr>
+        <p:spPr/>
+        <p:txBody>
+          <a:bodyPr/>
+          <a:lstStyle/>
+          <a:p>
+            <a:r>
+              <a:rPr lang="en-US" dirty="0"/>
+              <a:t>Sample commands can be found in </a:t>
+            </a:r>
+            <a:r>
+              <a:rPr lang="en-US" dirty="0" err="1"/>
+              <a:t>src</a:t>
+            </a:r>
+            <a:r>
+              <a:rPr lang="en-US" dirty="0"/>
+              <a:t>/05_Orchestrating_Systems_with_Docker</a:t>
+            </a:r>
+          </a:p>
+        </p:txBody>
+      </p:sp>
+      <p:sp>
+        <p:nvSpPr>
+          <p:cNvPr id="4" name="Slide Number Placeholder 3"/>
+          <p:cNvSpPr>
+            <a:spLocks noGrp="1"/>
+          </p:cNvSpPr>
+          <p:nvPr>
+            <p:ph type="sldNum" sz="quarter" idx="5"/>
+          </p:nvPr>
+        </p:nvSpPr>
+        <p:spPr/>
+        <p:txBody>
+          <a:bodyPr/>
+          <a:lstStyle/>
+          <a:p>
+            <a:fld id="{AA4E6B44-8A2D-409F-997F-4C23C1BB012E}" type="slidenum">
+              <a:rPr lang="en-US" smtClean="0"/>
+              <a:t>36</a:t>
+            </a:fld>
+            <a:endParaRPr lang="en-US"/>
+          </a:p>
+        </p:txBody>
+      </p:sp>
+    </p:spTree>
+    <p:extLst>
+      <p:ext uri="{BB962C8B-B14F-4D97-AF65-F5344CB8AC3E}">
+        <p14:creationId xmlns:p14="http://schemas.microsoft.com/office/powerpoint/2010/main" val="2842535337"/>
+      </p:ext>
+    </p:extLst>
+  </p:cSld>
+  <p:clrMapOvr>
+    <a:masterClrMapping/>
+  </p:clrMapOvr>
+</p:notes>
+</file>
+
+<file path=ppt/notesSlides/notesSlide15.xml><?xml version="1.0" encoding="utf-8"?>
+<p:notes xmlns:a="http://schemas.openxmlformats.org/drawingml/2006/main" xmlns:r="http://schemas.openxmlformats.org/officeDocument/2006/relationships" xmlns:p="http://schemas.openxmlformats.org/presentationml/2006/main">
+  <p:cSld>
+    <p:spTree>
+      <p:nvGrpSpPr>
+        <p:cNvPr id="1" name=""/>
+        <p:cNvGrpSpPr/>
+        <p:nvPr/>
+      </p:nvGrpSpPr>
+      <p:grpSpPr>
+        <a:xfrm>
+          <a:off x="0" y="0"/>
+          <a:ext cx="0" cy="0"/>
+          <a:chOff x="0" y="0"/>
+          <a:chExt cx="0" cy="0"/>
+        </a:xfrm>
+      </p:grpSpPr>
+      <p:sp>
+        <p:nvSpPr>
+          <p:cNvPr id="2" name="Slide Image Placeholder 1"/>
+          <p:cNvSpPr>
+            <a:spLocks noGrp="1" noRot="1" noChangeAspect="1"/>
+          </p:cNvSpPr>
+          <p:nvPr>
+            <p:ph type="sldImg"/>
+          </p:nvPr>
+        </p:nvSpPr>
+        <p:spPr/>
+      </p:sp>
+      <p:sp>
+        <p:nvSpPr>
+          <p:cNvPr id="3" name="Notes Placeholder 2"/>
+          <p:cNvSpPr>
+            <a:spLocks noGrp="1"/>
+          </p:cNvSpPr>
+          <p:nvPr>
+            <p:ph type="body" idx="1"/>
+          </p:nvPr>
+        </p:nvSpPr>
+        <p:spPr/>
+        <p:txBody>
+          <a:bodyPr/>
+          <a:lstStyle/>
+          <a:p>
+            <a:r>
+              <a:rPr lang="en-US" dirty="0"/>
+              <a:t>Sample commands can be found in </a:t>
+            </a:r>
+            <a:r>
+              <a:rPr lang="en-US" dirty="0" err="1"/>
+              <a:t>src</a:t>
+            </a:r>
+            <a:r>
+              <a:rPr lang="en-US" dirty="0"/>
+              <a:t>/05_Orchestrating_Systems_with_Docker</a:t>
+            </a:r>
+          </a:p>
+        </p:txBody>
+      </p:sp>
+      <p:sp>
+        <p:nvSpPr>
+          <p:cNvPr id="4" name="Slide Number Placeholder 3"/>
+          <p:cNvSpPr>
+            <a:spLocks noGrp="1"/>
+          </p:cNvSpPr>
+          <p:nvPr>
+            <p:ph type="sldNum" sz="quarter" idx="5"/>
+          </p:nvPr>
+        </p:nvSpPr>
+        <p:spPr/>
+        <p:txBody>
+          <a:bodyPr/>
+          <a:lstStyle/>
+          <a:p>
+            <a:fld id="{AA4E6B44-8A2D-409F-997F-4C23C1BB012E}" type="slidenum">
+              <a:rPr lang="en-US" smtClean="0"/>
+              <a:t>38</a:t>
+            </a:fld>
+            <a:endParaRPr lang="en-US"/>
+          </a:p>
+        </p:txBody>
+      </p:sp>
+    </p:spTree>
+    <p:extLst>
+      <p:ext uri="{BB962C8B-B14F-4D97-AF65-F5344CB8AC3E}">
+        <p14:creationId xmlns:p14="http://schemas.microsoft.com/office/powerpoint/2010/main" val="2757767638"/>
       </p:ext>
     </p:extLst>
   </p:cSld>
@@ -25491,7 +25695,7 @@
           <a:p>
             <a:r>
               <a:rPr lang="en-US" dirty="0"/>
-              <a:t>Running containers</a:t>
+              <a:t>Working with image registries</a:t>
             </a:r>
           </a:p>
         </p:txBody>
@@ -25940,9 +26144,50 @@
               <a:buChar char="•"/>
             </a:pPr>
             <a:r>
-              <a:rPr lang="en-US" dirty="0"/>
-              <a:t>Content</a:t>
-            </a:r>
+              <a:rPr lang="en-US" b="0" dirty="0"/>
+              <a:t>When you break down a large application into smaller parts with each part running in a separate container, you’ll need a way for containers to work together. That’s called orchestration.</a:t>
+            </a:r>
+          </a:p>
+          <a:p>
+            <a:pPr marL="342900" indent="-342900">
+              <a:buFont typeface="Arial" panose="020B0604020202020204" pitchFamily="34" charset="0"/>
+              <a:buChar char="•"/>
+            </a:pPr>
+            <a:r>
+              <a:rPr lang="en-US" b="0" dirty="0"/>
+              <a:t>Orchestration requires a framework that allows communication between containers, configuration of how containers need to be connected, scheduling for container creation, monitoring of health, and scaling.</a:t>
+            </a:r>
+          </a:p>
+          <a:p>
+            <a:pPr marL="342900" indent="-342900">
+              <a:buFont typeface="Arial" panose="020B0604020202020204" pitchFamily="34" charset="0"/>
+              <a:buChar char="•"/>
+            </a:pPr>
+            <a:r>
+              <a:rPr lang="en-US" b="0" dirty="0"/>
+              <a:t>There are external platforms for container orchestration—</a:t>
+            </a:r>
+            <a:r>
+              <a:rPr lang="en-US" b="0" dirty="0">
+                <a:hlinkClick r:id="rId2"/>
+              </a:rPr>
+              <a:t>Mesos</a:t>
+            </a:r>
+            <a:r>
+              <a:rPr lang="en-US" b="0" dirty="0"/>
+              <a:t> and </a:t>
+            </a:r>
+            <a:r>
+              <a:rPr lang="en-US" b="0" dirty="0">
+                <a:hlinkClick r:id="rId3"/>
+              </a:rPr>
+              <a:t>Kubernetes</a:t>
+            </a:r>
+            <a:r>
+              <a:rPr lang="en-US" b="0" dirty="0"/>
+              <a:t> are popular—but Docker has orchestration built into the platform.</a:t>
+            </a:r>
+            <a:endParaRPr lang="en-US" dirty="0"/>
           </a:p>
           <a:p>
             <a:pPr marL="342900" indent="-342900">
@@ -25976,7 +26221,15 @@
           <a:p>
             <a:r>
               <a:rPr lang="en-US" dirty="0"/>
-              <a:t>Header</a:t>
+              <a:t>Orchestrating </a:t>
+            </a:r>
+            <a:r>
+              <a:rPr lang="en-US" dirty="0" err="1"/>
+              <a:t>multicontainer</a:t>
+            </a:r>
+            <a:r>
+              <a:rPr lang="en-US" dirty="0"/>
+              <a:t> solutions </a:t>
             </a:r>
           </a:p>
         </p:txBody>
@@ -26013,10 +26266,10 @@
       </p:grpSpPr>
       <p:sp>
         <p:nvSpPr>
-          <p:cNvPr id="2" name="Text Placeholder 1">
+          <p:cNvPr id="2" name="Content Placeholder 1">
             <a:extLst>
               <a:ext uri="{FF2B5EF4-FFF2-40B4-BE49-F238E27FC236}">
-                <a16:creationId xmlns:a16="http://schemas.microsoft.com/office/drawing/2014/main" id="{149FE133-FF4E-4029-8D0B-291BF433476E}"/>
+                <a16:creationId xmlns:a16="http://schemas.microsoft.com/office/drawing/2014/main" id="{AFF96931-CCDB-47D1-B982-0BFE2F5C618C}"/>
               </a:ext>
             </a:extLst>
           </p:cNvPr>
@@ -26024,7 +26277,7 @@
             <a:spLocks noGrp="1"/>
           </p:cNvSpPr>
           <p:nvPr>
-            <p:ph type="body" sz="quarter" idx="10"/>
+            <p:ph idx="1"/>
           </p:nvPr>
         </p:nvSpPr>
         <p:spPr/>
@@ -26032,9 +26285,85 @@
           <a:bodyPr/>
           <a:lstStyle/>
           <a:p>
-            <a:r>
-              <a:rPr lang="en-US" dirty="0"/>
-              <a:t>Clustering Hosts with Docker Swarm</a:t>
+            <a:pPr marL="342900" indent="-342900">
+              <a:buFont typeface="Arial" panose="020B0604020202020204" pitchFamily="34" charset="0"/>
+              <a:buChar char="•"/>
+            </a:pPr>
+            <a:r>
+              <a:rPr lang="en-US" b="0" dirty="0"/>
+              <a:t>Docker is the platform for your application runtime, and it controls how your container interacts with resources from the host. You can set memory and CPU restrictions on containers, and when your app runs it only sees the resources allocated to it. At the network level, Docker creates a bridge network on your host.</a:t>
+            </a:r>
+          </a:p>
+          <a:p>
+            <a:pPr marL="342900" indent="-342900">
+              <a:buFont typeface="Arial" panose="020B0604020202020204" pitchFamily="34" charset="0"/>
+              <a:buChar char="•"/>
+            </a:pPr>
+            <a:r>
+              <a:rPr lang="en-US" b="0" dirty="0"/>
+              <a:t>A bridge network gives every container its own IP address, and it allows communication between containers and also between containers and the host.</a:t>
+            </a:r>
+          </a:p>
+          <a:p>
+            <a:pPr marL="342900" indent="-342900">
+              <a:buFont typeface="Arial" panose="020B0604020202020204" pitchFamily="34" charset="0"/>
+              <a:buChar char="•"/>
+            </a:pPr>
+            <a:r>
+              <a:rPr lang="en-US" dirty="0"/>
+              <a:t>There are other types of networks supported by Docker. The </a:t>
+            </a:r>
+            <a:r>
+              <a:rPr lang="en-US" b="0" i="1" dirty="0"/>
+              <a:t>bridge</a:t>
+            </a:r>
+            <a:r>
+              <a:rPr lang="en-US" b="0" dirty="0"/>
+              <a:t> </a:t>
+            </a:r>
+            <a:r>
+              <a:rPr lang="en-US" dirty="0"/>
+              <a:t>network is for working with containers on a single host. The </a:t>
+            </a:r>
+            <a:r>
+              <a:rPr lang="en-US" b="0" i="1" dirty="0"/>
+              <a:t>overlay</a:t>
+            </a:r>
+            <a:r>
+              <a:rPr lang="en-US" b="0" dirty="0"/>
+              <a:t> </a:t>
+            </a:r>
+            <a:r>
+              <a:rPr lang="en-US" dirty="0"/>
+              <a:t>network is for working with containers that run across multiple hosts.</a:t>
+            </a:r>
+          </a:p>
+        </p:txBody>
+      </p:sp>
+      <p:sp>
+        <p:nvSpPr>
+          <p:cNvPr id="3" name="Text Placeholder 2">
+            <a:extLst>
+              <a:ext uri="{FF2B5EF4-FFF2-40B4-BE49-F238E27FC236}">
+                <a16:creationId xmlns:a16="http://schemas.microsoft.com/office/drawing/2014/main" id="{CBA50F54-F9F0-49C1-A1C9-8D18F10A83B3}"/>
+              </a:ext>
+            </a:extLst>
+          </p:cNvPr>
+          <p:cNvSpPr>
+            <a:spLocks noGrp="1"/>
+          </p:cNvSpPr>
+          <p:nvPr>
+            <p:ph type="body" sz="quarter" idx="12"/>
+          </p:nvPr>
+        </p:nvSpPr>
+        <p:spPr/>
+        <p:txBody>
+          <a:bodyPr/>
+          <a:lstStyle/>
+          <a:p>
+            <a:r>
+              <a:rPr lang="en-US" dirty="0"/>
+              <a:t>About Docker networks </a:t>
             </a:r>
           </a:p>
         </p:txBody>
@@ -26042,7 +26371,7 @@
     </p:spTree>
     <p:extLst>
       <p:ext uri="{BB962C8B-B14F-4D97-AF65-F5344CB8AC3E}">
-        <p14:creationId xmlns:p14="http://schemas.microsoft.com/office/powerpoint/2010/main" val="3059142854"/>
+        <p14:creationId xmlns:p14="http://schemas.microsoft.com/office/powerpoint/2010/main" val="3231616546"/>
       </p:ext>
     </p:extLst>
   </p:cSld>
@@ -26095,9 +26424,111 @@
               <a:buChar char="•"/>
             </a:pPr>
             <a:r>
-              <a:rPr lang="en-US" dirty="0"/>
-              <a:t>Content</a:t>
-            </a:r>
+              <a:rPr lang="en-US" b="0" dirty="0"/>
+              <a:t>Creating a network in Docker is easy. Bridge networks are the default, which means you simply need to give the network a name:</a:t>
+            </a:r>
+          </a:p>
+          <a:p>
+            <a:pPr marL="1028700" lvl="1" indent="-342900"/>
+            <a:r>
+              <a:rPr lang="en-US" b="0" dirty="0">
+                <a:latin typeface="Consolas" panose="020B0609020204030204" pitchFamily="49" charset="0"/>
+              </a:rPr>
+              <a:t>docker network create </a:t>
+            </a:r>
+            <a:r>
+              <a:rPr lang="en-US" dirty="0" err="1">
+                <a:latin typeface="Consolas" panose="020B0609020204030204" pitchFamily="49" charset="0"/>
+              </a:rPr>
+              <a:t>docker_training_network</a:t>
+            </a:r>
+            <a:endParaRPr lang="en-US" dirty="0">
+              <a:latin typeface="Consolas" panose="020B0609020204030204" pitchFamily="49" charset="0"/>
+            </a:endParaRPr>
+          </a:p>
+          <a:p>
+            <a:pPr marL="342900" indent="-342900">
+              <a:buFont typeface="Arial" panose="020B0604020202020204" pitchFamily="34" charset="0"/>
+              <a:buChar char="•"/>
+            </a:pPr>
+            <a:r>
+              <a:rPr lang="en-US" dirty="0"/>
+              <a:t>Once network is created, we can start container that joins the new network:</a:t>
+            </a:r>
+          </a:p>
+          <a:p>
+            <a:pPr marL="1028700" lvl="1" indent="-342900"/>
+            <a:r>
+              <a:rPr lang="en-US" dirty="0">
+                <a:latin typeface="Consolas" panose="020B0609020204030204" pitchFamily="49" charset="0"/>
+              </a:rPr>
+              <a:t>docker container run -d --name </a:t>
+            </a:r>
+            <a:r>
+              <a:rPr lang="en-US" dirty="0" err="1">
+                <a:latin typeface="Consolas" panose="020B0609020204030204" pitchFamily="49" charset="0"/>
+              </a:rPr>
+              <a:t>docker_training_nginx</a:t>
+            </a:r>
+            <a:r>
+              <a:rPr lang="en-US" dirty="0">
+                <a:latin typeface="Consolas" panose="020B0609020204030204" pitchFamily="49" charset="0"/>
+              </a:rPr>
+              <a:t> --network </a:t>
+            </a:r>
+            <a:r>
+              <a:rPr lang="en-US" dirty="0" err="1">
+                <a:latin typeface="Consolas" panose="020B0609020204030204" pitchFamily="49" charset="0"/>
+              </a:rPr>
+              <a:t>docker_training_network</a:t>
+            </a:r>
+            <a:r>
+              <a:rPr lang="en-US" dirty="0">
+                <a:latin typeface="Consolas" panose="020B0609020204030204" pitchFamily="49" charset="0"/>
+              </a:rPr>
+              <a:t> </a:t>
+            </a:r>
+            <a:r>
+              <a:rPr lang="en-US" dirty="0" err="1">
+                <a:latin typeface="Consolas" panose="020B0609020204030204" pitchFamily="49" charset="0"/>
+              </a:rPr>
+              <a:t>nginx:alpine</a:t>
+            </a:r>
+            <a:endParaRPr lang="en-US" dirty="0">
+              <a:latin typeface="Consolas" panose="020B0609020204030204" pitchFamily="49" charset="0"/>
+            </a:endParaRPr>
+          </a:p>
+          <a:p>
+            <a:pPr marL="342900" indent="-342900">
+              <a:buFont typeface="Arial" panose="020B0604020202020204" pitchFamily="34" charset="0"/>
+              <a:buChar char="•"/>
+            </a:pPr>
+            <a:r>
+              <a:rPr lang="en-US" b="0" dirty="0"/>
+              <a:t>The </a:t>
+            </a:r>
+            <a:r>
+              <a:rPr lang="en-US" b="0" dirty="0">
+                <a:latin typeface="Consolas" panose="020B0609020204030204" pitchFamily="49" charset="0"/>
+              </a:rPr>
+              <a:t>--network</a:t>
+            </a:r>
+            <a:r>
+              <a:rPr lang="en-US" dirty="0"/>
+              <a:t> </a:t>
+            </a:r>
+            <a:r>
+              <a:rPr lang="en-US" b="0" dirty="0"/>
+              <a:t>option tells Docker to join container into the network, which means container will get an IP address from the network’s range. </a:t>
+            </a:r>
+            <a:r>
+              <a:rPr lang="en-US" dirty="0"/>
+              <a:t>	</a:t>
+            </a:r>
+          </a:p>
+          <a:p>
+            <a:pPr marL="1028700" lvl="1" indent="-342900"/>
+            <a:endParaRPr lang="en-US" b="0" dirty="0"/>
           </a:p>
           <a:p>
             <a:pPr marL="342900" indent="-342900">
@@ -26131,7 +26562,7 @@
           <a:p>
             <a:r>
               <a:rPr lang="en-US" dirty="0"/>
-              <a:t>Header</a:t>
+              <a:t>Creating and using Docker networks </a:t>
             </a:r>
           </a:p>
         </p:txBody>
@@ -26139,7 +26570,7 @@
     </p:spTree>
     <p:extLst>
       <p:ext uri="{BB962C8B-B14F-4D97-AF65-F5344CB8AC3E}">
-        <p14:creationId xmlns:p14="http://schemas.microsoft.com/office/powerpoint/2010/main" val="2079409009"/>
+        <p14:creationId xmlns:p14="http://schemas.microsoft.com/office/powerpoint/2010/main" val="2163352603"/>
       </p:ext>
     </p:extLst>
   </p:cSld>
@@ -26168,10 +26599,10 @@
       </p:grpSpPr>
       <p:sp>
         <p:nvSpPr>
-          <p:cNvPr id="2" name="Text Placeholder 1">
+          <p:cNvPr id="2" name="Content Placeholder 1">
             <a:extLst>
               <a:ext uri="{FF2B5EF4-FFF2-40B4-BE49-F238E27FC236}">
-                <a16:creationId xmlns:a16="http://schemas.microsoft.com/office/drawing/2014/main" id="{882E656E-F534-4E9B-AF42-6610DE8D6DE7}"/>
+                <a16:creationId xmlns:a16="http://schemas.microsoft.com/office/drawing/2014/main" id="{AFF96931-CCDB-47D1-B982-0BFE2F5C618C}"/>
               </a:ext>
             </a:extLst>
           </p:cNvPr>
@@ -26179,7 +26610,7 @@
             <a:spLocks noGrp="1"/>
           </p:cNvSpPr>
           <p:nvPr>
-            <p:ph type="body" sz="quarter" idx="10"/>
+            <p:ph idx="1"/>
           </p:nvPr>
         </p:nvSpPr>
         <p:spPr/>
@@ -26187,9 +26618,113 @@
           <a:bodyPr/>
           <a:lstStyle/>
           <a:p>
-            <a:r>
-              <a:rPr lang="en-US" sz="9600" dirty="0"/>
-              <a:t>Q&amp;A</a:t>
+            <a:pPr marL="342900" indent="-342900">
+              <a:buFont typeface="Arial" panose="020B0604020202020204" pitchFamily="34" charset="0"/>
+              <a:buChar char="•"/>
+            </a:pPr>
+            <a:r>
+              <a:rPr lang="en-US" b="0" dirty="0"/>
+              <a:t>We can get the IP address either by inspecting the container or the network.</a:t>
+            </a:r>
+            <a:r>
+              <a:rPr lang="en-US" b="1" dirty="0"/>
+              <a:t> </a:t>
+            </a:r>
+            <a:r>
+              <a:rPr lang="en-US" dirty="0"/>
+              <a:t>	</a:t>
+            </a:r>
+            <a:endParaRPr lang="ru-UA" dirty="0"/>
+          </a:p>
+          <a:p>
+            <a:pPr marL="1028700" lvl="1" indent="-342900"/>
+            <a:r>
+              <a:rPr lang="en-US" b="0" dirty="0">
+                <a:latin typeface="Consolas" panose="020B0609020204030204" pitchFamily="49" charset="0"/>
+              </a:rPr>
+              <a:t>docker network inspect </a:t>
+            </a:r>
+            <a:r>
+              <a:rPr lang="en-US" b="0" dirty="0" err="1">
+                <a:latin typeface="Consolas" panose="020B0609020204030204" pitchFamily="49" charset="0"/>
+              </a:rPr>
+              <a:t>docker_training_network</a:t>
+            </a:r>
+            <a:endParaRPr lang="en-US" b="0" dirty="0">
+              <a:latin typeface="Consolas" panose="020B0609020204030204" pitchFamily="49" charset="0"/>
+            </a:endParaRPr>
+          </a:p>
+          <a:p>
+            <a:pPr marL="342900" indent="-342900">
+              <a:buFont typeface="Arial" panose="020B0604020202020204" pitchFamily="34" charset="0"/>
+              <a:buChar char="•"/>
+            </a:pPr>
+            <a:r>
+              <a:rPr lang="en-US" dirty="0"/>
+              <a:t>Because network is a bridge network, it should be possible to access container by its IP address from the host.</a:t>
+            </a:r>
+          </a:p>
+          <a:p>
+            <a:pPr marL="342900" indent="-342900">
+              <a:buFont typeface="Arial" panose="020B0604020202020204" pitchFamily="34" charset="0"/>
+              <a:buChar char="•"/>
+            </a:pPr>
+            <a:r>
+              <a:rPr lang="en-US" b="0" u="sng" dirty="0"/>
+              <a:t>Note:</a:t>
+            </a:r>
+            <a:r>
+              <a:rPr lang="en-US" dirty="0"/>
+              <a:t> The bridge is between the container and the host. If you’re running on Linux you can access containers by their IP address. On Docker for Mac and Docker for Windows, remember the host is a Linux VM, so you can’t connect directly to the container IP address from your host machine.</a:t>
+            </a:r>
+            <a:endParaRPr lang="en-US" b="0" dirty="0">
+              <a:latin typeface="Consolas" panose="020B0609020204030204" pitchFamily="49" charset="0"/>
+            </a:endParaRPr>
+          </a:p>
+          <a:p>
+            <a:pPr marL="342900" indent="-342900">
+              <a:buFont typeface="Arial" panose="020B0604020202020204" pitchFamily="34" charset="0"/>
+              <a:buChar char="•"/>
+            </a:pPr>
+            <a:endParaRPr lang="en-US" dirty="0"/>
+          </a:p>
+          <a:p>
+            <a:pPr marL="1028700" lvl="1" indent="-342900"/>
+            <a:endParaRPr lang="en-US" b="0" dirty="0"/>
+          </a:p>
+          <a:p>
+            <a:pPr marL="342900" indent="-342900">
+              <a:buFont typeface="Arial" panose="020B0604020202020204" pitchFamily="34" charset="0"/>
+              <a:buChar char="•"/>
+            </a:pPr>
+            <a:endParaRPr lang="en-US" dirty="0"/>
+          </a:p>
+        </p:txBody>
+      </p:sp>
+      <p:sp>
+        <p:nvSpPr>
+          <p:cNvPr id="3" name="Text Placeholder 2">
+            <a:extLst>
+              <a:ext uri="{FF2B5EF4-FFF2-40B4-BE49-F238E27FC236}">
+                <a16:creationId xmlns:a16="http://schemas.microsoft.com/office/drawing/2014/main" id="{CBA50F54-F9F0-49C1-A1C9-8D18F10A83B3}"/>
+              </a:ext>
+            </a:extLst>
+          </p:cNvPr>
+          <p:cNvSpPr>
+            <a:spLocks noGrp="1"/>
+          </p:cNvSpPr>
+          <p:nvPr>
+            <p:ph type="body" sz="quarter" idx="12"/>
+          </p:nvPr>
+        </p:nvSpPr>
+        <p:spPr/>
+        <p:txBody>
+          <a:bodyPr/>
+          <a:lstStyle/>
+          <a:p>
+            <a:r>
+              <a:rPr lang="en-US" dirty="0"/>
+              <a:t>Inspecting Docker networks </a:t>
             </a:r>
           </a:p>
         </p:txBody>
@@ -26197,7 +26732,7 @@
     </p:spTree>
     <p:extLst>
       <p:ext uri="{BB962C8B-B14F-4D97-AF65-F5344CB8AC3E}">
-        <p14:creationId xmlns:p14="http://schemas.microsoft.com/office/powerpoint/2010/main" val="1891880177"/>
+        <p14:creationId xmlns:p14="http://schemas.microsoft.com/office/powerpoint/2010/main" val="2327305631"/>
       </p:ext>
     </p:extLst>
   </p:cSld>
@@ -26224,10 +26759,493 @@
           <a:chExt cx="0" cy="0"/>
         </a:xfrm>
       </p:grpSpPr>
+      <p:sp>
+        <p:nvSpPr>
+          <p:cNvPr id="2" name="Content Placeholder 1">
+            <a:extLst>
+              <a:ext uri="{FF2B5EF4-FFF2-40B4-BE49-F238E27FC236}">
+                <a16:creationId xmlns:a16="http://schemas.microsoft.com/office/drawing/2014/main" id="{AFF96931-CCDB-47D1-B982-0BFE2F5C618C}"/>
+              </a:ext>
+            </a:extLst>
+          </p:cNvPr>
+          <p:cNvSpPr>
+            <a:spLocks noGrp="1"/>
+          </p:cNvSpPr>
+          <p:nvPr>
+            <p:ph idx="1"/>
+          </p:nvPr>
+        </p:nvSpPr>
+        <p:spPr/>
+        <p:txBody>
+          <a:bodyPr/>
+          <a:lstStyle/>
+          <a:p>
+            <a:pPr marL="342900" indent="-342900">
+              <a:buFont typeface="Arial" panose="020B0604020202020204" pitchFamily="34" charset="0"/>
+              <a:buChar char="•"/>
+            </a:pPr>
+            <a:r>
+              <a:rPr lang="en-US" b="0" dirty="0"/>
+              <a:t>Docker has a built-in DNS server, so containers on the same network can access each other by name as well as by IP address.</a:t>
+            </a:r>
+          </a:p>
+          <a:p>
+            <a:pPr marL="342900" indent="-342900">
+              <a:buFont typeface="Arial" panose="020B0604020202020204" pitchFamily="34" charset="0"/>
+              <a:buChar char="•"/>
+            </a:pPr>
+            <a:r>
+              <a:rPr lang="en-US" b="0" dirty="0"/>
+              <a:t>The DNS server in Docker makes application configuration easy in a </a:t>
+            </a:r>
+            <a:r>
+              <a:rPr lang="en-US" b="0" dirty="0" err="1"/>
+              <a:t>multicontainer</a:t>
+            </a:r>
+            <a:r>
+              <a:rPr lang="en-US" b="0" dirty="0"/>
+              <a:t> system because, in your applications, you simply refer to dependencies by their container name. If you have a database container called </a:t>
+            </a:r>
+            <a:r>
+              <a:rPr lang="en-US" b="0" dirty="0" err="1">
+                <a:latin typeface="Consolas" panose="020B0609020204030204" pitchFamily="49" charset="0"/>
+              </a:rPr>
+              <a:t>mysql</a:t>
+            </a:r>
+            <a:r>
+              <a:rPr lang="en-US" b="0" dirty="0"/>
+              <a:t>, the connection string in your web app can always use </a:t>
+            </a:r>
+            <a:r>
+              <a:rPr lang="en-US" b="0" dirty="0" err="1">
+                <a:latin typeface="Consolas" panose="020B0609020204030204" pitchFamily="49" charset="0"/>
+              </a:rPr>
+              <a:t>mysql</a:t>
+            </a:r>
+            <a:r>
+              <a:rPr lang="en-US" dirty="0"/>
+              <a:t> </a:t>
+            </a:r>
+            <a:r>
+              <a:rPr lang="en-US" b="0" dirty="0"/>
+              <a:t>as the server name. You don’t need to switch connection strings for different environments—provided you orchestrate the same way in every environment.</a:t>
+            </a:r>
+          </a:p>
+          <a:p>
+            <a:pPr marL="342900" indent="-342900">
+              <a:buFont typeface="Arial" panose="020B0604020202020204" pitchFamily="34" charset="0"/>
+              <a:buChar char="•"/>
+            </a:pPr>
+            <a:r>
+              <a:rPr lang="en-US" b="0" dirty="0"/>
+              <a:t>When you make assumptions about server names in your system, orchestration becomes a key part of your delivery. You can use Docker Compose to ensure containers get orchestrated correctly.</a:t>
+            </a:r>
+            <a:endParaRPr lang="en-US" dirty="0"/>
+          </a:p>
+          <a:p>
+            <a:pPr marL="1028700" lvl="1" indent="-342900"/>
+            <a:endParaRPr lang="en-US" b="0" dirty="0"/>
+          </a:p>
+          <a:p>
+            <a:pPr marL="342900" indent="-342900">
+              <a:buFont typeface="Arial" panose="020B0604020202020204" pitchFamily="34" charset="0"/>
+              <a:buChar char="•"/>
+            </a:pPr>
+            <a:endParaRPr lang="en-US" dirty="0"/>
+          </a:p>
+        </p:txBody>
+      </p:sp>
+      <p:sp>
+        <p:nvSpPr>
+          <p:cNvPr id="3" name="Text Placeholder 2">
+            <a:extLst>
+              <a:ext uri="{FF2B5EF4-FFF2-40B4-BE49-F238E27FC236}">
+                <a16:creationId xmlns:a16="http://schemas.microsoft.com/office/drawing/2014/main" id="{CBA50F54-F9F0-49C1-A1C9-8D18F10A83B3}"/>
+              </a:ext>
+            </a:extLst>
+          </p:cNvPr>
+          <p:cNvSpPr>
+            <a:spLocks noGrp="1"/>
+          </p:cNvSpPr>
+          <p:nvPr>
+            <p:ph type="body" sz="quarter" idx="12"/>
+          </p:nvPr>
+        </p:nvSpPr>
+        <p:spPr/>
+        <p:txBody>
+          <a:bodyPr/>
+          <a:lstStyle/>
+          <a:p>
+            <a:r>
+              <a:rPr lang="en-US" dirty="0"/>
+              <a:t>Docker DNS Server </a:t>
+            </a:r>
+          </a:p>
+        </p:txBody>
+      </p:sp>
     </p:spTree>
     <p:extLst>
       <p:ext uri="{BB962C8B-B14F-4D97-AF65-F5344CB8AC3E}">
-        <p14:creationId xmlns:p14="http://schemas.microsoft.com/office/powerpoint/2010/main" val="1456301527"/>
+        <p14:creationId xmlns:p14="http://schemas.microsoft.com/office/powerpoint/2010/main" val="3861258480"/>
+      </p:ext>
+    </p:extLst>
+  </p:cSld>
+  <p:clrMapOvr>
+    <a:masterClrMapping/>
+  </p:clrMapOvr>
+</p:sld>
+</file>
+
+<file path=ppt/slides/slide36.xml><?xml version="1.0" encoding="utf-8"?>
+<p:sld xmlns:a="http://schemas.openxmlformats.org/drawingml/2006/main" xmlns:r="http://schemas.openxmlformats.org/officeDocument/2006/relationships" xmlns:p="http://schemas.openxmlformats.org/presentationml/2006/main">
+  <p:cSld>
+    <p:spTree>
+      <p:nvGrpSpPr>
+        <p:cNvPr id="1" name=""/>
+        <p:cNvGrpSpPr/>
+        <p:nvPr/>
+      </p:nvGrpSpPr>
+      <p:grpSpPr>
+        <a:xfrm>
+          <a:off x="0" y="0"/>
+          <a:ext cx="0" cy="0"/>
+          <a:chOff x="0" y="0"/>
+          <a:chExt cx="0" cy="0"/>
+        </a:xfrm>
+      </p:grpSpPr>
+      <p:sp>
+        <p:nvSpPr>
+          <p:cNvPr id="2" name="Content Placeholder 1">
+            <a:extLst>
+              <a:ext uri="{FF2B5EF4-FFF2-40B4-BE49-F238E27FC236}">
+                <a16:creationId xmlns:a16="http://schemas.microsoft.com/office/drawing/2014/main" id="{AFF96931-CCDB-47D1-B982-0BFE2F5C618C}"/>
+              </a:ext>
+            </a:extLst>
+          </p:cNvPr>
+          <p:cNvSpPr>
+            <a:spLocks noGrp="1"/>
+          </p:cNvSpPr>
+          <p:nvPr>
+            <p:ph idx="1"/>
+          </p:nvPr>
+        </p:nvSpPr>
+        <p:spPr/>
+        <p:txBody>
+          <a:bodyPr anchor="ctr"/>
+          <a:lstStyle/>
+          <a:p>
+            <a:pPr algn="ctr"/>
+            <a:r>
+              <a:rPr lang="en-US" sz="9600" b="0" dirty="0"/>
+              <a:t>DEMO</a:t>
+            </a:r>
+            <a:r>
+              <a:rPr lang="en-US" b="0" dirty="0"/>
+              <a:t> </a:t>
+            </a:r>
+          </a:p>
+          <a:p>
+            <a:pPr marL="342900" indent="-342900">
+              <a:buFont typeface="Arial" panose="020B0604020202020204" pitchFamily="34" charset="0"/>
+              <a:buChar char="•"/>
+            </a:pPr>
+            <a:endParaRPr lang="en-US" b="0" dirty="0"/>
+          </a:p>
+          <a:p>
+            <a:pPr marL="342900" indent="-342900"/>
+            <a:endParaRPr lang="en-US" dirty="0"/>
+          </a:p>
+        </p:txBody>
+      </p:sp>
+      <p:sp>
+        <p:nvSpPr>
+          <p:cNvPr id="3" name="Text Placeholder 2">
+            <a:extLst>
+              <a:ext uri="{FF2B5EF4-FFF2-40B4-BE49-F238E27FC236}">
+                <a16:creationId xmlns:a16="http://schemas.microsoft.com/office/drawing/2014/main" id="{CBA50F54-F9F0-49C1-A1C9-8D18F10A83B3}"/>
+              </a:ext>
+            </a:extLst>
+          </p:cNvPr>
+          <p:cNvSpPr>
+            <a:spLocks noGrp="1"/>
+          </p:cNvSpPr>
+          <p:nvPr>
+            <p:ph type="body" sz="quarter" idx="12"/>
+          </p:nvPr>
+        </p:nvSpPr>
+        <p:spPr/>
+        <p:txBody>
+          <a:bodyPr/>
+          <a:lstStyle/>
+          <a:p>
+            <a:r>
+              <a:rPr lang="en-US" dirty="0"/>
+              <a:t>Using Docker networks</a:t>
+            </a:r>
+          </a:p>
+        </p:txBody>
+      </p:sp>
+    </p:spTree>
+    <p:extLst>
+      <p:ext uri="{BB962C8B-B14F-4D97-AF65-F5344CB8AC3E}">
+        <p14:creationId xmlns:p14="http://schemas.microsoft.com/office/powerpoint/2010/main" val="2876609037"/>
+      </p:ext>
+    </p:extLst>
+  </p:cSld>
+  <p:clrMapOvr>
+    <a:masterClrMapping/>
+  </p:clrMapOvr>
+</p:sld>
+</file>
+
+<file path=ppt/slides/slide37.xml><?xml version="1.0" encoding="utf-8"?>
+<p:sld xmlns:a="http://schemas.openxmlformats.org/drawingml/2006/main" xmlns:r="http://schemas.openxmlformats.org/officeDocument/2006/relationships" xmlns:p="http://schemas.openxmlformats.org/presentationml/2006/main">
+  <p:cSld>
+    <p:spTree>
+      <p:nvGrpSpPr>
+        <p:cNvPr id="1" name=""/>
+        <p:cNvGrpSpPr/>
+        <p:nvPr/>
+      </p:nvGrpSpPr>
+      <p:grpSpPr>
+        <a:xfrm>
+          <a:off x="0" y="0"/>
+          <a:ext cx="0" cy="0"/>
+          <a:chOff x="0" y="0"/>
+          <a:chExt cx="0" cy="0"/>
+        </a:xfrm>
+      </p:grpSpPr>
+      <p:sp>
+        <p:nvSpPr>
+          <p:cNvPr id="2" name="Content Placeholder 1">
+            <a:extLst>
+              <a:ext uri="{FF2B5EF4-FFF2-40B4-BE49-F238E27FC236}">
+                <a16:creationId xmlns:a16="http://schemas.microsoft.com/office/drawing/2014/main" id="{AFF96931-CCDB-47D1-B982-0BFE2F5C618C}"/>
+              </a:ext>
+            </a:extLst>
+          </p:cNvPr>
+          <p:cNvSpPr>
+            <a:spLocks noGrp="1"/>
+          </p:cNvSpPr>
+          <p:nvPr>
+            <p:ph idx="1"/>
+          </p:nvPr>
+        </p:nvSpPr>
+        <p:spPr/>
+        <p:txBody>
+          <a:bodyPr/>
+          <a:lstStyle/>
+          <a:p>
+            <a:pPr marL="342900" indent="-342900">
+              <a:buFont typeface="Arial" panose="020B0604020202020204" pitchFamily="34" charset="0"/>
+              <a:buChar char="•"/>
+            </a:pPr>
+            <a:r>
+              <a:rPr lang="en-US" dirty="0"/>
+              <a:t>Content</a:t>
+            </a:r>
+          </a:p>
+          <a:p>
+            <a:pPr marL="342900" indent="-342900">
+              <a:buFont typeface="Arial" panose="020B0604020202020204" pitchFamily="34" charset="0"/>
+              <a:buChar char="•"/>
+            </a:pPr>
+            <a:endParaRPr lang="en-US" dirty="0"/>
+          </a:p>
+        </p:txBody>
+      </p:sp>
+      <p:sp>
+        <p:nvSpPr>
+          <p:cNvPr id="3" name="Text Placeholder 2">
+            <a:extLst>
+              <a:ext uri="{FF2B5EF4-FFF2-40B4-BE49-F238E27FC236}">
+                <a16:creationId xmlns:a16="http://schemas.microsoft.com/office/drawing/2014/main" id="{CBA50F54-F9F0-49C1-A1C9-8D18F10A83B3}"/>
+              </a:ext>
+            </a:extLst>
+          </p:cNvPr>
+          <p:cNvSpPr>
+            <a:spLocks noGrp="1"/>
+          </p:cNvSpPr>
+          <p:nvPr>
+            <p:ph type="body" sz="quarter" idx="12"/>
+          </p:nvPr>
+        </p:nvSpPr>
+        <p:spPr/>
+        <p:txBody>
+          <a:bodyPr/>
+          <a:lstStyle/>
+          <a:p>
+            <a:r>
+              <a:rPr lang="en-US" dirty="0"/>
+              <a:t>Docker Compose</a:t>
+            </a:r>
+          </a:p>
+        </p:txBody>
+      </p:sp>
+    </p:spTree>
+    <p:extLst>
+      <p:ext uri="{BB962C8B-B14F-4D97-AF65-F5344CB8AC3E}">
+        <p14:creationId xmlns:p14="http://schemas.microsoft.com/office/powerpoint/2010/main" val="2820559053"/>
+      </p:ext>
+    </p:extLst>
+  </p:cSld>
+  <p:clrMapOvr>
+    <a:masterClrMapping/>
+  </p:clrMapOvr>
+</p:sld>
+</file>
+
+<file path=ppt/slides/slide38.xml><?xml version="1.0" encoding="utf-8"?>
+<p:sld xmlns:a="http://schemas.openxmlformats.org/drawingml/2006/main" xmlns:r="http://schemas.openxmlformats.org/officeDocument/2006/relationships" xmlns:p="http://schemas.openxmlformats.org/presentationml/2006/main">
+  <p:cSld>
+    <p:spTree>
+      <p:nvGrpSpPr>
+        <p:cNvPr id="1" name=""/>
+        <p:cNvGrpSpPr/>
+        <p:nvPr/>
+      </p:nvGrpSpPr>
+      <p:grpSpPr>
+        <a:xfrm>
+          <a:off x="0" y="0"/>
+          <a:ext cx="0" cy="0"/>
+          <a:chOff x="0" y="0"/>
+          <a:chExt cx="0" cy="0"/>
+        </a:xfrm>
+      </p:grpSpPr>
+      <p:sp>
+        <p:nvSpPr>
+          <p:cNvPr id="2" name="Content Placeholder 1">
+            <a:extLst>
+              <a:ext uri="{FF2B5EF4-FFF2-40B4-BE49-F238E27FC236}">
+                <a16:creationId xmlns:a16="http://schemas.microsoft.com/office/drawing/2014/main" id="{AFF96931-CCDB-47D1-B982-0BFE2F5C618C}"/>
+              </a:ext>
+            </a:extLst>
+          </p:cNvPr>
+          <p:cNvSpPr>
+            <a:spLocks noGrp="1"/>
+          </p:cNvSpPr>
+          <p:nvPr>
+            <p:ph idx="1"/>
+          </p:nvPr>
+        </p:nvSpPr>
+        <p:spPr/>
+        <p:txBody>
+          <a:bodyPr anchor="ctr"/>
+          <a:lstStyle/>
+          <a:p>
+            <a:pPr algn="ctr"/>
+            <a:r>
+              <a:rPr lang="en-US" sz="9600" b="0" dirty="0"/>
+              <a:t>DEMO</a:t>
+            </a:r>
+            <a:r>
+              <a:rPr lang="en-US" b="0" dirty="0"/>
+              <a:t> </a:t>
+            </a:r>
+          </a:p>
+          <a:p>
+            <a:pPr marL="342900" indent="-342900">
+              <a:buFont typeface="Arial" panose="020B0604020202020204" pitchFamily="34" charset="0"/>
+              <a:buChar char="•"/>
+            </a:pPr>
+            <a:endParaRPr lang="en-US" b="0" dirty="0"/>
+          </a:p>
+          <a:p>
+            <a:pPr marL="342900" indent="-342900"/>
+            <a:endParaRPr lang="en-US" dirty="0"/>
+          </a:p>
+        </p:txBody>
+      </p:sp>
+      <p:sp>
+        <p:nvSpPr>
+          <p:cNvPr id="3" name="Text Placeholder 2">
+            <a:extLst>
+              <a:ext uri="{FF2B5EF4-FFF2-40B4-BE49-F238E27FC236}">
+                <a16:creationId xmlns:a16="http://schemas.microsoft.com/office/drawing/2014/main" id="{CBA50F54-F9F0-49C1-A1C9-8D18F10A83B3}"/>
+              </a:ext>
+            </a:extLst>
+          </p:cNvPr>
+          <p:cNvSpPr>
+            <a:spLocks noGrp="1"/>
+          </p:cNvSpPr>
+          <p:nvPr>
+            <p:ph type="body" sz="quarter" idx="12"/>
+          </p:nvPr>
+        </p:nvSpPr>
+        <p:spPr/>
+        <p:txBody>
+          <a:bodyPr/>
+          <a:lstStyle/>
+          <a:p>
+            <a:r>
+              <a:rPr lang="en-US" dirty="0"/>
+              <a:t>Using Docker Compose</a:t>
+            </a:r>
+          </a:p>
+        </p:txBody>
+      </p:sp>
+    </p:spTree>
+    <p:extLst>
+      <p:ext uri="{BB962C8B-B14F-4D97-AF65-F5344CB8AC3E}">
+        <p14:creationId xmlns:p14="http://schemas.microsoft.com/office/powerpoint/2010/main" val="619748903"/>
+      </p:ext>
+    </p:extLst>
+  </p:cSld>
+  <p:clrMapOvr>
+    <a:masterClrMapping/>
+  </p:clrMapOvr>
+</p:sld>
+</file>
+
+<file path=ppt/slides/slide39.xml><?xml version="1.0" encoding="utf-8"?>
+<p:sld xmlns:a="http://schemas.openxmlformats.org/drawingml/2006/main" xmlns:r="http://schemas.openxmlformats.org/officeDocument/2006/relationships" xmlns:p="http://schemas.openxmlformats.org/presentationml/2006/main">
+  <p:cSld>
+    <p:spTree>
+      <p:nvGrpSpPr>
+        <p:cNvPr id="1" name=""/>
+        <p:cNvGrpSpPr/>
+        <p:nvPr/>
+      </p:nvGrpSpPr>
+      <p:grpSpPr>
+        <a:xfrm>
+          <a:off x="0" y="0"/>
+          <a:ext cx="0" cy="0"/>
+          <a:chOff x="0" y="0"/>
+          <a:chExt cx="0" cy="0"/>
+        </a:xfrm>
+      </p:grpSpPr>
+      <p:sp>
+        <p:nvSpPr>
+          <p:cNvPr id="2" name="Text Placeholder 1">
+            <a:extLst>
+              <a:ext uri="{FF2B5EF4-FFF2-40B4-BE49-F238E27FC236}">
+                <a16:creationId xmlns:a16="http://schemas.microsoft.com/office/drawing/2014/main" id="{149FE133-FF4E-4029-8D0B-291BF433476E}"/>
+              </a:ext>
+            </a:extLst>
+          </p:cNvPr>
+          <p:cNvSpPr>
+            <a:spLocks noGrp="1"/>
+          </p:cNvSpPr>
+          <p:nvPr>
+            <p:ph type="body" sz="quarter" idx="10"/>
+          </p:nvPr>
+        </p:nvSpPr>
+        <p:spPr/>
+        <p:txBody>
+          <a:bodyPr/>
+          <a:lstStyle/>
+          <a:p>
+            <a:r>
+              <a:rPr lang="en-US" dirty="0"/>
+              <a:t>Clustering Hosts with Docker Swarm</a:t>
+            </a:r>
+          </a:p>
+        </p:txBody>
+      </p:sp>
+    </p:spTree>
+    <p:extLst>
+      <p:ext uri="{BB962C8B-B14F-4D97-AF65-F5344CB8AC3E}">
+        <p14:creationId xmlns:p14="http://schemas.microsoft.com/office/powerpoint/2010/main" val="3059142854"/>
       </p:ext>
     </p:extLst>
   </p:cSld>
@@ -26286,6 +27304,191 @@
     <p:extLst>
       <p:ext uri="{BB962C8B-B14F-4D97-AF65-F5344CB8AC3E}">
         <p14:creationId xmlns:p14="http://schemas.microsoft.com/office/powerpoint/2010/main" val="3404857500"/>
+      </p:ext>
+    </p:extLst>
+  </p:cSld>
+  <p:clrMapOvr>
+    <a:masterClrMapping/>
+  </p:clrMapOvr>
+</p:sld>
+</file>
+
+<file path=ppt/slides/slide40.xml><?xml version="1.0" encoding="utf-8"?>
+<p:sld xmlns:a="http://schemas.openxmlformats.org/drawingml/2006/main" xmlns:r="http://schemas.openxmlformats.org/officeDocument/2006/relationships" xmlns:p="http://schemas.openxmlformats.org/presentationml/2006/main">
+  <p:cSld>
+    <p:spTree>
+      <p:nvGrpSpPr>
+        <p:cNvPr id="1" name=""/>
+        <p:cNvGrpSpPr/>
+        <p:nvPr/>
+      </p:nvGrpSpPr>
+      <p:grpSpPr>
+        <a:xfrm>
+          <a:off x="0" y="0"/>
+          <a:ext cx="0" cy="0"/>
+          <a:chOff x="0" y="0"/>
+          <a:chExt cx="0" cy="0"/>
+        </a:xfrm>
+      </p:grpSpPr>
+      <p:sp>
+        <p:nvSpPr>
+          <p:cNvPr id="2" name="Content Placeholder 1">
+            <a:extLst>
+              <a:ext uri="{FF2B5EF4-FFF2-40B4-BE49-F238E27FC236}">
+                <a16:creationId xmlns:a16="http://schemas.microsoft.com/office/drawing/2014/main" id="{AFF96931-CCDB-47D1-B982-0BFE2F5C618C}"/>
+              </a:ext>
+            </a:extLst>
+          </p:cNvPr>
+          <p:cNvSpPr>
+            <a:spLocks noGrp="1"/>
+          </p:cNvSpPr>
+          <p:nvPr>
+            <p:ph idx="1"/>
+          </p:nvPr>
+        </p:nvSpPr>
+        <p:spPr/>
+        <p:txBody>
+          <a:bodyPr/>
+          <a:lstStyle/>
+          <a:p>
+            <a:pPr marL="342900" indent="-342900">
+              <a:buFont typeface="Arial" panose="020B0604020202020204" pitchFamily="34" charset="0"/>
+              <a:buChar char="•"/>
+            </a:pPr>
+            <a:r>
+              <a:rPr lang="en-US" dirty="0"/>
+              <a:t>Content</a:t>
+            </a:r>
+          </a:p>
+          <a:p>
+            <a:pPr marL="342900" indent="-342900">
+              <a:buFont typeface="Arial" panose="020B0604020202020204" pitchFamily="34" charset="0"/>
+              <a:buChar char="•"/>
+            </a:pPr>
+            <a:endParaRPr lang="en-US" dirty="0"/>
+          </a:p>
+        </p:txBody>
+      </p:sp>
+      <p:sp>
+        <p:nvSpPr>
+          <p:cNvPr id="3" name="Text Placeholder 2">
+            <a:extLst>
+              <a:ext uri="{FF2B5EF4-FFF2-40B4-BE49-F238E27FC236}">
+                <a16:creationId xmlns:a16="http://schemas.microsoft.com/office/drawing/2014/main" id="{CBA50F54-F9F0-49C1-A1C9-8D18F10A83B3}"/>
+              </a:ext>
+            </a:extLst>
+          </p:cNvPr>
+          <p:cNvSpPr>
+            <a:spLocks noGrp="1"/>
+          </p:cNvSpPr>
+          <p:nvPr>
+            <p:ph type="body" sz="quarter" idx="12"/>
+          </p:nvPr>
+        </p:nvSpPr>
+        <p:spPr/>
+        <p:txBody>
+          <a:bodyPr/>
+          <a:lstStyle/>
+          <a:p>
+            <a:r>
+              <a:rPr lang="en-US" dirty="0"/>
+              <a:t>Header</a:t>
+            </a:r>
+          </a:p>
+        </p:txBody>
+      </p:sp>
+    </p:spTree>
+    <p:extLst>
+      <p:ext uri="{BB962C8B-B14F-4D97-AF65-F5344CB8AC3E}">
+        <p14:creationId xmlns:p14="http://schemas.microsoft.com/office/powerpoint/2010/main" val="2079409009"/>
+      </p:ext>
+    </p:extLst>
+  </p:cSld>
+  <p:clrMapOvr>
+    <a:masterClrMapping/>
+  </p:clrMapOvr>
+</p:sld>
+</file>
+
+<file path=ppt/slides/slide41.xml><?xml version="1.0" encoding="utf-8"?>
+<p:sld xmlns:a="http://schemas.openxmlformats.org/drawingml/2006/main" xmlns:r="http://schemas.openxmlformats.org/officeDocument/2006/relationships" xmlns:p="http://schemas.openxmlformats.org/presentationml/2006/main">
+  <p:cSld>
+    <p:spTree>
+      <p:nvGrpSpPr>
+        <p:cNvPr id="1" name=""/>
+        <p:cNvGrpSpPr/>
+        <p:nvPr/>
+      </p:nvGrpSpPr>
+      <p:grpSpPr>
+        <a:xfrm>
+          <a:off x="0" y="0"/>
+          <a:ext cx="0" cy="0"/>
+          <a:chOff x="0" y="0"/>
+          <a:chExt cx="0" cy="0"/>
+        </a:xfrm>
+      </p:grpSpPr>
+      <p:sp>
+        <p:nvSpPr>
+          <p:cNvPr id="2" name="Text Placeholder 1">
+            <a:extLst>
+              <a:ext uri="{FF2B5EF4-FFF2-40B4-BE49-F238E27FC236}">
+                <a16:creationId xmlns:a16="http://schemas.microsoft.com/office/drawing/2014/main" id="{882E656E-F534-4E9B-AF42-6610DE8D6DE7}"/>
+              </a:ext>
+            </a:extLst>
+          </p:cNvPr>
+          <p:cNvSpPr>
+            <a:spLocks noGrp="1"/>
+          </p:cNvSpPr>
+          <p:nvPr>
+            <p:ph type="body" sz="quarter" idx="10"/>
+          </p:nvPr>
+        </p:nvSpPr>
+        <p:spPr/>
+        <p:txBody>
+          <a:bodyPr/>
+          <a:lstStyle/>
+          <a:p>
+            <a:r>
+              <a:rPr lang="en-US" sz="9600" dirty="0"/>
+              <a:t>Q&amp;A</a:t>
+            </a:r>
+          </a:p>
+        </p:txBody>
+      </p:sp>
+    </p:spTree>
+    <p:extLst>
+      <p:ext uri="{BB962C8B-B14F-4D97-AF65-F5344CB8AC3E}">
+        <p14:creationId xmlns:p14="http://schemas.microsoft.com/office/powerpoint/2010/main" val="1891880177"/>
+      </p:ext>
+    </p:extLst>
+  </p:cSld>
+  <p:clrMapOvr>
+    <a:masterClrMapping/>
+  </p:clrMapOvr>
+</p:sld>
+</file>
+
+<file path=ppt/slides/slide42.xml><?xml version="1.0" encoding="utf-8"?>
+<p:sld xmlns:a="http://schemas.openxmlformats.org/drawingml/2006/main" xmlns:r="http://schemas.openxmlformats.org/officeDocument/2006/relationships" xmlns:p="http://schemas.openxmlformats.org/presentationml/2006/main">
+  <p:cSld>
+    <p:spTree>
+      <p:nvGrpSpPr>
+        <p:cNvPr id="1" name=""/>
+        <p:cNvGrpSpPr/>
+        <p:nvPr/>
+      </p:nvGrpSpPr>
+      <p:grpSpPr>
+        <a:xfrm>
+          <a:off x="0" y="0"/>
+          <a:ext cx="0" cy="0"/>
+          <a:chOff x="0" y="0"/>
+          <a:chExt cx="0" cy="0"/>
+        </a:xfrm>
+      </p:grpSpPr>
+    </p:spTree>
+    <p:extLst>
+      <p:ext uri="{BB962C8B-B14F-4D97-AF65-F5344CB8AC3E}">
+        <p14:creationId xmlns:p14="http://schemas.microsoft.com/office/powerpoint/2010/main" val="1456301527"/>
       </p:ext>
     </p:extLst>
   </p:cSld>

</xml_diff>

<commit_message>
Add scripts for deploying SQL server and database to it, update web app to connect to deployed SQL server
</commit_message>
<xml_diff>
--- a/docs/Introduction to Docker.pptx
+++ b/docs/Introduction to Docker.pptx
@@ -377,7 +377,7 @@
               <a:rPr lang="en-US" smtClean="0">
                 <a:latin typeface="Open Sans" panose="020B0606030504020204" pitchFamily="34" charset="0"/>
               </a:rPr>
-              <a:t>10/15/2019</a:t>
+              <a:t>10/16/2019</a:t>
             </a:fld>
             <a:endParaRPr lang="en-US" dirty="0">
               <a:latin typeface="Open Sans" panose="020B0606030504020204" pitchFamily="34" charset="0"/>
@@ -562,7 +562,7 @@
           <a:p>
             <a:fld id="{1287E087-90D8-45F8-80C0-6755C3C3CEFE}" type="datetimeFigureOut">
               <a:rPr lang="en-US" smtClean="0"/>
-              <a:t>10/15/2019</a:t>
+              <a:t>10/16/2019</a:t>
             </a:fld>
             <a:endParaRPr lang="en-US"/>
           </a:p>
@@ -27174,7 +27174,12 @@
             <p:ph idx="1"/>
           </p:nvPr>
         </p:nvSpPr>
-        <p:spPr/>
+        <p:spPr>
+          <a:xfrm>
+            <a:off x="498418" y="1352362"/>
+            <a:ext cx="11168270" cy="2757522"/>
+          </a:xfrm>
+        </p:spPr>
         <p:txBody>
           <a:bodyPr anchor="ctr"/>
           <a:lstStyle/>
@@ -27230,6 +27235,36 @@
           </a:p>
         </p:txBody>
       </p:sp>
+      <p:pic>
+        <p:nvPicPr>
+          <p:cNvPr id="4" name="Picture 3">
+            <a:extLst>
+              <a:ext uri="{FF2B5EF4-FFF2-40B4-BE49-F238E27FC236}">
+                <a16:creationId xmlns:a16="http://schemas.microsoft.com/office/drawing/2014/main" id="{F978E71E-170F-47E9-96E0-570EC05C7749}"/>
+              </a:ext>
+            </a:extLst>
+          </p:cNvPr>
+          <p:cNvPicPr>
+            <a:picLocks noChangeAspect="1"/>
+          </p:cNvPicPr>
+          <p:nvPr/>
+        </p:nvPicPr>
+        <p:blipFill>
+          <a:blip r:embed="rId3"/>
+          <a:stretch>
+            <a:fillRect/>
+          </a:stretch>
+        </p:blipFill>
+        <p:spPr>
+          <a:xfrm>
+            <a:off x="366755" y="3351697"/>
+            <a:ext cx="11431595" cy="2534004"/>
+          </a:xfrm>
+          <a:prstGeom prst="rect">
+            <a:avLst/>
+          </a:prstGeom>
+        </p:spPr>
+      </p:pic>
     </p:spTree>
     <p:extLst>
       <p:ext uri="{BB962C8B-B14F-4D97-AF65-F5344CB8AC3E}">

</xml_diff>

<commit_message>
Update slides about Docker Compose
</commit_message>
<xml_diff>
--- a/docs/Introduction to Docker.pptx
+++ b/docs/Introduction to Docker.pptx
@@ -5,10 +5,10 @@
     <p:sldMasterId id="2147483648" r:id="rId1"/>
   </p:sldMasterIdLst>
   <p:notesMasterIdLst>
-    <p:notesMasterId r:id="rId44"/>
+    <p:notesMasterId r:id="rId49"/>
   </p:notesMasterIdLst>
   <p:handoutMasterIdLst>
-    <p:handoutMasterId r:id="rId45"/>
+    <p:handoutMasterId r:id="rId50"/>
   </p:handoutMasterIdLst>
   <p:sldIdLst>
     <p:sldId id="279" r:id="rId2"/>
@@ -48,47 +48,52 @@
     <p:sldId id="739" r:id="rId36"/>
     <p:sldId id="740" r:id="rId37"/>
     <p:sldId id="735" r:id="rId38"/>
-    <p:sldId id="736" r:id="rId39"/>
-    <p:sldId id="692" r:id="rId40"/>
-    <p:sldId id="713" r:id="rId41"/>
-    <p:sldId id="321" r:id="rId42"/>
-    <p:sldId id="320" r:id="rId43"/>
+    <p:sldId id="741" r:id="rId39"/>
+    <p:sldId id="742" r:id="rId40"/>
+    <p:sldId id="743" r:id="rId41"/>
+    <p:sldId id="744" r:id="rId42"/>
+    <p:sldId id="745" r:id="rId43"/>
+    <p:sldId id="736" r:id="rId44"/>
+    <p:sldId id="692" r:id="rId45"/>
+    <p:sldId id="713" r:id="rId46"/>
+    <p:sldId id="321" r:id="rId47"/>
+    <p:sldId id="320" r:id="rId48"/>
   </p:sldIdLst>
   <p:sldSz cx="12192000" cy="6858000"/>
   <p:notesSz cx="6858000" cy="9144000"/>
   <p:embeddedFontLst>
     <p:embeddedFont>
       <p:font typeface="Calibri" panose="020F0502020204030204" pitchFamily="34" charset="0"/>
-      <p:regular r:id="rId46"/>
-      <p:bold r:id="rId47"/>
-      <p:italic r:id="rId48"/>
-      <p:boldItalic r:id="rId49"/>
+      <p:regular r:id="rId51"/>
+      <p:bold r:id="rId52"/>
+      <p:italic r:id="rId53"/>
+      <p:boldItalic r:id="rId54"/>
     </p:embeddedFont>
     <p:embeddedFont>
       <p:font typeface="Consolas" panose="020B0609020204030204" pitchFamily="49" charset="0"/>
-      <p:regular r:id="rId50"/>
-      <p:bold r:id="rId51"/>
-      <p:italic r:id="rId52"/>
-      <p:boldItalic r:id="rId53"/>
+      <p:regular r:id="rId55"/>
+      <p:bold r:id="rId56"/>
+      <p:italic r:id="rId57"/>
+      <p:boldItalic r:id="rId58"/>
     </p:embeddedFont>
     <p:embeddedFont>
       <p:font typeface="Open Sans" panose="020B0606030504020204" pitchFamily="34" charset="0"/>
-      <p:regular r:id="rId54"/>
-      <p:bold r:id="rId55"/>
-      <p:italic r:id="rId56"/>
-      <p:boldItalic r:id="rId57"/>
+      <p:regular r:id="rId59"/>
+      <p:bold r:id="rId60"/>
+      <p:italic r:id="rId61"/>
+      <p:boldItalic r:id="rId62"/>
     </p:embeddedFont>
     <p:embeddedFont>
       <p:font typeface="Open Sans Light" panose="020B0306030504020204" pitchFamily="34" charset="0"/>
-      <p:regular r:id="rId58"/>
-      <p:italic r:id="rId59"/>
+      <p:regular r:id="rId63"/>
+      <p:italic r:id="rId64"/>
     </p:embeddedFont>
     <p:embeddedFont>
       <p:font typeface="Open Sans Semibold" panose="020B0706030804020204" pitchFamily="34" charset="0"/>
-      <p:regular r:id="rId60"/>
-      <p:bold r:id="rId61"/>
-      <p:italic r:id="rId62"/>
-      <p:boldItalic r:id="rId63"/>
+      <p:regular r:id="rId65"/>
+      <p:bold r:id="rId66"/>
+      <p:italic r:id="rId67"/>
+      <p:boldItalic r:id="rId68"/>
     </p:embeddedFont>
   </p:embeddedFontLst>
   <p:defaultTextStyle>
@@ -252,6 +257,11 @@
             <p14:sldId id="739"/>
             <p14:sldId id="740"/>
             <p14:sldId id="735"/>
+            <p14:sldId id="741"/>
+            <p14:sldId id="742"/>
+            <p14:sldId id="743"/>
+            <p14:sldId id="744"/>
+            <p14:sldId id="745"/>
             <p14:sldId id="736"/>
           </p14:sldIdLst>
         </p14:section>
@@ -1735,7 +1745,7 @@
           <a:p>
             <a:fld id="{AA4E6B44-8A2D-409F-997F-4C23C1BB012E}" type="slidenum">
               <a:rPr lang="en-US" smtClean="0"/>
-              <a:t>38</a:t>
+              <a:t>43</a:t>
             </a:fld>
             <a:endParaRPr lang="en-US"/>
           </a:p>
@@ -27087,9 +27097,60 @@
               <a:buChar char="•"/>
             </a:pPr>
             <a:r>
-              <a:rPr lang="en-US" dirty="0"/>
-              <a:t>Content</a:t>
-            </a:r>
+              <a:rPr lang="en-US" b="0" dirty="0">
+                <a:hlinkClick r:id="rId2"/>
+              </a:rPr>
+              <a:t>Docker Compose</a:t>
+            </a:r>
+            <a:r>
+              <a:rPr lang="en-US" b="0" dirty="0"/>
+              <a:t> is a separate client tool that lets you define your solution architecture in a YAML file, and then manage a whole set of containers with a single command.</a:t>
+            </a:r>
+          </a:p>
+          <a:p>
+            <a:pPr marL="342900" indent="-342900">
+              <a:buFont typeface="Arial" panose="020B0604020202020204" pitchFamily="34" charset="0"/>
+              <a:buChar char="•"/>
+            </a:pPr>
+            <a:r>
+              <a:rPr lang="en-US" dirty="0"/>
+              <a:t>Docker Compose comes bundled with Docker for Mac, Docker for Windows, and the Docker Toolbox. On Linux, it’s a separate install.</a:t>
+            </a:r>
+          </a:p>
+          <a:p>
+            <a:pPr marL="342900" indent="-342900">
+              <a:buFont typeface="Arial" panose="020B0604020202020204" pitchFamily="34" charset="0"/>
+              <a:buChar char="•"/>
+            </a:pPr>
+            <a:r>
+              <a:rPr lang="en-US" b="0" dirty="0"/>
+              <a:t>The Docker Compose syntax takes the arguments available in the </a:t>
+            </a:r>
+            <a:r>
+              <a:rPr lang="en-US" dirty="0">
+                <a:latin typeface="Consolas" panose="020B0609020204030204" pitchFamily="49" charset="0"/>
+              </a:rPr>
+              <a:t>docker container run</a:t>
+            </a:r>
+            <a:r>
+              <a:rPr lang="en-US" dirty="0"/>
+              <a:t> </a:t>
+            </a:r>
+            <a:r>
+              <a:rPr lang="en-US" b="0" dirty="0"/>
+              <a:t>command and structures them as </a:t>
+            </a:r>
+            <a:r>
+              <a:rPr lang="en-US" b="0" dirty="0">
+                <a:hlinkClick r:id="rId3"/>
+              </a:rPr>
+              <a:t>YAML</a:t>
+            </a:r>
+            <a:r>
+              <a:rPr lang="en-US" b="0" dirty="0"/>
+              <a:t>. You specify an image to run from, container names, ports to expose, volumes to map, and networks—all the major command-line options are supported by Compose. </a:t>
+            </a:r>
+            <a:endParaRPr lang="en-US" dirty="0"/>
           </a:p>
           <a:p>
             <a:pPr marL="342900" indent="-342900">
@@ -27123,7 +27184,7 @@
           <a:p>
             <a:r>
               <a:rPr lang="en-US" dirty="0"/>
-              <a:t>Docker Compose</a:t>
+              <a:t>About Docker Compose</a:t>
             </a:r>
           </a:p>
         </p:txBody>
@@ -27174,6 +27235,789 @@
             <p:ph idx="1"/>
           </p:nvPr>
         </p:nvSpPr>
+        <p:spPr/>
+        <p:txBody>
+          <a:bodyPr/>
+          <a:lstStyle/>
+          <a:p>
+            <a:pPr marL="342900" indent="-342900">
+              <a:buFont typeface="Arial" panose="020B0604020202020204" pitchFamily="34" charset="0"/>
+              <a:buChar char="•"/>
+            </a:pPr>
+            <a:r>
+              <a:rPr lang="en-US" b="0" dirty="0"/>
+              <a:t>In Compose, you define containers to run as services, then you specify the image name and any other optional properties, such as the container name, ports and networks in this example. </a:t>
+            </a:r>
+          </a:p>
+          <a:p>
+            <a:pPr marL="342900" indent="-342900">
+              <a:buFont typeface="Arial" panose="020B0604020202020204" pitchFamily="34" charset="0"/>
+              <a:buChar char="•"/>
+            </a:pPr>
+            <a:endParaRPr lang="en-US" dirty="0"/>
+          </a:p>
+        </p:txBody>
+      </p:sp>
+      <p:sp>
+        <p:nvSpPr>
+          <p:cNvPr id="3" name="Text Placeholder 2">
+            <a:extLst>
+              <a:ext uri="{FF2B5EF4-FFF2-40B4-BE49-F238E27FC236}">
+                <a16:creationId xmlns:a16="http://schemas.microsoft.com/office/drawing/2014/main" id="{CBA50F54-F9F0-49C1-A1C9-8D18F10A83B3}"/>
+              </a:ext>
+            </a:extLst>
+          </p:cNvPr>
+          <p:cNvSpPr>
+            <a:spLocks noGrp="1"/>
+          </p:cNvSpPr>
+          <p:nvPr>
+            <p:ph type="body" sz="quarter" idx="12"/>
+          </p:nvPr>
+        </p:nvSpPr>
+        <p:spPr/>
+        <p:txBody>
+          <a:bodyPr/>
+          <a:lstStyle/>
+          <a:p>
+            <a:r>
+              <a:rPr lang="en-US" dirty="0"/>
+              <a:t>Docker Compose file</a:t>
+            </a:r>
+          </a:p>
+        </p:txBody>
+      </p:sp>
+      <p:pic>
+        <p:nvPicPr>
+          <p:cNvPr id="6" name="Picture 5">
+            <a:extLst>
+              <a:ext uri="{FF2B5EF4-FFF2-40B4-BE49-F238E27FC236}">
+                <a16:creationId xmlns:a16="http://schemas.microsoft.com/office/drawing/2014/main" id="{A44CB66A-FCD1-4947-AE07-53EAAA3A5B24}"/>
+              </a:ext>
+            </a:extLst>
+          </p:cNvPr>
+          <p:cNvPicPr>
+            <a:picLocks noChangeAspect="1"/>
+          </p:cNvPicPr>
+          <p:nvPr/>
+        </p:nvPicPr>
+        <p:blipFill>
+          <a:blip r:embed="rId2"/>
+          <a:stretch>
+            <a:fillRect/>
+          </a:stretch>
+        </p:blipFill>
+        <p:spPr>
+          <a:xfrm>
+            <a:off x="2790418" y="2904949"/>
+            <a:ext cx="6611163" cy="2915747"/>
+          </a:xfrm>
+          <a:prstGeom prst="rect">
+            <a:avLst/>
+          </a:prstGeom>
+        </p:spPr>
+      </p:pic>
+    </p:spTree>
+    <p:extLst>
+      <p:ext uri="{BB962C8B-B14F-4D97-AF65-F5344CB8AC3E}">
+        <p14:creationId xmlns:p14="http://schemas.microsoft.com/office/powerpoint/2010/main" val="1205089908"/>
+      </p:ext>
+    </p:extLst>
+  </p:cSld>
+  <p:clrMapOvr>
+    <a:masterClrMapping/>
+  </p:clrMapOvr>
+</p:sld>
+</file>
+
+<file path=ppt/slides/slide39.xml><?xml version="1.0" encoding="utf-8"?>
+<p:sld xmlns:a="http://schemas.openxmlformats.org/drawingml/2006/main" xmlns:r="http://schemas.openxmlformats.org/officeDocument/2006/relationships" xmlns:p="http://schemas.openxmlformats.org/presentationml/2006/main">
+  <p:cSld>
+    <p:spTree>
+      <p:nvGrpSpPr>
+        <p:cNvPr id="1" name=""/>
+        <p:cNvGrpSpPr/>
+        <p:nvPr/>
+      </p:nvGrpSpPr>
+      <p:grpSpPr>
+        <a:xfrm>
+          <a:off x="0" y="0"/>
+          <a:ext cx="0" cy="0"/>
+          <a:chOff x="0" y="0"/>
+          <a:chExt cx="0" cy="0"/>
+        </a:xfrm>
+      </p:grpSpPr>
+      <p:sp>
+        <p:nvSpPr>
+          <p:cNvPr id="2" name="Content Placeholder 1">
+            <a:extLst>
+              <a:ext uri="{FF2B5EF4-FFF2-40B4-BE49-F238E27FC236}">
+                <a16:creationId xmlns:a16="http://schemas.microsoft.com/office/drawing/2014/main" id="{AFF96931-CCDB-47D1-B982-0BFE2F5C618C}"/>
+              </a:ext>
+            </a:extLst>
+          </p:cNvPr>
+          <p:cNvSpPr>
+            <a:spLocks noGrp="1"/>
+          </p:cNvSpPr>
+          <p:nvPr>
+            <p:ph idx="1"/>
+          </p:nvPr>
+        </p:nvSpPr>
+        <p:spPr/>
+        <p:txBody>
+          <a:bodyPr/>
+          <a:lstStyle/>
+          <a:p>
+            <a:pPr marL="342900" indent="-342900">
+              <a:buFont typeface="Arial" panose="020B0604020202020204" pitchFamily="34" charset="0"/>
+              <a:buChar char="•"/>
+            </a:pPr>
+            <a:r>
+              <a:rPr lang="en-US" b="0" dirty="0"/>
+              <a:t>By convention, Compose files are named </a:t>
+            </a:r>
+            <a:r>
+              <a:rPr lang="en-US" dirty="0">
+                <a:latin typeface="Consolas" panose="020B0609020204030204" pitchFamily="49" charset="0"/>
+              </a:rPr>
+              <a:t>docker-</a:t>
+            </a:r>
+            <a:r>
+              <a:rPr lang="en-US" dirty="0" err="1">
+                <a:latin typeface="Consolas" panose="020B0609020204030204" pitchFamily="49" charset="0"/>
+              </a:rPr>
+              <a:t>compose.yml</a:t>
+            </a:r>
+            <a:r>
+              <a:rPr lang="en-US" b="0" dirty="0"/>
+              <a:t>. From the directory where the YAML file is saved, you can start all the services in the Compose file as containers by running the </a:t>
+            </a:r>
+            <a:r>
+              <a:rPr lang="en-US" dirty="0">
+                <a:latin typeface="Consolas" panose="020B0609020204030204" pitchFamily="49" charset="0"/>
+              </a:rPr>
+              <a:t>up</a:t>
+            </a:r>
+            <a:r>
+              <a:rPr lang="en-US" dirty="0"/>
+              <a:t> </a:t>
+            </a:r>
+            <a:r>
+              <a:rPr lang="en-US" b="0" dirty="0"/>
+              <a:t>command:</a:t>
+            </a:r>
+          </a:p>
+          <a:p>
+            <a:pPr marL="1028700" lvl="1" indent="-342900"/>
+            <a:r>
+              <a:rPr lang="en-US" dirty="0">
+                <a:latin typeface="Consolas" panose="020B0609020204030204" pitchFamily="49" charset="0"/>
+              </a:rPr>
+              <a:t>docker-compose up -d</a:t>
+            </a:r>
+          </a:p>
+          <a:p>
+            <a:pPr marL="342900" indent="-342900">
+              <a:buFont typeface="Arial" panose="020B0604020202020204" pitchFamily="34" charset="0"/>
+              <a:buChar char="•"/>
+            </a:pPr>
+            <a:r>
+              <a:rPr lang="en-US" b="0" dirty="0"/>
+              <a:t>As with the Docker CLI, we can specify </a:t>
+            </a:r>
+            <a:r>
+              <a:rPr lang="en-US" dirty="0">
+                <a:latin typeface="Consolas" panose="020B0609020204030204" pitchFamily="49" charset="0"/>
+              </a:rPr>
+              <a:t>-d</a:t>
+            </a:r>
+            <a:r>
+              <a:rPr lang="en-US" dirty="0"/>
+              <a:t> </a:t>
+            </a:r>
+            <a:r>
+              <a:rPr lang="en-US" b="0" dirty="0"/>
+              <a:t>to </a:t>
+            </a:r>
+            <a:r>
+              <a:rPr lang="en-US" b="0" dirty="0" err="1"/>
+              <a:t>daemonize</a:t>
+            </a:r>
+            <a:r>
+              <a:rPr lang="en-US" b="0" dirty="0"/>
+              <a:t> all the containers and keep them running in the background.</a:t>
+            </a:r>
+          </a:p>
+          <a:p>
+            <a:pPr marL="342900" indent="-342900">
+              <a:buFont typeface="Arial" panose="020B0604020202020204" pitchFamily="34" charset="0"/>
+              <a:buChar char="•"/>
+            </a:pPr>
+            <a:r>
+              <a:rPr lang="en-US" b="0" dirty="0"/>
+              <a:t>Containers started using Docker Compose are just normal Docker containers and we can work with them using Docker CLI in the normal way.</a:t>
+            </a:r>
+          </a:p>
+          <a:p>
+            <a:pPr marL="342900" indent="-342900">
+              <a:buFont typeface="Arial" panose="020B0604020202020204" pitchFamily="34" charset="0"/>
+              <a:buChar char="•"/>
+            </a:pPr>
+            <a:endParaRPr lang="en-US" dirty="0"/>
+          </a:p>
+        </p:txBody>
+      </p:sp>
+      <p:sp>
+        <p:nvSpPr>
+          <p:cNvPr id="3" name="Text Placeholder 2">
+            <a:extLst>
+              <a:ext uri="{FF2B5EF4-FFF2-40B4-BE49-F238E27FC236}">
+                <a16:creationId xmlns:a16="http://schemas.microsoft.com/office/drawing/2014/main" id="{CBA50F54-F9F0-49C1-A1C9-8D18F10A83B3}"/>
+              </a:ext>
+            </a:extLst>
+          </p:cNvPr>
+          <p:cNvSpPr>
+            <a:spLocks noGrp="1"/>
+          </p:cNvSpPr>
+          <p:nvPr>
+            <p:ph type="body" sz="quarter" idx="12"/>
+          </p:nvPr>
+        </p:nvSpPr>
+        <p:spPr/>
+        <p:txBody>
+          <a:bodyPr/>
+          <a:lstStyle/>
+          <a:p>
+            <a:r>
+              <a:rPr lang="en-US" dirty="0"/>
+              <a:t>Starting containers using Docker Compose</a:t>
+            </a:r>
+          </a:p>
+        </p:txBody>
+      </p:sp>
+    </p:spTree>
+    <p:extLst>
+      <p:ext uri="{BB962C8B-B14F-4D97-AF65-F5344CB8AC3E}">
+        <p14:creationId xmlns:p14="http://schemas.microsoft.com/office/powerpoint/2010/main" val="3412967014"/>
+      </p:ext>
+    </p:extLst>
+  </p:cSld>
+  <p:clrMapOvr>
+    <a:masterClrMapping/>
+  </p:clrMapOvr>
+</p:sld>
+</file>
+
+<file path=ppt/slides/slide4.xml><?xml version="1.0" encoding="utf-8"?>
+<p:sld xmlns:a="http://schemas.openxmlformats.org/drawingml/2006/main" xmlns:r="http://schemas.openxmlformats.org/officeDocument/2006/relationships" xmlns:p="http://schemas.openxmlformats.org/presentationml/2006/main">
+  <p:cSld>
+    <p:spTree>
+      <p:nvGrpSpPr>
+        <p:cNvPr id="1" name=""/>
+        <p:cNvGrpSpPr/>
+        <p:nvPr/>
+      </p:nvGrpSpPr>
+      <p:grpSpPr>
+        <a:xfrm>
+          <a:off x="0" y="0"/>
+          <a:ext cx="0" cy="0"/>
+          <a:chOff x="0" y="0"/>
+          <a:chExt cx="0" cy="0"/>
+        </a:xfrm>
+      </p:grpSpPr>
+      <p:sp>
+        <p:nvSpPr>
+          <p:cNvPr id="2" name="Text Placeholder 1">
+            <a:extLst>
+              <a:ext uri="{FF2B5EF4-FFF2-40B4-BE49-F238E27FC236}">
+                <a16:creationId xmlns:a16="http://schemas.microsoft.com/office/drawing/2014/main" id="{149FE133-FF4E-4029-8D0B-291BF433476E}"/>
+              </a:ext>
+            </a:extLst>
+          </p:cNvPr>
+          <p:cNvSpPr>
+            <a:spLocks noGrp="1"/>
+          </p:cNvSpPr>
+          <p:nvPr>
+            <p:ph type="body" sz="quarter" idx="10"/>
+          </p:nvPr>
+        </p:nvSpPr>
+        <p:spPr/>
+        <p:txBody>
+          <a:bodyPr/>
+          <a:lstStyle/>
+          <a:p>
+            <a:r>
+              <a:rPr lang="en-US" dirty="0"/>
+              <a:t>Introducing Docker</a:t>
+            </a:r>
+          </a:p>
+        </p:txBody>
+      </p:sp>
+    </p:spTree>
+    <p:extLst>
+      <p:ext uri="{BB962C8B-B14F-4D97-AF65-F5344CB8AC3E}">
+        <p14:creationId xmlns:p14="http://schemas.microsoft.com/office/powerpoint/2010/main" val="3404857500"/>
+      </p:ext>
+    </p:extLst>
+  </p:cSld>
+  <p:clrMapOvr>
+    <a:masterClrMapping/>
+  </p:clrMapOvr>
+</p:sld>
+</file>
+
+<file path=ppt/slides/slide40.xml><?xml version="1.0" encoding="utf-8"?>
+<p:sld xmlns:a="http://schemas.openxmlformats.org/drawingml/2006/main" xmlns:r="http://schemas.openxmlformats.org/officeDocument/2006/relationships" xmlns:p="http://schemas.openxmlformats.org/presentationml/2006/main">
+  <p:cSld>
+    <p:spTree>
+      <p:nvGrpSpPr>
+        <p:cNvPr id="1" name=""/>
+        <p:cNvGrpSpPr/>
+        <p:nvPr/>
+      </p:nvGrpSpPr>
+      <p:grpSpPr>
+        <a:xfrm>
+          <a:off x="0" y="0"/>
+          <a:ext cx="0" cy="0"/>
+          <a:chOff x="0" y="0"/>
+          <a:chExt cx="0" cy="0"/>
+        </a:xfrm>
+      </p:grpSpPr>
+      <p:sp>
+        <p:nvSpPr>
+          <p:cNvPr id="2" name="Content Placeholder 1">
+            <a:extLst>
+              <a:ext uri="{FF2B5EF4-FFF2-40B4-BE49-F238E27FC236}">
+                <a16:creationId xmlns:a16="http://schemas.microsoft.com/office/drawing/2014/main" id="{AFF96931-CCDB-47D1-B982-0BFE2F5C618C}"/>
+              </a:ext>
+            </a:extLst>
+          </p:cNvPr>
+          <p:cNvSpPr>
+            <a:spLocks noGrp="1"/>
+          </p:cNvSpPr>
+          <p:nvPr>
+            <p:ph idx="1"/>
+          </p:nvPr>
+        </p:nvSpPr>
+        <p:spPr/>
+        <p:txBody>
+          <a:bodyPr/>
+          <a:lstStyle/>
+          <a:p>
+            <a:pPr marL="342900" indent="-342900">
+              <a:buFont typeface="Arial" panose="020B0604020202020204" pitchFamily="34" charset="0"/>
+              <a:buChar char="•"/>
+            </a:pPr>
+            <a:r>
+              <a:rPr lang="en-US" b="0" dirty="0"/>
+              <a:t>Docker Compose lets you scale up by adding more containers. More containers can be added with the </a:t>
+            </a:r>
+            <a:r>
+              <a:rPr lang="en-US" dirty="0">
+                <a:latin typeface="Consolas" panose="020B0609020204030204" pitchFamily="49" charset="0"/>
+              </a:rPr>
+              <a:t>scale</a:t>
+            </a:r>
+            <a:r>
+              <a:rPr lang="en-US" dirty="0"/>
+              <a:t> </a:t>
+            </a:r>
+            <a:r>
+              <a:rPr lang="en-US" b="0" dirty="0"/>
+              <a:t>option to the </a:t>
+            </a:r>
+            <a:r>
+              <a:rPr lang="en-US" dirty="0">
+                <a:latin typeface="Consolas" panose="020B0609020204030204" pitchFamily="49" charset="0"/>
+              </a:rPr>
+              <a:t>up</a:t>
+            </a:r>
+            <a:r>
+              <a:rPr lang="en-US" dirty="0"/>
+              <a:t> </a:t>
+            </a:r>
+            <a:r>
+              <a:rPr lang="en-US" b="0" dirty="0"/>
+              <a:t>command as in the following example, which specifies the desired number of containers:</a:t>
+            </a:r>
+          </a:p>
+          <a:p>
+            <a:pPr marL="1028700" lvl="1" indent="-342900"/>
+            <a:r>
+              <a:rPr lang="en-US" dirty="0">
+                <a:latin typeface="Consolas" panose="020B0609020204030204" pitchFamily="49" charset="0"/>
+              </a:rPr>
+              <a:t>docker-compose up –d --scale [SERVICE_NAME]=5</a:t>
+            </a:r>
+          </a:p>
+          <a:p>
+            <a:pPr marL="342900" indent="-342900">
+              <a:buFont typeface="Arial" panose="020B0604020202020204" pitchFamily="34" charset="0"/>
+              <a:buChar char="•"/>
+            </a:pPr>
+            <a:r>
+              <a:rPr lang="en-US" dirty="0"/>
+              <a:t>The DNS server in Docker supports load balancing, which means that if you repeat web requests to the scaled service, each request may be routed to a different container instance.</a:t>
+            </a:r>
+          </a:p>
+          <a:p>
+            <a:pPr marL="1028700" lvl="1" indent="-342900"/>
+            <a:endParaRPr lang="en-US" dirty="0"/>
+          </a:p>
+        </p:txBody>
+      </p:sp>
+      <p:sp>
+        <p:nvSpPr>
+          <p:cNvPr id="3" name="Text Placeholder 2">
+            <a:extLst>
+              <a:ext uri="{FF2B5EF4-FFF2-40B4-BE49-F238E27FC236}">
+                <a16:creationId xmlns:a16="http://schemas.microsoft.com/office/drawing/2014/main" id="{CBA50F54-F9F0-49C1-A1C9-8D18F10A83B3}"/>
+              </a:ext>
+            </a:extLst>
+          </p:cNvPr>
+          <p:cNvSpPr>
+            <a:spLocks noGrp="1"/>
+          </p:cNvSpPr>
+          <p:nvPr>
+            <p:ph type="body" sz="quarter" idx="12"/>
+          </p:nvPr>
+        </p:nvSpPr>
+        <p:spPr/>
+        <p:txBody>
+          <a:bodyPr/>
+          <a:lstStyle/>
+          <a:p>
+            <a:r>
+              <a:rPr lang="en-US" dirty="0"/>
+              <a:t>Scaling using Docker Compose</a:t>
+            </a:r>
+          </a:p>
+        </p:txBody>
+      </p:sp>
+    </p:spTree>
+    <p:extLst>
+      <p:ext uri="{BB962C8B-B14F-4D97-AF65-F5344CB8AC3E}">
+        <p14:creationId xmlns:p14="http://schemas.microsoft.com/office/powerpoint/2010/main" val="3659698249"/>
+      </p:ext>
+    </p:extLst>
+  </p:cSld>
+  <p:clrMapOvr>
+    <a:masterClrMapping/>
+  </p:clrMapOvr>
+</p:sld>
+</file>
+
+<file path=ppt/slides/slide41.xml><?xml version="1.0" encoding="utf-8"?>
+<p:sld xmlns:a="http://schemas.openxmlformats.org/drawingml/2006/main" xmlns:r="http://schemas.openxmlformats.org/officeDocument/2006/relationships" xmlns:p="http://schemas.openxmlformats.org/presentationml/2006/main">
+  <p:cSld>
+    <p:spTree>
+      <p:nvGrpSpPr>
+        <p:cNvPr id="1" name=""/>
+        <p:cNvGrpSpPr/>
+        <p:nvPr/>
+      </p:nvGrpSpPr>
+      <p:grpSpPr>
+        <a:xfrm>
+          <a:off x="0" y="0"/>
+          <a:ext cx="0" cy="0"/>
+          <a:chOff x="0" y="0"/>
+          <a:chExt cx="0" cy="0"/>
+        </a:xfrm>
+      </p:grpSpPr>
+      <p:sp>
+        <p:nvSpPr>
+          <p:cNvPr id="2" name="Content Placeholder 1">
+            <a:extLst>
+              <a:ext uri="{FF2B5EF4-FFF2-40B4-BE49-F238E27FC236}">
+                <a16:creationId xmlns:a16="http://schemas.microsoft.com/office/drawing/2014/main" id="{AFF96931-CCDB-47D1-B982-0BFE2F5C618C}"/>
+              </a:ext>
+            </a:extLst>
+          </p:cNvPr>
+          <p:cNvSpPr>
+            <a:spLocks noGrp="1"/>
+          </p:cNvSpPr>
+          <p:nvPr>
+            <p:ph idx="1"/>
+          </p:nvPr>
+        </p:nvSpPr>
+        <p:spPr/>
+        <p:txBody>
+          <a:bodyPr/>
+          <a:lstStyle/>
+          <a:p>
+            <a:pPr marL="342900" indent="-342900">
+              <a:buFont typeface="Arial" panose="020B0604020202020204" pitchFamily="34" charset="0"/>
+              <a:buChar char="•"/>
+            </a:pPr>
+            <a:r>
+              <a:rPr lang="en-US" b="0" dirty="0"/>
+              <a:t>It is possible to administer all the containers in Compose project with single commands. These are typically the Docker CLI commands transplanted to Docker Compose. </a:t>
+            </a:r>
+          </a:p>
+          <a:p>
+            <a:pPr marL="342900" indent="-342900">
+              <a:buFont typeface="Arial" panose="020B0604020202020204" pitchFamily="34" charset="0"/>
+              <a:buChar char="•"/>
+            </a:pPr>
+            <a:r>
+              <a:rPr lang="en-US" b="0" dirty="0"/>
+              <a:t>To stop all the containers:</a:t>
+            </a:r>
+          </a:p>
+          <a:p>
+            <a:pPr marL="1028700" lvl="1" indent="-342900"/>
+            <a:r>
+              <a:rPr lang="en-US" dirty="0">
+                <a:latin typeface="Consolas" panose="020B0609020204030204" pitchFamily="49" charset="0"/>
+              </a:rPr>
+              <a:t>docker-compose stop</a:t>
+            </a:r>
+          </a:p>
+          <a:p>
+            <a:pPr marL="342900" indent="-342900">
+              <a:buFont typeface="Arial" panose="020B0604020202020204" pitchFamily="34" charset="0"/>
+              <a:buChar char="•"/>
+            </a:pPr>
+            <a:r>
+              <a:rPr lang="en-US" b="0" dirty="0"/>
+              <a:t>To start all the containers:</a:t>
+            </a:r>
+          </a:p>
+          <a:p>
+            <a:pPr marL="1028700" lvl="1" indent="-342900"/>
+            <a:r>
+              <a:rPr lang="en-US" dirty="0">
+                <a:latin typeface="Consolas" panose="020B0609020204030204" pitchFamily="49" charset="0"/>
+              </a:rPr>
+              <a:t>docker-compose start</a:t>
+            </a:r>
+          </a:p>
+          <a:p>
+            <a:pPr marL="342900" indent="-342900">
+              <a:buFont typeface="Arial" panose="020B0604020202020204" pitchFamily="34" charset="0"/>
+              <a:buChar char="•"/>
+            </a:pPr>
+            <a:r>
+              <a:rPr lang="en-US" dirty="0"/>
+              <a:t>When you create services with Compose, Docker has no notion that they’re related (other than being in the same network). In order to manage the services as a single unit, you work in the directory on your client machine where the </a:t>
+            </a:r>
+            <a:r>
+              <a:rPr lang="en-US" b="0" dirty="0"/>
+              <a:t>docker-</a:t>
+            </a:r>
+            <a:r>
+              <a:rPr lang="en-US" b="0" dirty="0" err="1"/>
+              <a:t>compose.yml</a:t>
+            </a:r>
+            <a:r>
+              <a:rPr lang="en-US" b="0" dirty="0"/>
+              <a:t> </a:t>
+            </a:r>
+            <a:r>
+              <a:rPr lang="en-US" dirty="0"/>
+              <a:t>file lives. </a:t>
+            </a:r>
+          </a:p>
+          <a:p>
+            <a:pPr marL="342900" indent="-342900"/>
+            <a:endParaRPr lang="en-US" dirty="0"/>
+          </a:p>
+          <a:p>
+            <a:pPr marL="1028700" lvl="1" indent="-342900"/>
+            <a:endParaRPr lang="en-US" dirty="0"/>
+          </a:p>
+          <a:p>
+            <a:pPr marL="1028700" lvl="1" indent="-342900"/>
+            <a:endParaRPr lang="en-US" dirty="0"/>
+          </a:p>
+        </p:txBody>
+      </p:sp>
+      <p:sp>
+        <p:nvSpPr>
+          <p:cNvPr id="3" name="Text Placeholder 2">
+            <a:extLst>
+              <a:ext uri="{FF2B5EF4-FFF2-40B4-BE49-F238E27FC236}">
+                <a16:creationId xmlns:a16="http://schemas.microsoft.com/office/drawing/2014/main" id="{CBA50F54-F9F0-49C1-A1C9-8D18F10A83B3}"/>
+              </a:ext>
+            </a:extLst>
+          </p:cNvPr>
+          <p:cNvSpPr>
+            <a:spLocks noGrp="1"/>
+          </p:cNvSpPr>
+          <p:nvPr>
+            <p:ph type="body" sz="quarter" idx="12"/>
+          </p:nvPr>
+        </p:nvSpPr>
+        <p:spPr/>
+        <p:txBody>
+          <a:bodyPr/>
+          <a:lstStyle/>
+          <a:p>
+            <a:r>
+              <a:rPr lang="en-US" dirty="0"/>
+              <a:t>Administer all the containers</a:t>
+            </a:r>
+          </a:p>
+        </p:txBody>
+      </p:sp>
+    </p:spTree>
+    <p:extLst>
+      <p:ext uri="{BB962C8B-B14F-4D97-AF65-F5344CB8AC3E}">
+        <p14:creationId xmlns:p14="http://schemas.microsoft.com/office/powerpoint/2010/main" val="3391519072"/>
+      </p:ext>
+    </p:extLst>
+  </p:cSld>
+  <p:clrMapOvr>
+    <a:masterClrMapping/>
+  </p:clrMapOvr>
+</p:sld>
+</file>
+
+<file path=ppt/slides/slide42.xml><?xml version="1.0" encoding="utf-8"?>
+<p:sld xmlns:a="http://schemas.openxmlformats.org/drawingml/2006/main" xmlns:r="http://schemas.openxmlformats.org/officeDocument/2006/relationships" xmlns:p="http://schemas.openxmlformats.org/presentationml/2006/main">
+  <p:cSld>
+    <p:spTree>
+      <p:nvGrpSpPr>
+        <p:cNvPr id="1" name=""/>
+        <p:cNvGrpSpPr/>
+        <p:nvPr/>
+      </p:nvGrpSpPr>
+      <p:grpSpPr>
+        <a:xfrm>
+          <a:off x="0" y="0"/>
+          <a:ext cx="0" cy="0"/>
+          <a:chOff x="0" y="0"/>
+          <a:chExt cx="0" cy="0"/>
+        </a:xfrm>
+      </p:grpSpPr>
+      <p:sp>
+        <p:nvSpPr>
+          <p:cNvPr id="2" name="Content Placeholder 1">
+            <a:extLst>
+              <a:ext uri="{FF2B5EF4-FFF2-40B4-BE49-F238E27FC236}">
+                <a16:creationId xmlns:a16="http://schemas.microsoft.com/office/drawing/2014/main" id="{AFF96931-CCDB-47D1-B982-0BFE2F5C618C}"/>
+              </a:ext>
+            </a:extLst>
+          </p:cNvPr>
+          <p:cNvSpPr>
+            <a:spLocks noGrp="1"/>
+          </p:cNvSpPr>
+          <p:nvPr>
+            <p:ph idx="1"/>
+          </p:nvPr>
+        </p:nvSpPr>
+        <p:spPr/>
+        <p:txBody>
+          <a:bodyPr/>
+          <a:lstStyle/>
+          <a:p>
+            <a:pPr marL="342900" indent="-342900">
+              <a:buFont typeface="Arial" panose="020B0604020202020204" pitchFamily="34" charset="0"/>
+              <a:buChar char="•"/>
+            </a:pPr>
+            <a:r>
+              <a:rPr lang="en-US" b="0" dirty="0"/>
+              <a:t>With Docker Compose, you can orchestrate complex applications by linking containers together and running them inside a Docker network. Distributed solutions can be captured at the infrastructure level in a Compose file.</a:t>
+            </a:r>
+          </a:p>
+          <a:p>
+            <a:pPr marL="342900" indent="-342900">
+              <a:buFont typeface="Arial" panose="020B0604020202020204" pitchFamily="34" charset="0"/>
+              <a:buChar char="•"/>
+            </a:pPr>
+            <a:r>
+              <a:rPr lang="en-US" b="0" dirty="0"/>
+              <a:t>Each component in the stack refers to its dependencies by name, and that will be consistent for every environment in which the containers are in the same network, even if they are running at different levels of scale (which means there’s no change to application configuration).</a:t>
+            </a:r>
+            <a:endParaRPr lang="en-US" dirty="0"/>
+          </a:p>
+          <a:p>
+            <a:pPr marL="342900" indent="-342900"/>
+            <a:endParaRPr lang="en-US" dirty="0"/>
+          </a:p>
+          <a:p>
+            <a:pPr marL="1028700" lvl="1" indent="-342900"/>
+            <a:endParaRPr lang="en-US" dirty="0"/>
+          </a:p>
+          <a:p>
+            <a:pPr marL="1028700" lvl="1" indent="-342900"/>
+            <a:endParaRPr lang="en-US" dirty="0"/>
+          </a:p>
+        </p:txBody>
+      </p:sp>
+      <p:sp>
+        <p:nvSpPr>
+          <p:cNvPr id="3" name="Text Placeholder 2">
+            <a:extLst>
+              <a:ext uri="{FF2B5EF4-FFF2-40B4-BE49-F238E27FC236}">
+                <a16:creationId xmlns:a16="http://schemas.microsoft.com/office/drawing/2014/main" id="{CBA50F54-F9F0-49C1-A1C9-8D18F10A83B3}"/>
+              </a:ext>
+            </a:extLst>
+          </p:cNvPr>
+          <p:cNvSpPr>
+            <a:spLocks noGrp="1"/>
+          </p:cNvSpPr>
+          <p:nvPr>
+            <p:ph type="body" sz="quarter" idx="12"/>
+          </p:nvPr>
+        </p:nvSpPr>
+        <p:spPr/>
+        <p:txBody>
+          <a:bodyPr/>
+          <a:lstStyle/>
+          <a:p>
+            <a:r>
+              <a:rPr lang="en-US" dirty="0"/>
+              <a:t>Benefits of using Docker Compose</a:t>
+            </a:r>
+          </a:p>
+        </p:txBody>
+      </p:sp>
+    </p:spTree>
+    <p:extLst>
+      <p:ext uri="{BB962C8B-B14F-4D97-AF65-F5344CB8AC3E}">
+        <p14:creationId xmlns:p14="http://schemas.microsoft.com/office/powerpoint/2010/main" val="834121795"/>
+      </p:ext>
+    </p:extLst>
+  </p:cSld>
+  <p:clrMapOvr>
+    <a:masterClrMapping/>
+  </p:clrMapOvr>
+</p:sld>
+</file>
+
+<file path=ppt/slides/slide43.xml><?xml version="1.0" encoding="utf-8"?>
+<p:sld xmlns:a="http://schemas.openxmlformats.org/drawingml/2006/main" xmlns:r="http://schemas.openxmlformats.org/officeDocument/2006/relationships" xmlns:p="http://schemas.openxmlformats.org/presentationml/2006/main">
+  <p:cSld>
+    <p:spTree>
+      <p:nvGrpSpPr>
+        <p:cNvPr id="1" name=""/>
+        <p:cNvGrpSpPr/>
+        <p:nvPr/>
+      </p:nvGrpSpPr>
+      <p:grpSpPr>
+        <a:xfrm>
+          <a:off x="0" y="0"/>
+          <a:ext cx="0" cy="0"/>
+          <a:chOff x="0" y="0"/>
+          <a:chExt cx="0" cy="0"/>
+        </a:xfrm>
+      </p:grpSpPr>
+      <p:sp>
+        <p:nvSpPr>
+          <p:cNvPr id="2" name="Content Placeholder 1">
+            <a:extLst>
+              <a:ext uri="{FF2B5EF4-FFF2-40B4-BE49-F238E27FC236}">
+                <a16:creationId xmlns:a16="http://schemas.microsoft.com/office/drawing/2014/main" id="{AFF96931-CCDB-47D1-B982-0BFE2F5C618C}"/>
+              </a:ext>
+            </a:extLst>
+          </p:cNvPr>
+          <p:cNvSpPr>
+            <a:spLocks noGrp="1"/>
+          </p:cNvSpPr>
+          <p:nvPr>
+            <p:ph idx="1"/>
+          </p:nvPr>
+        </p:nvSpPr>
         <p:spPr>
           <a:xfrm>
             <a:off x="498418" y="1352362"/>
@@ -27278,7 +28122,7 @@
 </p:sld>
 </file>
 
-<file path=ppt/slides/slide39.xml><?xml version="1.0" encoding="utf-8"?>
+<file path=ppt/slides/slide44.xml><?xml version="1.0" encoding="utf-8"?>
 <p:sld xmlns:a="http://schemas.openxmlformats.org/drawingml/2006/main" xmlns:r="http://schemas.openxmlformats.org/officeDocument/2006/relationships" xmlns:p="http://schemas.openxmlformats.org/presentationml/2006/main">
   <p:cSld>
     <p:spTree>
@@ -27336,7 +28180,104 @@
 </p:sld>
 </file>
 
-<file path=ppt/slides/slide4.xml><?xml version="1.0" encoding="utf-8"?>
+<file path=ppt/slides/slide45.xml><?xml version="1.0" encoding="utf-8"?>
+<p:sld xmlns:a="http://schemas.openxmlformats.org/drawingml/2006/main" xmlns:r="http://schemas.openxmlformats.org/officeDocument/2006/relationships" xmlns:p="http://schemas.openxmlformats.org/presentationml/2006/main">
+  <p:cSld>
+    <p:spTree>
+      <p:nvGrpSpPr>
+        <p:cNvPr id="1" name=""/>
+        <p:cNvGrpSpPr/>
+        <p:nvPr/>
+      </p:nvGrpSpPr>
+      <p:grpSpPr>
+        <a:xfrm>
+          <a:off x="0" y="0"/>
+          <a:ext cx="0" cy="0"/>
+          <a:chOff x="0" y="0"/>
+          <a:chExt cx="0" cy="0"/>
+        </a:xfrm>
+      </p:grpSpPr>
+      <p:sp>
+        <p:nvSpPr>
+          <p:cNvPr id="2" name="Content Placeholder 1">
+            <a:extLst>
+              <a:ext uri="{FF2B5EF4-FFF2-40B4-BE49-F238E27FC236}">
+                <a16:creationId xmlns:a16="http://schemas.microsoft.com/office/drawing/2014/main" id="{AFF96931-CCDB-47D1-B982-0BFE2F5C618C}"/>
+              </a:ext>
+            </a:extLst>
+          </p:cNvPr>
+          <p:cNvSpPr>
+            <a:spLocks noGrp="1"/>
+          </p:cNvSpPr>
+          <p:nvPr>
+            <p:ph idx="1"/>
+          </p:nvPr>
+        </p:nvSpPr>
+        <p:spPr/>
+        <p:txBody>
+          <a:bodyPr/>
+          <a:lstStyle/>
+          <a:p>
+            <a:pPr marL="342900" indent="-342900">
+              <a:buFont typeface="Arial" panose="020B0604020202020204" pitchFamily="34" charset="0"/>
+              <a:buChar char="•"/>
+            </a:pPr>
+            <a:r>
+              <a:rPr lang="en-US" dirty="0"/>
+              <a:t>Content</a:t>
+            </a:r>
+          </a:p>
+          <a:p>
+            <a:pPr marL="342900" indent="-342900">
+              <a:buFont typeface="Arial" panose="020B0604020202020204" pitchFamily="34" charset="0"/>
+              <a:buChar char="•"/>
+            </a:pPr>
+            <a:endParaRPr lang="en-US" dirty="0"/>
+          </a:p>
+        </p:txBody>
+      </p:sp>
+      <p:sp>
+        <p:nvSpPr>
+          <p:cNvPr id="3" name="Text Placeholder 2">
+            <a:extLst>
+              <a:ext uri="{FF2B5EF4-FFF2-40B4-BE49-F238E27FC236}">
+                <a16:creationId xmlns:a16="http://schemas.microsoft.com/office/drawing/2014/main" id="{CBA50F54-F9F0-49C1-A1C9-8D18F10A83B3}"/>
+              </a:ext>
+            </a:extLst>
+          </p:cNvPr>
+          <p:cNvSpPr>
+            <a:spLocks noGrp="1"/>
+          </p:cNvSpPr>
+          <p:nvPr>
+            <p:ph type="body" sz="quarter" idx="12"/>
+          </p:nvPr>
+        </p:nvSpPr>
+        <p:spPr/>
+        <p:txBody>
+          <a:bodyPr/>
+          <a:lstStyle/>
+          <a:p>
+            <a:r>
+              <a:rPr lang="en-US" dirty="0"/>
+              <a:t>Header</a:t>
+            </a:r>
+          </a:p>
+        </p:txBody>
+      </p:sp>
+    </p:spTree>
+    <p:extLst>
+      <p:ext uri="{BB962C8B-B14F-4D97-AF65-F5344CB8AC3E}">
+        <p14:creationId xmlns:p14="http://schemas.microsoft.com/office/powerpoint/2010/main" val="2079409009"/>
+      </p:ext>
+    </p:extLst>
+  </p:cSld>
+  <p:clrMapOvr>
+    <a:masterClrMapping/>
+  </p:clrMapOvr>
+</p:sld>
+</file>
+
+<file path=ppt/slides/slide46.xml><?xml version="1.0" encoding="utf-8"?>
 <p:sld xmlns:a="http://schemas.openxmlformats.org/drawingml/2006/main" xmlns:r="http://schemas.openxmlformats.org/officeDocument/2006/relationships" xmlns:p="http://schemas.openxmlformats.org/presentationml/2006/main">
   <p:cSld>
     <p:spTree>
@@ -27358,161 +28299,6 @@
           <p:cNvPr id="2" name="Text Placeholder 1">
             <a:extLst>
               <a:ext uri="{FF2B5EF4-FFF2-40B4-BE49-F238E27FC236}">
-                <a16:creationId xmlns:a16="http://schemas.microsoft.com/office/drawing/2014/main" id="{149FE133-FF4E-4029-8D0B-291BF433476E}"/>
-              </a:ext>
-            </a:extLst>
-          </p:cNvPr>
-          <p:cNvSpPr>
-            <a:spLocks noGrp="1"/>
-          </p:cNvSpPr>
-          <p:nvPr>
-            <p:ph type="body" sz="quarter" idx="10"/>
-          </p:nvPr>
-        </p:nvSpPr>
-        <p:spPr/>
-        <p:txBody>
-          <a:bodyPr/>
-          <a:lstStyle/>
-          <a:p>
-            <a:r>
-              <a:rPr lang="en-US" dirty="0"/>
-              <a:t>Introducing Docker</a:t>
-            </a:r>
-          </a:p>
-        </p:txBody>
-      </p:sp>
-    </p:spTree>
-    <p:extLst>
-      <p:ext uri="{BB962C8B-B14F-4D97-AF65-F5344CB8AC3E}">
-        <p14:creationId xmlns:p14="http://schemas.microsoft.com/office/powerpoint/2010/main" val="3404857500"/>
-      </p:ext>
-    </p:extLst>
-  </p:cSld>
-  <p:clrMapOvr>
-    <a:masterClrMapping/>
-  </p:clrMapOvr>
-</p:sld>
-</file>
-
-<file path=ppt/slides/slide40.xml><?xml version="1.0" encoding="utf-8"?>
-<p:sld xmlns:a="http://schemas.openxmlformats.org/drawingml/2006/main" xmlns:r="http://schemas.openxmlformats.org/officeDocument/2006/relationships" xmlns:p="http://schemas.openxmlformats.org/presentationml/2006/main">
-  <p:cSld>
-    <p:spTree>
-      <p:nvGrpSpPr>
-        <p:cNvPr id="1" name=""/>
-        <p:cNvGrpSpPr/>
-        <p:nvPr/>
-      </p:nvGrpSpPr>
-      <p:grpSpPr>
-        <a:xfrm>
-          <a:off x="0" y="0"/>
-          <a:ext cx="0" cy="0"/>
-          <a:chOff x="0" y="0"/>
-          <a:chExt cx="0" cy="0"/>
-        </a:xfrm>
-      </p:grpSpPr>
-      <p:sp>
-        <p:nvSpPr>
-          <p:cNvPr id="2" name="Content Placeholder 1">
-            <a:extLst>
-              <a:ext uri="{FF2B5EF4-FFF2-40B4-BE49-F238E27FC236}">
-                <a16:creationId xmlns:a16="http://schemas.microsoft.com/office/drawing/2014/main" id="{AFF96931-CCDB-47D1-B982-0BFE2F5C618C}"/>
-              </a:ext>
-            </a:extLst>
-          </p:cNvPr>
-          <p:cNvSpPr>
-            <a:spLocks noGrp="1"/>
-          </p:cNvSpPr>
-          <p:nvPr>
-            <p:ph idx="1"/>
-          </p:nvPr>
-        </p:nvSpPr>
-        <p:spPr/>
-        <p:txBody>
-          <a:bodyPr/>
-          <a:lstStyle/>
-          <a:p>
-            <a:pPr marL="342900" indent="-342900">
-              <a:buFont typeface="Arial" panose="020B0604020202020204" pitchFamily="34" charset="0"/>
-              <a:buChar char="•"/>
-            </a:pPr>
-            <a:r>
-              <a:rPr lang="en-US" dirty="0"/>
-              <a:t>Content</a:t>
-            </a:r>
-          </a:p>
-          <a:p>
-            <a:pPr marL="342900" indent="-342900">
-              <a:buFont typeface="Arial" panose="020B0604020202020204" pitchFamily="34" charset="0"/>
-              <a:buChar char="•"/>
-            </a:pPr>
-            <a:endParaRPr lang="en-US" dirty="0"/>
-          </a:p>
-        </p:txBody>
-      </p:sp>
-      <p:sp>
-        <p:nvSpPr>
-          <p:cNvPr id="3" name="Text Placeholder 2">
-            <a:extLst>
-              <a:ext uri="{FF2B5EF4-FFF2-40B4-BE49-F238E27FC236}">
-                <a16:creationId xmlns:a16="http://schemas.microsoft.com/office/drawing/2014/main" id="{CBA50F54-F9F0-49C1-A1C9-8D18F10A83B3}"/>
-              </a:ext>
-            </a:extLst>
-          </p:cNvPr>
-          <p:cNvSpPr>
-            <a:spLocks noGrp="1"/>
-          </p:cNvSpPr>
-          <p:nvPr>
-            <p:ph type="body" sz="quarter" idx="12"/>
-          </p:nvPr>
-        </p:nvSpPr>
-        <p:spPr/>
-        <p:txBody>
-          <a:bodyPr/>
-          <a:lstStyle/>
-          <a:p>
-            <a:r>
-              <a:rPr lang="en-US" dirty="0"/>
-              <a:t>Header</a:t>
-            </a:r>
-          </a:p>
-        </p:txBody>
-      </p:sp>
-    </p:spTree>
-    <p:extLst>
-      <p:ext uri="{BB962C8B-B14F-4D97-AF65-F5344CB8AC3E}">
-        <p14:creationId xmlns:p14="http://schemas.microsoft.com/office/powerpoint/2010/main" val="2079409009"/>
-      </p:ext>
-    </p:extLst>
-  </p:cSld>
-  <p:clrMapOvr>
-    <a:masterClrMapping/>
-  </p:clrMapOvr>
-</p:sld>
-</file>
-
-<file path=ppt/slides/slide41.xml><?xml version="1.0" encoding="utf-8"?>
-<p:sld xmlns:a="http://schemas.openxmlformats.org/drawingml/2006/main" xmlns:r="http://schemas.openxmlformats.org/officeDocument/2006/relationships" xmlns:p="http://schemas.openxmlformats.org/presentationml/2006/main">
-  <p:cSld>
-    <p:spTree>
-      <p:nvGrpSpPr>
-        <p:cNvPr id="1" name=""/>
-        <p:cNvGrpSpPr/>
-        <p:nvPr/>
-      </p:nvGrpSpPr>
-      <p:grpSpPr>
-        <a:xfrm>
-          <a:off x="0" y="0"/>
-          <a:ext cx="0" cy="0"/>
-          <a:chOff x="0" y="0"/>
-          <a:chExt cx="0" cy="0"/>
-        </a:xfrm>
-      </p:grpSpPr>
-      <p:sp>
-        <p:nvSpPr>
-          <p:cNvPr id="2" name="Text Placeholder 1">
-            <a:extLst>
-              <a:ext uri="{FF2B5EF4-FFF2-40B4-BE49-F238E27FC236}">
                 <a16:creationId xmlns:a16="http://schemas.microsoft.com/office/drawing/2014/main" id="{882E656E-F534-4E9B-AF42-6610DE8D6DE7}"/>
               </a:ext>
             </a:extLst>
@@ -27549,7 +28335,7 @@
 </p:sld>
 </file>
 
-<file path=ppt/slides/slide42.xml><?xml version="1.0" encoding="utf-8"?>
+<file path=ppt/slides/slide47.xml><?xml version="1.0" encoding="utf-8"?>
 <p:sld xmlns:a="http://schemas.openxmlformats.org/drawingml/2006/main" xmlns:r="http://schemas.openxmlformats.org/officeDocument/2006/relationships" xmlns:p="http://schemas.openxmlformats.org/presentationml/2006/main">
   <p:cSld>
     <p:spTree>

</xml_diff>

<commit_message>
Fix typos and styles
</commit_message>
<xml_diff>
--- a/docs/Introduction to Docker.pptx
+++ b/docs/Introduction to Docker.pptx
@@ -1844,6 +1844,24 @@
             </a:r>
             <a:endParaRPr lang="en-US" dirty="0"/>
           </a:p>
+          <a:p>
+            <a:endParaRPr lang="en-US" dirty="0"/>
+          </a:p>
+          <a:p>
+            <a:r>
+              <a:rPr lang="en-US" dirty="0"/>
+              <a:t>Sitecore registry:</a:t>
+            </a:r>
+          </a:p>
+          <a:p>
+            <a:r>
+              <a:rPr lang="en-US" dirty="0">
+                <a:hlinkClick r:id="rId4"/>
+              </a:rPr>
+              <a:t>http://nuget1ca2/feeds/SC_Dev_Containers</a:t>
+            </a:r>
+            <a:endParaRPr lang="en-US" dirty="0"/>
+          </a:p>
         </p:txBody>
       </p:sp>
       <p:sp>
@@ -1936,7 +1954,7 @@
             </a:r>
             <a:r>
               <a:rPr lang="en-US" dirty="0"/>
-              <a:t>/03_Image_registries_and_Docker_Hub</a:t>
+              <a:t>/04_Data_Storage</a:t>
             </a:r>
           </a:p>
         </p:txBody>
@@ -2115,7 +2133,7 @@
             </a:r>
             <a:r>
               <a:rPr lang="en-US" dirty="0"/>
-              <a:t>/03_Image_registries_and_Docker_Hub</a:t>
+              <a:t>/04_Data_Storage</a:t>
             </a:r>
           </a:p>
         </p:txBody>
@@ -2341,6 +2359,109 @@
 </file>
 
 <file path=ppt/notesSlides/notesSlide21.xml><?xml version="1.0" encoding="utf-8"?>
+<p:notes xmlns:a="http://schemas.openxmlformats.org/drawingml/2006/main" xmlns:r="http://schemas.openxmlformats.org/officeDocument/2006/relationships" xmlns:p="http://schemas.openxmlformats.org/presentationml/2006/main">
+  <p:cSld>
+    <p:spTree>
+      <p:nvGrpSpPr>
+        <p:cNvPr id="1" name=""/>
+        <p:cNvGrpSpPr/>
+        <p:nvPr/>
+      </p:nvGrpSpPr>
+      <p:grpSpPr>
+        <a:xfrm>
+          <a:off x="0" y="0"/>
+          <a:ext cx="0" cy="0"/>
+          <a:chOff x="0" y="0"/>
+          <a:chExt cx="0" cy="0"/>
+        </a:xfrm>
+      </p:grpSpPr>
+      <p:sp>
+        <p:nvSpPr>
+          <p:cNvPr id="2" name="Slide Image Placeholder 1"/>
+          <p:cNvSpPr>
+            <a:spLocks noGrp="1" noRot="1" noChangeAspect="1"/>
+          </p:cNvSpPr>
+          <p:nvPr>
+            <p:ph type="sldImg"/>
+          </p:nvPr>
+        </p:nvSpPr>
+        <p:spPr/>
+      </p:sp>
+      <p:sp>
+        <p:nvSpPr>
+          <p:cNvPr id="3" name="Notes Placeholder 2"/>
+          <p:cNvSpPr>
+            <a:spLocks noGrp="1"/>
+          </p:cNvSpPr>
+          <p:nvPr>
+            <p:ph type="body" idx="1"/>
+          </p:nvPr>
+        </p:nvSpPr>
+        <p:spPr/>
+        <p:txBody>
+          <a:bodyPr/>
+          <a:lstStyle/>
+          <a:p>
+            <a:r>
+              <a:rPr lang="en-US" dirty="0"/>
+              <a:t>In docker-</a:t>
+            </a:r>
+            <a:r>
+              <a:rPr lang="en-US" dirty="0" err="1"/>
+              <a:t>compose.yml</a:t>
+            </a:r>
+            <a:r>
+              <a:rPr lang="en-US" dirty="0"/>
+              <a:t> it is possible to use </a:t>
+            </a:r>
+            <a:r>
+              <a:rPr lang="en-US" dirty="0" err="1"/>
+              <a:t>deploy.replicas</a:t>
+            </a:r>
+            <a:r>
+              <a:rPr lang="en-US" dirty="0"/>
+              <a:t> to set scaling level.</a:t>
+            </a:r>
+          </a:p>
+        </p:txBody>
+      </p:sp>
+      <p:sp>
+        <p:nvSpPr>
+          <p:cNvPr id="4" name="Slide Number Placeholder 3"/>
+          <p:cNvSpPr>
+            <a:spLocks noGrp="1"/>
+          </p:cNvSpPr>
+          <p:nvPr>
+            <p:ph type="sldNum" sz="quarter" idx="5"/>
+          </p:nvPr>
+        </p:nvSpPr>
+        <p:spPr/>
+        <p:txBody>
+          <a:bodyPr/>
+          <a:lstStyle/>
+          <a:p>
+            <a:fld id="{AA4E6B44-8A2D-409F-997F-4C23C1BB012E}" type="slidenum">
+              <a:rPr lang="en-US" smtClean="0"/>
+              <a:t>55</a:t>
+            </a:fld>
+            <a:endParaRPr lang="en-US"/>
+          </a:p>
+        </p:txBody>
+      </p:sp>
+    </p:spTree>
+    <p:extLst>
+      <p:ext uri="{BB962C8B-B14F-4D97-AF65-F5344CB8AC3E}">
+        <p14:creationId xmlns:p14="http://schemas.microsoft.com/office/powerpoint/2010/main" val="2338327581"/>
+      </p:ext>
+    </p:extLst>
+  </p:cSld>
+  <p:clrMapOvr>
+    <a:masterClrMapping/>
+  </p:clrMapOvr>
+</p:notes>
+</file>
+
+<file path=ppt/notesSlides/notesSlide22.xml><?xml version="1.0" encoding="utf-8"?>
 <p:notes xmlns:a="http://schemas.openxmlformats.org/drawingml/2006/main" xmlns:r="http://schemas.openxmlformats.org/officeDocument/2006/relationships" xmlns:p="http://schemas.openxmlformats.org/presentationml/2006/main">
   <p:cSld>
     <p:spTree>
@@ -23449,6 +23570,9 @@
           <a:lstStyle/>
           <a:p>
             <a:pPr marL="342900" indent="-342900">
+              <a:spcBef>
+                <a:spcPts val="1200"/>
+              </a:spcBef>
               <a:buFont typeface="Arial" panose="020B0604020202020204" pitchFamily="34" charset="0"/>
               <a:buChar char="•"/>
             </a:pPr>
@@ -23459,6 +23583,9 @@
           </a:p>
           <a:p>
             <a:pPr marL="342900" indent="-342900">
+              <a:spcBef>
+                <a:spcPts val="1200"/>
+              </a:spcBef>
               <a:buFont typeface="Arial" panose="020B0604020202020204" pitchFamily="34" charset="0"/>
               <a:buChar char="•"/>
             </a:pPr>
@@ -23469,12 +23596,15 @@
           </a:p>
           <a:p>
             <a:pPr marL="342900" indent="-342900">
+              <a:spcBef>
+                <a:spcPts val="1200"/>
+              </a:spcBef>
               <a:buFont typeface="Arial" panose="020B0604020202020204" pitchFamily="34" charset="0"/>
               <a:buChar char="•"/>
             </a:pPr>
             <a:r>
               <a:rPr lang="en-US" sz="2000" dirty="0"/>
-              <a:t>You can switch between Windows containers and Linux containers</a:t>
+              <a:t>You can switch between Windows containers and Linux containers.</a:t>
             </a:r>
             <a:endParaRPr lang="en-US" sz="2000" b="0" dirty="0"/>
           </a:p>
@@ -23833,6 +23963,9 @@
           <a:lstStyle/>
           <a:p>
             <a:pPr marL="342900" indent="-342900">
+              <a:spcBef>
+                <a:spcPts val="1200"/>
+              </a:spcBef>
               <a:buFont typeface="Arial" panose="020B0604020202020204" pitchFamily="34" charset="0"/>
               <a:buChar char="•"/>
             </a:pPr>
@@ -23843,16 +23976,22 @@
           </a:p>
           <a:p>
             <a:pPr marL="342900" indent="-342900">
+              <a:spcBef>
+                <a:spcPts val="1200"/>
+              </a:spcBef>
               <a:buFont typeface="Arial" panose="020B0604020202020204" pitchFamily="34" charset="0"/>
               <a:buChar char="•"/>
             </a:pPr>
             <a:r>
               <a:rPr lang="en-US" b="0" dirty="0"/>
-              <a:t>Images are typically built to run a single process. If your app needs to work with other services, you run those services in their own containers and orchestrate them so that all the containers can work together</a:t>
+              <a:t>Images are typically built to run a single process. If your app needs to work with other services, you run those services in their own containers and orchestrate them so that all the containers can work together.</a:t>
             </a:r>
           </a:p>
           <a:p>
             <a:pPr marL="342900" indent="-342900">
+              <a:spcBef>
+                <a:spcPts val="1200"/>
+              </a:spcBef>
               <a:buFont typeface="Arial" panose="020B0604020202020204" pitchFamily="34" charset="0"/>
               <a:buChar char="•"/>
             </a:pPr>
@@ -23954,6 +24093,9 @@
           <a:lstStyle/>
           <a:p>
             <a:pPr marL="342900" indent="-342900">
+              <a:spcBef>
+                <a:spcPts val="1200"/>
+              </a:spcBef>
               <a:buFont typeface="Arial" panose="020B0604020202020204" pitchFamily="34" charset="0"/>
               <a:buChar char="•"/>
             </a:pPr>
@@ -23963,7 +24105,11 @@
             </a:r>
           </a:p>
           <a:p>
-            <a:pPr marL="1028700" lvl="1" indent="-342900"/>
+            <a:pPr marL="1028700" lvl="1" indent="-342900">
+              <a:spcBef>
+                <a:spcPts val="1200"/>
+              </a:spcBef>
+            </a:pPr>
             <a:r>
               <a:rPr lang="en-US" dirty="0">
                 <a:latin typeface="Consolas" panose="020B0609020204030204" pitchFamily="49" charset="0"/>
@@ -23976,6 +24122,9 @@
           </a:p>
           <a:p>
             <a:pPr marL="342900" indent="-342900">
+              <a:spcBef>
+                <a:spcPts val="1200"/>
+              </a:spcBef>
               <a:buFont typeface="Arial" panose="020B0604020202020204" pitchFamily="34" charset="0"/>
               <a:buChar char="•"/>
             </a:pPr>
@@ -24049,13 +24198,13 @@
           <p:nvPr>
             <p:extLst>
               <p:ext uri="{D42A27DB-BD31-4B8C-83A1-F6EECF244321}">
-                <p14:modId xmlns:p14="http://schemas.microsoft.com/office/powerpoint/2010/main" val="816298275"/>
+                <p14:modId xmlns:p14="http://schemas.microsoft.com/office/powerpoint/2010/main" val="1816765642"/>
               </p:ext>
             </p:extLst>
           </p:nvPr>
         </p:nvGraphicFramePr>
         <p:xfrm>
-          <a:off x="525312" y="2687320"/>
+          <a:off x="525312" y="3284856"/>
           <a:ext cx="11168270" cy="2225040"/>
         </p:xfrm>
         <a:graphic>
@@ -24386,6 +24535,9 @@
           <a:lstStyle/>
           <a:p>
             <a:pPr marL="342900" indent="-342900">
+              <a:spcBef>
+                <a:spcPts val="1200"/>
+              </a:spcBef>
               <a:buFont typeface="Arial" panose="020B0604020202020204" pitchFamily="34" charset="0"/>
               <a:buChar char="•"/>
             </a:pPr>
@@ -24395,7 +24547,11 @@
             </a:r>
           </a:p>
           <a:p>
-            <a:pPr marL="1028700" lvl="1" indent="-342900"/>
+            <a:pPr marL="1028700" lvl="1" indent="-342900">
+              <a:spcBef>
+                <a:spcPts val="1200"/>
+              </a:spcBef>
+            </a:pPr>
             <a:r>
               <a:rPr lang="en-US" dirty="0">
                 <a:latin typeface="Consolas" panose="020B0609020204030204" pitchFamily="49" charset="0"/>
@@ -24408,6 +24564,9 @@
           </a:p>
           <a:p>
             <a:pPr marL="342900" indent="-342900">
+              <a:spcBef>
+                <a:spcPts val="1200"/>
+              </a:spcBef>
               <a:buFont typeface="Arial" panose="020B0604020202020204" pitchFamily="34" charset="0"/>
               <a:buChar char="•"/>
             </a:pPr>
@@ -24481,13 +24640,13 @@
           <p:nvPr>
             <p:extLst>
               <p:ext uri="{D42A27DB-BD31-4B8C-83A1-F6EECF244321}">
-                <p14:modId xmlns:p14="http://schemas.microsoft.com/office/powerpoint/2010/main" val="3060113552"/>
+                <p14:modId xmlns:p14="http://schemas.microsoft.com/office/powerpoint/2010/main" val="2852252805"/>
               </p:ext>
             </p:extLst>
           </p:nvPr>
         </p:nvGraphicFramePr>
         <p:xfrm>
-          <a:off x="525312" y="2687320"/>
+          <a:off x="525312" y="3094721"/>
           <a:ext cx="11168270" cy="2225040"/>
         </p:xfrm>
         <a:graphic>
@@ -25436,15 +25595,29 @@
           <a:bodyPr/>
           <a:lstStyle/>
           <a:p>
-            <a:r>
-              <a:rPr lang="en-US" dirty="0"/>
-              <a:t>Build process is executed by the docker service/daemon</a:t>
-            </a:r>
-          </a:p>
-          <a:p>
-            <a:r>
-              <a:rPr lang="en-US" dirty="0"/>
-              <a:t>Build context and docker file are sent to service to create an image</a:t>
+            <a:pPr marL="342900" indent="-342900">
+              <a:spcBef>
+                <a:spcPts val="1200"/>
+              </a:spcBef>
+              <a:buFont typeface="Arial" panose="020B0604020202020204" pitchFamily="34" charset="0"/>
+              <a:buChar char="•"/>
+            </a:pPr>
+            <a:r>
+              <a:rPr lang="en-US" dirty="0"/>
+              <a:t>Build process is executed by the docker service/daemon.</a:t>
+            </a:r>
+          </a:p>
+          <a:p>
+            <a:pPr marL="342900" indent="-342900">
+              <a:spcBef>
+                <a:spcPts val="1200"/>
+              </a:spcBef>
+              <a:buFont typeface="Arial" panose="020B0604020202020204" pitchFamily="34" charset="0"/>
+              <a:buChar char="•"/>
+            </a:pPr>
+            <a:r>
+              <a:rPr lang="en-US" dirty="0"/>
+              <a:t>Build context and docker file are sent to service to create an image.</a:t>
             </a:r>
           </a:p>
           <a:p>
@@ -25567,13 +25740,13 @@
           <a:p>
             <a:r>
               <a:rPr lang="en-US" sz="2000" dirty="0"/>
-              <a:t>Each command in a docker file creates a new “temp” image. So result image is set of layers.</a:t>
+              <a:t>Each command in a docker file creates a new “temp” image. So resulting image is a set of layers.</a:t>
             </a:r>
           </a:p>
           <a:p>
             <a:r>
               <a:rPr lang="en-US" sz="2000" dirty="0"/>
-              <a:t>All temp images are cached and used when possible</a:t>
+              <a:t>All temp images are cached and used when possible.</a:t>
             </a:r>
           </a:p>
         </p:txBody>
@@ -26278,7 +26451,7 @@
           <a:p>
             <a:r>
               <a:rPr lang="en-US" sz="2000" dirty="0"/>
-              <a:t>Defines base image for the image</a:t>
+              <a:t>Defines base image for the image.</a:t>
             </a:r>
           </a:p>
           <a:p>
@@ -26287,7 +26460,7 @@
           <a:p>
             <a:r>
               <a:rPr lang="en-US" sz="2000" dirty="0"/>
-              <a:t>The only mandatory command</a:t>
+              <a:t>The only mandatory command.</a:t>
             </a:r>
           </a:p>
           <a:p>
@@ -26300,15 +26473,33 @@
             </a:r>
           </a:p>
           <a:p>
+            <a:pPr marL="342900" indent="-342900">
+              <a:buFont typeface="Arial" panose="020B0604020202020204" pitchFamily="34" charset="0"/>
+              <a:buChar char="•"/>
+            </a:pPr>
             <a:r>
               <a:rPr lang="en-US" sz="2000" dirty="0"/>
-              <a:t>Use official images where possible</a:t>
-            </a:r>
-          </a:p>
-          <a:p>
+              <a:t>Use official images where possible.</a:t>
+            </a:r>
+          </a:p>
+          <a:p>
+            <a:pPr marL="342900" indent="-342900">
+              <a:buFont typeface="Arial" panose="020B0604020202020204" pitchFamily="34" charset="0"/>
+              <a:buChar char="•"/>
+            </a:pPr>
             <a:r>
               <a:rPr lang="en-US" sz="2000" dirty="0"/>
-              <a:t>Use version tags to avoid latest hell</a:t>
+              <a:t>Use version tags to avoid </a:t>
+            </a:r>
+            <a:r>
+              <a:rPr lang="en-US" sz="2000" dirty="0">
+                <a:latin typeface="Consolas" panose="020B0609020204030204" pitchFamily="49" charset="0"/>
+              </a:rPr>
+              <a:t>latest</a:t>
+            </a:r>
+            <a:r>
+              <a:rPr lang="en-US" sz="2000" dirty="0"/>
+              <a:t> hell.</a:t>
             </a:r>
           </a:p>
         </p:txBody>
@@ -26502,7 +26693,7 @@
           <a:p>
             <a:r>
               <a:rPr lang="en-US" sz="2000" dirty="0"/>
-              <a:t>Runs a command in the build context</a:t>
+              <a:t>Runs a command in the build context.</a:t>
             </a:r>
           </a:p>
           <a:p>
@@ -26521,7 +26712,7 @@
             </a:pPr>
             <a:r>
               <a:rPr lang="en-US" dirty="0"/>
-              <a:t>Each run command creates a new layer – better to compose several in 1 line</a:t>
+              <a:t>Each run command creates a new layer – better to compose several in 1 line.</a:t>
             </a:r>
           </a:p>
           <a:p>
@@ -26531,13 +26722,8 @@
             </a:pPr>
             <a:r>
               <a:rPr lang="en-US" dirty="0"/>
-              <a:t>Cache is used, so you may have weird </a:t>
-            </a:r>
-            <a:r>
-              <a:rPr lang="en-US" dirty="0" err="1"/>
-              <a:t>behaviour</a:t>
-            </a:r>
-            <a:endParaRPr lang="en-US" dirty="0"/>
+              <a:t>Cache is used, so you may have weird behavior.</a:t>
+            </a:r>
           </a:p>
         </p:txBody>
       </p:sp>
@@ -26730,7 +26916,7 @@
           <a:p>
             <a:r>
               <a:rPr lang="en-US" sz="2000" dirty="0"/>
-              <a:t>Copy files from build context to the image</a:t>
+              <a:t>Copy files from build context to the image.</a:t>
             </a:r>
           </a:p>
           <a:p>
@@ -26749,7 +26935,7 @@
             </a:pPr>
             <a:r>
               <a:rPr lang="en-US" dirty="0"/>
-              <a:t>Wildcards can be used</a:t>
+              <a:t>Wildcards can be used.</a:t>
             </a:r>
           </a:p>
           <a:p>
@@ -26759,7 +26945,7 @@
             </a:pPr>
             <a:r>
               <a:rPr lang="en-US" dirty="0"/>
-              <a:t>Only files from build context is available, but not the whole FS </a:t>
+              <a:t>Only files from build context are available, but not the whole FS. </a:t>
             </a:r>
           </a:p>
         </p:txBody>
@@ -26953,7 +27139,7 @@
           <a:p>
             <a:r>
               <a:rPr lang="en-US" sz="2000" dirty="0"/>
-              <a:t>Sets default execution command for the container</a:t>
+              <a:t>Sets default execution command for the container.</a:t>
             </a:r>
           </a:p>
           <a:p>
@@ -26978,7 +27164,10 @@
               <a:rPr lang="en-US" dirty="0" err="1"/>
               <a:t>dockerfile</a:t>
             </a:r>
-            <a:endParaRPr lang="en-US" dirty="0"/>
+            <a:r>
+              <a:rPr lang="en-US" dirty="0"/>
+              <a:t>.</a:t>
+            </a:r>
           </a:p>
           <a:p>
             <a:pPr marL="342900" indent="-342900">
@@ -26987,7 +27176,7 @@
             </a:pPr>
             <a:r>
               <a:rPr lang="en-US" dirty="0"/>
-              <a:t>Might be omitted</a:t>
+              <a:t>Might be omitted in certain cases.</a:t>
             </a:r>
           </a:p>
         </p:txBody>
@@ -27204,6 +27393,9 @@
           <a:lstStyle/>
           <a:p>
             <a:pPr marL="342900" indent="-342900">
+              <a:spcBef>
+                <a:spcPts val="1200"/>
+              </a:spcBef>
               <a:buFont typeface="Arial" panose="020B0604020202020204" pitchFamily="34" charset="0"/>
               <a:buChar char="•"/>
             </a:pPr>
@@ -27228,6 +27420,9 @@
           </a:p>
           <a:p>
             <a:pPr marL="342900" indent="-342900">
+              <a:spcBef>
+                <a:spcPts val="1200"/>
+              </a:spcBef>
               <a:buFont typeface="Arial" panose="020B0604020202020204" pitchFamily="34" charset="0"/>
               <a:buChar char="•"/>
             </a:pPr>
@@ -27238,6 +27433,9 @@
           </a:p>
           <a:p>
             <a:pPr marL="342900" indent="-342900">
+              <a:spcBef>
+                <a:spcPts val="1200"/>
+              </a:spcBef>
               <a:buFont typeface="Arial" panose="020B0604020202020204" pitchFamily="34" charset="0"/>
               <a:buChar char="•"/>
             </a:pPr>
@@ -27248,6 +27446,9 @@
           </a:p>
           <a:p>
             <a:pPr marL="342900" indent="-342900">
+              <a:spcBef>
+                <a:spcPts val="1200"/>
+              </a:spcBef>
               <a:buFont typeface="Arial" panose="020B0604020202020204" pitchFamily="34" charset="0"/>
               <a:buChar char="•"/>
             </a:pPr>
@@ -27469,6 +27670,9 @@
           <a:lstStyle/>
           <a:p>
             <a:pPr marL="342900" indent="-342900">
+              <a:spcBef>
+                <a:spcPts val="1200"/>
+              </a:spcBef>
               <a:buFont typeface="Arial" panose="020B0604020202020204" pitchFamily="34" charset="0"/>
               <a:buChar char="•"/>
             </a:pPr>
@@ -27489,6 +27693,9 @@
           </a:p>
           <a:p>
             <a:pPr marL="342900" indent="-342900">
+              <a:spcBef>
+                <a:spcPts val="1200"/>
+              </a:spcBef>
               <a:buFont typeface="Arial" panose="020B0604020202020204" pitchFamily="34" charset="0"/>
               <a:buChar char="•"/>
             </a:pPr>
@@ -27507,6 +27714,9 @@
           </a:p>
           <a:p>
             <a:pPr marL="342900" indent="-342900">
+              <a:spcBef>
+                <a:spcPts val="1200"/>
+              </a:spcBef>
               <a:buFont typeface="Arial" panose="020B0604020202020204" pitchFamily="34" charset="0"/>
               <a:buChar char="•"/>
             </a:pPr>
@@ -27517,6 +27727,9 @@
           </a:p>
           <a:p>
             <a:pPr marL="342900" indent="-342900">
+              <a:spcBef>
+                <a:spcPts val="1200"/>
+              </a:spcBef>
               <a:buFont typeface="Arial" panose="020B0604020202020204" pitchFamily="34" charset="0"/>
               <a:buChar char="•"/>
             </a:pPr>
@@ -27620,6 +27833,9 @@
           <a:lstStyle/>
           <a:p>
             <a:pPr marL="342900" indent="-342900">
+              <a:spcBef>
+                <a:spcPts val="1200"/>
+              </a:spcBef>
               <a:buFont typeface="Arial" panose="020B0604020202020204" pitchFamily="34" charset="0"/>
               <a:buChar char="•"/>
             </a:pPr>
@@ -27630,6 +27846,9 @@
           </a:p>
           <a:p>
             <a:pPr marL="342900" indent="-342900">
+              <a:spcBef>
+                <a:spcPts val="1200"/>
+              </a:spcBef>
               <a:buFont typeface="Arial" panose="020B0604020202020204" pitchFamily="34" charset="0"/>
               <a:buChar char="•"/>
             </a:pPr>
@@ -27650,6 +27869,9 @@
           </a:p>
           <a:p>
             <a:pPr marL="342900" indent="-342900">
+              <a:spcBef>
+                <a:spcPts val="1200"/>
+              </a:spcBef>
               <a:buFont typeface="Arial" panose="020B0604020202020204" pitchFamily="34" charset="0"/>
               <a:buChar char="•"/>
             </a:pPr>
@@ -27676,6 +27898,9 @@
           </a:p>
           <a:p>
             <a:pPr marL="342900" indent="-342900">
+              <a:spcBef>
+                <a:spcPts val="1200"/>
+              </a:spcBef>
               <a:buFont typeface="Arial" panose="020B0604020202020204" pitchFamily="34" charset="0"/>
               <a:buChar char="•"/>
             </a:pPr>
@@ -27772,6 +27997,9 @@
           <a:lstStyle/>
           <a:p>
             <a:pPr marL="342900" indent="-342900">
+              <a:spcBef>
+                <a:spcPts val="1200"/>
+              </a:spcBef>
               <a:buFont typeface="Arial" panose="020B0604020202020204" pitchFamily="34" charset="0"/>
               <a:buChar char="•"/>
             </a:pPr>
@@ -27781,7 +28009,11 @@
             </a:r>
           </a:p>
           <a:p>
-            <a:pPr marL="1028700" lvl="1" indent="-342900"/>
+            <a:pPr marL="1028700" lvl="1" indent="-342900">
+              <a:spcBef>
+                <a:spcPts val="1200"/>
+              </a:spcBef>
+            </a:pPr>
             <a:r>
               <a:rPr lang="en-US" dirty="0">
                 <a:latin typeface="Consolas" panose="020B0609020204030204" pitchFamily="49" charset="0"/>
@@ -27791,6 +28023,9 @@
           </a:p>
           <a:p>
             <a:pPr marL="342900" indent="-342900">
+              <a:spcBef>
+                <a:spcPts val="1200"/>
+              </a:spcBef>
               <a:buFont typeface="Arial" panose="020B0604020202020204" pitchFamily="34" charset="0"/>
               <a:buChar char="•"/>
             </a:pPr>
@@ -27814,7 +28049,11 @@
             </a:r>
           </a:p>
           <a:p>
-            <a:pPr marL="1028700" lvl="1" indent="-342900"/>
+            <a:pPr marL="1028700" lvl="1" indent="-342900">
+              <a:spcBef>
+                <a:spcPts val="1200"/>
+              </a:spcBef>
+            </a:pPr>
             <a:r>
               <a:rPr lang="en-US" b="0" dirty="0"/>
               <a:t>docker image push [OPTIONS] NAME[:TAG] </a:t>
@@ -27822,6 +28061,9 @@
           </a:p>
           <a:p>
             <a:pPr marL="342900" indent="-342900">
+              <a:spcBef>
+                <a:spcPts val="1200"/>
+              </a:spcBef>
               <a:buFont typeface="Arial" panose="020B0604020202020204" pitchFamily="34" charset="0"/>
               <a:buChar char="•"/>
             </a:pPr>
@@ -27928,6 +28170,9 @@
           <a:lstStyle/>
           <a:p>
             <a:pPr marL="342900" indent="-342900">
+              <a:spcBef>
+                <a:spcPts val="1200"/>
+              </a:spcBef>
               <a:buFont typeface="Arial" panose="020B0604020202020204" pitchFamily="34" charset="0"/>
               <a:buChar char="•"/>
             </a:pPr>
@@ -27938,6 +28183,9 @@
           </a:p>
           <a:p>
             <a:pPr marL="342900" indent="-342900">
+              <a:spcBef>
+                <a:spcPts val="1200"/>
+              </a:spcBef>
               <a:buFont typeface="Arial" panose="020B0604020202020204" pitchFamily="34" charset="0"/>
               <a:buChar char="•"/>
             </a:pPr>
@@ -27947,7 +28195,11 @@
             </a:r>
           </a:p>
           <a:p>
-            <a:pPr marL="1028700" lvl="1" indent="-342900"/>
+            <a:pPr marL="1028700" lvl="1" indent="-342900">
+              <a:spcBef>
+                <a:spcPts val="1200"/>
+              </a:spcBef>
+            </a:pPr>
             <a:r>
               <a:rPr lang="en-US" dirty="0">
                 <a:latin typeface="Consolas" panose="020B0609020204030204" pitchFamily="49" charset="0"/>
@@ -28036,12 +28288,20 @@
             <p:ph idx="1"/>
           </p:nvPr>
         </p:nvSpPr>
-        <p:spPr/>
+        <p:spPr>
+          <a:xfrm>
+            <a:off x="498418" y="1093509"/>
+            <a:ext cx="11168270" cy="5026183"/>
+          </a:xfrm>
+        </p:spPr>
         <p:txBody>
           <a:bodyPr/>
           <a:lstStyle/>
           <a:p>
             <a:pPr marL="342900" indent="-342900">
+              <a:spcBef>
+                <a:spcPts val="1200"/>
+              </a:spcBef>
               <a:buFont typeface="Arial" panose="020B0604020202020204" pitchFamily="34" charset="0"/>
               <a:buChar char="•"/>
             </a:pPr>
@@ -28072,6 +28332,9 @@
           </a:p>
           <a:p>
             <a:pPr marL="342900" indent="-342900">
+              <a:spcBef>
+                <a:spcPts val="1200"/>
+              </a:spcBef>
               <a:buFont typeface="Arial" panose="020B0604020202020204" pitchFamily="34" charset="0"/>
               <a:buChar char="•"/>
             </a:pPr>
@@ -28096,6 +28359,9 @@
           </a:p>
           <a:p>
             <a:pPr marL="342900" indent="-342900">
+              <a:spcBef>
+                <a:spcPts val="1200"/>
+              </a:spcBef>
               <a:buFont typeface="Arial" panose="020B0604020202020204" pitchFamily="34" charset="0"/>
               <a:buChar char="•"/>
             </a:pPr>
@@ -28106,12 +28372,35 @@
           </a:p>
           <a:p>
             <a:pPr marL="342900" indent="-342900">
+              <a:spcBef>
+                <a:spcPts val="1200"/>
+              </a:spcBef>
               <a:buFont typeface="Arial" panose="020B0604020202020204" pitchFamily="34" charset="0"/>
               <a:buChar char="•"/>
             </a:pPr>
             <a:r>
               <a:rPr lang="en-US" b="0" dirty="0"/>
-              <a:t>It’s important to specify a tag for base images in your FROM instruction. If you don’t, the image tagged as latest will be used. That tag can change to a different image without warning, and there can be breaking changes between image versions, which means your own images might fail to build.</a:t>
+              <a:t>It’s important to specify a tag for base images in your </a:t>
+            </a:r>
+            <a:r>
+              <a:rPr lang="en-US" b="0" dirty="0">
+                <a:latin typeface="Consolas" panose="020B0609020204030204" pitchFamily="49" charset="0"/>
+              </a:rPr>
+              <a:t>FROM</a:t>
+            </a:r>
+            <a:r>
+              <a:rPr lang="en-US" b="0" dirty="0"/>
+              <a:t> instruction. If you don’t, the image tagged as </a:t>
+            </a:r>
+            <a:r>
+              <a:rPr lang="en-US" b="0" dirty="0">
+                <a:latin typeface="Consolas" panose="020B0609020204030204" pitchFamily="49" charset="0"/>
+              </a:rPr>
+              <a:t>latest</a:t>
+            </a:r>
+            <a:r>
+              <a:rPr lang="en-US" b="0" dirty="0"/>
+              <a:t> will be used. That tag can change to a different image without warning, and there can be breaking changes between image versions, which means your own images might fail to build.</a:t>
             </a:r>
           </a:p>
         </p:txBody>
@@ -28201,6 +28490,9 @@
           <a:lstStyle/>
           <a:p>
             <a:pPr marL="342900" indent="-342900">
+              <a:spcBef>
+                <a:spcPts val="1200"/>
+              </a:spcBef>
               <a:buFont typeface="Arial" panose="020B0604020202020204" pitchFamily="34" charset="0"/>
               <a:buChar char="•"/>
             </a:pPr>
@@ -28212,6 +28504,9 @@
           </a:p>
           <a:p>
             <a:pPr marL="342900" indent="-342900">
+              <a:spcBef>
+                <a:spcPts val="1200"/>
+              </a:spcBef>
               <a:buFont typeface="Arial" panose="020B0604020202020204" pitchFamily="34" charset="0"/>
               <a:buChar char="•"/>
             </a:pPr>
@@ -28222,6 +28517,9 @@
           </a:p>
           <a:p>
             <a:pPr marL="342900" indent="-342900">
+              <a:spcBef>
+                <a:spcPts val="1200"/>
+              </a:spcBef>
               <a:buFont typeface="Arial" panose="020B0604020202020204" pitchFamily="34" charset="0"/>
               <a:buChar char="•"/>
             </a:pPr>
@@ -28315,12 +28613,20 @@
             <p:ph idx="1"/>
           </p:nvPr>
         </p:nvSpPr>
-        <p:spPr/>
+        <p:spPr>
+          <a:xfrm>
+            <a:off x="498418" y="914400"/>
+            <a:ext cx="11168270" cy="5205292"/>
+          </a:xfrm>
+        </p:spPr>
         <p:txBody>
           <a:bodyPr/>
           <a:lstStyle/>
           <a:p>
             <a:pPr marL="342900" indent="-342900">
+              <a:spcBef>
+                <a:spcPts val="1200"/>
+              </a:spcBef>
               <a:buFont typeface="Arial" panose="020B0604020202020204" pitchFamily="34" charset="0"/>
               <a:buChar char="•"/>
             </a:pPr>
@@ -28344,7 +28650,11 @@
             </a:r>
           </a:p>
           <a:p>
-            <a:pPr marL="1028700" lvl="1" indent="-342900"/>
+            <a:pPr marL="1028700" lvl="1" indent="-342900">
+              <a:spcBef>
+                <a:spcPts val="1200"/>
+              </a:spcBef>
+            </a:pPr>
             <a:r>
               <a:rPr lang="en-US" b="0" dirty="0">
                 <a:latin typeface="Consolas" panose="020B0609020204030204" pitchFamily="49" charset="0"/>
@@ -28370,6 +28680,9 @@
           </a:p>
           <a:p>
             <a:pPr marL="342900" indent="-342900">
+              <a:spcBef>
+                <a:spcPts val="1200"/>
+              </a:spcBef>
               <a:buFont typeface="Arial" panose="020B0604020202020204" pitchFamily="34" charset="0"/>
               <a:buChar char="•"/>
             </a:pPr>
@@ -28379,7 +28692,11 @@
             </a:r>
           </a:p>
           <a:p>
-            <a:pPr marL="1028700" lvl="1" indent="-342900"/>
+            <a:pPr marL="1028700" lvl="1" indent="-342900">
+              <a:spcBef>
+                <a:spcPts val="1200"/>
+              </a:spcBef>
+            </a:pPr>
             <a:r>
               <a:rPr lang="en-US" b="0" dirty="0">
                 <a:latin typeface="Consolas" panose="020B0609020204030204" pitchFamily="49" charset="0"/>
@@ -28413,6 +28730,9 @@
           </a:p>
           <a:p>
             <a:pPr marL="342900" indent="-342900">
+              <a:spcBef>
+                <a:spcPts val="1200"/>
+              </a:spcBef>
               <a:buFont typeface="Arial" panose="020B0604020202020204" pitchFamily="34" charset="0"/>
               <a:buChar char="•"/>
             </a:pPr>
@@ -28422,7 +28742,11 @@
             </a:r>
           </a:p>
           <a:p>
-            <a:pPr marL="1028700" lvl="1" indent="-342900"/>
+            <a:pPr marL="1028700" lvl="1" indent="-342900">
+              <a:spcBef>
+                <a:spcPts val="1200"/>
+              </a:spcBef>
+            </a:pPr>
             <a:r>
               <a:rPr lang="en-US" b="0" dirty="0">
                 <a:latin typeface="Consolas" panose="020B0609020204030204" pitchFamily="49" charset="0"/>
@@ -29068,7 +29392,7 @@
           <a:p>
             <a:r>
               <a:rPr lang="en-US" dirty="0"/>
-              <a:t>Each container has its own RW layer in file system, but base images FSs are RO</a:t>
+              <a:t>Each container has its own RW layer in file system, but base images FSs are RO.</a:t>
             </a:r>
           </a:p>
           <a:p>
@@ -29077,7 +29401,7 @@
           <a:p>
             <a:r>
               <a:rPr lang="en-US" dirty="0"/>
-              <a:t>As a result, each container starts exactly in the same state as other containers started from the same image</a:t>
+              <a:t>As a result, each container starts exactly in the same state as other containers started from the same image.</a:t>
             </a:r>
           </a:p>
         </p:txBody>
@@ -29570,49 +29894,68 @@
           <a:bodyPr/>
           <a:lstStyle/>
           <a:p>
-            <a:r>
-              <a:rPr lang="en-US" dirty="0"/>
-              <a:t>Volumes might be used</a:t>
-            </a:r>
-          </a:p>
-          <a:p>
-            <a:endParaRPr lang="en-US" dirty="0"/>
-          </a:p>
-          <a:p>
-            <a:r>
-              <a:rPr lang="en-US" dirty="0"/>
-              <a:t>You may share:</a:t>
-            </a:r>
-          </a:p>
-          <a:p>
             <a:pPr marL="342900" indent="-342900">
+              <a:spcBef>
+                <a:spcPts val="1200"/>
+              </a:spcBef>
               <a:buFont typeface="Arial" panose="020B0604020202020204" pitchFamily="34" charset="0"/>
               <a:buChar char="•"/>
             </a:pPr>
             <a:r>
               <a:rPr lang="en-US" dirty="0"/>
-              <a:t>Data volumes (DBs</a:t>
-            </a:r>
-            <a:r>
-              <a:rPr lang="en-US"/>
-              <a:t>, indexes)</a:t>
-            </a:r>
-            <a:endParaRPr lang="en-US" dirty="0"/>
+              <a:t>Volumes might be used</a:t>
+            </a:r>
           </a:p>
           <a:p>
             <a:pPr marL="342900" indent="-342900">
+              <a:spcBef>
+                <a:spcPts val="1200"/>
+              </a:spcBef>
               <a:buFont typeface="Arial" panose="020B0604020202020204" pitchFamily="34" charset="0"/>
               <a:buChar char="•"/>
             </a:pPr>
-            <a:r>
-              <a:rPr lang="en-US" dirty="0"/>
-              <a:t>Folders (folder to write logs to)</a:t>
-            </a:r>
+            <a:endParaRPr lang="en-US" dirty="0"/>
           </a:p>
           <a:p>
             <a:pPr marL="342900" indent="-342900">
+              <a:spcBef>
+                <a:spcPts val="1200"/>
+              </a:spcBef>
               <a:buFont typeface="Arial" panose="020B0604020202020204" pitchFamily="34" charset="0"/>
               <a:buChar char="•"/>
+            </a:pPr>
+            <a:r>
+              <a:rPr lang="en-US" dirty="0"/>
+              <a:t>You may share:</a:t>
+            </a:r>
+          </a:p>
+          <a:p>
+            <a:pPr marL="1028700" lvl="1" indent="-342900">
+              <a:spcBef>
+                <a:spcPts val="1200"/>
+              </a:spcBef>
+            </a:pPr>
+            <a:r>
+              <a:rPr lang="en-US" dirty="0"/>
+              <a:t>Data volumes (DBs, indexes)</a:t>
+            </a:r>
+          </a:p>
+          <a:p>
+            <a:pPr marL="1028700" lvl="1" indent="-342900">
+              <a:spcBef>
+                <a:spcPts val="1200"/>
+              </a:spcBef>
+            </a:pPr>
+            <a:r>
+              <a:rPr lang="en-US" dirty="0"/>
+              <a:t>Folders (folder to write logs to)</a:t>
+            </a:r>
+          </a:p>
+          <a:p>
+            <a:pPr marL="1028700" lvl="1" indent="-342900">
+              <a:spcBef>
+                <a:spcPts val="1200"/>
+              </a:spcBef>
             </a:pPr>
             <a:r>
               <a:rPr lang="en-US" dirty="0"/>
@@ -29759,6 +30102,9 @@
           <a:lstStyle/>
           <a:p>
             <a:pPr marL="342900" indent="-342900">
+              <a:spcBef>
+                <a:spcPts val="1200"/>
+              </a:spcBef>
               <a:buFont typeface="Arial" panose="020B0604020202020204" pitchFamily="34" charset="0"/>
               <a:buChar char="•"/>
             </a:pPr>
@@ -29769,6 +30115,9 @@
           </a:p>
           <a:p>
             <a:pPr marL="342900" indent="-342900">
+              <a:spcBef>
+                <a:spcPts val="1200"/>
+              </a:spcBef>
               <a:buFont typeface="Arial" panose="020B0604020202020204" pitchFamily="34" charset="0"/>
               <a:buChar char="•"/>
             </a:pPr>
@@ -29779,6 +30128,9 @@
           </a:p>
           <a:p>
             <a:pPr marL="342900" indent="-342900">
+              <a:spcBef>
+                <a:spcPts val="1200"/>
+              </a:spcBef>
               <a:buFont typeface="Arial" panose="020B0604020202020204" pitchFamily="34" charset="0"/>
               <a:buChar char="•"/>
             </a:pPr>
@@ -29905,6 +30257,9 @@
           <a:lstStyle/>
           <a:p>
             <a:pPr marL="342900" indent="-342900">
+              <a:spcBef>
+                <a:spcPts val="1200"/>
+              </a:spcBef>
               <a:buFont typeface="Arial" panose="020B0604020202020204" pitchFamily="34" charset="0"/>
               <a:buChar char="•"/>
             </a:pPr>
@@ -29915,6 +30270,9 @@
           </a:p>
           <a:p>
             <a:pPr marL="342900" indent="-342900">
+              <a:spcBef>
+                <a:spcPts val="1200"/>
+              </a:spcBef>
               <a:buFont typeface="Arial" panose="020B0604020202020204" pitchFamily="34" charset="0"/>
               <a:buChar char="•"/>
             </a:pPr>
@@ -29925,6 +30283,9 @@
           </a:p>
           <a:p>
             <a:pPr marL="342900" indent="-342900">
+              <a:spcBef>
+                <a:spcPts val="1200"/>
+              </a:spcBef>
               <a:buFont typeface="Arial" panose="020B0604020202020204" pitchFamily="34" charset="0"/>
               <a:buChar char="•"/>
             </a:pPr>
@@ -30039,6 +30400,9 @@
           <a:lstStyle/>
           <a:p>
             <a:pPr marL="342900" indent="-342900">
+              <a:spcBef>
+                <a:spcPts val="1200"/>
+              </a:spcBef>
               <a:buFont typeface="Arial" panose="020B0604020202020204" pitchFamily="34" charset="0"/>
               <a:buChar char="•"/>
             </a:pPr>
@@ -30048,7 +30412,11 @@
             </a:r>
           </a:p>
           <a:p>
-            <a:pPr marL="1028700" lvl="1" indent="-342900"/>
+            <a:pPr marL="1028700" lvl="1" indent="-342900">
+              <a:spcBef>
+                <a:spcPts val="1200"/>
+              </a:spcBef>
+            </a:pPr>
             <a:r>
               <a:rPr lang="en-US" b="0" dirty="0">
                 <a:latin typeface="Consolas" panose="020B0609020204030204" pitchFamily="49" charset="0"/>
@@ -30067,6 +30435,9 @@
           </a:p>
           <a:p>
             <a:pPr marL="342900" indent="-342900">
+              <a:spcBef>
+                <a:spcPts val="1200"/>
+              </a:spcBef>
               <a:buFont typeface="Arial" panose="020B0604020202020204" pitchFamily="34" charset="0"/>
               <a:buChar char="•"/>
             </a:pPr>
@@ -30076,7 +30447,11 @@
             </a:r>
           </a:p>
           <a:p>
-            <a:pPr marL="1028700" lvl="1" indent="-342900"/>
+            <a:pPr marL="1028700" lvl="1" indent="-342900">
+              <a:spcBef>
+                <a:spcPts val="1200"/>
+              </a:spcBef>
+            </a:pPr>
             <a:r>
               <a:rPr lang="en-US" dirty="0">
                 <a:latin typeface="Consolas" panose="020B0609020204030204" pitchFamily="49" charset="0"/>
@@ -30119,6 +30494,9 @@
           </a:p>
           <a:p>
             <a:pPr marL="342900" indent="-342900">
+              <a:spcBef>
+                <a:spcPts val="1200"/>
+              </a:spcBef>
               <a:buFont typeface="Arial" panose="020B0604020202020204" pitchFamily="34" charset="0"/>
               <a:buChar char="•"/>
             </a:pPr>
@@ -30238,12 +30616,15 @@
           <a:lstStyle/>
           <a:p>
             <a:pPr marL="342900" indent="-342900">
+              <a:spcBef>
+                <a:spcPts val="1200"/>
+              </a:spcBef>
               <a:buFont typeface="Arial" panose="020B0604020202020204" pitchFamily="34" charset="0"/>
               <a:buChar char="•"/>
             </a:pPr>
             <a:r>
               <a:rPr lang="en-US" b="0" dirty="0"/>
-              <a:t>We can get the IP address either by inspecting the container or the network.</a:t>
+              <a:t>We can get the IP address either by inspecting the container or the network:</a:t>
             </a:r>
             <a:r>
               <a:rPr lang="en-US" b="1" dirty="0"/>
@@ -30256,7 +30637,11 @@
             <a:endParaRPr lang="ru-UA" dirty="0"/>
           </a:p>
           <a:p>
-            <a:pPr marL="1028700" lvl="1" indent="-342900"/>
+            <a:pPr marL="1028700" lvl="1" indent="-342900">
+              <a:spcBef>
+                <a:spcPts val="1200"/>
+              </a:spcBef>
+            </a:pPr>
             <a:r>
               <a:rPr lang="en-US" b="0" dirty="0">
                 <a:latin typeface="Consolas" panose="020B0609020204030204" pitchFamily="49" charset="0"/>
@@ -30275,6 +30660,9 @@
           </a:p>
           <a:p>
             <a:pPr marL="342900" indent="-342900">
+              <a:spcBef>
+                <a:spcPts val="1200"/>
+              </a:spcBef>
               <a:buFont typeface="Arial" panose="020B0604020202020204" pitchFamily="34" charset="0"/>
               <a:buChar char="•"/>
             </a:pPr>
@@ -30285,6 +30673,9 @@
           </a:p>
           <a:p>
             <a:pPr marL="342900" indent="-342900">
+              <a:spcBef>
+                <a:spcPts val="1200"/>
+              </a:spcBef>
               <a:buFont typeface="Arial" panose="020B0604020202020204" pitchFamily="34" charset="0"/>
               <a:buChar char="•"/>
             </a:pPr>
@@ -30458,6 +30849,9 @@
           <a:lstStyle/>
           <a:p>
             <a:pPr marL="342900" indent="-342900">
+              <a:spcBef>
+                <a:spcPts val="1200"/>
+              </a:spcBef>
               <a:buFont typeface="Arial" panose="020B0604020202020204" pitchFamily="34" charset="0"/>
               <a:buChar char="•"/>
             </a:pPr>
@@ -30468,6 +30862,9 @@
           </a:p>
           <a:p>
             <a:pPr marL="342900" indent="-342900">
+              <a:spcBef>
+                <a:spcPts val="1200"/>
+              </a:spcBef>
               <a:buFont typeface="Arial" panose="020B0604020202020204" pitchFamily="34" charset="0"/>
               <a:buChar char="•"/>
             </a:pPr>
@@ -30510,6 +30907,9 @@
           </a:p>
           <a:p>
             <a:pPr marL="342900" indent="-342900">
+              <a:spcBef>
+                <a:spcPts val="1200"/>
+              </a:spcBef>
               <a:buFont typeface="Arial" panose="020B0604020202020204" pitchFamily="34" charset="0"/>
               <a:buChar char="•"/>
             </a:pPr>
@@ -30714,6 +31114,9 @@
           <a:lstStyle/>
           <a:p>
             <a:pPr marL="342900" indent="-342900">
+              <a:spcBef>
+                <a:spcPts val="1200"/>
+              </a:spcBef>
               <a:buFont typeface="Arial" panose="020B0604020202020204" pitchFamily="34" charset="0"/>
               <a:buChar char="•"/>
             </a:pPr>
@@ -30730,6 +31133,9 @@
           </a:p>
           <a:p>
             <a:pPr marL="342900" indent="-342900">
+              <a:spcBef>
+                <a:spcPts val="1200"/>
+              </a:spcBef>
               <a:buFont typeface="Arial" panose="020B0604020202020204" pitchFamily="34" charset="0"/>
               <a:buChar char="•"/>
             </a:pPr>
@@ -30740,6 +31146,9 @@
           </a:p>
           <a:p>
             <a:pPr marL="342900" indent="-342900">
+              <a:spcBef>
+                <a:spcPts val="1200"/>
+              </a:spcBef>
               <a:buFont typeface="Arial" panose="020B0604020202020204" pitchFamily="34" charset="0"/>
               <a:buChar char="•"/>
             </a:pPr>
@@ -30748,7 +31157,7 @@
               <a:t>The Docker Compose syntax takes the arguments available in the </a:t>
             </a:r>
             <a:r>
-              <a:rPr lang="en-US" dirty="0">
+              <a:rPr lang="en-US" b="0" dirty="0">
                 <a:latin typeface="Consolas" panose="020B0609020204030204" pitchFamily="49" charset="0"/>
               </a:rPr>
               <a:t>docker container run</a:t>
@@ -30867,7 +31276,7 @@
             </a:pPr>
             <a:r>
               <a:rPr lang="en-US" b="0" dirty="0"/>
-              <a:t>In Compose, you define containers to run as services, then you specify the image name and any other optional properties, such as the container name, ports and networks in this example. </a:t>
+              <a:t>In Compose, you define containers to run as services, then you specify the image name and any other optional properties, such as the container name, ports and networks in this example: </a:t>
             </a:r>
           </a:p>
           <a:p>
@@ -30989,6 +31398,9 @@
           <a:lstStyle/>
           <a:p>
             <a:pPr marL="342900" indent="-342900">
+              <a:spcBef>
+                <a:spcPts val="1200"/>
+              </a:spcBef>
               <a:buFont typeface="Arial" panose="020B0604020202020204" pitchFamily="34" charset="0"/>
               <a:buChar char="•"/>
             </a:pPr>
@@ -30997,13 +31409,13 @@
               <a:t>By convention, Compose files are named </a:t>
             </a:r>
             <a:r>
-              <a:rPr lang="en-US" dirty="0">
+              <a:rPr lang="en-US" b="0" dirty="0">
                 <a:latin typeface="Consolas" panose="020B0609020204030204" pitchFamily="49" charset="0"/>
               </a:rPr>
               <a:t>docker-</a:t>
             </a:r>
             <a:r>
-              <a:rPr lang="en-US" dirty="0" err="1">
+              <a:rPr lang="en-US" b="0" dirty="0" err="1">
                 <a:latin typeface="Consolas" panose="020B0609020204030204" pitchFamily="49" charset="0"/>
               </a:rPr>
               <a:t>compose.yml</a:t>
@@ -31013,7 +31425,7 @@
               <a:t>. From the directory where the YAML file is saved, you can start all the services in the Compose file as containers by running the </a:t>
             </a:r>
             <a:r>
-              <a:rPr lang="en-US" dirty="0">
+              <a:rPr lang="en-US" b="0" dirty="0">
                 <a:latin typeface="Consolas" panose="020B0609020204030204" pitchFamily="49" charset="0"/>
               </a:rPr>
               <a:t>up</a:t>
@@ -31028,7 +31440,11 @@
             </a:r>
           </a:p>
           <a:p>
-            <a:pPr marL="1028700" lvl="1" indent="-342900"/>
+            <a:pPr marL="1028700" lvl="1" indent="-342900">
+              <a:spcBef>
+                <a:spcPts val="1200"/>
+              </a:spcBef>
+            </a:pPr>
             <a:r>
               <a:rPr lang="en-US" dirty="0">
                 <a:latin typeface="Consolas" panose="020B0609020204030204" pitchFamily="49" charset="0"/>
@@ -31038,6 +31454,9 @@
           </a:p>
           <a:p>
             <a:pPr marL="342900" indent="-342900">
+              <a:spcBef>
+                <a:spcPts val="1200"/>
+              </a:spcBef>
               <a:buFont typeface="Arial" panose="020B0604020202020204" pitchFamily="34" charset="0"/>
               <a:buChar char="•"/>
             </a:pPr>
@@ -31046,7 +31465,7 @@
               <a:t>As with the Docker CLI, we can specify </a:t>
             </a:r>
             <a:r>
-              <a:rPr lang="en-US" dirty="0">
+              <a:rPr lang="en-US" b="0" dirty="0">
                 <a:latin typeface="Consolas" panose="020B0609020204030204" pitchFamily="49" charset="0"/>
               </a:rPr>
               <a:t>-d</a:t>
@@ -31070,6 +31489,9 @@
           </a:p>
           <a:p>
             <a:pPr marL="342900" indent="-342900">
+              <a:spcBef>
+                <a:spcPts val="1200"/>
+              </a:spcBef>
               <a:buFont typeface="Arial" panose="020B0604020202020204" pitchFamily="34" charset="0"/>
               <a:buChar char="•"/>
             </a:pPr>
@@ -31167,6 +31589,9 @@
           <a:lstStyle/>
           <a:p>
             <a:pPr marL="342900" indent="-342900">
+              <a:spcBef>
+                <a:spcPts val="1200"/>
+              </a:spcBef>
               <a:buFont typeface="Arial" panose="020B0604020202020204" pitchFamily="34" charset="0"/>
               <a:buChar char="•"/>
             </a:pPr>
@@ -31175,7 +31600,7 @@
               <a:t>Docker Compose lets you scale up by adding more containers. More containers can be added with the </a:t>
             </a:r>
             <a:r>
-              <a:rPr lang="en-US" dirty="0">
+              <a:rPr lang="en-US" b="0" dirty="0">
                 <a:latin typeface="Consolas" panose="020B0609020204030204" pitchFamily="49" charset="0"/>
               </a:rPr>
               <a:t>scale</a:t>
@@ -31189,7 +31614,7 @@
               <a:t>option to the </a:t>
             </a:r>
             <a:r>
-              <a:rPr lang="en-US" dirty="0">
+              <a:rPr lang="en-US" b="0" dirty="0">
                 <a:latin typeface="Consolas" panose="020B0609020204030204" pitchFamily="49" charset="0"/>
               </a:rPr>
               <a:t>up</a:t>
@@ -31204,7 +31629,11 @@
             </a:r>
           </a:p>
           <a:p>
-            <a:pPr marL="1028700" lvl="1" indent="-342900"/>
+            <a:pPr marL="1028700" lvl="1" indent="-342900">
+              <a:spcBef>
+                <a:spcPts val="1200"/>
+              </a:spcBef>
+            </a:pPr>
             <a:r>
               <a:rPr lang="en-US" dirty="0">
                 <a:latin typeface="Consolas" panose="020B0609020204030204" pitchFamily="49" charset="0"/>
@@ -31214,6 +31643,9 @@
           </a:p>
           <a:p>
             <a:pPr marL="342900" indent="-342900">
+              <a:spcBef>
+                <a:spcPts val="1200"/>
+              </a:spcBef>
               <a:buFont typeface="Arial" panose="020B0604020202020204" pitchFamily="34" charset="0"/>
               <a:buChar char="•"/>
             </a:pPr>
@@ -31317,58 +31749,72 @@
             </a:r>
           </a:p>
           <a:p>
+            <a:pPr marL="1028700" lvl="1" indent="-342900"/>
+            <a:r>
+              <a:rPr lang="en-US" b="0" dirty="0"/>
+              <a:t>To stop all the containers:</a:t>
+            </a:r>
+          </a:p>
+          <a:p>
+            <a:pPr marL="1485900" lvl="2" indent="-342900"/>
+            <a:r>
+              <a:rPr lang="en-US" dirty="0">
+                <a:latin typeface="Consolas" panose="020B0609020204030204" pitchFamily="49" charset="0"/>
+              </a:rPr>
+              <a:t>docker-compose stop</a:t>
+            </a:r>
+          </a:p>
+          <a:p>
+            <a:pPr marL="1028700" lvl="1" indent="-342900"/>
+            <a:r>
+              <a:rPr lang="en-US" b="0" dirty="0"/>
+              <a:t>To start all the containers:</a:t>
+            </a:r>
+          </a:p>
+          <a:p>
+            <a:pPr marL="1485900" lvl="2" indent="-342900"/>
+            <a:r>
+              <a:rPr lang="en-US" dirty="0">
+                <a:latin typeface="Consolas" panose="020B0609020204030204" pitchFamily="49" charset="0"/>
+              </a:rPr>
+              <a:t>docker-compose start</a:t>
+            </a:r>
+          </a:p>
+          <a:p>
+            <a:pPr marL="1028700" lvl="1" indent="-342900"/>
+            <a:r>
+              <a:rPr lang="en-US" dirty="0"/>
+              <a:t>To stop and remove all the containers:</a:t>
+            </a:r>
+          </a:p>
+          <a:p>
+            <a:pPr marL="1485900" lvl="2" indent="-342900"/>
+            <a:r>
+              <a:rPr lang="en-US" dirty="0">
+                <a:latin typeface="Consolas" panose="020B0609020204030204" pitchFamily="49" charset="0"/>
+              </a:rPr>
+              <a:t>docker-compose down</a:t>
+            </a:r>
+          </a:p>
+          <a:p>
             <a:pPr marL="342900" indent="-342900">
               <a:buFont typeface="Arial" panose="020B0604020202020204" pitchFamily="34" charset="0"/>
               <a:buChar char="•"/>
             </a:pPr>
             <a:r>
-              <a:rPr lang="en-US" b="0" dirty="0"/>
-              <a:t>To stop all the containers:</a:t>
-            </a:r>
-          </a:p>
-          <a:p>
-            <a:pPr marL="1028700" lvl="1" indent="-342900"/>
-            <a:r>
-              <a:rPr lang="en-US" dirty="0">
+              <a:rPr lang="en-US" dirty="0"/>
+              <a:t>When you create services with Compose, Docker has no notion that they’re related (other than being in the same network). In order to manage the services as a single unit, you work in the directory on your client machine where the </a:t>
+            </a:r>
+            <a:r>
+              <a:rPr lang="en-US" b="0" dirty="0">
                 <a:latin typeface="Consolas" panose="020B0609020204030204" pitchFamily="49" charset="0"/>
               </a:rPr>
-              <a:t>docker-compose stop</a:t>
-            </a:r>
-          </a:p>
-          <a:p>
-            <a:pPr marL="342900" indent="-342900">
-              <a:buFont typeface="Arial" panose="020B0604020202020204" pitchFamily="34" charset="0"/>
-              <a:buChar char="•"/>
-            </a:pPr>
-            <a:r>
-              <a:rPr lang="en-US" b="0" dirty="0"/>
-              <a:t>To start all the containers:</a:t>
-            </a:r>
-          </a:p>
-          <a:p>
-            <a:pPr marL="1028700" lvl="1" indent="-342900"/>
-            <a:r>
-              <a:rPr lang="en-US" dirty="0">
+              <a:t>docker-</a:t>
+            </a:r>
+            <a:r>
+              <a:rPr lang="en-US" b="0" dirty="0" err="1">
                 <a:latin typeface="Consolas" panose="020B0609020204030204" pitchFamily="49" charset="0"/>
               </a:rPr>
-              <a:t>docker-compose start</a:t>
-            </a:r>
-          </a:p>
-          <a:p>
-            <a:pPr marL="342900" indent="-342900">
-              <a:buFont typeface="Arial" panose="020B0604020202020204" pitchFamily="34" charset="0"/>
-              <a:buChar char="•"/>
-            </a:pPr>
-            <a:r>
-              <a:rPr lang="en-US" dirty="0"/>
-              <a:t>When you create services with Compose, Docker has no notion that they’re related (other than being in the same network). In order to manage the services as a single unit, you work in the directory on your client machine where the </a:t>
-            </a:r>
-            <a:r>
-              <a:rPr lang="en-US" b="0" dirty="0"/>
-              <a:t>docker-</a:t>
-            </a:r>
-            <a:r>
-              <a:rPr lang="en-US" b="0" dirty="0" err="1"/>
               <a:t>compose.yml</a:t>
             </a:r>
             <a:r>
@@ -31474,6 +31920,9 @@
           <a:lstStyle/>
           <a:p>
             <a:pPr marL="342900" indent="-342900">
+              <a:spcBef>
+                <a:spcPts val="1200"/>
+              </a:spcBef>
               <a:buFont typeface="Arial" panose="020B0604020202020204" pitchFamily="34" charset="0"/>
               <a:buChar char="•"/>
             </a:pPr>
@@ -31484,6 +31933,9 @@
           </a:p>
           <a:p>
             <a:pPr marL="342900" indent="-342900">
+              <a:spcBef>
+                <a:spcPts val="1200"/>
+              </a:spcBef>
               <a:buFont typeface="Arial" panose="020B0604020202020204" pitchFamily="34" charset="0"/>
               <a:buChar char="•"/>
             </a:pPr>
@@ -33020,7 +33472,7 @@
             </a:pPr>
             <a:r>
               <a:rPr lang="en-US" dirty="0"/>
-              <a:t>Use the latest available docker when playing with swarm</a:t>
+              <a:t>Use the latest available docker when playing with swarm.</a:t>
             </a:r>
           </a:p>
           <a:p>
@@ -33034,11 +33486,11 @@
             </a:r>
             <a:r>
               <a:rPr lang="en-US" dirty="0" err="1"/>
-              <a:t>dokernized</a:t>
-            </a:r>
-            <a:r>
-              <a:rPr lang="en-US" dirty="0"/>
-              <a:t>” VMs</a:t>
+              <a:t>dockernized</a:t>
+            </a:r>
+            <a:r>
+              <a:rPr lang="en-US" dirty="0"/>
+              <a:t>” VMs.</a:t>
             </a:r>
           </a:p>
           <a:p>
@@ -33218,6 +33670,9 @@
           <a:lstStyle/>
           <a:p>
             <a:pPr marL="342900" indent="-342900">
+              <a:spcBef>
+                <a:spcPts val="1200"/>
+              </a:spcBef>
               <a:buFont typeface="Arial" panose="020B0604020202020204" pitchFamily="34" charset="0"/>
               <a:buChar char="•"/>
             </a:pPr>
@@ -33228,6 +33683,9 @@
           </a:p>
           <a:p>
             <a:pPr marL="342900" indent="-342900">
+              <a:spcBef>
+                <a:spcPts val="1200"/>
+              </a:spcBef>
               <a:buFont typeface="Arial" panose="020B0604020202020204" pitchFamily="34" charset="0"/>
               <a:buChar char="•"/>
             </a:pPr>
@@ -33238,6 +33696,9 @@
           </a:p>
           <a:p>
             <a:pPr marL="342900" indent="-342900">
+              <a:spcBef>
+                <a:spcPts val="1200"/>
+              </a:spcBef>
               <a:buFont typeface="Arial" panose="020B0604020202020204" pitchFamily="34" charset="0"/>
               <a:buChar char="•"/>
             </a:pPr>
@@ -33248,6 +33709,9 @@
           </a:p>
           <a:p>
             <a:pPr marL="342900" indent="-342900">
+              <a:spcBef>
+                <a:spcPts val="1200"/>
+              </a:spcBef>
               <a:buFont typeface="Arial" panose="020B0604020202020204" pitchFamily="34" charset="0"/>
               <a:buChar char="•"/>
             </a:pPr>
@@ -33339,6 +33803,9 @@
           <a:lstStyle/>
           <a:p>
             <a:pPr marL="342900" indent="-342900">
+              <a:spcBef>
+                <a:spcPts val="1200"/>
+              </a:spcBef>
               <a:buFont typeface="Arial" panose="020B0604020202020204" pitchFamily="34" charset="0"/>
               <a:buChar char="•"/>
             </a:pPr>
@@ -33349,6 +33816,9 @@
           </a:p>
           <a:p>
             <a:pPr marL="342900" indent="-342900">
+              <a:spcBef>
+                <a:spcPts val="1200"/>
+              </a:spcBef>
               <a:buFont typeface="Arial" panose="020B0604020202020204" pitchFamily="34" charset="0"/>
               <a:buChar char="•"/>
             </a:pPr>
@@ -33440,6 +33910,9 @@
           <a:lstStyle/>
           <a:p>
             <a:pPr marL="342900" indent="-342900">
+              <a:spcBef>
+                <a:spcPts val="1200"/>
+              </a:spcBef>
               <a:buFont typeface="Arial" panose="020B0604020202020204" pitchFamily="34" charset="0"/>
               <a:buChar char="•"/>
             </a:pPr>
@@ -33449,21 +33922,33 @@
             </a:r>
           </a:p>
           <a:p>
-            <a:pPr marL="1028700" lvl="1" indent="-342900"/>
+            <a:pPr marL="1028700" lvl="1" indent="-342900">
+              <a:spcBef>
+                <a:spcPts val="1200"/>
+              </a:spcBef>
+            </a:pPr>
             <a:r>
               <a:rPr lang="en-US" b="0" dirty="0"/>
               <a:t>Background server that does the work;</a:t>
             </a:r>
           </a:p>
           <a:p>
-            <a:pPr marL="1028700" lvl="1" indent="-342900"/>
+            <a:pPr marL="1028700" lvl="1" indent="-342900">
+              <a:spcBef>
+                <a:spcPts val="1200"/>
+              </a:spcBef>
+            </a:pPr>
             <a:r>
               <a:rPr lang="en-US" b="0" dirty="0"/>
               <a:t>Docker client, a command-line interface for working with the server;</a:t>
             </a:r>
           </a:p>
           <a:p>
-            <a:pPr marL="1028700" lvl="1" indent="-342900"/>
+            <a:pPr marL="1028700" lvl="1" indent="-342900">
+              <a:spcBef>
+                <a:spcPts val="1200"/>
+              </a:spcBef>
+            </a:pPr>
             <a:r>
               <a:rPr lang="en-US" b="0" dirty="0"/>
               <a:t>REST API for client-server communication.</a:t>
@@ -33471,6 +33956,9 @@
           </a:p>
           <a:p>
             <a:pPr marL="342900" indent="-342900">
+              <a:spcBef>
+                <a:spcPts val="1200"/>
+              </a:spcBef>
               <a:buFont typeface="Arial" panose="020B0604020202020204" pitchFamily="34" charset="0"/>
               <a:buChar char="•"/>
             </a:pPr>
@@ -33481,6 +33969,9 @@
           </a:p>
           <a:p>
             <a:pPr marL="342900" indent="-342900">
+              <a:spcBef>
+                <a:spcPts val="1200"/>
+              </a:spcBef>
               <a:buFont typeface="Arial" panose="020B0604020202020204" pitchFamily="34" charset="0"/>
               <a:buChar char="•"/>
             </a:pPr>

</xml_diff>

<commit_message>
Add notes to Demo slides
</commit_message>
<xml_diff>
--- a/docs/Introduction to Docker.pptx
+++ b/docs/Introduction to Docker.pptx
@@ -5,10 +5,10 @@
     <p:sldMasterId id="2147483648" r:id="rId1"/>
   </p:sldMasterIdLst>
   <p:notesMasterIdLst>
-    <p:notesMasterId r:id="rId69"/>
+    <p:notesMasterId r:id="rId70"/>
   </p:notesMasterIdLst>
   <p:handoutMasterIdLst>
-    <p:handoutMasterId r:id="rId70"/>
+    <p:handoutMasterId r:id="rId71"/>
   </p:handoutMasterIdLst>
   <p:sldIdLst>
     <p:sldId id="279" r:id="rId2"/>
@@ -75,45 +75,46 @@
     <p:sldId id="764" r:id="rId63"/>
     <p:sldId id="761" r:id="rId64"/>
     <p:sldId id="765" r:id="rId65"/>
-    <p:sldId id="766" r:id="rId66"/>
-    <p:sldId id="321" r:id="rId67"/>
-    <p:sldId id="320" r:id="rId68"/>
+    <p:sldId id="768" r:id="rId66"/>
+    <p:sldId id="766" r:id="rId67"/>
+    <p:sldId id="321" r:id="rId68"/>
+    <p:sldId id="320" r:id="rId69"/>
   </p:sldIdLst>
   <p:sldSz cx="12192000" cy="6858000"/>
   <p:notesSz cx="6858000" cy="9144000"/>
   <p:embeddedFontLst>
     <p:embeddedFont>
       <p:font typeface="Calibri" panose="020F0502020204030204" pitchFamily="34" charset="0"/>
-      <p:regular r:id="rId71"/>
-      <p:bold r:id="rId72"/>
-      <p:italic r:id="rId73"/>
-      <p:boldItalic r:id="rId74"/>
+      <p:regular r:id="rId72"/>
+      <p:bold r:id="rId73"/>
+      <p:italic r:id="rId74"/>
+      <p:boldItalic r:id="rId75"/>
     </p:embeddedFont>
     <p:embeddedFont>
       <p:font typeface="Consolas" panose="020B0609020204030204" pitchFamily="49" charset="0"/>
-      <p:regular r:id="rId75"/>
-      <p:bold r:id="rId76"/>
-      <p:italic r:id="rId77"/>
-      <p:boldItalic r:id="rId78"/>
+      <p:regular r:id="rId76"/>
+      <p:bold r:id="rId77"/>
+      <p:italic r:id="rId78"/>
+      <p:boldItalic r:id="rId79"/>
     </p:embeddedFont>
     <p:embeddedFont>
       <p:font typeface="Open Sans" panose="020B0606030504020204" pitchFamily="34" charset="0"/>
-      <p:regular r:id="rId79"/>
-      <p:bold r:id="rId80"/>
-      <p:italic r:id="rId81"/>
-      <p:boldItalic r:id="rId82"/>
+      <p:regular r:id="rId80"/>
+      <p:bold r:id="rId81"/>
+      <p:italic r:id="rId82"/>
+      <p:boldItalic r:id="rId83"/>
     </p:embeddedFont>
     <p:embeddedFont>
       <p:font typeface="Open Sans Light" panose="020B0306030504020204" pitchFamily="34" charset="0"/>
-      <p:regular r:id="rId83"/>
-      <p:italic r:id="rId84"/>
+      <p:regular r:id="rId84"/>
+      <p:italic r:id="rId85"/>
     </p:embeddedFont>
     <p:embeddedFont>
       <p:font typeface="Open Sans Semibold" panose="020B0706030804020204" pitchFamily="34" charset="0"/>
-      <p:regular r:id="rId85"/>
-      <p:bold r:id="rId86"/>
-      <p:italic r:id="rId87"/>
-      <p:boldItalic r:id="rId88"/>
+      <p:regular r:id="rId86"/>
+      <p:bold r:id="rId87"/>
+      <p:italic r:id="rId88"/>
+      <p:boldItalic r:id="rId89"/>
     </p:embeddedFont>
   </p:embeddedFontLst>
   <p:defaultTextStyle>
@@ -308,6 +309,7 @@
             <p14:sldId id="764"/>
             <p14:sldId id="761"/>
             <p14:sldId id="765"/>
+            <p14:sldId id="768"/>
             <p14:sldId id="766"/>
           </p14:sldIdLst>
         </p14:section>
@@ -1693,37 +1695,34 @@
           <a:p>
             <a:r>
               <a:rPr lang="en-US" dirty="0"/>
-              <a:t>Sample commands can be found in </a:t>
+              <a:t>Demo scripts are in 02_Creating_Docker_Images folder</a:t>
+            </a:r>
+          </a:p>
+          <a:p>
+            <a:r>
+              <a:rPr lang="en-US" dirty="0"/>
+              <a:t>Creating and running image for </a:t>
             </a:r>
             <a:r>
               <a:rPr lang="en-US" dirty="0" err="1"/>
-              <a:t>src</a:t>
-            </a:r>
-            <a:r>
-              <a:rPr lang="en-US" dirty="0"/>
-              <a:t>/01_Introducing_Docker</a:t>
-            </a:r>
-          </a:p>
-          <a:p>
-            <a:r>
-              <a:rPr lang="en-US" dirty="0"/>
-              <a:t>When connecting to SQL Server using SQL Server Management Studio, specify “localhost,14330” as server name</a:t>
-            </a:r>
-          </a:p>
-          <a:p>
-            <a:r>
-              <a:rPr lang="en-US" dirty="0"/>
-              <a:t>Show switching from Linux containers to Windows containers, show output of “docker version” command after switching.</a:t>
-            </a:r>
-          </a:p>
-          <a:p>
-            <a:r>
-              <a:rPr lang="en-US" dirty="0"/>
-              <a:t>Mention requirement to install updates to be able to run Windows containers. Show output of “docker version” command, it includes </a:t>
-            </a:r>
-            <a:r>
-              <a:rPr lang="en-US"/>
-              <a:t>system architecture.</a:t>
+              <a:t>SampleWebApp</a:t>
+            </a:r>
+            <a:endParaRPr lang="en-US" dirty="0"/>
+          </a:p>
+          <a:p>
+            <a:r>
+              <a:rPr lang="en-US" dirty="0"/>
+              <a:t>Creating image in several stages</a:t>
+            </a:r>
+          </a:p>
+          <a:p>
+            <a:r>
+              <a:rPr lang="en-US" dirty="0"/>
+              <a:t>Creating Ubuntu with built-in </a:t>
+            </a:r>
+            <a:r>
+              <a:rPr lang="en-US" dirty="0" err="1"/>
+              <a:t>utils</a:t>
             </a:r>
             <a:endParaRPr lang="en-US" dirty="0"/>
           </a:p>
@@ -1953,6 +1952,12 @@
               <a:t>/04_Data_Storage</a:t>
             </a:r>
           </a:p>
+          <a:p>
+            <a:r>
+              <a:rPr lang="en-US" dirty="0"/>
+              <a:t>Demo SQL server without volumes – restart erases all databases</a:t>
+            </a:r>
+          </a:p>
         </p:txBody>
       </p:sp>
       <p:sp>
@@ -2132,6 +2137,30 @@
               <a:t>/04_Data_Storage</a:t>
             </a:r>
           </a:p>
+          <a:p>
+            <a:r>
+              <a:rPr lang="en-US" dirty="0"/>
+              <a:t>Demo SQL server with volume attached</a:t>
+            </a:r>
+          </a:p>
+          <a:p>
+            <a:r>
+              <a:rPr lang="en-US" dirty="0"/>
+              <a:t>Demo app with logs in folder</a:t>
+            </a:r>
+          </a:p>
+          <a:p>
+            <a:r>
+              <a:rPr lang="en-US" dirty="0"/>
+              <a:t>Demo SQL server with folder attached</a:t>
+            </a:r>
+          </a:p>
+          <a:p>
+            <a:r>
+              <a:rPr lang="en-US" dirty="0"/>
+              <a:t> </a:t>
+            </a:r>
+          </a:p>
         </p:txBody>
       </p:sp>
       <p:sp>
@@ -2584,6 +2613,304 @@
     <p:extLst>
       <p:ext uri="{BB962C8B-B14F-4D97-AF65-F5344CB8AC3E}">
         <p14:creationId xmlns:p14="http://schemas.microsoft.com/office/powerpoint/2010/main" val="2757767638"/>
+      </p:ext>
+    </p:extLst>
+  </p:cSld>
+  <p:clrMapOvr>
+    <a:masterClrMapping/>
+  </p:clrMapOvr>
+</p:notes>
+</file>
+
+<file path=ppt/notesSlides/notesSlide23.xml><?xml version="1.0" encoding="utf-8"?>
+<p:notes xmlns:a="http://schemas.openxmlformats.org/drawingml/2006/main" xmlns:r="http://schemas.openxmlformats.org/officeDocument/2006/relationships" xmlns:p="http://schemas.openxmlformats.org/presentationml/2006/main">
+  <p:cSld>
+    <p:spTree>
+      <p:nvGrpSpPr>
+        <p:cNvPr id="1" name=""/>
+        <p:cNvGrpSpPr/>
+        <p:nvPr/>
+      </p:nvGrpSpPr>
+      <p:grpSpPr>
+        <a:xfrm>
+          <a:off x="0" y="0"/>
+          <a:ext cx="0" cy="0"/>
+          <a:chOff x="0" y="0"/>
+          <a:chExt cx="0" cy="0"/>
+        </a:xfrm>
+      </p:grpSpPr>
+      <p:sp>
+        <p:nvSpPr>
+          <p:cNvPr id="2" name="Slide Image Placeholder 1"/>
+          <p:cNvSpPr>
+            <a:spLocks noGrp="1" noRot="1" noChangeAspect="1"/>
+          </p:cNvSpPr>
+          <p:nvPr>
+            <p:ph type="sldImg"/>
+          </p:nvPr>
+        </p:nvSpPr>
+        <p:spPr/>
+      </p:sp>
+      <p:sp>
+        <p:nvSpPr>
+          <p:cNvPr id="3" name="Notes Placeholder 2"/>
+          <p:cNvSpPr>
+            <a:spLocks noGrp="1"/>
+          </p:cNvSpPr>
+          <p:nvPr>
+            <p:ph type="body" idx="1"/>
+          </p:nvPr>
+        </p:nvSpPr>
+        <p:spPr/>
+        <p:txBody>
+          <a:bodyPr/>
+          <a:lstStyle/>
+          <a:p>
+            <a:pPr marL="0" marR="0" lvl="0" indent="0" algn="l" defTabSz="914400" rtl="0" eaLnBrk="1" fontAlgn="auto" latinLnBrk="0" hangingPunct="1">
+              <a:lnSpc>
+                <a:spcPct val="100000"/>
+              </a:lnSpc>
+              <a:spcBef>
+                <a:spcPts val="0"/>
+              </a:spcBef>
+              <a:spcAft>
+                <a:spcPts val="0"/>
+              </a:spcAft>
+              <a:buClrTx/>
+              <a:buSzTx/>
+              <a:buFontTx/>
+              <a:buNone/>
+              <a:tabLst/>
+              <a:defRPr/>
+            </a:pPr>
+            <a:r>
+              <a:rPr lang="en-US" dirty="0"/>
+              <a:t>Initialize 3 ubuntu VMs</a:t>
+            </a:r>
+          </a:p>
+          <a:p>
+            <a:pPr marL="0" marR="0" lvl="0" indent="0" algn="l" defTabSz="914400" rtl="0" eaLnBrk="1" fontAlgn="auto" latinLnBrk="0" hangingPunct="1">
+              <a:lnSpc>
+                <a:spcPct val="100000"/>
+              </a:lnSpc>
+              <a:spcBef>
+                <a:spcPts val="0"/>
+              </a:spcBef>
+              <a:spcAft>
+                <a:spcPts val="0"/>
+              </a:spcAft>
+              <a:buClrTx/>
+              <a:buSzTx/>
+              <a:buFontTx/>
+              <a:buNone/>
+              <a:tabLst/>
+              <a:defRPr/>
+            </a:pPr>
+            <a:r>
+              <a:rPr lang="en-US" dirty="0"/>
+              <a:t>Init swarm on 1 of them</a:t>
+            </a:r>
+          </a:p>
+          <a:p>
+            <a:pPr marL="0" marR="0" lvl="0" indent="0" algn="l" defTabSz="914400" rtl="0" eaLnBrk="1" fontAlgn="auto" latinLnBrk="0" hangingPunct="1">
+              <a:lnSpc>
+                <a:spcPct val="100000"/>
+              </a:lnSpc>
+              <a:spcBef>
+                <a:spcPts val="0"/>
+              </a:spcBef>
+              <a:spcAft>
+                <a:spcPts val="0"/>
+              </a:spcAft>
+              <a:buClrTx/>
+              <a:buSzTx/>
+              <a:buFontTx/>
+              <a:buNone/>
+              <a:tabLst/>
+              <a:defRPr/>
+            </a:pPr>
+            <a:r>
+              <a:rPr lang="en-US" dirty="0"/>
+              <a:t>Join swarm from another</a:t>
+            </a:r>
+          </a:p>
+          <a:p>
+            <a:pPr marL="0" marR="0" lvl="0" indent="0" algn="l" defTabSz="914400" rtl="0" eaLnBrk="1" fontAlgn="auto" latinLnBrk="0" hangingPunct="1">
+              <a:lnSpc>
+                <a:spcPct val="100000"/>
+              </a:lnSpc>
+              <a:spcBef>
+                <a:spcPts val="0"/>
+              </a:spcBef>
+              <a:spcAft>
+                <a:spcPts val="0"/>
+              </a:spcAft>
+              <a:buClrTx/>
+              <a:buSzTx/>
+              <a:buFontTx/>
+              <a:buNone/>
+              <a:tabLst/>
+              <a:defRPr/>
+            </a:pPr>
+            <a:r>
+              <a:rPr lang="en-US" dirty="0"/>
+              <a:t>Create service </a:t>
+            </a:r>
+            <a:r>
+              <a:rPr lang="en-US" dirty="0" err="1"/>
+              <a:t>nginx:alpine</a:t>
+            </a:r>
+            <a:endParaRPr lang="en-US" dirty="0"/>
+          </a:p>
+          <a:p>
+            <a:pPr marL="0" marR="0" lvl="0" indent="0" algn="l" defTabSz="914400" rtl="0" eaLnBrk="1" fontAlgn="auto" latinLnBrk="0" hangingPunct="1">
+              <a:lnSpc>
+                <a:spcPct val="100000"/>
+              </a:lnSpc>
+              <a:spcBef>
+                <a:spcPts val="0"/>
+              </a:spcBef>
+              <a:spcAft>
+                <a:spcPts val="0"/>
+              </a:spcAft>
+              <a:buClrTx/>
+              <a:buSzTx/>
+              <a:buFontTx/>
+              <a:buNone/>
+              <a:tabLst/>
+              <a:defRPr/>
+            </a:pPr>
+            <a:r>
+              <a:rPr lang="en-US" dirty="0"/>
+              <a:t>Show its availability on both nodes</a:t>
+            </a:r>
+          </a:p>
+          <a:p>
+            <a:pPr marL="0" marR="0" lvl="0" indent="0" algn="l" defTabSz="914400" rtl="0" eaLnBrk="1" fontAlgn="auto" latinLnBrk="0" hangingPunct="1">
+              <a:lnSpc>
+                <a:spcPct val="100000"/>
+              </a:lnSpc>
+              <a:spcBef>
+                <a:spcPts val="0"/>
+              </a:spcBef>
+              <a:spcAft>
+                <a:spcPts val="0"/>
+              </a:spcAft>
+              <a:buClrTx/>
+              <a:buSzTx/>
+              <a:buFontTx/>
+              <a:buNone/>
+              <a:tabLst/>
+              <a:defRPr/>
+            </a:pPr>
+            <a:r>
+              <a:rPr lang="en-US" dirty="0"/>
+              <a:t>Add node</a:t>
+            </a:r>
+          </a:p>
+          <a:p>
+            <a:pPr marL="0" marR="0" lvl="0" indent="0" algn="l" defTabSz="914400" rtl="0" eaLnBrk="1" fontAlgn="auto" latinLnBrk="0" hangingPunct="1">
+              <a:lnSpc>
+                <a:spcPct val="100000"/>
+              </a:lnSpc>
+              <a:spcBef>
+                <a:spcPts val="0"/>
+              </a:spcBef>
+              <a:spcAft>
+                <a:spcPts val="0"/>
+              </a:spcAft>
+              <a:buClrTx/>
+              <a:buSzTx/>
+              <a:buFontTx/>
+              <a:buNone/>
+              <a:tabLst/>
+              <a:defRPr/>
+            </a:pPr>
+            <a:r>
+              <a:rPr lang="en-US" dirty="0"/>
+              <a:t>Show that </a:t>
+            </a:r>
+            <a:r>
+              <a:rPr lang="en-US" dirty="0" err="1"/>
+              <a:t>nginx</a:t>
+            </a:r>
+            <a:r>
+              <a:rPr lang="en-US" dirty="0"/>
+              <a:t> available on newly added node</a:t>
+            </a:r>
+          </a:p>
+          <a:p>
+            <a:pPr marL="0" marR="0" lvl="0" indent="0" algn="l" defTabSz="914400" rtl="0" eaLnBrk="1" fontAlgn="auto" latinLnBrk="0" hangingPunct="1">
+              <a:lnSpc>
+                <a:spcPct val="100000"/>
+              </a:lnSpc>
+              <a:spcBef>
+                <a:spcPts val="0"/>
+              </a:spcBef>
+              <a:spcAft>
+                <a:spcPts val="0"/>
+              </a:spcAft>
+              <a:buClrTx/>
+              <a:buSzTx/>
+              <a:buFontTx/>
+              <a:buNone/>
+              <a:tabLst/>
+              <a:defRPr/>
+            </a:pPr>
+            <a:r>
+              <a:rPr lang="en-US" dirty="0"/>
+              <a:t>Scale service </a:t>
+            </a:r>
+          </a:p>
+          <a:p>
+            <a:pPr marL="0" marR="0" lvl="0" indent="0" algn="l" defTabSz="914400" rtl="0" eaLnBrk="1" fontAlgn="auto" latinLnBrk="0" hangingPunct="1">
+              <a:lnSpc>
+                <a:spcPct val="100000"/>
+              </a:lnSpc>
+              <a:spcBef>
+                <a:spcPts val="0"/>
+              </a:spcBef>
+              <a:spcAft>
+                <a:spcPts val="0"/>
+              </a:spcAft>
+              <a:buClrTx/>
+              <a:buSzTx/>
+              <a:buFontTx/>
+              <a:buNone/>
+              <a:tabLst/>
+              <a:defRPr/>
+            </a:pPr>
+            <a:endParaRPr lang="en-US" dirty="0"/>
+          </a:p>
+        </p:txBody>
+      </p:sp>
+      <p:sp>
+        <p:nvSpPr>
+          <p:cNvPr id="4" name="Slide Number Placeholder 3"/>
+          <p:cNvSpPr>
+            <a:spLocks noGrp="1"/>
+          </p:cNvSpPr>
+          <p:nvPr>
+            <p:ph type="sldNum" sz="quarter" idx="5"/>
+          </p:nvPr>
+        </p:nvSpPr>
+        <p:spPr/>
+        <p:txBody>
+          <a:bodyPr/>
+          <a:lstStyle/>
+          <a:p>
+            <a:fld id="{AA4E6B44-8A2D-409F-997F-4C23C1BB012E}" type="slidenum">
+              <a:rPr lang="en-US" smtClean="0"/>
+              <a:t>65</a:t>
+            </a:fld>
+            <a:endParaRPr lang="en-US"/>
+          </a:p>
+        </p:txBody>
+      </p:sp>
+    </p:spTree>
+    <p:extLst>
+      <p:ext uri="{BB962C8B-B14F-4D97-AF65-F5344CB8AC3E}">
+        <p14:creationId xmlns:p14="http://schemas.microsoft.com/office/powerpoint/2010/main" val="748794910"/>
       </p:ext>
     </p:extLst>
   </p:cSld>
@@ -29899,29 +30226,6 @@
             </a:pPr>
             <a:r>
               <a:rPr lang="en-US" dirty="0"/>
-              <a:t>Volumes might be used</a:t>
-            </a:r>
-          </a:p>
-          <a:p>
-            <a:pPr marL="342900" indent="-342900">
-              <a:spcBef>
-                <a:spcPts val="1200"/>
-              </a:spcBef>
-              <a:buFont typeface="Arial" panose="020B0604020202020204" pitchFamily="34" charset="0"/>
-              <a:buChar char="•"/>
-            </a:pPr>
-            <a:endParaRPr lang="en-US" dirty="0"/>
-          </a:p>
-          <a:p>
-            <a:pPr marL="342900" indent="-342900">
-              <a:spcBef>
-                <a:spcPts val="1200"/>
-              </a:spcBef>
-              <a:buFont typeface="Arial" panose="020B0604020202020204" pitchFamily="34" charset="0"/>
-              <a:buChar char="•"/>
-            </a:pPr>
-            <a:r>
-              <a:rPr lang="en-US" dirty="0"/>
               <a:t>You may share:</a:t>
             </a:r>
           </a:p>
@@ -33745,7 +34049,7 @@
           <p:cNvPr id="2" name="Content Placeholder 1">
             <a:extLst>
               <a:ext uri="{FF2B5EF4-FFF2-40B4-BE49-F238E27FC236}">
-                <a16:creationId xmlns:a16="http://schemas.microsoft.com/office/drawing/2014/main" id="{DA11F7F6-965D-4995-ABE8-5D61921E242E}"/>
+                <a16:creationId xmlns:a16="http://schemas.microsoft.com/office/drawing/2014/main" id="{AFF96931-CCDB-47D1-B982-0BFE2F5C618C}"/>
               </a:ext>
             </a:extLst>
           </p:cNvPr>
@@ -33756,43 +34060,35 @@
             <p:ph idx="1"/>
           </p:nvPr>
         </p:nvSpPr>
-        <p:spPr/>
+        <p:spPr>
+          <a:xfrm>
+            <a:off x="498418" y="1352362"/>
+            <a:ext cx="11168270" cy="2757522"/>
+          </a:xfrm>
+        </p:spPr>
         <p:txBody>
-          <a:bodyPr/>
+          <a:bodyPr anchor="ctr"/>
           <a:lstStyle/>
+          <a:p>
+            <a:pPr algn="ctr"/>
+            <a:r>
+              <a:rPr lang="en-US" sz="9600" b="0" dirty="0"/>
+              <a:t>DEMO</a:t>
+            </a:r>
+            <a:r>
+              <a:rPr lang="en-US" b="0" dirty="0"/>
+              <a:t> </a:t>
+            </a:r>
+          </a:p>
           <a:p>
             <a:pPr marL="342900" indent="-342900">
               <a:buFont typeface="Arial" panose="020B0604020202020204" pitchFamily="34" charset="0"/>
               <a:buChar char="•"/>
             </a:pPr>
-            <a:r>
-              <a:rPr lang="en-US" dirty="0"/>
-              <a:t>Use the latest available docker when playing with swarm.</a:t>
-            </a:r>
-          </a:p>
-          <a:p>
-            <a:pPr marL="342900" indent="-342900">
-              <a:buFont typeface="Arial" panose="020B0604020202020204" pitchFamily="34" charset="0"/>
-              <a:buChar char="•"/>
-            </a:pPr>
-            <a:r>
-              <a:rPr lang="en-US" dirty="0"/>
-              <a:t>Consider using docker-machine tool to create “</a:t>
-            </a:r>
-            <a:r>
-              <a:rPr lang="en-US" dirty="0" err="1"/>
-              <a:t>dockernized</a:t>
-            </a:r>
-            <a:r>
-              <a:rPr lang="en-US" dirty="0"/>
-              <a:t>” VMs.</a:t>
-            </a:r>
-          </a:p>
-          <a:p>
-            <a:pPr marL="342900" indent="-342900">
-              <a:buFont typeface="Arial" panose="020B0604020202020204" pitchFamily="34" charset="0"/>
-              <a:buChar char="•"/>
-            </a:pPr>
+            <a:endParaRPr lang="en-US" b="0" dirty="0"/>
+          </a:p>
+          <a:p>
+            <a:pPr marL="342900" indent="-342900"/>
             <a:endParaRPr lang="en-US" dirty="0"/>
           </a:p>
         </p:txBody>
@@ -33802,7 +34098,7 @@
           <p:cNvPr id="3" name="Text Placeholder 2">
             <a:extLst>
               <a:ext uri="{FF2B5EF4-FFF2-40B4-BE49-F238E27FC236}">
-                <a16:creationId xmlns:a16="http://schemas.microsoft.com/office/drawing/2014/main" id="{3D4FC62B-7787-4864-ABB8-D6F5D10C5F2B}"/>
+                <a16:creationId xmlns:a16="http://schemas.microsoft.com/office/drawing/2014/main" id="{CBA50F54-F9F0-49C1-A1C9-8D18F10A83B3}"/>
               </a:ext>
             </a:extLst>
           </p:cNvPr>
@@ -33820,7 +34116,7 @@
           <a:p>
             <a:r>
               <a:rPr lang="en-US" dirty="0"/>
-              <a:t>Notes</a:t>
+              <a:t>Using Docker Swarm</a:t>
             </a:r>
           </a:p>
         </p:txBody>
@@ -33828,7 +34124,7 @@
     </p:spTree>
     <p:extLst>
       <p:ext uri="{BB962C8B-B14F-4D97-AF65-F5344CB8AC3E}">
-        <p14:creationId xmlns:p14="http://schemas.microsoft.com/office/powerpoint/2010/main" val="3471266635"/>
+        <p14:creationId xmlns:p14="http://schemas.microsoft.com/office/powerpoint/2010/main" val="3590514809"/>
       </p:ext>
     </p:extLst>
   </p:cSld>
@@ -33857,6 +34153,121 @@
       </p:grpSpPr>
       <p:sp>
         <p:nvSpPr>
+          <p:cNvPr id="2" name="Content Placeholder 1">
+            <a:extLst>
+              <a:ext uri="{FF2B5EF4-FFF2-40B4-BE49-F238E27FC236}">
+                <a16:creationId xmlns:a16="http://schemas.microsoft.com/office/drawing/2014/main" id="{DA11F7F6-965D-4995-ABE8-5D61921E242E}"/>
+              </a:ext>
+            </a:extLst>
+          </p:cNvPr>
+          <p:cNvSpPr>
+            <a:spLocks noGrp="1"/>
+          </p:cNvSpPr>
+          <p:nvPr>
+            <p:ph idx="1"/>
+          </p:nvPr>
+        </p:nvSpPr>
+        <p:spPr/>
+        <p:txBody>
+          <a:bodyPr/>
+          <a:lstStyle/>
+          <a:p>
+            <a:pPr marL="342900" indent="-342900">
+              <a:buFont typeface="Arial" panose="020B0604020202020204" pitchFamily="34" charset="0"/>
+              <a:buChar char="•"/>
+            </a:pPr>
+            <a:r>
+              <a:rPr lang="en-US" dirty="0"/>
+              <a:t>Use the latest available docker when playing with swarm.</a:t>
+            </a:r>
+          </a:p>
+          <a:p>
+            <a:pPr marL="342900" indent="-342900">
+              <a:buFont typeface="Arial" panose="020B0604020202020204" pitchFamily="34" charset="0"/>
+              <a:buChar char="•"/>
+            </a:pPr>
+            <a:r>
+              <a:rPr lang="en-US" dirty="0"/>
+              <a:t>Consider using docker-machine tool to create “</a:t>
+            </a:r>
+            <a:r>
+              <a:rPr lang="en-US" dirty="0" err="1"/>
+              <a:t>dockernized</a:t>
+            </a:r>
+            <a:r>
+              <a:rPr lang="en-US" dirty="0"/>
+              <a:t>” VMs.</a:t>
+            </a:r>
+          </a:p>
+          <a:p>
+            <a:pPr marL="342900" indent="-342900">
+              <a:buFont typeface="Arial" panose="020B0604020202020204" pitchFamily="34" charset="0"/>
+              <a:buChar char="•"/>
+            </a:pPr>
+            <a:endParaRPr lang="en-US" dirty="0"/>
+          </a:p>
+        </p:txBody>
+      </p:sp>
+      <p:sp>
+        <p:nvSpPr>
+          <p:cNvPr id="3" name="Text Placeholder 2">
+            <a:extLst>
+              <a:ext uri="{FF2B5EF4-FFF2-40B4-BE49-F238E27FC236}">
+                <a16:creationId xmlns:a16="http://schemas.microsoft.com/office/drawing/2014/main" id="{3D4FC62B-7787-4864-ABB8-D6F5D10C5F2B}"/>
+              </a:ext>
+            </a:extLst>
+          </p:cNvPr>
+          <p:cNvSpPr>
+            <a:spLocks noGrp="1"/>
+          </p:cNvSpPr>
+          <p:nvPr>
+            <p:ph type="body" sz="quarter" idx="12"/>
+          </p:nvPr>
+        </p:nvSpPr>
+        <p:spPr/>
+        <p:txBody>
+          <a:bodyPr/>
+          <a:lstStyle/>
+          <a:p>
+            <a:r>
+              <a:rPr lang="en-US" dirty="0"/>
+              <a:t>Notes</a:t>
+            </a:r>
+          </a:p>
+        </p:txBody>
+      </p:sp>
+    </p:spTree>
+    <p:extLst>
+      <p:ext uri="{BB962C8B-B14F-4D97-AF65-F5344CB8AC3E}">
+        <p14:creationId xmlns:p14="http://schemas.microsoft.com/office/powerpoint/2010/main" val="3471266635"/>
+      </p:ext>
+    </p:extLst>
+  </p:cSld>
+  <p:clrMapOvr>
+    <a:masterClrMapping/>
+  </p:clrMapOvr>
+</p:sld>
+</file>
+
+<file path=ppt/slides/slide67.xml><?xml version="1.0" encoding="utf-8"?>
+<p:sld xmlns:a="http://schemas.openxmlformats.org/drawingml/2006/main" xmlns:r="http://schemas.openxmlformats.org/officeDocument/2006/relationships" xmlns:p="http://schemas.openxmlformats.org/presentationml/2006/main">
+  <p:cSld>
+    <p:spTree>
+      <p:nvGrpSpPr>
+        <p:cNvPr id="1" name=""/>
+        <p:cNvGrpSpPr/>
+        <p:nvPr/>
+      </p:nvGrpSpPr>
+      <p:grpSpPr>
+        <a:xfrm>
+          <a:off x="0" y="0"/>
+          <a:ext cx="0" cy="0"/>
+          <a:chOff x="0" y="0"/>
+          <a:chExt cx="0" cy="0"/>
+        </a:xfrm>
+      </p:grpSpPr>
+      <p:sp>
+        <p:nvSpPr>
           <p:cNvPr id="2" name="Text Placeholder 1">
             <a:extLst>
               <a:ext uri="{FF2B5EF4-FFF2-40B4-BE49-F238E27FC236}">
@@ -33896,7 +34307,7 @@
 </p:sld>
 </file>
 
-<file path=ppt/slides/slide67.xml><?xml version="1.0" encoding="utf-8"?>
+<file path=ppt/slides/slide68.xml><?xml version="1.0" encoding="utf-8"?>
 <p:sld xmlns:a="http://schemas.openxmlformats.org/drawingml/2006/main" xmlns:r="http://schemas.openxmlformats.org/officeDocument/2006/relationships" xmlns:p="http://schemas.openxmlformats.org/presentationml/2006/main">
   <p:cSld>
     <p:spTree>

</xml_diff>